<commit_message>
Modify the project schedule
</commit_message>
<xml_diff>
--- a/Concept/Car-Project Schedule.pptx
+++ b/Concept/Car-Project Schedule.pptx
@@ -10887,8 +10887,8 @@
         </p:nvSpPr>
         <p:spPr>
           <a:xfrm>
-            <a:off x="4014489" y="3983355"/>
-            <a:ext cx="7175500" cy="203200"/>
+            <a:off x="7598467" y="3983355"/>
+            <a:ext cx="3594100" cy="203200"/>
           </a:xfrm>
           <a:prstGeom prst="roundRect">
             <a:avLst>
@@ -10965,7 +10965,7 @@
         <p:spPr>
           <a:xfrm>
             <a:off x="6702472" y="4250055"/>
-            <a:ext cx="4483100" cy="203200"/>
+            <a:ext cx="3594100" cy="203200"/>
           </a:xfrm>
           <a:prstGeom prst="roundRect">
             <a:avLst>
@@ -11658,7 +11658,7 @@
         <p:spPr>
           <a:xfrm>
             <a:off x="2057400" y="3048000"/>
-            <a:ext cx="8318500" cy="381000"/>
+            <a:ext cx="8382000" cy="381000"/>
           </a:xfrm>
           <a:prstGeom prst="roundRect">
             <a:avLst>
@@ -11734,7 +11734,7 @@
         </p:nvSpPr>
         <p:spPr>
           <a:xfrm>
-            <a:off x="4014489" y="3983355"/>
+            <a:off x="7598467" y="3983355"/>
             <a:ext cx="0" cy="0"/>
           </a:xfrm>
           <a:prstGeom prst="roundRect">
@@ -12524,7 +12524,7 @@
         </p:nvSpPr>
         <p:spPr>
           <a:xfrm>
-            <a:off x="12700" y="-271991"/>
+            <a:off x="12700" y="-356629"/>
             <a:ext cx="0" cy="0"/>
           </a:xfrm>
           <a:prstGeom prst="rect">
@@ -12559,7 +12559,7 @@
         </p:nvSpPr>
         <p:spPr>
           <a:xfrm>
-            <a:off x="12700" y="-271991"/>
+            <a:off x="12700" y="-356629"/>
             <a:ext cx="0" cy="0"/>
           </a:xfrm>
           <a:prstGeom prst="rect">
@@ -12639,7 +12639,7 @@
         </p:nvSpPr>
         <p:spPr>
           <a:xfrm>
-            <a:off x="12700" y="-271991"/>
+            <a:off x="12700" y="-356629"/>
             <a:ext cx="0" cy="169277"/>
           </a:xfrm>
           <a:prstGeom prst="rect">
@@ -12674,7 +12674,7 @@
         </p:nvSpPr>
         <p:spPr>
           <a:xfrm>
-            <a:off x="10313708" y="3429000"/>
+            <a:off x="10376438" y="3429000"/>
             <a:ext cx="114300" cy="127000"/>
           </a:xfrm>
           <a:prstGeom prst="triangle">
@@ -12740,7 +12740,7 @@
         </p:nvSpPr>
         <p:spPr>
           <a:xfrm>
-            <a:off x="10188008" y="3556000"/>
+            <a:off x="10250739" y="3556000"/>
             <a:ext cx="368300" cy="186055"/>
           </a:xfrm>
           <a:prstGeom prst="rect">
@@ -12756,7 +12756,7 @@
           <a:p>
             <a:pPr algn="ctr"/>
             <a:r>
-              <a:rPr lang="en-US" sz="1200" spc="-14" smtClean="0">
+              <a:rPr lang="en-US" sz="1200" spc="-12" smtClean="0">
                 <a:solidFill>
                   <a:schemeClr val="dk1"/>
                 </a:solidFill>
@@ -12764,7 +12764,7 @@
               </a:rPr>
               <a:t>Today</a:t>
             </a:r>
-            <a:endParaRPr lang="en-US" sz="1200" spc="-14">
+            <a:endParaRPr lang="en-US" sz="1200" spc="-12">
               <a:solidFill>
                 <a:schemeClr val="dk1"/>
               </a:solidFill>
@@ -12786,7 +12786,7 @@
         <p:spPr>
           <a:xfrm>
             <a:off x="2286000" y="3145473"/>
-            <a:ext cx="341760" cy="186055"/>
+            <a:ext cx="348172" cy="186055"/>
           </a:xfrm>
           <a:prstGeom prst="rect">
             <a:avLst/>
@@ -13225,8 +13225,8 @@
         </p:nvSpPr>
         <p:spPr>
           <a:xfrm>
-            <a:off x="12700" y="-233521"/>
-            <a:ext cx="330200" cy="165100"/>
+            <a:off x="12700" y="-227915"/>
+            <a:ext cx="330200" cy="153888"/>
           </a:xfrm>
           <a:prstGeom prst="rect">
             <a:avLst/>
@@ -13246,7 +13246,7 @@
                 </a:solidFill>
                 <a:latin typeface="Calibri" panose="020F0502020204030204" pitchFamily="34" charset="0"/>
               </a:rPr>
-              <a:t>5 days</a:t>
+              <a:t>3 days</a:t>
             </a:r>
             <a:endParaRPr lang="en-US" sz="1000">
               <a:solidFill>
@@ -13340,8 +13340,8 @@
         </p:nvSpPr>
         <p:spPr>
           <a:xfrm>
-            <a:off x="3646062" y="4007443"/>
-            <a:ext cx="330200" cy="155025"/>
+            <a:off x="7165651" y="4007443"/>
+            <a:ext cx="393700" cy="155025"/>
           </a:xfrm>
           <a:prstGeom prst="rect">
             <a:avLst/>
@@ -13362,7 +13362,7 @@
                 </a:solidFill>
                 <a:latin typeface="Calibri" panose="020F0502020204030204" pitchFamily="34" charset="0"/>
               </a:rPr>
-              <a:t>May 7</a:t>
+              <a:t>May 11</a:t>
             </a:r>
             <a:endParaRPr lang="en-US" sz="1000" spc="-8">
               <a:solidFill>
@@ -13430,7 +13430,7 @@
         </p:nvSpPr>
         <p:spPr>
           <a:xfrm>
-            <a:off x="7096464" y="3999696"/>
+            <a:off x="8888453" y="3999696"/>
             <a:ext cx="1016000" cy="170519"/>
           </a:xfrm>
           <a:prstGeom prst="rect">
@@ -13635,7 +13635,7 @@
         </p:nvSpPr>
         <p:spPr>
           <a:xfrm>
-            <a:off x="11232623" y="4274143"/>
+            <a:off x="10336628" y="4274143"/>
             <a:ext cx="393700" cy="155025"/>
           </a:xfrm>
           <a:prstGeom prst="rect">
@@ -13657,7 +13657,7 @@
                 </a:solidFill>
                 <a:latin typeface="Calibri" panose="020F0502020204030204" pitchFamily="34" charset="0"/>
               </a:rPr>
-              <a:t>May 14</a:t>
+              <a:t>May 13</a:t>
             </a:r>
             <a:endParaRPr lang="en-US" sz="1000" spc="-8">
               <a:solidFill>
@@ -13680,7 +13680,7 @@
         </p:nvSpPr>
         <p:spPr>
           <a:xfrm>
-            <a:off x="8633707" y="4266396"/>
+            <a:off x="8185710" y="4266396"/>
             <a:ext cx="622300" cy="170519"/>
           </a:xfrm>
           <a:prstGeom prst="rect">
@@ -16441,7 +16441,7 @@
 
 <file path=ppt/tags/tag125.xml><?xml version="1.0" encoding="utf-8"?>
 <p:tagLst xmlns:a="http://schemas.openxmlformats.org/drawingml/2006/main" xmlns:r="http://schemas.openxmlformats.org/officeDocument/2006/relationships" xmlns:p="http://schemas.openxmlformats.org/presentationml/2006/main">
-  <p:tag name="__PART_0" val="eyIkaWQiOiIxIiwiX3N3aW1sYW5lc1YyIjpbeyIkaWQiOiIyIiwiX2FjdGl2aXRpZXMiOlt7IiRpZCI6IjMiLCJfcm93cyI6W3siJGlkIjoiNCIsIl90YXNrcyI6W3siJGlkIjoiNSIsIl9hdHRhY2hlZE1pbGVzdG9uZXMiOltdLCJUYXNrRGVmaW5pdGlvbiI6eyIkaWQiOiI2IiwiR3JvdXBOYW1lIjpudWxsLCJTdGFydERhdGUiOiIyMDIyLTA1LTA3VDAwOjAwOjAwWiIsIkVuZERhdGUiOiIyMDIyLTA1LTE0VDIzOjU5OjAwWiIsIlBlcmNlbnRhZ2VDb21wbGV0ZSI6bnVsbCwiU3R5bGUiOnsiJGlkIjoiNyIsIlNoYXBlIjoyLCJTaGFwZVRoaWNrbmVzcyI6MSwiRHVyYXRpb25Gb3JtYXQiOjAsIkluY2x1ZGVOb25Xb3JraW5nRGF5c0luRHVyYXRpb24iOmZhbHNlLCJQZXJjZW50YWdlQ29tcGxldGVTdHlsZSI6eyIkaWQiOiI4IiwiRm9udFNldHRpbmdzIjp7IiRpZCI6IjkiLCJGb250U2l6ZSI6MTAsIkZvbnROYW1lIjoiQ2FsaWJyaSIsIklzQm9sZCI6ZmFsc2UsIklzSXRhbGljIjpmYWxzZSwiSXNVbmRlcmxpbmVkIjpmYWxzZSwiUGFyZW50U3R5bGUiOm51bGx9LCJBdXRvU2l6ZSI6MCwiRm9yZWdyb3VuZCI6eyIkaWQiOiIxMCIsIkNvbG9yIjp7IiRpZCI6IjExIiwiQSI6MjU1LCJSIjoyMzcsIkciOjEyNSwiQiI6NDl9fSwiTWF4V2lkdGgiOjIwMC4wLCJNYXhIZWlnaHQiOiJJbmZpbml0eSIsIlNtYXJ0Rm9yZWdyb3VuZElzQWN0aXZlIjpmYWxzZSwiSG9yaXpvbnRhbEFsaWdubWVudCI6MCwiVmVydGljYWxBbGlnbm1lbnQiOjAsIlNtYXJ0Rm9yZWdyb3VuZCI6bnVsbCwiQmFja2dyb3VuZEZpbGxUeXBlIjowLCJNYXJnaW4iOnsiJGlkIjoiMTIiLCJUb3AiOjAuMCwiTGVmdCI6MC4wLCJSaWdodCI6MC4wLCJCb3R0b20iOjAuMH0sIlBhZGRpbmciOnsiJGlkIjoiMTMiLCJUb3AiOjAuMCwiTGVmdCI6MC4wLCJSaWdodCI6MC4wLCJCb3R0b20iOjAuMH0sIkJhY2tncm91bmQiOnsiJGlkIjoiMTQiLCJDb2xvciI6eyIkaWQiOiIxNSIsIkEiOjg5LCJSIjowLCJHIjowLCJCIjowfX0sIklzVmlzaWJsZSI6dHJ1ZSwiV2lkdGgiOjAuMCwiSGVpZ2h0IjowLjAsIkJvcmRlclN0eWxlIjp7IiRpZCI6IjE2IiwiTGluZUNvbG9yIjpudWxsLCJMaW5lV2VpZ2h0IjowLjAsIkxpbmVUeXBlIjowLCJQYXJlbnRTdHlsZSI6bnVsbH0sIlBhcmVudFN0eWxlIjpudWxsfSwiRHVyYXRpb25TdHlsZSI6eyIkaWQiOiIxNyIsIkZvbnRTZXR0aW5ncyI6eyIkaWQiOiIxOCIsIkZvbnRTaXplIjoxMCwiRm9udE5hbWUiOiJDYWxpYnJpIiwiSXNCb2xkIjpmYWxzZSwiSXNJdGFsaWMiOmZhbHNlLCJJc1VuZGVybGluZWQiOmZhbHNlLCJQYXJlbnRTdHlsZSI6bnVsbH0sIkF1dG9TaXplIjowLCJGb3JlZ3JvdW5kIjp7IiRpZCI6IjE5IiwiQ29sb3IiOnsiJGlkIjoiMjAiLCJBIjoyNTUsIlIiOjIzNywiRyI6MTI1LCJCIjo0OX19LCJNYXhXaWR0aCI6MjAwLjAsIk1heEhlaWdodCI6IkluZmluaXR5IiwiU21hcnRGb3JlZ3JvdW5kSXNBY3RpdmUiOmZhbHNlLCJIb3Jpem9udGFsQWxpZ25tZW50IjowLCJWZXJ0aWNhbEFsaWdubWVudCI6MCwiU21hcnRGb3JlZ3JvdW5kIjpudWxsLCJCYWNrZ3JvdW5kRmlsbFR5cGUiOjAsIk1hcmdpbiI6eyIkaWQiOiIyMSIsIlRvcCI6MC4wLCJMZWZ0IjowLjAsIlJpZ2h0IjowLjAsIkJvdHRvbSI6MC4wfSwiUGFkZGluZyI6eyIkaWQiOiIyMiIsIlRvcCI6MC4wLCJMZWZ0IjowLjAsIlJpZ2h0IjowLjAsIkJvdHRvbSI6MC4wfSwiQmFja2dyb3VuZCI6eyIkaWQiOiIyMyIsIkNvbG9yIjp7IiRyZWYiOiIxNSJ9fSwiSXNWaXNpYmxlIjp0cnVlLCJXaWR0aCI6MC4wLCJIZWlnaHQiOjAuMCwiQm9yZGVyU3R5bGUiOnsiJGlkIjoiMjQiLCJMaW5lQ29sb3IiOm51bGwsIkxpbmVXZWlnaHQiOjAuMCwiTGluZVR5cGUiOjAsIlBhcmVudFN0eWxlIjpudWxsfSwiUGFyZW50U3R5bGUiOm51bGx9LCJIb3Jpem9udGFsQ29ubmVjdG9yU3R5bGUiOnsiJGlkIjoiMjUiLCJMaW5lQ29sb3IiOnsiJGlkIjoiMjYiLCIkdHlwZSI6Ik5MUkUuQ29tbW9uLkRvbS5Tb2xpZENvbG9yQnJ1c2gsIE5MUkUuQ29tbW9uIiwiQ29sb3IiOnsiJGlkIjoiMjciLCJBIjoyNTUsIlIiOjIwNCwiRyI6MjA0LCJCIjoyMDR9fSwiTGluZVdlaWdodCI6MS4wLCJMaW5lVHlwZSI6MCwiUGFyZW50U3R5bGUiOm51bGx9LCJWZXJ0aWNhbENvbm5lY3RvclN0eWxlIjp7IiRpZCI6IjI4IiwiTGluZUNvbG9yIjp7IiRpZCI6IjI5IiwiJHR5cGUiOiJOTFJFLkNvbW1vbi5Eb20uU29saWRDb2xvckJydXNoLCBOTFJFLkNvbW1vbiIsIkNvbG9yIjp7IiRpZCI6IjMwIiwiQSI6MjU1LCJSIjoyMDQsIkciOjIwNCwiQiI6MjA0fX0sIkxpbmVXZWlnaHQiOjAuMCwiTGluZVR5cGUiOjAsIlBhcmVudFN0eWxlIjpudWxsfSwiTWFyZ2luIjpudWxsLCJTdGFydERhdGVQb3NpdGlvbiI6MywiRW5kRGF0ZVBvc2l0aW9uIjo0LCJEYXRlSXNWaXNpYmxlIjp0cnVlLCJUaXRsZVBvc2l0aW9uIjoyLCJEdXJhdGlvblBvc2l0aW9uIjo2LCJQZXJjZW50YWdlQ29tcGxldGVkUG9zaXRpb24iOjYsIlNwYWNpbmciOjUsIklzQmVsb3dUaW1lYmFuZCI6dHJ1ZSwiUGVyY2VudGFnZUNvbXBsZXRlU2hhcGVPcGFjaXR5IjozNSwiU2hhcGVTdHlsZSI6eyIkaWQiOiIzMSIsIk1hcmdpbiI6eyIkaWQiOiIzMiIsIlRvcCI6MC4wLCJMZWZ0Ijo0LjAsIlJpZ2h0Ijo0LjAsIkJvdHRvbSI6MC4wfSwiUGFkZGluZyI6eyIkaWQiOiIzMyIsIlRvcCI6MC4wLCJMZWZ0IjowLjAsIlJpZ2h0IjowLjAsIkJvdHRvbSI6MC4wfSwiQmFja2dyb3VuZCI6eyIkaWQiOiIzNCIsIkNvbG9yIjp7IiRpZCI6IjM1IiwiQSI6MjU1LCJSIjo5MSwiRyI6MTU1LCJCIjoyMTN9fSwiSXNWaXNpYmxlIjp0cnVlLCJXaWR0aCI6MC4wLCJIZWlnaHQiOjE2LjAsIkJvcmRlclN0eWxlIjp7IiRpZCI6IjM2IiwiTGluZUNvbG9yIjp7IiRpZCI6IjM3IiwiJHR5cGUiOiJOTFJFLkNvbW1vbi5Eb20uU29saWRDb2xvckJydXNoLCBOTFJFLkNvbW1vbiIsIkNvbG9yIjp7IiRpZCI6IjM4IiwiQSI6MjU1LCJSIjoyNTUsIkciOjAsIkIiOjB9fSwiTGluZVdlaWdodCI6MC4wLCJMaW5lVHlwZSI6MCwiUGFyZW50U3R5bGUiOm51bGx9LCJQYXJlbnRTdHlsZSI6bnVsbH0sIlRpdGxlU3R5bGUiOnsiJGlkIjoiMzkiLCJGb250U2V0dGluZ3MiOnsiJGlkIjoiNDAiLCJGb250U2l6ZSI6MTEsIkZvbnROYW1lIjoiQ2FsaWJyaSIsIklzQm9sZCI6dHJ1ZSwiSXNJdGFsaWMiOmZhbHNlLCJJc1VuZGVybGluZWQiOmZhbHNlLCJQYXJlbnRTdHlsZSI6bnVsbH0sIkF1dG9TaXplIjowLCJGb3JlZ3JvdW5kIjp7IiRpZCI6IjQxIiwiQ29sb3IiOnsiJGlkIjoiNDIiLCJBIjoyNTUsIlIiOjAsIkciOjAsIkIiOjB9fSwiTWF4V2lkdGgiOjcyMC4wLCJNYXhIZWlnaHQiOiJJbmZpbml0eSIsIlNtYXJ0Rm9yZWdyb3VuZElzQWN0aXZlIjpmYWxzZSwiSG9yaXpvbnRhbEFsaWdubWVudCI6MSwiVmVydGljYWxBbGlnbm1lbnQiOjAsIlNtYXJ0Rm9yZWdyb3VuZCI6bnVsbCwiQmFja2dyb3VuZEZpbGxUeXBlIjowLCJNYXJnaW4iOnsiJGlkIjoiNDMiLCJUb3AiOjAuMCwiTGVmdCI6MC4wLCJSaWdodCI6MC4wLCJCb3R0b20iOjAuMH0sIlBhZGRpbmciOnsiJGlkIjoiNDQiLCJUb3AiOjAuMCwiTGVmdCI6MC4wLCJSaWdodCI6MC4wLCJCb3R0b20iOjAuMH0sIkJhY2tncm91bmQiOnsiJGlkIjoiNDUiLCJDb2xvciI6eyIkaWQiOiI0NiIsIkEiOjAsIlIiOjI1NSwiRyI6MjU1LCJCIjoyNTV9fSwiSXNWaXNpYmxlIjp0cnVlLCJXaWR0aCI6MC4wLCJIZWlnaHQiOjAuMCwiQm9yZGVyU3R5bGUiOnsiJGlkIjoiNDciLCJMaW5lQ29sb3IiOm51bGwsIkxpbmVXZWlnaHQiOjAuMCwiTGluZVR5cGUiOjAsIlBhcmVudFN0eWxlIjpudWxsfSwiUGFyZW50U3R5bGUiOm51bGx9LCJEYXRlU3R5bGUiOnsiJGlkIjoiNDgiLCJGb250U2V0dGluZ3MiOnsiJGlkIjoiNDkiLCJGb250U2l6ZSI6MTAsIkZvbnROYW1lIjoiQ2FsaWJyaSIsIklzQm9sZCI6ZmFsc2UsIklzSXRhbGljIjpmYWxzZSwiSXNVbmRlcmxpbmVkIjpmYWxzZSwiUGFyZW50U3R5bGUiOm51bGx9LCJBdXRvU2l6ZSI6MCwiRm9yZWdyb3VuZCI6eyIkaWQiOiI1MCIsIkNvbG9yIjp7IiRpZCI6IjUxIiwiQSI6MjU1LCJSIjo2OCwiRyI6ODQsIkIiOjEwNn19LCJNYXhXaWR0aCI6MjAwLjAsIk1heEhlaWdodCI6IkluZmluaXR5IiwiU21hcnRGb3JlZ3JvdW5kSXNBY3RpdmUiOmZhbHNlLCJIb3Jpem9udGFsQWxpZ25tZW50IjoxLCJWZXJ0aWNhbEFsaWdubWVudCI6MCwiU21hcnRGb3JlZ3JvdW5kIjpudWxsLCJCYWNrZ3JvdW5kRmlsbFR5cGUiOjAsIk1hcmdpbiI6eyIkaWQiOiI1MiIsIlRvcCI6MC4wLCJMZWZ0IjowLjAsIlJpZ2h0IjowLjAsIkJvdHRvbSI6MC4wfSwiUGFkZGluZyI6eyIkaWQiOiI1MyIsIlRvcCI6MC4wLCJMZWZ0IjowLjAsIlJpZ2h0IjowLjAsIkJvdHRvbSI6MC4wfSwiQmFja2dyb3VuZCI6eyIkaWQiOiI1NCIsIkNvbG9yIjp7IiRpZCI6IjU1IiwiQSI6MCwiUiI6MjU1LCJHIjoyNTUsIkIiOjI1NX19LCJJc1Zpc2libGUiOnRydWUsIldpZHRoIjowLjAsIkhlaWdodCI6MC4wLCJCb3JkZXJTdHlsZSI6eyIkaWQiOiI1NiIsIkxpbmVDb2xvciI6bnVsbCwiTGluZVdlaWdodCI6MC4wLCJMaW5lVHlwZSI6MCwiUGFyZW50U3R5bGUiOm51bGx9LCJQYXJlbnRTdHlsZSI6bnVsbH0sIkRhdGVGb3JtYXQiOnsiJGlkIjoiNTciLCJGb3JtYXRTdHJpbmciOiJNTU0gZCIsIlNlcGFyYXRvciI6Ii8iLCJVc2VJbnRlcm5hdGlvbmFsRGF0ZUZvcm1hdCI6ZmFsc2UsIkRhdGVJc1Zpc2libGUiOnRydWUsIlRpbWVJc1Zpc2libGUiOmZhbHNlLCJIb3VyRGlnaXRzIjoxLCJBbVBtRGVzaWduYXRvciI6MiwiVHJpbTAwTWludXRlcyI6ZmFsc2UsIkxhc3RLbm93blZpc2liaWxpdHlTdGF0ZSI6bnVsbH0sIldlZWtOdW1iZXJpbmciOnsiJGlkIjoiNTgiLCJGb3JtYXQiOjAsIklzVmlzaWJsZSI6ZmFsc2UsIkxhc3RLbm93blZpc2liaWxpdHlTdGF0ZSI6ZmFsc2V9LCJJc1Zpc2libGUiOnRydWUsIlBhcmVudFN0eWxlIjpudWxsfSwiSW5kZXgiOjEsIlNtYXJ0RHVyYXRpb25BY3RpdmF0ZWQiOmZhbHNlLCJEYXRlRm9ybWF0Ijp7IiRyZWYiOiI1NyJ9LCJXZWVrTnVtYmVyaW5nIjp7IiRpZCI6IjU5IiwiRm9ybWF0IjowLCJJc1Zpc2libGUiOmZhbHNlLCJMYXN0S25vd25WaXNpYmlsaXR5U3RhdGUiOmZhbHNlfSwiSWQiOiIwMTk0YjRhYy04MGQzLTQ2NWEtODJmNi03NjE4NjYwNjM5ZTciLCJJbXBvcnRJZCI6bnVsbCwiVGl0bGUiOiJSZWdpc3RyYXRpb24gUGFnZSIsIk5vdGUiOm51bGwsIkh5cGVybGluayI6eyIkaWQiOiI2MCIsIkFkZHJlc3MiOiIiLCJTdWJBZGRyZXNzIjoiIn0sIklzQ2hhbmdlZCI6ZmFsc2UsIklzTmV3IjpmYWxzZX19XSwiX21pbGVzdG9uZXMiOltdLCJJZCI6IjAwMDAwMDAwLTAwMDAtMDAwMC0wMDAwLTAwMDAwMDAwMDAwMCIsIklzU2luZ2xlSXRlbVJvdyI6dHJ1ZX0seyIkaWQiOiI2MSIsIl90YXNrcyI6W3siJGlkIjoiNjIiLCJfYXR0YWNoZWRNaWxlc3RvbmVzIjpbXSwiVGFza0RlZmluaXRpb24iOnsiJGlkIjoiNjMiLCJHcm91cE5hbWUiOm51bGwsIlN0YXJ0RGF0ZSI6IjIwMjItMDUtMTBUMDA6MDA6MDBaIiwiRW5kRGF0ZSI6IjIwMjItMDUtMTRUMjM6NTk6MDBaIiwiUGVyY2VudGFnZUNvbXBsZXRlIjpudWxsLCJTdHlsZSI6eyIkaWQiOiI2NCIsIlNoYXBlIjoyLCJTaGFwZVRoaWNrbmVzcyI6MSwiRHVyYXRpb25Gb3JtYXQiOjAsIkluY2x1ZGVOb25Xb3JraW5nRGF5c0luRHVyYXRpb24iOmZhbHNlLCJQZXJjZW50YWdlQ29tcGxldGVTdHlsZSI6eyIkaWQiOiI2NSIsIkZvbnRTZXR0aW5ncyI6eyIkaWQiOiI2NiIsIkZvbnRTaXplIjoxMCwiRm9udE5hbWUiOiJDYWxpYnJpIiwiSXNCb2xkIjpmYWxzZSwiSXNJdGFsaWMiOmZhbHNlLCJJc1VuZGVybGluZWQiOmZhbHNlLCJQYXJlbnRTdHlsZSI6bnVsbH0sIkF1dG9TaXplIjowLCJGb3JlZ3JvdW5kIjp7IiRyZWYiOiIxMCJ9LCJNYXhXaWR0aCI6MjAwLjAsIk1heEhlaWdodCI6IkluZmluaXR5IiwiU21hcnRGb3JlZ3JvdW5kSXNBY3RpdmUiOmZhbHNlLCJIb3Jpem9udGFsQWxpZ25tZW50IjowLCJWZXJ0aWNhbEFsaWdubWVudCI6MCwiU21hcnRGb3JlZ3JvdW5kIjpudWxsLCJCYWNrZ3JvdW5kRmlsbFR5cGUiOjAsIk1hcmdpbiI6eyIkcmVmIjoiMTIifSwiUGFkZGluZyI6eyIkcmVmIjoiMTMifSwiQmFja2dyb3VuZCI6eyIkcmVmIjoiMTQifSwiSXNWaXNpYmxlIjp0cnVlLCJXaWR0aCI6MC4wLCJIZWlnaHQiOjAuMCwiQm9yZGVyU3R5bGUiOnsiJGlkIjoiNjciLCJMaW5lQ29sb3IiOm51bGwsIkxpbmVXZWlnaHQiOjAuMCwiTGluZVR5cGUiOjAsIlBhcmVudFN0eWxlIjpudWxsfSwiUGFyZW50U3R5bGUiOm51bGx9LCJEdXJhdGlvblN0eWxlIjp7IiRpZCI6IjY4IiwiRm9udFNldHRpbmdzIjp7IiRpZCI6IjY5IiwiRm9udFNpemUiOjEwLCJGb250TmFtZSI6IkNhbGlicmkiLCJJc0JvbGQiOmZhbHNlLCJJc0l0YWxpYyI6ZmFsc2UsIklzVW5kZXJsaW5lZCI6ZmFsc2UsIlBhcmVudFN0eWxlIjpudWxsfSwiQXV0b1NpemUiOjAsIkZvcmVncm91bmQiOnsiJHJlZiI6IjE5In0sIk1heFdpZHRoIjoyMDAuMCwiTWF4SGVpZ2h0IjoiSW5maW5pdHkiLCJTbWFydEZvcmVncm91bmRJc0FjdGl2ZSI6ZmFsc2UsIkhvcml6b250YWxBbGlnbm1lbnQiOjAsIlZlcnRpY2FsQWxpZ25tZW50IjowLCJTbWFydEZvcmVncm91bmQiOm51bGwsIkJhY2tncm91bmRGaWxsVHlwZSI6MCwiTWFyZ2luIjp7IiRyZWYiOiIyMSJ9LCJQYWRkaW5nIjp7IiRyZWYiOiIyMiJ9LCJCYWNrZ3JvdW5kIjp7IiRyZWYiOiIyMyJ9LCJJc1Zpc2libGUiOnRydWUsIldpZHRoIjowLjAsIkhlaWdodCI6MC4wLCJCb3JkZXJTdHlsZSI6eyIkaWQiOiI3MCIsIkxpbmVDb2xvciI6bnVsbCwiTGluZVdlaWdodCI6MC4wLCJMaW5lVHlwZSI6MCwiUGFyZW50U3R5bGUiOm51bGx9LCJQYXJlbnRTdHlsZSI6bnVsbH0sIkhvcml6b250YWxDb25uZWN0b3JTdHlsZSI6eyIkaWQiOiI3MSIsIkxpbmVDb2xvciI6eyIkcmVmIjoiMjYifSwiTGluZVdlaWdodCI6MS4wLCJMaW5lVHlwZSI6MCwiUGFyZW50U3R5bGUiOm51bGx9LCJWZXJ0aWNhbENvbm5lY3RvclN0eWxlIjp7IiRpZCI6IjcyIiwiTGluZUNvbG9yIjp7IiRyZWYiOiIyOSJ9LCJMaW5lV2VpZ2h0IjowLjAsIkxpbmVUeXBlIjowLCJQYXJlbnRTdHlsZSI6bnVsbH0sIk1hcmdpbiI6bnVsbCwiU3RhcnREYXRlUG9zaXRpb24iOjMsIkVuZERhdGVQb3NpdGlvbiI6NCwiRGF0ZUlzVmlzaWJsZSI6dHJ1ZSwiVGl0bGVQb3NpdGlvbiI6MiwiRHVyYXRpb25Qb3NpdGlvbiI6NiwiUGVyY2VudGFnZUNvbXBsZXRlZFBvc2l0aW9uIjo2LCJTcGFjaW5nIjo1LCJJc0JlbG93VGltZWJhbmQiOnRydWUsIlBlcmNlbnRhZ2VDb21wbGV0ZVNoYXBlT3BhY2l0eSI6MzUsIlNoYXBlU3R5bGUiOnsiJGlkIjoiNzMiLCJNYXJnaW4iOnsiJHJlZiI6IjMyIn0sIlBhZGRpbmciOnsiJHJlZiI6IjMzIn0sIkJhY2tncm91bmQiOnsiJGlkIjoiNzQiLCJDb2xvciI6eyIkaWQiOiI3NSIsIkEiOjI1NSwiUiI6OTEsIkciOjE1NSwiQiI6MjEzfX0sIklzVmlzaWJsZSI6dHJ1ZSwiV2lkdGgiOjAuMCwiSGVpZ2h0IjoxNi4wLCJCb3JkZXJTdHlsZSI6eyIkaWQiOiI3NiIsIkxpbmVDb2xvciI6eyIkcmVmIjoiMzcifSwiTGluZVdlaWdodCI6MC4wLCJMaW5lVHlwZSI6MCwiUGFyZW50U3R5bGUiOm51bGx9LCJQYXJlbnRTdHlsZSI6bnVsbH0sIlRpdGxlU3R5bGUiOnsiJGlkIjoiNzciLCJGb250U2V0dGluZ3MiOnsiJGlkIjoiNzgiLCJGb250U2l6ZSI6MTEsIkZvbnROYW1lIjoiQ2FsaWJyaSIsIklzQm9sZCI6dHJ1ZSwiSXNJdGFsaWMiOmZhbHNlLCJJc1VuZGVybGluZWQiOmZhbHNlLCJQYXJlbnRTdHlsZSI6bnVsbH0sIkF1dG9TaXplIjowLCJGb3JlZ3JvdW5kIjp7IiRpZCI6Ijc5IiwiQ29sb3IiOnsiJGlkIjoiODAiLCJBIjoyNTUsIlIiOjAsIkciOjAsIkIiOjB9fSwiTWF4V2lkdGgiOjcyMC4wLCJNYXhIZWlnaHQiOiJJbmZpbml0eSIsIlNtYXJ0Rm9yZWdyb3VuZElzQWN0aXZlIjpmYWxzZSwiSG9yaXpvbnRhbEFsaWdubWVudCI6MSwiVmVydGljYWxBbGlnbm1lbnQiOjAsIlNtYXJ0Rm9yZWdyb3VuZCI6bnVsbCwiQmFja2dyb3VuZEZpbGxUeXBlIjowLCJNYXJnaW4iOnsiJHJlZiI6IjQzIn0sIlBhZGRpbmciOnsiJHJlZiI6IjQ0In0sIkJhY2tncm91bmQiOnsiJGlkIjoiODEiLCJDb2xvciI6eyIkaWQiOiI4MiIsIkEiOjAsIlIiOjI1NSwiRyI6MjU1LCJCIjoyNTV9fSwiSXNWaXNpYmxlIjp0cnVlLCJXaWR0aCI6MC4wLCJIZWlnaHQiOjAuMCwiQm9yZGVyU3R5bGUiOnsiJGlkIjoiODMiLCJMaW5lQ29sb3IiOm51bGwsIkxpbmVXZWlnaHQiOjAuMCwiTGluZVR5cGUiOjAsIlBhcmVudFN0eWxlIjpudWxsfSwiUGFyZW50U3R5bGUiOm51bGx9LCJEYXRlU3R5bGUiOnsiJGlkIjoiODQiLCJGb250U2V0dGluZ3MiOnsiJGlkIjoiODUiLCJGb250U2l6ZSI6MTAsIkZvbnROYW1lIjoiQ2FsaWJyaSIsIklzQm9sZCI6ZmFsc2UsIklzSXRhbGljIjpmYWxzZSwiSXNVbmRlcmxpbmVkIjpmYWxzZSwiUGFyZW50U3R5bGUiOm51bGx9LCJBdXRvU2l6ZSI6MCwiRm9yZWdyb3VuZCI6eyIkaWQiOiI4NiIsIkNvbG9yIjp7IiRpZCI6Ijg3IiwiQSI6MjU1LCJSIjo2OCwiRyI6ODQsIkIiOjEwNn19LCJNYXhXaWR0aCI6MjAwLjAsIk1heEhlaWdodCI6IkluZmluaXR5IiwiU21hcnRGb3JlZ3JvdW5kSXNBY3RpdmUiOmZhbHNlLCJIb3Jpem9udGFsQWxpZ25tZW50IjoxLCJWZXJ0aWNhbEFsaWdubWVudCI6MCwiU21hcnRGb3JlZ3JvdW5kIjpudWxsLCJCYWNrZ3JvdW5kRmlsbFR5cGUiOjAsIk1hcmdpbiI6eyIkcmVmIjoiNTIifSwiUGFkZGluZyI6eyIkcmVmIjoiNTMifSwiQmFja2dyb3VuZCI6eyIkaWQiOiI4OCIsIkNvbG9yIjp7IiRpZCI6Ijg5IiwiQSI6MCwiUiI6MjU1LCJHIjoyNTUsIkIiOjI1NX19LCJJc1Zpc2libGUiOnRydWUsIldpZHRoIjowLjAsIkhlaWdodCI6MC4wLCJCb3JkZXJTdHlsZSI6eyIkaWQiOiI5MCIsIkxpbmVDb2xvciI6bnVsbCwiTGluZVdlaWdodCI6MC4wLCJMaW5lVHlwZSI6MCwiUGFyZW50U3R5bGUiOm51bGx9LCJQYXJlbnRTdHlsZSI6bnVsbH0sIkRhdGVGb3JtYXQiOnsiJHJlZiI6IjU3In0sIldlZWtOdW1iZXJpbmciOnsiJGlkIjoiOTEiLCJGb3JtYXQiOjAsIklzVmlzaWJsZSI6ZmFsc2UsIkxhc3RLbm93blZpc2liaWxpdHlTdGF0ZSI6ZmFsc2V9LCJJc1Zpc2libGUiOnRydWUsIlBhcmVudFN0eWxlIjpudWxsfSwiSW5kZXgiOjIsIlNtYXJ0RHVyYXRpb25BY3RpdmF0ZWQiOmZhbHNlLCJEYXRlRm9ybWF0Ijp7IiRyZWYiOiI1NyJ9LCJXZWVrTnVtYmVyaW5nIjp7IiRpZCI6IjkyIiwiRm9ybWF0IjowLCJJc1Zpc2libGUiOmZhbHNlLCJMYXN0S25vd25WaXNpYmlsaXR5U3RhdGUiOmZhbHNlfSwiSWQiOiJjMjU5NGE2OC01MDg3LTQ2MTgtOWQxNS1mZWYxNjBmYjczOGQiLCJJbXBvcnRJZCI6bnVsbCwiVGl0bGUiOiJMb2dpbiBQYWdlIiwiTm90ZSI6bnVsbCwiSHlwZXJsaW5rIjp7IiRpZCI6IjkzIiwiQWRkcmVzcyI6IiIsIlN1YkFkZHJlc3MiOiIifSwiSXNDaGFuZ2VkIjpmYWxzZSwiSXNOZXciOmZhbHNlfX1dLCJfbWlsZXN0b25lcyI6W10sIklkIjoiMDAwMDAwMDAtMDAwMC0wMDAwLTAwMDAtMDAwMDAwMDAwMDAwIiwiSXNTaW5nbGVJdGVtUm93Ijp0cnVlfV0sIkluZGV4IjowLCJJZCI6ImE5NWFlMGE4LTgxYzAtNDdkYy1hYzM5LTMxZTZmNzIwMTYzNyIsIkhlYWRlclRleHQiOm51bGwsIklzRGVmYXVsdCI6dHJ1ZSwiU3R5bGUiOnsiJGlkIjoiOTQiLCJIZWFkZXJTdHlsZSI6eyIkaWQiOiI5NSIsIlRleHRTdHlsZSI6eyIkaWQiOiI5NiIsIkZvbnRTZXR0aW5ncyI6eyIkaWQiOiI5NyIsIkZvbnRTaXplIjoxMSwiRm9udE5hbWUiOiJDYWxpYnJpIiwiSXNCb2xkIjpmYWxzZSwiSXNJdGFsaWMiOmZhbHNlLCJJc1VuZGVybGluZWQiOmZhbHNlLCJQYXJlbnRTdHlsZSI6bnVsbH0sIkF1dG9TaXplIjoyLCJGb3JlZ3JvdW5kIjp7IiRpZCI6Ijk4IiwiQ29sb3IiOnsiJGlkIjoiOTkiLCJBIjoyNTUsIlIiOjAsIkciOjAsIkIiOjB9fSwiTWF4V2lkdGgiOjAuMCwiTWF4SGVpZ2h0IjoiSW5maW5pdHkiLCJTbWFydEZvcmVncm91bmRJc0FjdGl2ZSI6ZmFsc2UsIkhvcml6b250YWxBbGlnbm1lbnQiOjAsIlZlcnRpY2FsQWxpZ25tZW50IjowLCJTbWFydEZvcmVncm91bmQiOm51bGwsIkJhY2tncm91bmRGaWxsVHlwZSI6MCwiTWFyZ2luIjp7IiRpZCI6IjEwMCIsIlRvcCI6MC4wLCJMZWZ0IjowLjAsIlJpZ2h0IjowLjAsIkJvdHRvbSI6MC4wfSwiUGFkZGluZyI6eyIkaWQiOiIxMDEiLCJUb3AiOjAuMCwiTGVmdCI6MC4wLCJSaWdodCI6MC4wLCJCb3R0b20iOjAuMH0sIkJhY2tncm91bmQiOm51bGwsIklzVmlzaWJsZSI6dHJ1ZSwiV2lkdGgiOjAuMCwiSGVpZ2h0IjowLjAsIkJvcmRlclN0eWxlIjpudWxsLCJQYXJlbnRTdHlsZSI6bnVsbH0sIlJlY3RhbmdsZVN0eWxlIjp7IiRpZCI6IjEwMiIsIk1hcmdpbiI6eyIkaWQiOiIxMDMiLCJUb3AiOjAuMCwiTGVmdCI6MC4wLCJSaWdodCI6MC4wLCJCb3R0b20iOjAuMH0sIlBhZGRpbmciOnsiJGlkIjoiMTA0IiwiVG9wIjowLjAsIkxlZnQiOjAuMCwiUmlnaHQiOjAuMCwiQm90dG9tIjowLjB9LCJCYWNrZ3JvdW5kIjp7IiRpZCI6IjEwNSIsIkNvbG9yIjp7IiRpZCI6IjEwNiIsIkEiOjYzLCJSIjo5MSwiRyI6MTU1LCJCIjoyMTN9fSwiSXNWaXNpYmxlIjp0cnVlLCJXaWR0aCI6MC4wLCJIZWlnaHQiOjAuMCwiQm9yZGVyU3R5bGUiOnsiJGlkIjoiMTA3IiwiTGluZUNvbG9yIjp7IiRpZCI6IjEwOCIsIiR0eXBlIjoiTkxSRS5Db21tb24uRG9tLlNvbGlkQ29sb3JCcnVzaCwgTkxSRS5Db21tb24iLCJDb2xvciI6eyIkaWQiOiIxMDkiLCJBIjoyNTUsIlIiOjI1NSwiRyI6MCwiQiI6MH19LCJMaW5lV2VpZ2h0IjowLjAsIkxpbmVUeXBlIjowLCJQYXJlbnRTdHlsZSI6bnVsbH0sIlBhcmVudFN0eWxlIjpudWxsfSwiTWFyZ2luIjp7IiRpZCI6IjExMCIsIlRvcCI6MC4wLCJMZWZ0IjowLjAsIlJpZ2h0IjowLjAsIkJvdHRvbSI6MC4wfSwiUGFkZGluZyI6eyIkaWQiOiIxMTEiLCJUb3AiOjAuMCwiTGVmdCI6MC4wLCJSaWdodCI6MC4wLCJCb3R0b20iOjAuMH0sIkJhY2tncm91bmQiOm51bGwsIklzVmlzaWJsZSI6dHJ1ZSwiV2lkdGgiOjAuMCwiSGVpZ2h0IjowLjAsIkJvcmRlclN0eWxlIjpudWxsLCJQYXJlbnRTdHlsZSI6bnVsbH0sIkJhY2tncm91bmRTdHlsZSI6eyIkaWQiOiIxMTIiLCJNYXJnaW4iOnsiJGlkIjoiMTEzIiwiVG9wIjowLjAsIkxlZnQiOjAuMCwiUmlnaHQiOjAuMCwiQm90dG9tIjowLjB9LCJQYWRkaW5nIjp7IiRpZCI6IjExNCIsIlRvcCI6MC4wLCJMZWZ0IjowLjAsIlJpZ2h0IjowLjAsIkJvdHRvbSI6MC4wfSwiQmFja2dyb3VuZCI6eyIkaWQiOiIxMTUiLCJDb2xvciI6eyIkaWQiOiIxMTYiLCJBIjo1MSwiUiI6MTY1LCJHIjoxNjUsIkIiOjE2NX19LCJJc1Zpc2libGUiOnRydWUsIldpZHRoIjowLjAsIkhlaWdodCI6MC4wLCJCb3JkZXJTdHlsZSI6eyIkaWQiOiIxMTciLCJMaW5lQ29sb3IiOnsiJGlkIjoiMTE4IiwiJHR5cGUiOiJOTFJFLkNvbW1vbi5Eb20uU29saWRDb2xvckJydXNoLCBOTFJFLkNvbW1vbiIsIkNvbG9yIjp7IiRpZCI6IjExOSIsIkEiOjI1NSwiUiI6MjU1LCJHIjowLCJCIjowfX0sIkxpbmVXZWlnaHQiOjAuMCwiTGluZVR5cGUiOjAsIlBhcmVudFN0eWxlIjpudWxsfSwiUGFyZW50U3R5bGUiOm51bGx9LCJNYXJnaW4iOnsiJGlkIjoiMTIwIiwiVG9wIjowLjAsIkxlZnQiOjAuMCwiUmlnaHQiOjAuMCwiQm90dG9tIjowLjB9LCJQYWRkaW5nIjp7IiRpZCI6IjEyMSIsIlRvcCI6MC4wLCJMZWZ0IjowLjAsIlJpZ2h0IjowLjAsIkJvdHRvbSI6MC4wfSwiSXNWaXNpYmxlIjpmYWxzZSwiV2lkdGgiOjAuMCwiSGVpZ2h0IjowLjAsIkJvcmRlclN0eWxlIjpudWxsLCJQYXJlbnRTdHlsZSI6bnVsbH19XSwiSWQiOiI5M2IwYjA4Zi1mZTBiLTQ3NjMtYmY0ZC1mOTM4ZjM4ZGY3MTciLCJJbmRleCI6MCwiSGVhZGVyVGV4dCI6IkF1dGhlbnRpY2F0aW9uIiwiU3R5bGUiOnsiJGlkIjoiMTIyIiwiSGVhZGVyU3R5bGUiOnsiJGlkIjoiMTIzIiwiVGV4dElzVmVydGljYWwiOmZhbHNlLCJUZXh0U3R5bGUiOnsiJGlkIjoiMTI0IiwiRm9udFNldHRpbmdzIjp7IiRpZCI6IjEyNSIsIkZvbnRTaXplIjoxMiwiRm9udE5hbWUiOiJDYWxpYnJpIiwiSXNCb2xkIjpmYWxzZSwiSXNJdGFsaWMiOmZhbHNlLCJJc1VuZGVybGluZWQiOmZhbHNlLCJQYXJlbnRTdHlsZSI6bnVsbH0sIkF1dG9TaXplIjoyLCJGb3JlZ3JvdW5kIjp7IiRpZCI6IjEyNiIsIkNvbG9yIjp7IiRpZCI6IjEyNyIsIkEiOjI1NSwiUiI6MjU1LCJHIjoyNTUsIkIiOjI1NX19LCJNYXhXaWR0aCI6MTYwLjAsIk1heEhlaWdodCI6IkluZmluaXR5IiwiU21hcnRGb3JlZ3JvdW5kSXNBY3RpdmUiOmZhbHNlLCJIb3Jpem9udGFsQWxpZ25tZW50IjowLCJWZXJ0aWNhbEFsaWdubWVudCI6MCwiU21hcnRGb3JlZ3JvdW5kIjpudWxsLCJCYWNrZ3JvdW5kRmlsbFR5cGUiOjAsIk1hcmdpbiI6eyIkaWQiOiIxMjgiLCJUb3AiOjAuMCwiTGVmdCI6MC4wLCJSaWdodCI6MC4wLCJCb3R0b20iOjAuMH0sIlBhZGRpbmciOnsiJGlkIjoiMTI5IiwiVG9wIjowLjAsIkxlZnQiOjAuMCwiUmlnaHQiOjAuMCwiQm90dG9tIjowLjB9LCJCYWNrZ3JvdW5kIjpudWxsLCJJc1Zpc2libGUiOnRydWUsIldpZHRoIjowLjAsIkhlaWdodCI6MC4wLCJCb3JkZXJTdHlsZSI6bnVsbCwiUGFyZW50U3R5bGUiOm51bGx9LCJSZWN0YW5nbGVTdHlsZSI6eyIkaWQiOiIxMzAiLCJNYXJnaW4iOnsiJGlkIjoiMTMxIiwiVG9wIjowLjAsIkxlZnQiOjAuMCwiUmlnaHQiOjAuMCwiQm90dG9tIjowLjB9LCJQYWRkaW5nIjp7IiRpZCI6IjEzMiIsIlRvcCI6MC4wLCJMZWZ0IjowLjAsIlJpZ2h0IjowLjAsIkJvdHRvbSI6MC4wfSwiQmFja2dyb3VuZCI6eyIkaWQiOiIxMzMiLCJDb2xvciI6eyIkaWQiOiIxMzQiLCJBIjoyNTUsIlIiOjkxLCJHIjoxNTUsIkIiOjIxM319LCJJc1Zpc2libGUiOnRydWUsIldpZHRoIjowLjAsIkhlaWdodCI6MC4wLCJCb3JkZXJTdHlsZSI6eyIkaWQiOiIxMzUiLCJMaW5lQ29sb3IiOnsiJGlkIjoiMTM2IiwiJHR5cGUiOiJOTFJFLkNvbW1vbi5Eb20uU29saWRDb2xvckJydXNoLCBOTFJFLkNvbW1vbiIsIkNvbG9yIjp7IiRpZCI6IjEzNyIsIkEiOjI1NSwiUiI6MjU1LCJHIjowLCJCIjowfX0sIkxpbmVXZWlnaHQiOjAuMCwiTGluZVR5cGUiOjAsIlBhcmVudFN0eWxlIjpudWxsfSwiUGFyZW50U3R5bGUiOm51bGx9LCJNYXJnaW4iOnsiJGlkIjoiMTM4IiwiVG9wIjowLjAsIkxlZnQiOjAuMCwiUmlnaHQiOjAuMCwiQm90dG9tIjowLjB9LCJQYWRkaW5nIjp7IiRpZCI6IjEzOSIsIlRvcCI6MC4wLCJMZWZ0IjowLjAsIlJpZ2h0IjowLjAsIkJvdHRvbSI6MC4wfSwiQmFja2dyb3VuZCI6bnVsbCwiSXNWaXNpYmxlIjp0cnVlLCJXaWR0aCI6MC4wLCJIZWlnaHQiOjAuMCwiQm9yZGVyU3R5bGUiOm51bGwsIlBhcmVudFN0eWxlIjpudWxsfSwiQmFja2dyb3VuZFN0eWxlIjp7IiRpZCI6IjE0MCIsIk1hcmdpbiI6eyIkaWQiOiIxNDEiLCJUb3AiOjAuMCwiTGVmdCI6MC4wLCJSaWdodCI6MC4wLCJCb3R0b20iOjAuMH0sIlBhZGRpbmciOnsiJGlkIjoiMTQyIiwiVG9wIjowLjAsIkxlZnQiOjAuMCwiUmlnaHQiOjAuMCwiQm90dG9tIjowLjB9LCJCYWNrZ3JvdW5kIjp7IiRpZCI6IjE0MyIsIkNvbG9yIjp7IiRpZCI6IjE0NCIsIkEiOjUxLCJSIjoxNjUsIkciOjE2NSwiQiI6MTY1fX0sIklzVmlzaWJsZSI6dHJ1ZSwiV2lkdGgiOjAuMCwiSGVpZ2h0IjowLjAsIkJvcmRlclN0eWxlIjp7IiRpZCI6IjE0NSIsIkxpbmVDb2xvciI6eyIkaWQiOiIxNDYiLCIkdHlwZSI6Ik5MUkUuQ29tbW9uLkRvbS5Tb2xpZENvbG9yQnJ1c2gsIE5MUkUuQ29tbW9uIiwiQ29sb3IiOnsiJGlkIjoiMTQ3IiwiQSI6MjU1LCJSIjoyNTUsIkciOjAsIkIiOjB9fSwiTGluZVdlaWdodCI6MC4wLCJMaW5lVHlwZSI6MCwiUGFyZW50U3R5bGUiOm51bGx9LCJQYXJlbnRTdHlsZSI6bnVsbH0sIklzQWJvdmVUaW1lYmFuZCI6ZmFsc2UsIk1hcmdpbiI6eyIkaWQiOiIxNDgiLCJUb3AiOjAuMCwiTGVmdCI6MC4wLCJSaWdodCI6MC4wLCJCb3R0b20iOjAuMH0sIlBhZGRpbmciOnsiJGlkIjoiMTQ5IiwiVG9wIjowLjAsIkxlZnQiOjAuMCwiUmlnaHQiOjAuMCwiQm90dG9tIjowLjB9LCJJc1Zpc2libGUiOnRydWUsIldpZHRoIjowLjAsIkhlaWdodCI6MC4wLCJCb3JkZXJTdHlsZSI6eyIkaWQiOiIxNTAiLCJMaW5lQ29sb3IiOm51bGwsIkxpbmVXZWlnaHQiOjAuMCwiTGluZVR5cGUiOjAsIlBhcmVudFN0eWxlIjpudWxsfSwiUGFyZW50U3R5bGUiOm51bGx9fSx7IiRpZCI6IjE1MSIsIl9hY3Rpdml0aWVzIjpbeyIkaWQiOiIxNTIiLCJfcm93cyI6W3siJGlkIjoiMTUzIiwiX3Rhc2tzIjpbeyIkaWQiOiIxNTQiLCJfYXR0YWNoZWRNaWxlc3RvbmVzIjpbXSwiVGFza0RlZmluaXRpb24iOnsiJGlkIjoiMTU1IiwiR3JvdXBOYW1lIjpudWxsLCJTdGFydERhdGUiOiIyMDIyLTA1LTA1VDAwOjAwOjAwWiIsIkVuZERhdGUiOiIyMDIyLTA1LTA2VDIzOjU5OjAwWiIsIlBlcmNlbnRhZ2VDb21wbGV0ZSI6bnVsbCwiU3R5bGUiOnsiJGlkIjoiMTU2IiwiU2hhcGUiOjIsIlNoYXBlVGhpY2tuZXNzIjoxLCJEdXJhdGlvbkZvcm1hdCI6MCwiSW5jbHVkZU5vbldvcmtpbmdEYXlzSW5EdXJhdGlvbiI6ZmFsc2UsIlBlcmNlbnRhZ2VDb21wbGV0ZVN0eWxlIjp7IiRpZCI6IjE1NyIsIkZvbnRTZXR0aW5ncyI6eyIkaWQiOiIxNTgiLCJGb250U2l6ZSI6MTAsIkZvbnROYW1lIjoiQ2FsaWJyaSIsIklzQm9sZCI6ZmFsc2UsIklzSXRhbGljIjpmYWxzZSwiSXNVbmRlcmxpbmVkIjpmYWxzZSwiUGFyZW50U3R5bGUiOm51bGx9LCJBdXRvU2l6ZSI6MCwiRm9yZWdyb3VuZCI6eyIkcmVmIjoiMTAifSwiTWF4V2lkdGgiOjIwMC4wLCJNYXhIZWlnaHQiOiJJbmZpbml0eSIsIlNtYXJ0Rm9yZWdyb3VuZElzQWN0aXZlIjpmYWxzZSwiSG9yaXpvbnRhbEFsaWdubWVudCI6MCwiVmVydGljYWxBbGlnbm1lbnQiOjAsIlNtYXJ0Rm9yZWdyb3VuZCI6bnVsbCwiQmFja2dyb3VuZEZpbGxUeXBlIjowLCJNYXJnaW4iOnsiJHJlZiI6IjEyIn0sIlBhZGRpbmciOnsiJHJlZiI6IjEzIn0sIkJhY2tncm91bmQiOnsiJHJlZiI6IjE0In0sIklzVmlzaWJsZSI6dHJ1ZSwiV2lkdGgiOjAuMCwiSGVpZ2h0IjowLjAsIkJvcmRlclN0eWxlIjp7IiRpZCI6IjE1OSIsIkxpbmVDb2xvciI6bnVsbCwiTGluZVdlaWdodCI6MC4wLCJMaW5lVHlwZSI6MCwiUGFyZW50U3R5bGUiOm51bGx9LCJQYXJlbnRTdHlsZSI6bnVsbH0sIkR1cmF0aW9uU3R5bGUiOnsiJGlkIjoiMTYwIiwiRm9udFNldHRpbmdzIjp7IiRpZCI6IjE2MSIsIkZvbnRTaXplIjoxMCwiRm9udE5hbWUiOiJDYWxpYnJpIiwiSXNCb2xkIjpmYWxzZSwiSXNJdGFsaWMiOmZhbHNlLCJJc1VuZGVybGluZWQiOmZhbHNlLCJQYXJlbnRTdHlsZSI6bnVsbH0sIkF1dG9TaXplIjowLCJGb3JlZ3JvdW5kIjp7IiRyZWYiOiIxOSJ9LCJNYXhXaWR0aCI6MjAwLjAsIk1heEhlaWdodCI6IkluZmluaXR5IiwiU21hcnRGb3JlZ3JvdW5kSXNBY3RpdmUiOmZhbHNlLCJIb3Jpem9udGFsQWxpZ25tZW50IjowLCJWZXJ0aWNhbEFsaWdubWVudCI6MCwiU21hcnRGb3JlZ3JvdW5kIjpudWxsLCJCYWNrZ3JvdW5kRmlsbFR5cGUiOjAsIk1hcmdpbiI6eyIkcmVmIjoiMjEifSwiUGFkZGluZyI6eyIkcmVmIjoiMjIifSwiQmFja2dyb3VuZCI6eyIkcmVmIjoiMjMifSwiSXNWaXNpYmxlIjp0cnVlLCJXaWR0aCI6MC4wLCJIZWlnaHQiOjAuMCwiQm9yZGVyU3R5bGUiOnsiJGlkIjoiMTYyIiwiTGluZUNvbG9yIjpudWxsLCJMaW5lV2VpZ2h0IjowLjAsIkxpbmVUeXBlIjowLCJQYXJlbnRTdHlsZSI6bnVsbH0sIlBhcmVudFN0eWxlIjpudWxsfSwiSG9yaXpvbnRhbENvbm5lY3RvclN0eWxlIjp7IiRpZCI6IjE2MyIsIkxpbmVDb2xvciI6eyIkcmVmIjoiMjYifSwiTGluZVdlaWdodCI6MS4wLCJMaW5lVHlwZSI6MCwiUGFyZW50U3R5bGUiOm51bGx9LCJWZXJ0aWNhbENvbm5lY3RvclN0eWxlIjp7IiRpZCI6IjE2NCIsIkxpbmVDb2xvciI6eyIkcmVmIjoiMjkifSwiTGluZVdlaWdodCI6MC4wLCJMaW5lVHlwZSI6MCwiUGFyZW50U3R5bGUiOm51bGx9LCJNYXJnaW4iOm51bGwsIlN0YXJ0RGF0ZVBvc2l0aW9uIjozLCJFbmREYXRlUG9zaXRpb24iOjQsIkRhdGVJc1Zpc2libGUiOnRydWUsIlRpdGxlUG9zaXRpb24iOjIsIkR1cmF0aW9uUG9zaXRpb24iOjYsIlBlcmNlbnRhZ2VDb21wbGV0ZWRQb3NpdGlvbiI6NiwiU3BhY2luZyI6NSwiSXNCZWxvd1RpbWViYW5kIjp0cnVlLCJQZXJjZW50YWdlQ29tcGxldGVTaGFwZU9wYWNpdHkiOjM1LCJTaGFwZVN0eWxlIjp7IiRpZCI6IjE2NSIsIk1hcmdpbiI6eyIkcmVmIjoiMzIifSwiUGFkZGluZyI6eyIkcmVmIjoiMzMifSwiQmFja2dyb3VuZCI6eyIkaWQiOiIxNjYiLCJDb2xvciI6eyIkaWQiOiIxNjciLCJBIjoyNTUsIlIiOjkxLCJHIjoxNTUsIkIiOjIxM319LCJJc1Zpc2libGUiOnRydWUsIldpZHRoIjowLjAsIkhlaWdodCI6MTYuMCwiQm9yZGVyU3R5bGUiOnsiJGlkIjoiMTY4IiwiTGluZUNvbG9yIjp7IiRyZWYiOiIzNyJ9LCJMaW5lV2VpZ2h0IjowLjAsIkxpbmVUeXBlIjowLCJQYXJlbnRTdHlsZSI6bnVsbH0sIlBhcmVudFN0eWxlIjpudWxsfSwiVGl0bGVTdHlsZSI6eyIkaWQiOiIxNjkiLCJGb250U2V0dGluZ3MiOnsiJGlkIjoiMTcwIiwiRm9udFNpemUiOjExLCJGb250TmFtZSI6IkNhbGlicmkiLCJJc0JvbGQiOnRydWUsIklzSXRhbGljIjpmYWxzZSwiSXNVbmRlcmxpbmVkIjpmYWxzZSwiUGFyZW50U3R5bGUiOm51bGx9LCJBdXRvU2l6ZSI6MCwiRm9yZWdyb3VuZCI6eyIkaWQiOiIxNzEiLCJDb2xvciI6eyIkaWQiOiIxNzIiLCJBIjoyNTUsIlIiOjAsIkciOjAsIkIiOjB9fSwiTWF4V2lkdGgiOjcyMC4wLCJNYXhIZWlnaHQiOiJJbmZpbml0eSIsIlNtYXJ0Rm9yZWdyb3VuZElzQWN0aXZlIjpmYWxzZSwiSG9yaXpvbnRhbEFsaWdubWVudCI6MSwiVmVydGljYWxBbGlnbm1lbnQiOjAsIlNtYXJ0Rm9yZWdyb3VuZCI6bnVsbCwiQmFja2dyb3VuZEZpbGxUeXBlIjowLCJNYXJnaW4iOnsiJHJlZiI6IjQzIn0sIlBhZGRpbmciOnsiJHJlZiI6IjQ0In0sIkJhY2tncm91bmQiOnsiJGlkIjoiMTczIiwiQ29sb3IiOnsiJGlkIjoiMTc0IiwiQSI6MCwiUiI6MjU1LCJHIjoyNTUsIkIiOjI1NX19LCJJc1Zpc2libGUiOnRydWUsIldpZHRoIjowLjAsIkhlaWdodCI6MC4wLCJCb3JkZXJTdHlsZSI6eyIkaWQiOiIxNzUiLCJMaW5lQ29sb3IiOm51bGwsIkxpbmVXZWlnaHQiOjAuMCwiTGluZVR5cGUiOjAsIlBhcmVudFN0eWxlIjpudWxsfSwiUGFyZW50U3R5bGUiOm51bGx9LCJEYXRlU3R5bGUiOnsiJGlkIjoiMTc2IiwiRm9udFNldHRpbmdzIjp7IiRpZCI6IjE3NyIsIkZvbnRTaXplIjoxMCwiRm9udE5hbWUiOiJDYWxpYnJpIiwiSXNCb2xkIjpmYWxzZSwiSXNJdGFsaWMiOmZhbHNlLCJJc1VuZGVybGluZWQiOmZhbHNlLCJQYXJlbnRTdHlsZSI6bnVsbH0sIkF1dG9TaXplIjowLCJGb3JlZ3JvdW5kIjp7IiRpZCI6IjE3OCIsIkNvbG9yIjp7IiRpZCI6IjE3OSIsIkEiOjI1NSwiUiI6NjgsIkciOjg0LCJCIjoxMDZ9fSwiTWF4V2lkdGgiOjIwMC4wLCJNYXhIZWlnaHQiOiJJbmZpbml0eSIsIlNtYXJ0Rm9yZWdyb3VuZElzQWN0aXZlIjpmYWxzZSwiSG9yaXpvbnRhbEFsaWdubWVudCI6MSwiVmVydGljYWxBbGlnbm1lbnQiOjAsIlNtYXJ0Rm9yZWdyb3VuZCI6bnVsbCwiQmFja2dyb3VuZEZpbGxUeXBlIjowLCJNYXJnaW4iOnsiJHJlZiI6IjUyIn0sIlBhZGRpbmciOnsiJHJlZiI6IjUzIn0sIkJhY2tncm91bmQiOnsiJGlkIjoiMTgwIiwiQ29sb3IiOnsiJGlkIjoiMTgxIiwiQSI6MCwiUiI6MjU1LCJHIjoyNTUsIkIiOjI1NX19LCJJc1Zpc2libGUiOnRydWUsIldpZHRoIjowLjAsIkhlaWdodCI6MC4wLCJCb3JkZXJTdHlsZSI6eyIkaWQiOiIxODIiLCJMaW5lQ29sb3IiOm51bGwsIkxpbmVXZWlnaHQiOjAuMCwiTGluZVR5cGUiOjAsIlBhcmVudFN0eWxlIjpudWxsfSwiUGFyZW50U3R5bGUiOm51bGx9LCJEYXRlRm9ybWF0Ijp7IiRyZWYiOiI1NyJ9LCJXZWVrTnVtYmVyaW5nIjp7IiRpZCI6IjE4MyIsIkZvcm1hdCI6MCwiSXNWaXNpYmxlIjpmYWxzZSwiTGFzdEtub3duVmlzaWJpbGl0eVN0YXRlIjpmYWxzZX0sIklzVmlzaWJsZSI6dHJ1ZSwiUGFyZW50U3R5bGUiOm51bGx9LCJJbmRleCI6NCwiU21hcnREdXJhdGlvbkFjdGl2YXRlZCI6ZmFsc2UsIkRhdGVGb3JtYXQiOnsiJHJlZiI6IjU3In0sIldlZWtOdW1iZXJpbmciOnsiJGlkIjoiMTg0IiwiRm9ybWF0IjowLCJJc1Zpc2libGUiOmZhbHNlLCJMYXN0S25vd25WaXNpYmlsaXR5U3RhdGUiOmZhbHNlfSwiSWQiOiJlMTQwODEyMS04ZDRhLTQ0YTgtYWJjZS00OWU2ZjFhNzM3NDciLCJJbXBvcnRJZCI6bnVsbCwiVGl0bGUiOiJBZG1pbiBIb21lIFBhZ2UiLCJOb3RlIjpudWxsLCJIeXBlcmxpbmsiOnsiJGlkIjoiMTg1IiwiQWRkcmVzcyI6IiIsIlN1YkFkZHJlc3MiOiIifSwiSXNDaGFuZ2VkIjpmYWxzZSwiSXNOZXciOmZhbHNlfX1dLCJfbWlsZXN0b25lcyI6W10sIklkIjoiMDAwMDAwMDAtMDAwMC0wMDAwLTAwMDAtMDAwMDAwMDAwMDAwIiwiSXNTaW5nbGVJdGVtUm93Ijp0cnVlfSx7IiRpZCI6IjE4NiIsIl90YXNrcyI6W3siJGlkIjoiMTg3IiwiX2F0dGFjaGVkTWlsZXN0b25lcyI6W10sIlRhc2tEZWZpbml0aW9uIjp7IiRpZCI6IjE4OCIsIkdyb3VwTmFtZSI6bnVsbCwiU3RhcnREYXRlIjoiMjAyMi0wNS0wNlQwMDowMDowMFoiLCJFbmREYXRlIjoiMjAyMi0wNS0wOVQyMzo1OTowMFoiLCJQZXJjZW50YWdlQ29tcGxldGUiOm51bGwsIlN0eWxlIjp7IiRpZCI6IjE4OSIsIlNoYXBlIjoyLCJTaGFwZVRoaWNrbmVzcyI6MSwiRHVyYXRpb25Gb3JtYXQiOjAsIkluY2x1ZGVOb25Xb3JraW5nRGF5c0luRHVyYXRpb24iOmZhbHNlLCJQZXJjZW50YWdlQ29tcGxldGVTdHlsZSI6eyIkaWQiOiIxOTAiLCJGb250U2V0dGluZ3MiOnsiJGlkIjoiMTkxIiwiRm9udFNpemUiOjEwLCJGb250TmFtZSI6IkNhbGlicmkiLCJJc0JvbGQiOmZhbHNlLCJJc0l0YWxpYyI6ZmFsc2UsIklzVW5kZXJsaW5lZCI6ZmFsc2UsIlBhcmVudFN0eWxlIjpudWxsfSwiQXV0b1NpemUiOjAsIkZvcmVncm91bmQiOnsiJHJlZiI6IjEwIn0sIk1heFdpZHRoIjoyMDAuMCwiTWF4SGVpZ2h0IjoiSW5maW5pdHkiLCJTbWFydEZvcmVncm91bmRJc0FjdGl2ZSI6ZmFsc2UsIkhvcml6b250YWxBbGlnbm1lbnQiOjAsIlZlcnRpY2FsQWxpZ25tZW50IjowLCJTbWFydEZvcmVncm91bmQiOm51bGwsIkJhY2tncm91bmRGaWxsVHlwZSI6MCwiTWFyZ2luIjp7IiRyZWYiOiIxMiJ9LCJQYWRkaW5nIjp7IiRyZWYiOiIxMyJ9LCJCYWNrZ3JvdW5kIjp7IiRyZWYiOiIxNCJ9LCJJc1Zpc2libGUiOnRydWUsIldpZHRoIjowLjAsIkhlaWdodCI6MC4wLCJCb3JkZXJTdHlsZSI6eyIkaWQiOiIxOTIiLCJMaW5lQ29sb3IiOm51bGwsIkxpbmVXZWlnaHQiOjAuMCwiTGluZVR5cGUiOjAsIlBhcmVudFN0eWxlIjpudWxsfSwiUGFyZW50U3R5bGUiOm51bGx9LCJEdXJhdGlvblN0eWxlIjp7IiRpZCI6IjE5MyIsIkZvbnRTZXR0aW5ncyI6eyIkaWQiOiIxOTQiLCJGb250U2l6ZSI6MTAsIkZvbnROYW1lIjoiQ2FsaWJyaSIsIklzQm9sZCI6ZmFsc2UsIklzSXRhbGljIjpmYWxzZSwiSXNVbmRlcmxpbmVkIjpmYWxzZSwiUGFyZW50U3R5bGUiOm51bGx9LCJBdXRvU2l6ZSI6MCwiRm9yZWdyb3VuZCI6eyIkcmVmIjoiMTkifSwiTWF4V2lkdGgiOjIwMC4wLCJNYXhIZWlnaHQiOiJJbmZpbml0eSIsIlNtYXJ0Rm9yZWdyb3VuZElzQWN0aXZlIjpmYWxzZSwiSG9yaXpvbnRhbEFsaWdubWVudCI6MCwiVmVydGljYWxBbGlnbm1lbnQiOjAsIlNtYXJ0Rm9yZWdyb3VuZCI6bnVsbCwiQmFja2dyb3VuZEZpbGxUeXBlIjowLCJNYXJnaW4iOnsiJHJlZiI6IjIxIn0sIlBhZGRpbmciOnsiJHJlZiI6IjIyIn0sIkJhY2tncm91bmQiOnsiJHJlZiI6IjIzIn0sIklzVmlzaWJsZSI6dHJ1ZSwiV2lkdGgiOjAuMCwiSGVpZ2h0IjowLjAsIkJvcmRlclN0eWxlIjp7IiRpZCI6IjE5NSIsIkxpbmVDb2xvciI6bnVsbCwiTGluZVdlaWdodCI6MC4wLCJMaW5lVHlwZSI6MCwiUGFyZW50U3R5bGUiOm51bGx9LCJQYXJlbnRTdHlsZSI6bnVsbH0sIkhvcml6b250YWxDb25uZWN0b3JTdHlsZSI6eyIkaWQiOiIxOTYiLCJMaW5lQ29sb3IiOnsiJHJlZiI6IjI2In0sIkxpbmVXZWlnaHQiOjEuMCwiTGluZVR5cGUiOjAsIlBhcmVudFN0eWxlIjpudWxsfSwiVmVydGljYWxDb25uZWN0b3JTdHlsZSI6eyIkaWQiOiIxOTciLCJMaW5lQ29sb3IiOnsiJHJlZiI6IjI5In0sIkxpbmVXZWlnaHQiOjAuMCwiTGluZVR5cGUiOjAsIlBhcmVudFN0eWxlIjpudWxsfSwiTWFyZ2luIjpudWxsLCJTdGFydERhdGVQb3NpdGlvbiI6MywiRW5kRGF0ZVBvc2l0aW9uIjo0LCJEYXRlSXNWaXNpYmxlIjp0cnVlLCJUaXRsZVBvc2l0aW9uIjoyLCJEdXJhdGlvblBvc2l0aW9uIjo2LCJQZXJjZW50YWdlQ29tcGxldGVkUG9zaXRpb24iOjYsIlNwYWNpbmciOjUsIklzQmVsb3dUaW1lYmFuZCI6dHJ1ZSwiUGVyY2VudGFnZUNvbXBsZXRlU2hhcGVPcGFjaXR5IjozNSwiU2hhcGVTdHlsZSI6eyIkaWQiOiIxOTgiLCJNYXJnaW4iOnsiJHJlZiI6IjMyIn0sIlBhZGRpbmciOnsiJHJlZiI6IjMzIn0sIkJhY2tncm91bmQiOnsiJGlkIjoiMTk5IiwiQ29sb3IiOnsiJGlkIjoiMjAwIiwiQSI6MjU1LCJSIjo5MSwiRyI6MTU1LCJCIjoyMTN9fSwiSXNWaXNpYmxlIjp0cnVlLCJXaWR0aCI6MC4wLCJIZWlnaHQiOjE2LjAsIkJvcmRlclN0eWxlIjp7IiRpZCI6IjIwMSIsIkxpbmVDb2xvciI6eyIkcmVmIjoiMzcifSwiTGluZVdlaWdodCI6MC4wLCJMaW5lVHlwZSI6MCwiUGFyZW50U3R5bGUiOm51bGx9LCJQYXJlbnRTdHlsZSI6bnVsbH0sIlRpdGxlU3R5bGUiOnsiJGlkIjoiMjAyIiwiRm9udFNldHRpbmdzIjp7IiRpZCI6IjIwMyIsIkZvbnRTaXplIjoxMSwiRm9udE5hbWUiOiJDYWxpYnJpIiwiSXNCb2xkIjp0cnVlLCJJc0l0YWxpYyI6ZmFsc2UsIklzVW5kZXJsaW5lZCI6ZmFsc2UsIlBhcmVudFN0eWxlIjpudWxsfSwiQXV0b1NpemUiOjAsIkZvcmVncm91bmQiOnsiJGlkIjoiMjA0IiwiQ29sb3IiOnsiJGlkIjoiMjA1IiwiQSI6MjU1LCJSIjowLCJHIjowLCJCIjowfX0sIk1heFdpZHRoIjo3MjAuMCwiTWF4SGVpZ2h0IjoiSW5maW5pdHkiLCJTbWFydEZvcmVncm91bmRJc0FjdGl2ZSI6ZmFsc2UsIkhvcml6b250YWxBbGlnbm1lbnQiOjEsIlZlcnRpY2FsQWxpZ25tZW50IjowLCJTbWFydEZvcmVncm91bmQiOm51bGwsIkJhY2tncm91bmRGaWxsVHlwZSI6MCwiTWFyZ2luIjp7IiRyZWYiOiI0MyJ9LCJQYWRkaW5nIjp7IiRyZWYiOiI0NCJ9LCJCYWNrZ3JvdW5kIjp7IiRpZCI6IjIwNiIsIkNvbG9yIjp7IiRpZCI6IjIwNyIsIkEiOjAsIlIiOjI1NSwiRyI6MjU1LCJCIjoyNTV9fSwiSXNWaXNpYmxlIjp0cnVlLCJXaWR0aCI6MC4wLCJIZWlnaHQiOjAuMCwiQm9yZGVyU3R5bGUiOnsiJGlkIjoiMjA4IiwiTGluZUNvbG9yIjpudWxsLCJMaW5lV2VpZ2h0IjowLjAsIkxpbmVUeXBlIjowLCJQYXJlbnRTdHlsZSI6bnVsbH0sIlBhcmVudFN0eWxlIjpudWxsfSwiRGF0ZVN0eWxlIjp7IiRpZCI6IjIwOSIsIkZvbnRTZXR0aW5ncyI6eyIkaWQiOiIyMTAiLCJGb250U2l6ZSI6MTAsIkZvbnROYW1lIjoiQ2FsaWJyaSIsIklzQm9sZCI6ZmFsc2UsIklzSXRhbGljIjpmYWxzZSwiSXNVbmRlcmxpbmVkIjpmYWxzZSwiUGFyZW50U3R5bGUiOm51bGx9LCJBdXRvU2l6ZSI6MCwiRm9yZWdyb3VuZCI6eyIkaWQiOiIyMTEiLCJDb2xvciI6eyIkaWQiOiIyMTIiLCJBIjoyNTUsIlIiOjY4LCJHIjo4NCwiQiI6MTA2fX0sIk1heFdpZHRoIjoyMDAuMCwiTWF4SGVpZ2h0IjoiSW5maW5pdHkiLCJTbWFydEZvcmVncm91bmRJc0FjdGl2ZSI6ZmFsc2UsIkhvcml6b250YWxBbGlnbm1lbnQiOjEsIlZlcnRpY2FsQWxpZ25tZW50IjowLCJTbWFydEZvcmVncm91bmQiOm51bGwsIkJhY2tncm91bmRGaWxsVHlwZSI6MCwiTWFyZ2luIjp7IiRyZWYiOiI1MiJ9LCJQYWRkaW5nIjp7IiRyZWYiOiI1MyJ9LCJCYWNrZ3JvdW5kIjp7IiRpZCI6IjIxMyIsIkNvbG9yIjp7IiRpZCI6IjIxNCIsIkEiOjAsIlIiOjI1NSwiRyI6MjU1LCJCIjoyNTV9fSwiSXNWaXNpYmxlIjp0cnVlLCJXaWR0aCI6MC4wLCJIZWlnaHQiOjAuMCwiQm9yZGVyU3R5bGUiOnsiJGlkIjoiMjE1IiwiTGluZUNvbG9yIjpudWxsLCJMaW5lV2VpZ2h0IjowLjAsIkxpbmVUeXBlIjowLCJQYXJlbnRTdHlsZSI6bnVsbH0sIlBhcmVudFN0eWxlIjpudWxsfSwiRGF0ZUZvcm1hdCI6eyIkcmVmIjoiNTcifSwiV2Vla051bWJlcmluZyI6eyIkaWQiOiIyMTYiLCJGb3JtYXQiOjAsIklzVmlzaWJsZSI6ZmFsc2UsIkxhc3RLbm93blZpc2liaWxpdHlTdGF0ZSI6ZmFsc2V9LCJJc1Zpc2libGUiOnRydWUsIlBhcmVudFN0eWxlIjpudWxsfSwiSW5kZXgiOjUsIlNtYXJ0RHVyYXRpb25BY3RpdmF0ZWQiOmZhbHNlLCJEYXRlRm9ybWF0Ijp7IiRyZWYiOiI1NyJ9LCJXZWVrTnVtYmVyaW5nIjp7IiRpZCI6IjIxNyIsIkZvcm1hdCI6MCwiSXNWaXNpYmxlIjpmYWxzZSwiTGFzdEtub3duVmlzaWJpbGl0eVN0YXRlIjpmYWxzZX0sIklkIjoiZmQwMmQ2MWItNmU0MS00YmUwLTgxYWEtODE4N2FjZTJkYzVlIiwiSW1wb3J0SWQiOm51bGwsIlRpdGxlIjoiQWRkIEFkbWluIiwiTm90ZSI6bnVsbCwiSHlwZXJsaW5rIjp7IiRpZCI6IjIxOCIsIkFkZHJlc3MiOiIiLCJTdWJBZGRyZXNzIjoiIn0sIklzQ2hhbmdlZCI6ZmFsc2UsIklzTmV3IjpmYWxzZX19XSwiX21pbGVzdG9uZXMiOltdLCJJZCI6IjAwMDAwMDAwLTAwMDAtMDAwMC0wMDAwLTAwMDAwMDAwMDAwMCIsIklzU2luZ2xlSXRlbVJvdyI6dHJ1ZX0seyIkaWQiOiIyMTkiLCJfdGFza3MiOlt7IiRpZCI6IjIyMCIsIl9hdHRhY2hlZE1pbGVzdG9uZXMiOltdLCJUYXNrRGVmaW5pdGlvbiI6eyIkaWQiOiIyMjEiLCJHcm91cE5hbWUiOm51bGwsIlN0YXJ0RGF0ZSI6IjIwMjItMDUtMTFUMDA6MDA6MDBaIiwiRW5kRGF0ZSI6IjIwMjItMDUtMTNUMjM6NTk6MDBaIiwiUGVyY2VudGFnZUNvbXBsZXRlIjpudWxsLCJTdHlsZSI6eyIkaWQiOiIyMjIiLCJTaGFwZSI6MiwiU2hhcGVUaGlja25lc3MiOjEsIkR1cmF0aW9uRm9ybWF0IjowLCJJbmNsdWRlTm9uV29ya2luZ0RheXNJbkR1cmF0aW9uIjpmYWxzZSwiUGVyY2VudGFnZUNvbXBsZXRlU3R5bGUiOnsiJGlkIjoiMjIzIiwiRm9udFNldHRpbmdzIjp7IiRpZCI6IjIyNCIsIkZvbnRTaXplIjoxMCwiRm9udE5hbWUiOiJDYWxpYnJpIiwiSXNCb2xkIjpmYWxzZSwiSXNJdGFsaWMiOmZhbHNlLCJJc1VuZGVybGluZWQiOmZhbHNlLCJQYXJlbnRTdHlsZSI6bnVsbH0sIkF1dG9TaXplIjowLCJGb3JlZ3JvdW5kIjp7IiRyZWYiOiIxMCJ9LCJNYXhXaWR0aCI6MjAwLjAsIk1heEhlaWdodCI6IkluZmluaXR5IiwiU21hcnRGb3JlZ3JvdW5kSXNBY3RpdmUiOmZhbHNlLCJIb3Jpem9udGFsQWxpZ25tZW50IjowLCJWZXJ0aWNhbEFsaWdubWVudCI6MCwiU21hcnRGb3JlZ3JvdW5kIjpudWxsLCJCYWNrZ3JvdW5kRmlsbFR5cGUiOjAsIk1hcmdpbiI6eyIkcmVmIjoiMTIifSwiUGFkZGluZyI6eyIkcmVmIjoiMTMifSwiQmFja2dyb3VuZCI6eyIkcmVmIjoiMTQifSwiSXNWaXNpYmxlIjp0cnVlLCJXaWR0aCI6MC4wLCJIZWlnaHQiOjAuMCwiQm9yZGVyU3R5bGUiOnsiJGlkIjoiMjI1IiwiTGluZUNvbG9yIjpudWxsLCJMaW5lV2VpZ2h0IjowLjAsIkxpbmVUeXBlIjowLCJQYXJlbnRTdHlsZSI6bnVsbH0sIlBhcmVudFN0eWxlIjpudWxsfSwiRHVyYXRpb25TdHlsZSI6eyIkaWQiOiIyMjYiLCJGb250U2V0dGluZ3MiOnsiJGlkIjoiMjI3IiwiRm9udFNpemUiOjEwLCJGb250TmFtZSI6IkNhbGlicmkiLCJJc0JvbGQiOmZhbHNlLCJJc0l0YWxpYyI6ZmFsc2UsIklzVW5kZXJsaW5lZCI6ZmFsc2UsIlBhcmVudFN0eWxlIjpudWxsfSwiQXV0b1NpemUiOjAsIkZvcmVncm91bmQiOnsiJHJlZiI6IjE5In0sIk1heFdpZHRoIjoyMDAuMCwiTWF4SGVpZ2h0IjoiSW5maW5pdHkiLCJTbWFydEZvcmVncm91bmRJc0FjdGl2ZSI6ZmFsc2UsIkhvcml6b250YWxBbGlnbm1lbnQiOjAsIlZlcnRpY2FsQWxpZ25tZW50IjowLCJTbWFydEZvcmVncm91bmQiOm51bGwsIkJhY2tncm91bmRGaWxsVHlwZSI6MCwiTWFyZ2luIjp7IiRyZWYiOiIyMSJ9LCJQYWRkaW5nIjp7IiRyZWYiOiIyMiJ9LCJCYWNrZ3JvdW5kIjp7IiRyZWYiOiIyMyJ9LCJJc1Zpc2libGUiOnRydWUsIldpZHRoIjowLjAsIkhlaWdodCI6MC4wLCJCb3JkZXJTdHlsZSI6eyIkaWQiOiIyMjgiLCJMaW5lQ29sb3IiOm51bGwsIkxpbmVXZWlnaHQiOjAuMCwiTGluZVR5cGUiOjAsIlBhcmVudFN0eWxlIjpudWxsfSwiUGFyZW50U3R5bGUiOm51bGx9LCJIb3Jpem9udGFsQ29ubmVjdG9yU3R5bGUiOnsiJGlkIjoiMjI5IiwiTGluZUNvbG9yIjp7IiRyZWYiOiIyNiJ9LCJMaW5lV2VpZ2h0IjoxLjAsIkxpbmVUeXBlIjowLCJQYXJlbnRTdHlsZSI6bnVsbH0sIlZlcnRpY2FsQ29ubmVjdG9yU3R5bGUiOnsiJGlkIjoiMjMwIiwiTGluZUNvbG9yIjp7IiRyZWYiOiIyOSJ9LCJMaW5lV2VpZ2h0IjowLjAsIkxpbmVUeXBlIjowLCJQYXJlbnRTdHlsZSI6bnVsbH0sIk1hcmdpbiI6bnVsbCwiU3RhcnREYXRlUG9zaXRpb24iOjMsIkVuZERhdGVQb3NpdGlvbiI6NCwiRGF0ZUlzVmlzaWJsZSI6dHJ1ZSwiVGl0bGVQb3NpdGlvbiI6MiwiRHVyYXRpb25Qb3NpdGlvbiI6NiwiUGVyY2VudGFnZUNvbXBsZXRlZFBvc2l0aW9uIjo2LCJTcGFjaW5nIjo1LCJJc0JlbG93VGltZWJhbmQiOnRydWUsIlBlcmNlbnRhZ2VDb21wbGV0ZVNoYXBlT3BhY2l0eSI6MzUsIlNoYXBlU3R5bGUiOnsiJGlkIjoiMjMxIiwiTWFyZ2luIjp7IiRyZWYiOiIzMiJ9LCJQYWRkaW5nIjp7IiRyZWYiOiIzMyJ9LCJCYWNrZ3JvdW5kIjp7IiRpZCI6IjIzMiIsIkNvbG9yIjp7IiRpZCI6IjIzMyIsIkEiOjI1NSwiUiI6OTEsIkciOjE1NSwiQiI6MjEzfX0sIklzVmlzaWJsZSI6dHJ1ZSwiV2lkdGgiOjAuMCwiSGVpZ2h0IjoxNi4wLCJCb3JkZXJTdHlsZSI6eyIkaWQiOiIyMzQiLCJMaW5lQ29sb3IiOnsiJHJlZiI6IjM3In0sIkxpbmVXZWlnaHQiOjAuMCwiTGluZVR5cGUiOjAsIlBhcmVudFN0eWxlIjpudWxsfSwiUGFyZW50U3R5bGUiOm51bGx9LCJUaXRsZVN0eWxlIjp7IiRpZCI6IjIzNSIsIkZvbnRTZXR0aW5ncyI6eyIkaWQiOiIyMzYiLCJGb250U2l6ZSI6MTEsIkZvbnROYW1lIjoiQ2FsaWJyaSIsIklzQm9sZCI6dHJ1ZSwiSXNJdGFsaWMiOmZhbHNlLCJJc1VuZGVybGluZWQiOmZhbHNlLCJQYXJlbnRTdHlsZSI6bnVsbH0sIkF1dG9TaXplIjowLCJGb3JlZ3JvdW5kIjp7IiRpZCI6IjIzNyIsIkNvbG9yIjp7IiRpZCI6IjIzOCIsIkEiOjI1NSwiUiI6MCwiRyI6MCwiQiI6MH19LCJNYXhXaWR0aCI6NzIwLjAsIk1heEhlaWdodCI6IkluZmluaXR5IiwiU21hcnRGb3JlZ3JvdW5kSXNBY3RpdmUiOmZhbHNlLCJIb3Jpem9udGFsQWxpZ25tZW50IjoxLCJWZXJ0aWNhbEFsaWdubWVudCI6MCwiU21hcnRGb3JlZ3JvdW5kIjpudWxsLCJCYWNrZ3JvdW5kRmlsbFR5cGUiOjAsIk1hcmdpbiI6eyIkcmVmIjoiNDMifSwiUGFkZGluZyI6eyIkcmVmIjoiNDQifSwiQmFja2dyb3VuZCI6eyIkaWQiOiIyMzkiLCJDb2xvciI6eyIkaWQiOiIyNDAiLCJBIjowLCJSIjoyNTUsIkciOjI1NSwiQiI6MjU1fX0sIklzVmlzaWJsZSI6dHJ1ZSwiV2lkdGgiOjAuMCwiSGVpZ2h0IjowLjAsIkJvcmRlclN0eWxlIjp7IiRpZCI6IjI0MSIsIkxpbmVDb2xvciI6bnVsbCwiTGluZVdlaWdodCI6MC4wLCJMaW5lVHlwZSI6MCwiUGFyZW50U3R5bGUiOm51bGx9LCJQYXJlbnRTdHlsZSI6bnVsbH0sIkRhdGVTdHlsZSI6eyIkaWQiOiIyNDIiLCJGb250U2V0dGluZ3MiOnsiJGlkIjoiMjQzIiwiRm9udFNpemUiOjEwLCJGb250TmFtZSI6IkNhbGlicmkiLCJJc0JvbGQiOmZhbHNlLCJJc0l0YWxpYyI6ZmFsc2UsIklzVW5kZXJsaW5lZCI6ZmFsc2UsIlBhcmVudFN0eWxlIjpudWxsfSwiQXV0b1NpemUiOjAsIkZvcmVncm91bmQiOnsiJGlkIjoiMjQ0IiwiQ29sb3IiOnsiJGlkIjoiMjQ1IiwiQSI6MjU1LCJSIjo2OCwiRyI6ODQsIkIiOjEwNn19LCJNYXhXaWR0aCI6MjAwLjAsIk1heEhlaWdodCI6IkluZmluaXR5IiwiU21hcnRGb3JlZ3JvdW5kSXNBY3RpdmUiOmZhbHNlLCJIb3Jpem9udGFsQWxpZ25tZW50IjoxLCJWZXJ0aWNhbEFsaWdubWVudCI6MCwiU21hcnRGb3JlZ3JvdW5kIjpudWxsLCJCYWNrZ3JvdW5kRmlsbFR5cGUiOjAsIk1hcmdpbiI6eyIkcmVmIjoiNTIifSwiUGFkZGluZyI6eyIkcmVmIjoiNTMifSwiQmFja2dyb3VuZCI6eyIkaWQiOiIyNDYiLCJDb2xvciI6eyIkaWQiOiIyNDciLCJBIjowLCJSIjoyNTUsIkciOjI1NSwiQiI6MjU1fX0sIklzVmlzaWJsZSI6dHJ1ZSwiV2lkdGgiOjAuMCwiSGVpZ2h0IjowLjAsIkJvcmRlclN0eWxlIjp7IiRpZCI6IjI0OCIsIkxpbmVDb2xvciI6bnVsbCwiTGluZVdlaWdodCI6MC4wLCJMaW5lVHlwZSI6MCwiUGFyZW50U3R5bGUiOm51bGx9LCJQYXJlbnRTdHlsZSI6bnVsbH0sIkRhdGVGb3JtYXQiOnsiJHJlZiI6IjU3In0sIldlZWtOdW1iZXJpbmciOnsiJGlkIjoiMjQ5IiwiRm9ybWF0IjowLCJJc1Zpc2libGUiOmZhbHNlLCJMYXN0S25vd25WaXNpYmlsaXR5U3RhdGUiOmZhbHNlfSwiSXNWaXNpYmxlIjp0cnVlLCJQYXJlbnRTdHlsZSI6bnVsbH0sIkluZGV4Ijo2LCJTbWFydER1cmF0aW9uQWN0aXZhdGVkIjpmYWxzZSwiRGF0ZUZvcm1hdCI6eyIkcmVmIjoiNTcifSwiV2Vla051bWJlcmluZyI6eyIkaWQiOiIyNTAiLCJGb3JtYXQiOjAsIklzVmlzaWJsZSI6ZmFsc2UsIkxhc3RLbm93blZpc2liaWxpdHlTdGF0ZSI6ZmFsc2V9LCJJZCI6ImZlNDk4MDlkLWFlYTgtNDJhNy05MmJkLWE4ZTUyMDg4NDYwYiIsIkltcG9ydElkIjpudWxsLCJUaXRsZSI6IkFkZCBVc2VyIiwiTm90ZSI6bnVsbCwiSHlwZXJsaW5rIjp7IiRpZCI6IjI1MSIsIkFkZHJlc3MiOiIiLCJTdWJBZGRyZXNzIjoiIn0sIklzQ2hhbmdlZCI6ZmFsc2UsIklzTmV3IjpmYWxzZX19XSwiX21pbGVzdG9uZXMiOltdLCJJZCI6IjAwMDAwMDAwLTAwMDAtMDAwMC0wMDAwLTAwMDAwMDAwMDAwMCIsIklzU2luZ2xlSXRlbVJvdyI6dHJ1ZX0seyIkaWQiOiIyNTIiLCJfdGFza3MiOlt7IiRpZCI6IjI1MyIsIl9hdHRhY2hlZE1pbGVzdG9uZXMiOltdLCJUYXNrRGVmaW5pdGlvbiI6eyIkaWQiOiIyNTQiLCJHcm91cE5hbWUiOm51bGwsIlN0YXJ0RGF0ZSI6IjIwMjItMDUtMDlUMDA6MDA6MDBaIiwiRW5kRGF0ZSI6IjIwMjItMDUtMTNUMjM6NTk6MDBaIiwiUGVyY2VudGFnZUNvbXBsZXRlIjpudWxsLCJTdHlsZSI6eyIkaWQiOiIyNTUiLCJTaGFwZSI6MiwiU2hhcGVUaGlja25lc3MiOjEsIkR1cmF0aW9uRm9ybWF0IjowLCJJbmNsdWRlTm9uV29ya2luZ0RheXNJbkR1cmF0aW9uIjpmYWxzZSwiUGVyY2VudGFnZUNvbXBsZXRlU3R5bGUiOnsiJGlkIjoiMjU2IiwiRm9udFNldHRpbmdzIjp7IiRpZCI6IjI1NyIsIkZvbnRTaXplIjoxMCwiRm9udE5hbWUiOiJDYWxpYnJpIiwiSXNCb2xkIjpmYWxzZSwiSXNJdGFsaWMiOmZhbHNlLCJJc1VuZGVybGluZWQiOmZhbHNlLCJQYXJlbnRTdHlsZSI6bnVsbH0sIkF1dG9TaXplIjowLCJGb3JlZ3JvdW5kIjp7IiRyZWYiOiIxMCJ9LCJNYXhXaWR0aCI6MjAwLjAsIk1heEhlaWdodCI6IkluZmluaXR5IiwiU21hcnRGb3JlZ3JvdW5kSXNBY3RpdmUiOmZhbHNlLCJIb3Jpem9udGFsQWxpZ25tZW50IjowLCJWZXJ0aWNhbEFsaWdubWVudCI6MCwiU21hcnRGb3JlZ3JvdW5kIjpudWxsLCJCYWNrZ3JvdW5kRmlsbFR5cGUiOjAsIk1hcmdpbiI6eyIkcmVmIjoiMTIifSwiUGFkZGluZyI6eyIkcmVmIjoiMTMifSwiQmFja2dyb3VuZCI6eyIkcmVmIjoiMTQifSwiSXNWaXNpYmxlIjp0cnVlLCJXaWR0aCI6MC4wLCJIZWlnaHQiOjAuMCwiQm9yZGVyU3R5bGUiOnsiJGlkIjoiMjU4IiwiTGluZUNvbG9yIjpudWxsLCJMaW5lV2VpZ2h0IjowLjAsIkxpbmVUeXBlIjowLCJQYXJlbnRTdHlsZSI6bnVsbH0sIlBhcmVudFN0eWxlIjpudWxsfSwiRHVyYXRpb25TdHlsZSI6eyIkaWQiOiIyNTkiLCJGb250U2V0dGluZ3MiOnsiJGlkIjoiMjYwIiwiRm9udFNpemUiOjEwLCJGb250TmFtZSI6IkNhbGlicmkiLCJJc0JvbGQiOmZhbHNlLCJJc0l0YWxpYyI6ZmFsc2UsIklzVW5kZXJsaW5lZCI6ZmFsc2UsIlBhcmVudFN0eWxlIjpudWxsfSwiQXV0b1NpemUiOjAsIkZvcmVncm91bmQiOnsiJHJlZiI6IjE5In0sIk1heFdpZHRoIjoyMDAuMCwiTWF4SGVpZ2h0IjoiSW5maW5pdHkiLCJTbWFydEZvcmVncm91bmRJc0FjdGl2ZSI6ZmFsc2UsIkhvcml6b250YWxBbGlnbm1lbnQiOjAsIlZlcnRpY2FsQWxpZ25tZW50IjowLCJTbWFydEZvcmVncm91bmQiOm51bGwsIkJhY2tncm91bmRGaWxsVHlwZSI6MCwiTWFyZ2luIjp7IiRyZWYiOiIyMSJ9LCJQYWRkaW5nIjp7IiRyZWYiOiIyMiJ9LCJCYWNrZ3JvdW5kIjp7IiRyZWYiOiIyMyJ9LCJJc1Zpc2libGUiOnRydWUsIldpZHRoIjowLjAsIkhlaWdodCI6MC4wLCJCb3JkZXJTdHlsZSI6eyIkaWQiOiIyNjEiLCJMaW5lQ29sb3IiOm51bGwsIkxpbmVXZWlnaHQiOjAuMCwiTGluZVR5cGUiOjAsIlBhcmVudFN0eWxlIjpudWxsfSwiUGFyZW50U3R5bGUiOm51bGx9LCJIb3Jpem9udGFsQ29ubmVjdG9yU3R5bGUiOnsiJGlkIjoiMjYyIiwiTGluZUNvbG9yIjp7IiRyZWYiOiIyNiJ9LCJMaW5lV2VpZ2h0IjoxLjAsIkxpbmVUeXBlIjowLCJQYXJlbnRTdHlsZSI6bnVsbH0sIlZlcnRpY2FsQ29ubmVjdG9yU3R5bGUiOnsiJGlkIjoiMjYzIiwiTGluZUNvbG9yIjp7IiRyZWYiOiIyOSJ9LCJMaW5lV2VpZ2h0IjowLjAsIkxpbmVUeXBlIjowLCJQYXJlbnRTdHlsZSI6bnVsbH0sIk1hcmdpbiI6bnVsbCwiU3RhcnREYXRlUG9zaXRpb24iOjMsIkVuZERhdGVQb3NpdGlvbiI6NCwiRGF0ZUlzVmlzaWJsZSI6dHJ1ZSwiVGl0bGVQb3NpdGlvbiI6MiwiRHVyYXRpb25Qb3NpdGlvbiI6NiwiUGVyY2VudGFnZUNvbXBsZXRlZFBvc2l0aW9uIjo2LCJTcGFjaW5nIjo1LCJJc0JlbG93VGltZWJhbmQiOnRydWUsIlBlcmNlbnRhZ2VDb21wbGV0ZVNoYXBlT3BhY2l0eSI6MzUsIlNoYXBlU3R5bGUiOnsiJGlkIjoiMjY0IiwiTWFyZ2luIjp7IiRyZWYiOiIzMiJ9LCJQYWRkaW5nIjp7IiRyZWYiOiIzMyJ9LCJCYWNrZ3JvdW5kIjp7IiRpZCI6IjI2NSIsIkNvbG9yIjp7IiRpZCI6IjI2NiIsIkEiOjI1NSwiUiI6OTEsIkciOjE1NSwiQiI6MjEzfX0sIklzVmlzaWJsZSI6dHJ1ZSwiV2lkdGgiOjAuMCwiSGVpZ2h0IjoxNi4wLCJCb3JkZXJTdHlsZSI6eyIkaWQiOiIyNjciLCJMaW5lQ29sb3IiOnsiJHJlZiI6IjM3In0sIkxpbmVXZWlnaHQiOjAuMCwiTGluZVR5cGUiOjAsIlBhcmVudFN0eWxlIjpudWxsfSwiUGFyZW50U3R5bGUiOm51bGx9LCJUaXRsZVN0eWxlIjp7IiRpZCI6IjI2OCIsIkZvbnRTZXR0aW5ncyI6eyIkaWQiOiIyNjkiLCJGb250U2l6ZSI6MTEsIkZvbnROYW1lIjoiQ2FsaWJyaSIsIklzQm9sZCI6dHJ1ZSwiSXNJdGFsaWMiOmZhbHNlLCJJc1VuZGVybGluZWQiOmZhbHNlLCJQYXJlbnRTdHlsZSI6bnVsbH0sIkF1dG9TaXplIjowLCJGb3JlZ3JvdW5kIjp7IiRpZCI6IjI3MCIsIkNvbG9yIjp7IiRpZCI6IjI3MSIsIkEiOjI1NSwiUiI6MCwiRyI6MCwiQiI6MH19LCJNYXhXaWR0aCI6NzIwLjAsIk1heEhlaWdodCI6IkluZmluaXR5IiwiU21hcnRGb3JlZ3JvdW5kSXNBY3RpdmUiOmZhbHNlLCJIb3Jpem9udGFsQWxpZ25tZW50IjoxLCJWZXJ0aWNhbEFsaWdubWVudCI6MCwiU21hcnRGb3JlZ3JvdW5kIjpudWxsLCJCYWNrZ3JvdW5kRmlsbFR5cGUiOjAsIk1hcmdpbiI6eyIkcmVmIjoiNDMifSwiUGFkZGluZyI6eyIkcmVmIjoiNDQifSwiQmFja2dyb3VuZCI6eyIkaWQiOiIyNzIiLCJDb2xvciI6eyIkaWQiOiIyNzMiLCJBIjowLCJSIjoyNTUsIkciOjI1NSwiQiI6MjU1fX0sIklzVmlzaWJsZSI6dHJ1ZSwiV2lkdGgiOjAuMCwiSGVpZ2h0IjowLjAsIkJvcmRlclN0eWxlIjp7IiRpZCI6IjI3NCIsIkxpbmVDb2xvciI6bnVsbCwiTGluZVdlaWdodCI6MC4wLCJMaW5lVHlwZSI6MCwiUGFyZW50U3R5bGUiOm51bGx9LCJQYXJlbnRTdHlsZSI6bnVsbH0sIkRhdGVTdHlsZSI6eyIkaWQiOiIyNzUiLCJGb250U2V0dGluZ3MiOnsiJGlkIjoiMjc2IiwiRm9udFNpemUiOjEwLCJGb250TmFtZSI6IkNhbGlicmkiLCJJc0JvbGQiOmZhbHNlLCJJc0l0YWxpYyI6ZmFsc2UsIklzVW5kZXJsaW5lZCI6ZmFsc2UsIlBhcmVudFN0eWxlIjpudWxsfSwiQXV0b1NpemUiOjAsIkZvcmVncm91bmQiOnsiJGlkIjoiMjc3IiwiQ29sb3IiOnsiJGlkIjoiMjc4IiwiQSI6MjU1LCJSIjo2OCwiRyI6ODQsIkIiOjEwNn19LCJNYXhXaWR0aCI6MjAwLjAsIk1heEhlaWdodCI6IkluZmluaXR5IiwiU21hcnRGb3JlZ3JvdW5kSXNBY3RpdmUiOmZhbHNlLCJIb3Jpem9udGFsQWxpZ25tZW50IjoxLCJWZXJ0aWNhbEFsaWdubWVudCI6MCwiU21hcnRGb3JlZ3JvdW5kIjpudWxsLCJCYWNrZ3JvdW5kRmlsbFR5cGUiOjAsIk1hcmdpbiI6eyIkcmVmIjoiNTIifSwiUGFkZGluZyI6eyIkcmVmIjoiNTMifSwiQmFja2dyb3VuZCI6eyIkaWQiOiIyNzkiLCJDb2xvciI6eyIkaWQiOiIyODAiLCJBIjowLCJSIjoyNTUsIkciOjI1NSwiQiI6MjU1fX0sIklzVmlzaWJsZSI6dHJ1ZSwiV2lkdGgiOjAuMCwiSGVpZ2h0IjowLjAsIkJvcmRlclN0eWxlIjp7IiRpZCI6IjI4MSIsIkxpbmVDb2xvciI6bnVsbCwiTGluZVdlaWdodCI6MC4wLCJMaW5lVHlwZSI6MCwiUGFyZW50U3R5bGUiOm51bGx9LCJQYXJlbnRTdHlsZSI6bnVsbH0sIkRhdGVGb3JtYXQiOnsiJHJlZiI6IjU3In0sIldlZWtOdW1iZXJpbmciOnsiJGlkIjoiMjgyIiwiRm9ybWF0IjowLCJJc1Zpc2libGUiOmZhbHNlLCJMYXN0S25vd25WaXNpYmlsaXR5U3RhdGUiOmZhbHNlfSwiSXNWaXNpYmxlIjp0cnVlLCJQYXJlbnRTdHlsZSI6bnVsbH0sIkluZGV4Ijo3LCJTbWFydER1cmF0aW9uQWN0aXZhdGVkIjpmYWxzZSwiRGF0ZUZvcm1hdCI6eyIkcmVmIjoiNTcifSwiV2Vla051bWJlcmluZyI6eyIkaWQiOiIyODMiLCJGb3JtYXQiOjAsIklzVmlzaWJsZSI6ZmFsc2UsIkxhc3RLbm93blZpc2liaWxpdHlTdGF0ZSI6ZmFsc2V9LCJJZCI6IjBkNDAwYTAyLTAyYjAtNDI2NC1iNTJmLTExMDgxZWVmNmVhMCIsIkltcG9ydElkIjpudWxsLCJUaXRsZSI6IkFkZCBDYXIiLCJOb3RlIjpudWxsLCJIeXBlcmxpbmsiOnsiJGlkIjoiMjg0IiwiQWRkcmVzcyI6IiIsIlN1YkFkZHJlc3MiOiIifSwiSXNDaGFuZ2VkIjpmYWxzZSwiSXNOZXciOmZhbHNlfX1dLCJfbWlsZXN0b25lcyI6W10sIklkIjoiMDAwMDAwMDAtMDAwMC0wMDAwLTAwMDAtMDAwMDAwMDAwMDAwIiwiSXNTaW5nbGVJdGVtUm93Ijp0cnVlfSx7IiRpZCI6IjI4NSIsIl90YXNrcyI6W3siJGlkIjoiMjg2IiwiX2F0dGFjaGVkTWlsZXN0b25lcyI6W10sIlRhc2tEZWZpbml0aW9uIjp7IiRpZCI6IjI4NyIsIkdyb3VwTmFtZSI6bnVsbCwiU3RhcnREYXRlIjoiMjAyMi0wNS0xMFQwMDowMDowMFoiLCJFbmREYXRlIjoiMjAyMi0wNS0xM1QyMzo1OTowMFoiLCJQZXJjZW50YWdlQ29tcGxldGUiOm51bGwsIlN0eWxlIjp7IiRpZCI6IjI4OCIsIlNoYXBlIjoyLCJTaGFwZVRoaWNrbmVzcyI6MSwiRHVyYXRpb25Gb3JtYXQiOjAsIkluY2x1ZGVOb25Xb3JraW5nRGF5c0luRHVyYXRpb24iOmZhbHNlLCJQZXJjZW50YWdlQ29tcGxldGVTdHlsZSI6eyIkaWQiOiIyODkiLCJGb250U2V0dGluZ3MiOnsiJGlkIjoiMjkwIiwiRm9udFNpemUiOjEwLCJGb250TmFtZSI6IkNhbGlicmkiLCJJc0JvbGQiOmZhbHNlLCJJc0l0YWxpYyI6ZmFsc2UsIklzVW5kZXJsaW5lZCI6ZmFsc2UsIlBhcmVudFN0eWxlIjpudWxsfSwiQXV0b1NpemUiOjAsIkZvcmVncm91bmQiOnsiJHJlZiI6IjEwIn0sIk1heFdpZHRoIjoyMDAuMCwiTWF4SGVpZ2h0IjoiSW5maW5pdHkiLCJTbWFydEZvcmVncm91bmRJc0FjdGl2ZSI6ZmFsc2UsIkhvcml6b250YWxBbGlnbm1lbnQiOjAsIlZlcnRpY2FsQWxpZ25tZW50IjowLCJTbWFydEZvcmVncm91bmQiOm51bGwsIkJhY2tncm91bmRGaWxsVHlwZSI6MCwiTWFyZ2luIjp7IiRyZWYiOiIxMiJ9LCJQYWRkaW5nIjp7IiRyZWYiOiIxMyJ9LCJCYWNrZ3JvdW5kIjp7IiRyZWYiOiIxNCJ9LCJJc1Zpc2libGUiOnRydWUsIldpZHRoIjowLjAsIkhlaWdodCI6MC4wLCJCb3JkZXJTdHlsZSI6eyIkaWQiOiIyOTEiLCJMaW5lQ29sb3IiOm51bGwsIkxpbmVXZWlnaHQiOjAuMCwiTGluZVR5cGUiOjAsIlBhcmVudFN0eWxlIjpudWxsfSwiUGFyZW50U3R5bGUiOm51bGx9LCJEdXJhdGlvblN0eWxlIjp7IiRpZCI6IjI5MiIsIkZvbnRTZXR0aW5ncyI6eyIkaWQiOiIyOTMiLCJGb250U2l6ZSI6MTAsIkZvbnROYW1lIjoiQ2FsaWJyaSIsIklzQm9sZCI6ZmFsc2UsIklzSXRhbGljIjpmYWxzZSwiSXNVbmRlcmxpbmVkIjpmYWxzZSwiUGFyZW50U3R5bGUiOm51bGx9LCJBdXRvU2l6ZSI6MCwiRm9yZWdyb3VuZCI6eyIkcmVmIjoiMTkifSwiTWF4V2lkdGgiOjIwMC4wLCJNYXhIZWlnaHQiOiJJbmZpbml0eSIsIlNtYXJ0Rm9yZWdyb3VuZElzQWN0aXZlIjpmYWxzZSwiSG9yaXpvbnRhbEFsaWdubWVudCI6MCwiVmVydGljYWxBbGlnbm1lbnQiOjAsIlNtYXJ0Rm9yZWdyb3VuZCI6bnVsbCwiQmFja2dyb3VuZEZpbGxUeXBlIjowLCJNYXJnaW4iOnsiJHJlZiI6IjIxIn0sIlBhZGRpbmciOnsiJHJlZiI6IjIyIn0sIkJhY2tncm91bmQiOnsiJHJlZiI6IjIzIn0sIklzVmlzaWJsZSI6dHJ1ZSwiV2lkdGgiOjAuMCwiSGVpZ2h0IjowLjAsIkJvcmRlclN0eWxlIjp7IiRpZCI6IjI5NCIsIkxpbmVDb2xvciI6bnVsbCwiTGluZVdlaWdodCI6MC4wLCJMaW5lVHlwZSI6MCwiUGFyZW50U3R5bGUiOm51bGx9LCJQYXJlbnRTdHlsZSI6bnVsbH0sIkhvcml6b250YWxDb25uZWN0b3JTdHlsZSI6eyIkaWQiOiIyOTUiLCJMaW5lQ29sb3IiOnsiJHJlZiI6IjI2In0sIkxpbmVXZWlnaHQiOjEuMCwiTGluZVR5cGUiOjAsIlBhcmVudFN0eWxlIjpudWxsfSwiVmVydGljYWxDb25uZWN0b3JTdHlsZSI6eyIkaWQiOiIyOTYiLCJMaW5lQ29sb3IiOnsiJHJlZiI6IjI5In0sIkxpbmVXZWlnaHQiOjAuMCwiTGluZVR5cGUiOjAsIlBhcmVudFN0eWxlIjpudWxsfSwiTWFyZ2luIjpudWxsLCJTdGFydERhdGVQb3NpdGlvbiI6MywiRW5kRGF0ZVBvc2l0aW9uIjo0LCJEYXRlSXNWaXNpYmxlIjp0cnVlLCJUaXRsZVBvc2l0aW9uIjoyLCJEdXJhdGlvblBvc2l0aW9uIjo2LCJQZXJjZW50YWdlQ29tcGxldGVkUG9zaXRpb24iOjYsIlNwYWNpbmciOjUsIklzQmVsb3dUaW1lYmFuZCI6dHJ1ZSwiUGVyY2VudGFnZUNvbXBsZXRlU2hhcGVPcGFjaXR5IjozNSwiU2hhcGVTdHlsZSI6eyIkaWQiOiIyOTciLCJNYXJnaW4iOnsiJHJlZiI6IjMyIn0sIlBhZGRpbmciOnsiJHJlZiI6IjMzIn0sIkJhY2tncm91bmQiOnsiJGlkIjoiMjk4IiwiQ29sb3IiOnsiJGlkIjoiMjk5IiwiQSI6MjU1LCJSIjo5MSwiRyI6MTU1LCJCIjoyMTN9fSwiSXNWaXNpYmxlIjp0cnVlLCJXaWR0aCI6MC4wLCJIZWlnaHQiOjE2LjAsIkJvcmRlclN0eWxlIjp7IiRpZCI6IjMwMCIsIkxpbmVDb2xvciI6eyIkcmVmIjoiMzcifSwiTGluZVdlaWdodCI6MC4wLCJMaW5lVHlwZSI6MCwiUGFyZW50U3R5bGUiOm51bGx9LCJQYXJlbnRTdHlsZSI6bnVsbH0sIlRpdGxlU3R5bGUiOnsiJGlkIjoiMzAxIiwiRm9udFNldHRpbmdzIjp7IiRpZCI6IjMwMiIsIkZvbnRTaXplIjoxMSwiRm9udE5hbWUiOiJDYWxpYnJpIiwiSXNCb2xkIjp0cnVlLCJJc0l0YWxpYyI6ZmFsc2UsIklzVW5kZXJsaW5lZCI6ZmFsc2UsIlBhcmVudFN0eWxlIjpudWxsfSwiQXV0b1NpemUiOjAsIkZvcmVncm91bmQiOnsiJGlkIjoiMzAzIiwiQ29sb3IiOnsiJGlkIjoiMzA0IiwiQSI6MjU1LCJSIjowLCJHIjowLCJCIjowfX0sIk1heFdpZHRoIjo3MjAuMCwiTWF4SGVpZ2h0IjoiSW5maW5pdHkiLCJTbWFydEZvcmVncm91bmRJc0FjdGl2ZSI6ZmFsc2UsIkhvcml6b250YWxBbGlnbm1lbnQiOjEsIlZlcnRpY2FsQWxpZ25tZW50IjowLCJTbWFydEZvcmVncm91bmQiOm51bGwsIkJhY2tncm91bmRGaWxsVHlwZSI6MCwiTWFyZ2luIjp7IiRyZWYiOiI0MyJ9LCJQYWRkaW5nIjp7IiRyZWYiOiI0NCJ9LCJCYWNrZ3JvdW5kIjp7IiRpZCI6IjMwNSIsIkNvbG9yIjp7IiRpZCI6IjMwNiIsIkEiOjAsIlIiOjI1NSwiRyI6MjU1LCJCIjoyNTV9fSwiSXNWaXNpYmxlIjp0cnVlLCJXaWR0aCI6MC4wLCJIZWlnaHQiOjAuMCwiQm9yZGVyU3R5bGUiOnsiJGlkIjoiMzA3IiwiTGluZUNvbG9yIjpudWxsLCJMaW5lV2VpZ2h0IjowLjAsIkxpbmVUeXBlIjowLCJQYXJlbnRTdHlsZSI6bnVsbH0sIlBhcmVudFN0eWxlIjpudWxsfSwiRGF0ZVN0eWxlIjp7IiRpZCI6IjMwOCIsIkZvbnRTZXR0aW5ncyI6eyIkaWQiOiIzMDkiLCJGb250U2l6ZSI6MTAsIkZvbnROYW1lIjoiQ2FsaWJyaSIsIklzQm9sZCI6ZmFsc2UsIklzSXRhbGljIjpmYWxzZSwiSXNVbmRlcmxpbmVkIjpmYWxzZSwiUGFyZW50U3R5bGUiOm51bGx9LCJBdXRvU2l6ZSI6MCwiRm9yZWdyb3VuZCI6eyIkaWQiOiIzMTAiLCJDb2xvciI6eyIkaWQiOiIzMTEiLCJBIjoyNTUsIlIiOjY4LCJHIjo4NCwiQiI6MTA2fX0sIk1heFdpZHRoIjoyMDAuMCwiTWF4SGVpZ2h0IjoiSW5maW5pdHkiLCJTbWFydEZvcmVncm91bmRJc0FjdGl2ZSI6ZmFsc2UsIkhvcml6b250YWxBbGlnbm1lbnQiOjEsIlZlcnRpY2FsQWxpZ25tZW50IjowLCJTbWFydEZvcmVncm91bmQiOm51bGwsIkJhY2tncm91bmRGaWxsVHlwZSI6MCwiTWFyZ2luIjp7IiRyZWYiOiI1MiJ9LCJQYWRkaW5nIjp7IiRyZWYiOiI1MyJ9LCJCYWNrZ3JvdW5kIjp7IiRpZCI6IjMxMiIsIkNvbG9yIjp7IiRpZCI6IjMxMyIsIkEiOjAsIlIiOjI1NSwiRyI6MjU1LCJCIjoyNTV9fSwiSXNWaXNpYmxlIjp0cnVlLCJXaWR0aCI6MC4wLCJIZWlnaHQiOjAuMCwiQm9yZGVyU3R5bGUiOnsiJGlkIjoiMzE0IiwiTGluZUNvbG9yIjpudWxsLCJMaW5lV2VpZ2h0IjowLjAsIkxpbmVUeXBlIjowLCJQYXJlbnRTdHlsZSI6bnVsbH0sIlBhcmVudFN0eWxlIjpudWxsfSwiRGF0ZUZvcm1hdCI6eyIkcmVmIjoiNTcifSwiV2Vla051bWJlcmluZyI6eyIkaWQiOiIzMTUiLCJGb3JtYXQiOjAsIklzVmlzaWJsZSI6ZmFsc2UsIkxhc3RLbm93blZpc2liaWxpdHlTdGF0ZSI6ZmFsc2V9LCJJc1Zpc2libGUiOnRydWUsIlBhcmVudFN0eWxlIjpudWxsfSwiSW5kZXgiOjgsIlNtYXJ0RHVyYXRpb25BY3RpdmF0ZWQiOmZhbHNlLCJEYXRlRm9ybWF0Ijp7IiRyZWYiOiI1NyJ9LCJXZWVrTnVtYmVyaW5nIjp7IiRpZCI6IjMxNiIsIkZvcm1hdCI6MCwiSXNWaXNpYmxlIjpmYWxzZSwiTGFzdEtub3duVmlzaWJpbGl0eVN0YXRlIjpmYWxzZX0sIklkIjoiMWNhMTNjYTUtYTk1Yy00OTM3LWI2ZGEtMzIxNDkxNmIzMGJhIiwiSW1wb3J0SWQiOm51bGwsIlRpdGxlIjoiRGVsZXRlIENhciIsIk5vdGUiOm51bGwsIkh5cGVybGluayI6eyIkaWQiOiIzMTciLCJBZGRyZXNzIjoiIiwiU3ViQWRkcmVzcyI6IiJ9LCJJc0NoYW5nZWQiOmZhbHNlLCJJc05ldyI6ZmFsc2V9fV0sIl9taWxlc3RvbmVzIjpbXSwiSWQiOiIwMDAwMDAwMC0wMDAwLTAwMDAtMDAwMC0wMDAwMDAwMDAwMDAiLCJJc1NpbmdsZUl0ZW1Sb3ciOnRydWV9LHsiJGlkIjoiMzE4IiwiX3Rhc2tzIjpbeyIkaWQiOiIzMTkiLCJfYXR0YWNoZWRNaWxlc3RvbmVzIjpbXSwiVGFza0RlZmluaXRpb24iOnsiJGlkIjoiMzIwIiwiR3JvdXBOYW1lIjpudWxsLCJTdGFydERhdGUiOiIyMDIyLTA1LTEyVDAwOjAwOjAwWiIsIkVuZERhdGUiOiIyMDIyLTA1LTEzVDIzOjU5OjAwWiIsIlBlcmNlbnRhZ2VDb21wbGV0ZSI6bnVsbCwiU3R5bGUiOnsiJGlkIjoiMzIxIiwiU2hhcGUiOjIsIlNoYXBlVGhpY2tuZXNzIjoxLCJEdXJhdGlvbkZvcm1hdCI6MCwiSW5jbHVkZU5vbldvcmtpbmdEYXlzSW5EdXJhdGlvbiI6ZmFsc2UsIlBlcmNlbnRhZ2VDb21wbGV0ZVN0eWxlIjp7IiRpZCI6IjMyMiIsIkZvbnRTZXR0aW5ncyI6eyIkaWQiOiIzMjMiLCJGb250U2l6ZSI6MTAsIkZvbnROYW1lIjoiQ2FsaWJyaSIsIklzQm9sZCI6ZmFsc2UsIklzSXRhbGljIjpmYWxzZSwiSXNVbmRlcmxpbmVkIjpmYWxzZSwiUGFyZW50U3R5bGUiOm51bGx9LCJBdXRvU2l6ZSI6MCwiRm9yZWdyb3VuZCI6eyIkcmVmIjoiMTAifSwiTWF4V2lkdGgiOjIwMC4wLCJNYXhIZWlnaHQiOiJJbmZpbml0eSIsIlNtYXJ0Rm9yZWdyb3VuZElzQWN0aXZlIjpmYWxzZSwiSG9yaXpvbnRhbEFsaWdubWVudCI6MCwiVmVydGljYWxBbGlnbm1lbnQiOjAsIlNtYXJ0Rm9yZWdyb3VuZCI6bnVsbCwiQmFja2dyb3VuZEZpbGxUeXBlIjowLCJNYXJnaW4iOnsiJHJlZiI6IjEyIn0sIlBhZGRpbmciOnsiJHJlZiI6IjEzIn0sIkJhY2tncm91bmQiOnsiJHJlZiI6IjE0In0sIklzVmlzaWJsZSI6dHJ1ZSwiV2lkdGgiOjAuMCwiSGVpZ2h0IjowLjAsIkJvcmRlclN0eWxlIjp7IiRpZCI6IjMyNCIsIkxpbmVDb2xvciI6bnVsbCwiTGluZVdlaWdodCI6MC4wLCJMaW5lVHlwZSI6MCwiUGFyZW50U3R5bGUiOm51bGx9LCJQYXJlbnRTdHlsZSI6bnVsbH0sIkR1cmF0aW9uU3R5bGUiOnsiJGlkIjoiMzI1IiwiRm9udFNldHRpbmdzIjp7IiRpZCI6IjMyNiIsIkZvbnRTaXplIjoxMCwiRm9udE5hbWUiOiJDYWxpYnJpIiwiSXNCb2xkIjpmYWxzZSwiSXNJdGFsaWMiOmZhbHNlLCJJc1VuZGVybGluZWQiOmZhbHNlLCJQYXJlbnRTdHlsZSI6bnVsbH0sIkF1dG9TaXplIjowLCJGb3JlZ3JvdW5kIjp7IiRyZWYiOiIxOSJ9LCJNYXhXaWR0aCI6MjAwLjAsIk1heEhlaWdodCI6IkluZmluaXR5IiwiU21hcnRGb3JlZ3JvdW5kSXNBY3RpdmUiOmZhbHNlLCJIb3Jpem9udGFsQWxpZ25tZW50IjowLCJWZXJ0aWNhbEFsaWdubWVudCI6MCwiU21hcnRGb3JlZ3JvdW5kIjpudWxsLCJCYWNrZ3JvdW5kRmlsbFR5cGUiOjAsIk1hcmdpbiI6eyIkcmVmIjoiMjEifSwiUGFkZGluZyI6eyIkcmVmIjoiMjIifSwiQmFja2dyb3VuZCI6eyIkcmVmIjoiMjMifSwiSXNWaXNpYmxlIjp0cnVlLCJXaWR0aCI6MC4wLCJIZWlnaHQiOjAuMCwiQm9yZGVyU3R5bGUiOnsiJGlkIjoiMzI3IiwiTGluZUNvbG9yIjpudWxsLCJMaW5lV2VpZ2h0IjowLjAsIkxpbmVUeXBlIjowLCJQYXJlbnRTdHlsZSI6bnVsbH0sIlBhcmVudFN0eWxlIjpudWxsfSwiSG9yaXpvbnRhbENvbm5lY3RvclN0eWxlIjp7IiRpZCI6IjMyOCIsIkxpbmVDb2xvciI6eyIkcmVmIjoiMjYifSwiTGluZVdlaWdodCI6MS4wLCJMaW5lVHlwZSI6MCwiUGFyZW50U3R5bGUiOm51bGx9LCJWZXJ0aWNhbENvbm5lY3RvclN0eWxlIjp7IiRpZCI6IjMyOSIsIkxpbmVDb2xvciI6eyIkcmVmIjoiMjkifSwiTGluZVdlaWdodCI6MC4wLCJMaW5lVHlwZSI6MCwiUGFyZW50U3R5bGUiOm51bGx9LCJNYXJnaW4iOm51bGwsIlN0YXJ0RGF0ZVBvc2l0aW9uIjozLCJFbmREYXRlUG9zaXRpb24iOjQsIkRhdGVJc1Zpc2libGUiOnRydWUsIlRpdGxlUG9zaXRpb24iOjIsIkR1cmF0aW9uUG9zaXRpb24iOjYsIlBlcmNlbnRhZ2VDb21wbGV0ZWRQb3NpdGlvbiI6NiwiU3BhY2luZyI6NSwiSXNCZWxvd1RpbWViYW5kIjp0cnVlLCJQZXJjZW50YWdlQ29tcGxldGVTaGFwZU9wYWNpdHkiOjM1LCJTaGFwZVN0eWxlIjp7IiRpZCI6IjMzMCIsIk1hcmdpbiI6eyIkcmVmIjoiMzIifSwiUGFkZGluZyI6eyIkcmVmIjoiMzMifSwiQmFja2dyb3VuZCI6eyIkaWQiOiIzMzEiLCJDb2xvciI6eyIkaWQiOiIzMzIiLCJBIjoyNTUsIlIiOjkxLCJHIjoxNTUsIkIiOjIxM319LCJJc1Zpc2libGUiOnRydWUsIldpZHRoIjowLjAsIkhlaWdodCI6MTYuMCwiQm9yZGVyU3R5bGUiOnsiJGlkIjoiMzMzIiwiTGluZUNvbG9yIjp7IiRyZWYiOiIzNyJ9LCJMaW5lV2VpZ2h0IjowLjAsIkxpbmVUeXBlIjowLCJQYXJlbnRTdHlsZSI6bnVsbH0sIlBhcmVudFN0eWxlIjpudWxsfSwiVGl0bGVTdHlsZSI6eyIkaWQiOiIzMzQiLCJGb250U2V0dGluZ3MiOnsiJGlkIjoiMzM1IiwiRm9udFNpemUiOjExLCJGb250TmFtZSI6IkNhbGlicmkiLCJJc0JvbGQiOnRydWUsIklzSXRhbGljIjpmYWxzZSwiSXNVbmRlcmxpbmVkIjpmYWxzZSwiUGFyZW50U3R5bGUiOm51bGx9LCJBdXRvU2l6ZSI6MCwiRm9yZWdyb3VuZCI6eyIkaWQiOiIzMzYiLCJDb2xvciI6eyIkaWQiOiIzMzciLCJBIjoyNTUsIlIiOjAsIkciOjAsIkIiOjB9fSwiTWF4V2lkdGgiOjcyMC4wLCJNYXhIZWlnaHQiOiJJbmZpbml0eSIsIlNtYXJ0Rm9yZWdyb3VuZElzQWN0aXZlIjpmYWxzZSwiSG9yaXpvbnRhbEFsaWdubWVudCI6MSwiVmVydGljYWxBbGlnbm1lbnQiOjAsIlNtYXJ0Rm9yZWdyb3VuZCI6bnVsbCwiQmFja2dyb3VuZEZpbGxUeXBlIjowLCJNYXJnaW4iOnsiJHJlZiI6IjQzIn0sIlBhZGRpbmciOnsiJHJlZiI6IjQ0In0sIkJhY2tncm91bmQiOnsiJGlkIjoiMzM4IiwiQ29sb3IiOnsiJGlkIjoiMzM5IiwiQSI6MCwiUiI6MjU1LCJHIjoyNTUsIkIiOjI1NX19LCJJc1Zpc2libGUiOnRydWUsIldpZHRoIjowLjAsIkhlaWdodCI6MC4wLCJCb3JkZXJTdHlsZSI6eyIkaWQiOiIzNDAiLCJMaW5lQ29sb3IiOm51bGwsIkxpbmVXZWlnaHQiOjAuMCwiTGluZVR5cGUiOjAsIlBhcmVudFN0eWxlIjpudWxsfSwiUGFyZW50U3R5bGUiOm51bGx9LCJEYXRlU3R5bGUiOnsiJGlkIjoiMzQxIiwiRm9udFNldHRpbmdzIjp7IiRpZCI6IjM0MiIsIkZvbnRTaXplIjoxMCwiRm9udE5hbWUiOiJDYWxpYnJpIiwiSXNCb2xkIjpmYWxzZSwiSXNJdGFsaWMiOmZhbHNlLCJJc1VuZGVybGluZWQiOmZhbHNlLCJQYXJlbnRTdHlsZSI6bnVsbH0sIkF1dG9TaXplIjowLCJGb3JlZ3JvdW5kIjp7IiRpZCI6IjM0MyIsIkNvbG9yIjp7IiRpZCI6IjM0NCIsIkEiOjI1NSwiUiI6NjgsIkciOjg0LCJCIjoxMDZ9fSwiTWF4V2lkdGgiOjIwMC4wLCJNYXhIZWlnaHQiOiJJbmZpbml0eSIsIlNtYXJ0Rm9yZWdyb3VuZElzQWN0aXZlIjpmYWxzZSwiSG9yaXpvbnRhbEFsaWdubWVudCI6MSwiVmVydGljYWxBbGlnbm1lbnQiOjAsIlNtYXJ0Rm9yZWdyb3VuZCI6bnVsbCwiQmFja2dyb3VuZEZpbGxUeXBlIjowLCJNYXJnaW4iOnsiJHJlZiI6IjUyIn0sIlBhZGRpbmciOnsiJHJlZiI6IjUzIn0sIkJhY2tncm91bmQiOnsiJGlkIjoiMzQ1IiwiQ29sb3IiOnsiJGlkIjoiMzQ2IiwiQSI6MCwiUiI6MjU1LCJHIjoyNTUsIkIiOjI1NX19LCJJc1Zpc2libGUiOnRydWUsIldpZHRoIjowLjAsIkhlaWdodCI6MC4wLCJCb3JkZXJTdHlsZSI6eyIkaWQiOiIzNDciLCJMaW5lQ29sb3IiOm51bGwsIkxpbmVXZWlnaHQiOjAuMCwiTGluZVR5cGUiOjAsIlBhcmVudFN0eWxlIjpudWxsfSwiUGFyZW50U3R5bGUiOm51bGx9LCJEYXRlRm9ybWF0Ijp7IiRyZWYiOiI1NyJ9LCJXZWVrTnVtYmVyaW5nIjp7IiRpZCI6IjM0OCIsIkZvcm1hdCI6MCwiSXNWaXNpYmxlIjpmYWxzZSwiTGFzdEtub3duVmlzaWJpbGl0eVN0YXRlIjpmYWxzZX0sIklzVmlzaWJsZSI6dHJ1ZSwiUGFyZW50U3R5bGUiOm51bGx9LCJJbmRleCI6OSwiU21hcnREdXJhdGlvbkFjdGl2YXRlZCI6ZmFsc2UsIkRhdGVGb3JtYXQiOnsiJHJlZiI6IjU3In0sIldlZWtOdW1iZXJpbmciOnsiJGlkIjoiMzQ5IiwiRm9ybWF0IjowLCJJc1Zpc2libGUiOmZhbHNlLCJMYXN0S25vd25WaXNpYmlsaXR5U3RhdGUiOmZhbHNlfSwiSWQiOiI4YjM4NDM3Yi05NmFlLTQ3YzItYTg5ZS0yZjlhNDExYzhjMjgiLCJJbXBvcnRJZCI6bnVsbCwiVGl0bGUiOiJVcGRhdGUgQ2FyIiwiTm90ZSI6bnVsbCwiSHlwZXJsaW5rIjp7IiRpZCI6IjM1MCIsIkFkZHJlc3MiOiIiLCJTdWJBZGRyZXNzIjoiIn0sIklzQ2hhbmdlZCI6ZmFsc2UsIklzTmV3IjpmYWxzZX19XSwiX21pbGVzdG9uZXMiOltdLCJJZCI6IjAwMDAwMDAwLTAwMDAtMDAwMC0wMDAwLTAwMDAwMDAwMDAwMCIsIklzU2luZ2xlSXRlbVJvdyI6dHJ1ZX1dLCJJbmRleCI6MywiSWQiOiJkYzA3NmZjZC1kMWJlLTQyMDctYjVmOS0zODE1YjM4Y2Q5MWUiLCJIZWFkZXJUZXh0IjpudWxsLCJJc0RlZmF1bHQiOnRydWUsIlN0eWxlIjp7IiRpZCI6IjM1MSIsIkhlYWRlclN0eWxlIjp7IiRpZCI6IjM1MiIsIlRleHRTdHlsZSI6eyIkaWQiOiIzNTMiLCJGb250U2V0dGluZ3MiOnsiJGlkIjoiMzU0IiwiRm9udFNpemUiOjExLCJGb250TmFtZSI6IkNhbGlicmkiLCJJc0JvbGQiOmZhbHNlLCJJc0l0YWxpYyI6ZmFsc2UsIklzVW5kZXJsaW5lZCI6ZmFsc2UsIlBhcmVudFN0eWxlIjpudWxsfSwiQXV0b1NpemUiOjIsIkZvcmVncm91bmQiOnsiJGlkIjoiMzU1IiwiQ29sb3IiOnsiJGlkIjoiMzU2IiwiQSI6MjU1LCJSIjowLCJHIjowLCJCIjowfX0sIk1heFdpZHRoIjowLjAsIk1heEhlaWdodCI6IkluZmluaXR5IiwiU21hcnRGb3JlZ3JvdW5kSXNBY3RpdmUiOmZhbHNlLCJIb3Jpem9udGFsQWxpZ25tZW50IjowLCJWZXJ0aWNhbEFsaWdubWVudCI6MCwiU21hcnRGb3JlZ3JvdW5kIjpudWxsLCJCYWNrZ3JvdW5kRmlsbFR5cGUiOjAsIk1hcmdpbiI6eyIkaWQiOiIzNTciLCJUb3AiOjAuMCwiTGVmdCI6MC4wLCJSaWdodCI6MC4wLCJCb3R0b20iOjAuMH0sIlBhZGRpbmciOnsiJGlkIjoiMzU4IiwiVG9wIjowLjAsIkxlZnQiOjAuMCwiUmlnaHQiOjAuMCwiQm90dG9tIjowLjB9LCJCYWNrZ3JvdW5kIjpudWxsLCJJc1Zpc2libGUiOnRydWUsIldpZHRoIjowLjAsIkhlaWdodCI6MC4wLCJCb3JkZXJTdHlsZSI6bnVsbCwiUGFyZW50U3R5bGUiOm51bGx9LCJSZWN0YW5nbGVTdHlsZSI6eyIkaWQiOiIzNTkiLCJNYXJnaW4iOnsiJGlkIjoiMzYwIiwiVG9wIjowLjAsIkxlZnQiOjAuMCwiUmlnaHQiOjAuMCwiQm90dG9tIjowLjB9LCJQYWRkaW5nIjp7IiRpZCI6IjM2MSIsIlRvcCI6MC4wLCJMZWZ0IjowLjAsIlJpZ2h0IjowLjAsIkJvdHRvbSI6MC4wfSwiQmFja2dyb3VuZCI6eyIkaWQiOiIzNjIiLCJDb2xvciI6eyIkaWQiOiIzNjMiLCJBIjo2MywiUiI6MjM3LCJHIjoxMjUsIkIiOjQ5fX0sIklzVmlzaWJsZSI6dHJ1ZSwiV2lkdGgiOjAuMCwiSGVpZ2h0IjowLjAsIkJvcmRlclN0eWxlIjp7IiRpZCI6IjM2NCIsIkxpbmVDb2xvciI6eyIkaWQiOiIzNjUiLCIkdHlwZSI6Ik5MUkUuQ29tbW9uLkRvbS5Tb2xpZENvbG9yQnJ1c2gsIE5MUkUuQ29tbW9uIiwiQ29sb3IiOnsiJGlkIjoiMzY2IiwiQSI6MjU1LCJSIjoyNTUsIkciOjAsIkIiOjB9fSwiTGluZVdlaWdodCI6MC4wLCJMaW5lVHlwZSI6MCwiUGFyZW50U3R5bGUiOm51bGx9LCJQYXJlbnRTdHlsZSI6bnVsbH0sIk1hcmdpbiI6eyIkaWQiOiIzNjciLCJUb3AiOjAuMCwiTGVmdCI6MC4wLCJSaWdodCI6MC4wLCJCb3R0b20iOjAuMH0sIlBhZGRpbmciOnsiJGlkIjoiMzY4IiwiVG9wIjowLjAsIkxlZnQiOjAuMCwiUmlnaHQiOjAuMCwiQm90dG9tIjowLjB9LCJCYWNrZ3JvdW5kIjpudWxsLCJJc1Zpc2libGUiOnRydWUsIldpZHRoIjowLjAsIkhlaWdodCI6MC4wLCJCb3JkZXJTdHlsZSI6bnVsbCwiUGFyZW50U3R5bGUiOm51bGx9LCJCYWNrZ3JvdW5kU3R5bGUiOnsiJGlkIjoiMzY5IiwiTWFyZ2luIjp7IiRpZCI6IjM3MCIsIlRvcCI6MC4wLCJMZWZ0IjowLjAsIlJpZ2h0IjowLjAsIkJvdHRvbSI6MC4wfSwiUGFkZGluZyI6eyIkaWQiOiIzNzEiLCJUb3AiOjAuMCwiTGVmdCI6MC4wLCJSaWdodCI6MC4wLCJCb3R0b20iOjAuMH0sIkJhY2tncm91bmQiOnsiJGlkIjoiMzcyIiwiQ29sb3IiOnsiJGlkIjoiMzczIiwiQSI6NTEsIlIiOjE2NSwiRyI6MTY1LCJCIjoxNjV9fSwiSXNWaXNpYmxlIjp0cnVlLCJXaWR0aCI6MC4wLCJIZWlnaHQiOjAuMCwiQm9yZGVyU3R5bGUiOnsiJGlkIjoiMzc0IiwiTGluZUNvbG9yIjp7IiRpZCI6IjM3NSIsIiR0eXBlIjoiTkxSRS5Db21tb24uRG9tLlNvbGlkQ29sb3JCcnVzaCwgTkxSRS5Db21tb24iLCJDb2xvciI6eyIkaWQiOiIzNzYiLCJBIjoyNTUsIlIiOjI1NSwiRyI6MCwiQiI6MH19LCJMaW5lV2VpZ2h0IjowLjAsIkxpbmVUeXBlIjowLCJQYXJlbnRTdHlsZSI6bnVsbH0sIlBhcmVudFN0eWxlIjpudWxsfSwiTWFyZ2luIjp7IiRpZCI6IjM3NyIsIlRvcCI6MC4wLCJMZWZ0IjowLjAsIlJpZ2h0IjowLjAsIkJvdHRvbSI6MC4wfSwiUGFkZGluZyI6eyIkaWQiOiIzNzgiLCJUb3AiOjAuMCwiTGVmdCI6MC4wLCJSaWdodCI6MC4wLCJCb3R0b20iOjAuMH0sIklzVmlzaWJsZSI6ZmFsc2UsIldpZHRoIjowLjAsIkhlaWdodCI6MC4wLCJCb3JkZXJTdHlsZSI6bnVsbCwiUGFyZW50U3R5bGUiOm51bGx9fV0sIklkIjoiZTIwYWM2YzMtY2EwZi00NWRkLWJiNDktNWIxOGFiYTE4YTNkIiwiSW5kZXgiOjMsIkhlYWRlclRleHQiOiJBZG1pbiBGZWF0dXJlcyIsIlN0eWxlIjp7IiRpZCI6IjM3OSIsIkhlYWRlclN0eWxlIjp7IiRpZCI6IjM4MCIsIlRleHRJc1ZlcnRpY2FsIjpmYWxzZSwiVGV4dFN0eWxlIjp7IiRpZCI6IjM4MSIsIkZvbnRTZXR0aW5ncyI6eyIkaWQiOiIzODIiLCJGb250U2l6ZSI6MTIsIkZvbnROYW1lIjoiQ2FsaWJyaSIsIklzQm9sZCI6ZmFsc2UsIklzSXRhbGljIjpmYWxzZSwiSXNVbmRlcmxpbmVkIjpmYWxzZSwiUGFyZW50U3R5bGUiOm51bGx9LCJBdXRvU2l6ZSI6MiwiRm9yZWdyb3VuZCI6eyIkcmVmIjoiMTI2In0sIk1heFdpZHRoIjoxNjAuMCwiTWF4SGVpZ2h0IjoiSW5maW5pdHkiLCJTbWFydEZvcmVncm91bmRJc0FjdGl2ZSI6ZmFsc2UsIkhvcml6b250YWxBbGlnbm1lbnQiOjAsIlZlcnRpY2FsQWxpZ25tZW50IjowLCJTbWFydEZvcmVncm91bmQiOm51bGwsIkJhY2tncm91bmRGaWxsVHlwZSI6MCwiTWFyZ2luIjp7IiRyZWYiOiIxMjgifSwiUGFkZGluZyI6eyIkcmVmIjoiMTI5In0sIkJhY2tncm91bmQiOm51bGwsIklzVmlzaWJsZSI6dHJ1ZSwiV2lkdGgiOjAuMCwiSGVpZ2h0IjowLjAsIkJvcmRlclN0eWxlIjpudWxsLCJQYXJlbnRTdHlsZSI6bnVsbH0sIlJlY3RhbmdsZVN0eWxlIjp7IiRpZCI6IjM4MyIsIk1hcmdpbiI6eyIkaWQiOiIzODQiLCJUb3AiOjAuMCwiTGVmdCI6MC4wLCJSaWdodCI6MC4wLCJCb3R0b20iOjAuMH0sIlBhZGRpbmciOnsiJGlkIjoiMzg1IiwiVG9wIjowLjAsIkxlZnQiOjAuMCwiUmlnaHQiOjAuMCwiQm90dG9tIjowLjB9LCJCYWNrZ3JvdW5kIjp7IiRpZCI6IjM4NiIsIkNvbG9yIjp7IiRpZCI6IjM4NyIsIkEiOjI1NSwiUiI6MjM3LCJHIjoxMjUsIkIiOjQ5fX0sIklzVmlzaWJsZSI6dHJ1ZSwiV2lkdGgiOjAuMCwiSGVpZ2h0IjowLjAsIkJvcmRlclN0eWxlIjp7IiRpZCI6IjM4OCIsIkxpbmVDb2xvciI6eyIkaWQiOiIzODkiLCIkdHlwZSI6Ik5MUkUuQ29tbW9uLkRvbS5Tb2xpZENvbG9yQnJ1c2gsIE5MUkUuQ29tbW9uIiwiQ29sb3IiOnsiJGlkIjoiMzkwIiwiQSI6MjU1LCJSIjoyNTUsIkciOjAsIkIiOjB9fSwiTGluZVdlaWdodCI6MC4wLCJMaW5lVHlwZSI6MCwiUGFyZW50U3R5bGUiOm51bGx9LCJQYXJlbnRTdHlsZSI6bnVsbH0sIk1hcmdpbiI6eyIkaWQiOiIzOTEiLCJUb3AiOjAuMCwiTGVmdCI6MC4wLCJSaWdodCI6MC4wLCJCb3R0b20iOjAuMH0sIlBhZGRpbmciOnsiJGlkIjoiMzkyIiwiVG9wIjowLjAsIkxlZnQiOjAuMCwiUmlnaHQiOjAuMCwiQm90dG9tIjowLjB9LCJCYWNrZ3JvdW5kIjpudWxsLCJJc1Zpc2libGUiOnRydWUsIldpZHRoIjowLjAsIkhlaWdodCI6MC4wLCJCb3JkZXJTdHlsZSI6bnVsbCwiUGFyZW50U3R5bGUiOm51bGx9LCJCYWNrZ3JvdW5kU3R5bGUiOnsiJGlkIjoiMzkzIiwiTWFyZ2luIjp7IiRpZCI6IjM5NCIsIlRvcCI6MC4wLCJMZWZ0IjowLjAsIlJpZ2h0IjowLjAsIkJvdHRvbSI6MC4wfSwiUGFkZGluZyI6eyIkaWQiOiIzOTUiLCJUb3AiOjAuMCwiTGVmdCI6MC4wLCJSaWdodCI6MC4wLCJCb3R0b20iOjAuMH0sIkJhY2tncm91bmQiOnsiJGlkIjoiMzk2IiwiQ29sb3IiOnsiJGlkIjoiMzk3IiwiQSI6NTEsIlIiOjE2NSwiRyI6MTY1LCJCIjoxNjV9fSwiSXNWaXNpYmxlIjp0cnVlLCJXaWR0aCI6MC4wLCJIZWlnaHQiOjAuMCwiQm9yZGVyU3R5bGUiOnsiJGlkIjoiMzk4IiwiTGluZUNvbG9yIjp7IiRpZCI6IjM5OSIsIiR0eXBlIjoiTkxSRS5Db21tb24uRG9tLlNvbGlkQ29sb3JCcnVzaCwgTkxSRS5Db21tb24iLCJDb2xvciI6eyIkaWQiOiI0MDAiLCJBIjoyNTUsIlIiOjI1NSwiRyI6MCwiQiI6MH19LCJMaW5lV2VpZ2h0IjowLjAsIkxpbmVUeXBlIjowLCJQYXJlbnRTdHlsZSI6bnVsbH0sIlBhcmVudFN0eWxlIjpudWxsfSwiSXNBYm92ZVRpbWViYW5kIjpmYWxzZSwiTWFyZ2luIjp7IiRpZCI6IjQwMSIsIlRvcCI6MC4wLCJMZWZ0IjowLjAsIlJpZ2h0IjowLjAsIkJvdHRvbSI6MC4wfSwiUGFkZGluZyI6eyIkaWQiOiI0MDIiLCJUb3AiOjAuMCwiTGVmdCI6MC4wLCJSaWdodCI6MC4wLCJCb3R0b20iOjAuMH0sIklzVmlzaWJsZSI6dHJ1ZSwiV2lkdGgiOjAuMCwiSGVpZ2h0IjowLjAsIkJvcmRlclN0eWxlIjp7IiRpZCI6IjQwMyIsIkxpbmVDb2xvciI6bnVsbCwiTGluZVdlaWdodCI6MC4wLCJMaW5lVHlwZSI6MCwiUGFyZW50U3R5bGUiOm51bGx9LCJQYXJlbnRTdHlsZSI6bnVsbH19LHsiJGlkIjoiNDA0IiwiX2FjdGl2aXRpZXMiOlt7IiRpZCI6IjQwNSIsIl9yb3dzIjpbeyIkaWQiOiI0MDYiLCJfdGFza3MiOlt7IiRpZCI6IjQwNyIsIl9hdHRhY2hlZE1pbGVzdG9uZXMiOltdLCJUYXNrRGVmaW5pdGlvbiI6eyIkaWQiOiI0MDgiLCJHcm91cE5hbWUiOm51bGwsIlN0YXJ0RGF0ZSI6IjIwMjItMDUtMDZUMDA6MDA6MDBaIiwiRW5kRGF0ZSI6IjIwMjItMDUtMDhUMjM6NTk6MDBaIiwiUGVyY2VudGFnZUNvbXBsZXRlIjpudWxsLCJTdHlsZSI6eyIkaWQiOiI0MDkiLCJTaGFwZSI6MiwiU2hhcGVUaGlja25lc3MiOjEsIkR1cmF0aW9uRm9ybWF0IjowLCJJbmNsdWRlTm9uV29ya2luZ0RheXNJbkR1cmF0aW9uIjpmYWxzZSwiUGVyY2VudGFnZUNvbXBsZXRlU3R5bGUiOnsiJGlkIjoiNDEwIiwiRm9udFNldHRpbmdzIjp7IiRpZCI6IjQxMSIsIkZvbnRTaXplIjoxMCwiRm9udE5hbWUiOiJDYWxpYnJpIiwiSXNCb2xkIjpmYWxzZSwiSXNJdGFsaWMiOmZhbHNlLCJJc1VuZGVybGluZWQiOmZhbHNlLCJQYXJlbnRTdHlsZSI6bnVsbH0sIkF1dG9TaXplIjowLCJGb3JlZ3JvdW5kIjp7IiRyZWYiOiIxMCJ9LCJNYXhXaWR0aCI6MjAwLjAsIk1heEhlaWdodCI6IkluZmluaXR5IiwiU21hcnRGb3JlZ3JvdW5kSXNBY3RpdmUiOmZhbHNlLCJIb3Jpem9udGFsQWxpZ25tZW50IjowLCJWZXJ0aWNhbEFsaWdubWVudCI6MCwiU21hcnRGb3JlZ3JvdW5kIjpudWxsLCJCYWNrZ3JvdW5kRmlsbFR5cGUiOjAsIk1hcmdpbiI6eyIkcmVmIjoiMTIifSwiUGFkZGluZyI6eyIkcmVmIjoiMTMifSwiQmFja2dyb3VuZCI6eyIkcmVmIjoiMTQifSwiSXNWaXNpYmxlIjp0cnVlLCJXaWR0aCI6MC4wLCJIZWlnaHQiOjAuMCwiQm9yZGVyU3R5bGUiOnsiJGlkIjoiNDEyIiwiTGluZUNvbG9yIjpudWxsLCJMaW5lV2VpZ2h0IjowLjAsIkxpbmVUeXBlIjowLCJQYXJlbnRTdHlsZSI6bnVsbH0sIlBhcmVudFN0eWxlIjpudWxsfSwiRHVyYXRpb25TdHlsZSI6eyIkaWQiOiI0MTMiLCJGb250U2V0dGluZ3MiOnsiJGlkIjoiNDE0IiwiRm9udFNpemUiOjEwLCJGb250TmFtZSI6IkNhbGlicmkiLCJJc0JvbGQiOmZhbHNlLCJJc0l0YWxpYyI6ZmFsc2UsIklzVW5kZXJsaW5lZCI6ZmFsc2UsIlBhcmVudFN0eWxlIjpudWxsfSwiQXV0b1NpemUiOjAsIkZvcmVncm91bmQiOnsiJHJlZiI6IjE5In0sIk1heFdpZHRoIjoyMDAuMCwiTWF4SGVpZ2h0IjoiSW5maW5pdHkiLCJTbWFydEZvcmVncm91bmRJc0FjdGl2ZSI6ZmFsc2UsIkhvcml6b250YWxBbGlnbm1lbnQiOjAsIlZlcnRpY2FsQWxpZ25tZW50IjowLCJTbWFydEZvcmVncm91bmQiOm51bGwsIkJhY2tncm91bmRGaWxsVHlwZSI6MCwiTWFyZ2luIjp7IiRyZWYiOiIyMSJ9LCJQYWRkaW5nIjp7IiRyZWYiOiIyMiJ9LCJCYWNrZ3JvdW5kIjp7IiRyZWYiOiIyMyJ9LCJJc1Zpc2libGUiOnRydWUsIldpZHRoIjowLjAsIkhlaWdodCI6MC4wLCJCb3JkZXJTdHlsZSI6eyIkaWQiOiI0MTUiLCJMaW5lQ29sb3IiOm51bGwsIkxpbmVXZWlnaHQiOjAuMCwiTGluZVR5cGUiOjAsIlBhcmVudFN0eWxlIjpudWxsfSwiUGFyZW50U3R5bGUiOm51bGx9LCJIb3Jpem9udGFsQ29ubmVjdG9yU3R5bGUiOnsiJGlkIjoiNDE2IiwiTGluZUNvbG9yIjp7IiRyZWYiOiIyNiJ9LCJMaW5lV2VpZ2h0IjoxLjAsIkxpbmVUeXBlIjowLCJQYXJlbnRTdHlsZSI6bnVsbH0sIlZlcnRpY2FsQ29ubmVjdG9yU3R5bGUiOnsiJGlkIjoiNDE3IiwiTGluZUNvbG9yIjp7IiRyZWYiOiIyOSJ9LCJMaW5lV2VpZ2h0IjowLjAsIkxpbmVUeXBlIjowLCJQYXJlbnRTdHlsZSI6bnVsbH0sIk1hcmdpbiI6bnVsbCwiU3RhcnREYXRlUG9zaXRpb24iOjMsIkVuZERhdGVQb3NpdGlvbiI6NCwiRGF0ZUlzVmlzaWJsZSI6dHJ1ZSwiVGl0bGVQb3NpdGlvbiI6MiwiRHVyYXRpb25Qb3NpdGlvbiI6NiwiUGVyY2VudGFnZUNvbXBsZXRlZFBvc2l0aW9uIjo2LCJTcGFjaW5nIjo1LCJJc0JlbG93VGltZWJhbmQiOnRydWUsIlBlcmNlbnRhZ2VDb21wbGV0ZVNoYXBlT3BhY2l0eSI6MzUsIlNoYXBlU3R5bGUiOnsiJGlkIjoiNDE4IiwiTWFyZ2luIjp7IiRyZWYiOiIzMiJ9LCJQYWRkaW5nIjp7IiRyZWYiOiIzMyJ9LCJCYWNrZ3JvdW5kIjp7IiRpZCI6IjQxOSIsIkNvbG9yIjp7IiRpZCI6IjQyMCIsIkEiOjI1NSwiUiI6OTEsIkciOjE1NSwiQiI6MjEzfX0sIklzVmlzaWJsZSI6dHJ1ZSwiV2lkdGgiOjAuMCwiSGVpZ2h0IjoxNi4wLCJCb3JkZXJTdHlsZSI6eyIkaWQiOiI0MjEiLCJMaW5lQ29sb3IiOnsiJHJlZiI6IjM3In0sIkxpbmVXZWlnaHQiOjAuMCwiTGluZVR5cGUiOjAsIlBhcmVudFN0eWxlIjpudWxsfSwiUGFyZW50U3R5bGUiOm51bGx9LCJUaXRsZVN0eWxlIjp7IiRpZCI6IjQyMiIsIkZvbnRTZXR0aW5ncyI6eyIkaWQiOiI0MjMiLCJGb250U2l6ZSI6MTEsIkZvbnROYW1lIjoiQ2FsaWJyaSIsIklzQm9sZCI6dHJ1ZSwiSXNJdGFsaWMiOmZhbHNlLCJJc1VuZGVybGluZWQiOmZhbHNlLCJQYXJlbnRTdHlsZSI6bnVsbH0sIkF1dG9TaXplIjowLCJGb3JlZ3JvdW5kIjp7IiRpZCI6IjQyNCIsIkNvbG9yIjp7IiRpZCI6IjQyNSIsIkEiOjI1NSwiUiI6MCwiRyI6MCwiQiI6MH19LCJNYXhXaWR0aCI6NzIwLjAsIk1heEhlaWdodCI6IkluZmluaXR5IiwiU21hcnRGb3JlZ3JvdW5kSXNBY3RpdmUiOmZhbHNlLCJIb3Jpem9udGFsQWxpZ25tZW50IjoxLCJWZXJ0aWNhbEFsaWdubWVudCI6MCwiU21hcnRGb3JlZ3JvdW5kIjpudWxsLCJCYWNrZ3JvdW5kRmlsbFR5cGUiOjAsIk1hcmdpbiI6eyIkcmVmIjoiNDMifSwiUGFkZGluZyI6eyIkcmVmIjoiNDQifSwiQmFja2dyb3VuZCI6eyIkaWQiOiI0MjYiLCJDb2xvciI6eyIkaWQiOiI0MjciLCJBIjowLCJSIjoyNTUsIkciOjI1NSwiQiI6MjU1fX0sIklzVmlzaWJsZSI6dHJ1ZSwiV2lkdGgiOjAuMCwiSGVpZ2h0IjowLjAsIkJvcmRlclN0eWxlIjp7IiRpZCI6IjQyOCIsIkxpbmVDb2xvciI6bnVsbCwiTGluZVdlaWdodCI6MC4wLCJMaW5lVHlwZSI6MCwiUGFyZW50U3R5bGUiOm51bGx9LCJQYXJlbnRTdHlsZSI6bnVsbH0sIkRhdGVTdHlsZSI6eyIkaWQiOiI0MjkiLCJGb250U2V0dGluZ3MiOnsiJGlkIjoiNDMwIiwiRm9udFNpemUiOjEwLCJGb250TmFtZSI6IkNhbGlicmkiLCJJc0JvbGQiOmZhbHNlLCJJc0l0YWxpYyI6ZmFsc2UsIklzVW5kZXJsaW5lZCI6ZmFsc2UsIlBhcmVudFN0eWxlIjpudWxsfSwiQXV0b1NpemUiOjAsIkZvcmVncm91bmQiOnsiJGlkIjoiNDMxIiwiQ29sb3IiOnsiJGlkIjoiNDMyIiwiQSI6MjU1LCJSIjo2OCwiRyI6ODQsIkIiOjEwNn19LCJNYXhXaWR0aCI6MjAwLjAsIk1heEhlaWdodCI6IkluZmluaXR5IiwiU21hcnRGb3JlZ3JvdW5kSXNBY3RpdmUiOmZhbHNlLCJIb3Jpem9udGFsQWxpZ25tZW50IjoxLCJWZXJ0aWNhbEFsaWdubWVudCI6MCwiU21hcnRGb3JlZ3JvdW5kIjpudWxsLCJCYWNrZ3JvdW5kRmlsbFR5cGUiOjAsIk1hcmdpbiI6eyIkcmVmIjoiNTIifSwiUGFkZGluZyI6eyIkcmVmIjoiNTMifSwiQmFja2dyb3VuZCI6eyIkaWQiOiI0MzMiLCJDb2xvciI6eyIkaWQiOiI0MzQiLCJBIjowLCJSIjoyNTUsIkciOjI1NSwiQiI6MjU1fX0sIklzVmlzaWJsZSI6dHJ1ZSwiV2lkdGgiOjAuMCwiSGVpZ2h0IjowLjAsIkJvcmRlclN0eWxlIjp7IiRpZCI6IjQzNSIsIkxpbmVDb2xvciI6bnVsbCwiTGluZVdlaWdodCI6MC4wLCJMaW5lVHlwZSI6MCwiUGFyZW50U3R5bGUiOm51bGx9LCJQYXJlbnRTdHlsZSI6bnVsbH0sIkRhdGVGb3JtYXQiOnsiJHJlZiI6IjU3In0sIldlZWtOdW1iZXJpbmciOnsiJGlkIjoiNDM2IiwiRm9ybWF0IjowLCJJc1Zpc2libGUiOmZhbHNlLCJMYXN0S25vd25WaXNpYmlsaXR5U3RhdGUiOmZhbHNlfSwiSXNWaXNpYmxlIjp0cnVlLCJQYXJlbnRTdHlsZSI6bnVsbH0sIkluZGV4IjoxMSwiU21hcnREdXJhdGlvbkFjdGl2YXRlZCI6ZmFsc2UsIkRhdGVGb3JtYXQiOnsiJHJlZiI6IjU3In0sIldlZWtOdW1iZXJpbmciOnsiJGlkIjoiNDM3IiwiRm9ybWF0IjowLCJJc1Zpc2libGUiOmZhbHNlLCJMYXN0S25vd25WaXNpYmlsaXR5U3RhdGUiOmZhbHNlfSwiSWQiOiI0OTFhNWQ3Yy1kMmM5LTQyMmYtOWZhMy1jNmEzYjY2ZmEwZGIiLCJJbXBvcnRJZCI6bnVsbCwiVGl0bGUiOiJVc2VyIEhvbWUgUGFnZSIsIk5vdGUiOm51bGwsIkh5cGVybGluayI6eyIkaWQiOiI0MzgiLCJBZGRyZXNzIjoiIiwiU3ViQWRkcmVzcyI6IiJ9LCJJc0NoYW5nZWQiOmZhbHNlLCJJc05ldyI6ZmFsc2V9fV0sIl9taWxlc3RvbmVzIjpbXSwiSWQiOiIwMDAwMDAwMC0wMDAwLTAwMDAtMDAwMC0wMDAwMDAwMDAwMDAiLCJJc1NpbmdsZUl0ZW1Sb3ciOnRydWV9LHsiJGlkIjoiNDM5IiwiX3Rhc2tzIjpbeyIkaWQiOiI0NDAiLCJfYXR0YWNoZWRNaWxlc3RvbmVzIjpbXSwiVGFza0RlZmluaXRpb24iOnsiJGlkIjoiNDQxIiwiR3JvdXBOYW1lIjpudWxsLCJTdGFydERhdGUiOiIyMDIyLTA1LTA5VDAwOjAwOjAwWiIsIkVuZERhdGUiOiIyMDIyLTA1LTEzVDIzOjU5OjAwWiIsIlBlcmNlbnRhZ2VDb21wbGV0ZSI6bnVsbCwiU3R5bGUiOnsiJGlkIjoiNDQyIiwiU2hhcGUiOjIsIlNoYXBlVGhpY2tuZXNzIjoxLCJEdXJhdGlvbkZvcm1hdCI6MCwiSW5jbHVkZU5vbldvcmtpbmdEYXlzSW5EdXJhdGlvbiI6ZmFsc2UsIlBlcmNlbnRhZ2VDb21wbGV0ZVN0eWxlIjp7IiRpZCI6IjQ0MyIsIkZvbnRTZXR0aW5ncyI6eyIkaWQiOiI0NDQiLCJGb250U2l6ZSI6MTAsIkZvbnROYW1lIjoiQ2FsaWJyaSIsIklzQm9sZCI6ZmFsc2UsIklzSXRhbGljIjpmYWxzZSwiSXNVbmRlcmxpbmVkIjpmYWxzZSwiUGFyZW50U3R5bGUiOm51bGx9LCJBdXRvU2l6ZSI6MCwiRm9yZWdyb3VuZCI6eyIkcmVmIjoiMTAifSwiTWF4V2lkdGgiOjIwMC4wLCJNYXhIZWlnaHQiOiJJbmZpbml0eSIsIlNtYXJ0Rm9yZWdyb3VuZElzQWN0aXZlIjpmYWxzZSwiSG9yaXpvbnRhbEFsaWdubWVudCI6MCwiVmVydGljYWxBbGlnbm1lbnQiOjAsIlNtYXJ0Rm9yZWdyb3VuZCI6bnVsbCwiQmFja2dyb3VuZEZpbGxUeXBlIjowLCJNYXJnaW4iOnsiJHJlZiI6IjEyIn0sIlBhZGRpbmciOnsiJHJlZiI6IjEzIn0sIkJhY2tncm91bmQiOnsiJHJlZiI6IjE0In0sIklzVmlzaWJsZSI6dHJ1ZSwiV2lkdGgiOjAuMCwiSGVpZ2h0IjowLjAsIkJvcmRlclN0eWxlIjp7IiRpZCI6IjQ0NSIsIkxpbmVDb2xvciI6bnVsbCwiTGluZVdlaWdodCI6MC4wLCJMaW5lVHlwZSI6MCwiUGFyZW50U3R5bGUiOm51bGx9LCJQYXJlbnRTdHlsZSI6bnVsbH0sIkR1cmF0aW9uU3R5bGUiOnsiJGlkIjoiNDQ2IiwiRm9udFNldHRpbmdzIjp7IiRpZCI6IjQ0NyIsIkZvbnRTaXplIjoxMCwiRm9udE5hbWUiOiJDYWxpYnJpIiwiSXNCb2xkIjpmYWxzZSwiSXNJdGFsaWMiOmZhbHNlLCJJc1VuZGVybGluZWQiOmZhbHNlLCJQYXJlbnRTdHlsZSI6bnVsbH0sIkF1dG9TaXplIjowLCJGb3JlZ3JvdW5kIjp7IiRyZWYiOiIxOSJ9LCJNYXhXaWR0aCI6MjAwLjAsIk1heEhlaWdodCI6IkluZmluaXR5IiwiU21hcnRGb3JlZ3JvdW5kSXNBY3RpdmUiOmZhbHNlLCJIb3Jpem9udGFsQWxpZ25tZW50IjowLCJWZXJ0aWNhbEFsaWdubWVudCI6MCwiU21hcnRGb3JlZ3JvdW5kIjpudWxsLCJCYWNrZ3JvdW5kRmlsbFR5cGUiOjAsIk1hcmdpbiI6eyIkcmVmIjoiMjEifSwiUGFkZGluZyI6eyIkcmVmIjoiMjIifSwiQmFja2dyb3VuZCI6eyIkcmVmIjoiMjMifSwiSXNWaXNpYmxlIjp0cnVlLCJXaWR0aCI6MC4wLCJIZWlnaHQiOjAuMCwiQm9yZGVyU3R5bGUiOnsiJGlkIjoiNDQ4IiwiTGluZUNvbG9yIjpudWxsLCJMaW5lV2VpZ2h0IjowLjAsIkxpbmVUeXBlIjowLCJQYXJlbnRTdHlsZSI6bnVsbH0sIlBhcmVudFN0eWxlIjpudWxsfSwiSG9yaXpvbnRhbENvbm5lY3RvclN0eWxlIjp7IiRpZCI6IjQ0OSIsIkxpbmVDb2xvciI6eyIkcmVmIjoiMjYifSwiTGluZVdlaWdodCI6MS4wLCJMaW5lVHlwZSI6MCwiUGFyZW50U3R5bGUiOm51bGx9LCJWZXJ0aWNhbENvbm5lY3RvclN0eWxlIjp7IiRpZCI6IjQ1MCIsIkxpbmVDb2xvciI6eyIkcmVmIjoiMjkifSwiTGluZVdlaWdodCI6MC4wLCJMaW5lVHlwZSI6MCwiUGFyZW50U3R5bGUiOm51bGx9LCJNYXJnaW4iOm51bGwsIlN0YXJ0RGF0ZVBvc2l0aW9uIjozLCJFbmREYXRlUG9zaXRpb24iOjQsIkRhdGVJc1Zpc2libGUiOnRydWUsIlRpdGxlUG9zaXRpb24iOjIsIkR1cmF0aW9uUG9zaXRpb24iOjYsIlBlcmNlbnRhZ2VDb21wbGV0ZWRQb3NpdGlvbiI6NiwiU3BhY2luZyI6NSwiSXNCZWxvd1RpbWViYW5kIjp0cnVlLCJQZXJjZW50YWdlQ29tcGxldGVTaGFwZU9wYWNpdHkiOjM1LCJTaGFwZVN0eWxlIjp7IiRpZCI6IjQ1MSIsIk1hcmdpbiI6eyIkcmVmIjoiMzIifSwiUGFkZGluZyI6eyIkcmVmIjoiMzMifSwiQmFja2dyb3VuZCI6eyIkaWQiOiI0NTIiLCJDb2xvciI6eyIkaWQiOiI0NTMiLCJBIjoyNTUsIlIiOjkxLCJHIjoxNTUsIkIiOjIxM319LCJJc1Zpc2libGUiOnRydWUsIldpZHRoIjowLjAsIkhlaWdodCI6MTYuMCwiQm9yZGVyU3R5bGUiOnsiJGlkIjoiNDU0IiwiTGluZUNvbG9yIjp7IiRyZWYiOiIzNyJ9LCJMaW5lV2VpZ2h0IjowLjAsIkxpbmVUeXBlIjowLCJQYXJlbnRTdHlsZSI6bnVsbH0sIlBhcmVudFN0eWxlIjpudWxsfSwiVGl0bGVTdHlsZSI6eyIkaWQiOiI0NTUiLCJGb250U2V0dGluZ3MiOnsiJGlkIjoiNDU2IiwiRm9udFNpemUiOjExLCJGb250TmFtZSI6IkNhbGlicmkiLCJJc0JvbGQiOnRydWUsIklzSXRhbGljIjpmYWxzZSwiSXNVbmRlcmxpbmVkIjpmYWxzZSwiUGFyZW50U3R5bGUiOm51bGx9LCJBdXRvU2l6ZSI6MCwiRm9yZWdyb3VuZCI6eyIkaWQiOiI0NTciLCJDb2xvciI6eyIkaWQiOiI0NTgiLCJBIjoyNTUsIlIiOjAsIkciOjAsIkIiOjB9fSwiTWF4V2lkdGgiOjcyMC4wLCJNYXhIZWlnaHQiOiJJbmZpbml0eSIsIlNtYXJ0Rm9yZWdyb3VuZElzQWN0aXZlIjpmYWxzZSwiSG9yaXpvbnRhbEFsaWdubWVudCI6MSwiVmVydGljYWxBbGlnbm1lbnQiOjAsIlNtYXJ0Rm9yZWdyb3VuZCI6bnVsbCwiQmFja2dyb3VuZEZpbGxUeXBlIjowLCJNYXJnaW4iOnsiJHJlZiI6IjQzIn0sIlBhZGRpbmciOnsiJHJlZiI6IjQ0In0sIkJhY2tncm91bmQiOnsiJGlkIjoiNDU5IiwiQ29sb3IiOnsiJGlkIjoiNDYwIiwiQSI6MCwiUiI6MjU1LCJHIjoyNTUsIkIiOjI1NX19LCJJc1Zpc2libGUiOnRydWUsIldpZHRoIjowLjAsIkhlaWdodCI6MC4wLCJCb3JkZXJTdHlsZSI6eyIkaWQiOiI0NjEiLCJMaW5lQ29sb3IiOm51bGwsIkxpbmVXZWlnaHQiOjAuMCwiTGluZVR5cGUiOjAsIlBhcmVudFN0eWxlIjpudWxsfSwiUGFyZW50U3R5bGUiOm51bGx9LCJEYXRlU3R5bGUiOnsiJGlkIjoiNDYyIiwiRm9udFNldHRpbmdzIjp7IiRpZCI6IjQ2MyIsIkZvbnRTaXplIjoxMCwiRm9udE5hbWUiOiJDYWxpYnJpIiwiSXNCb2xkIjpmYWxzZSwiSXNJdGFsaWMiOmZhbHNlLCJJc1VuZGVybGluZWQiOmZhbHNlLCJQYXJlbnRTdHlsZSI6bnVsbH0sIkF1dG9TaXplIjowLCJGb3JlZ3JvdW5kIjp7IiRpZCI6IjQ2NCIsIkNvbG9yIjp7IiRpZCI6IjQ2NSIsIkEiOjI1NSwiUiI6NjgsIkciOjg0LCJCIjoxMDZ9fSwiTWF4V2lkdGgiOjIwMC4wLCJNYXhIZWlnaHQiOiJJbmZpbml0eSIsIlNtYXJ0Rm9yZWdyb3VuZElzQWN0aXZlIjpmYWxzZSwiSG9yaXpvbnRhbEFsaWdubWVudCI6MSwiVmVydGljYWxBbGlnbm1lbnQiOjAsIlNtYXJ0Rm9yZWdyb3VuZCI6bnVsbCwiQmFja2dyb3VuZEZpbGxUeXBlIjowLCJNYXJnaW4iOnsiJHJlZiI6IjUyIn0sIlBhZGRpbmciOnsiJHJlZiI6IjUzIn0sIkJhY2tncm91bmQiOnsiJGlkIjoiNDY2IiwiQ29sb3IiOnsiJGlkIjoiNDY3IiwiQSI6MCwiUiI6MjU1LCJHIjoyNTUsIkIiOjI1NX19LCJJc1Zpc2libGUiOnRydWUsIldpZHRoIjowLjAsIkhlaWdodCI6MC4wLCJCb3JkZXJTdHlsZSI6eyIkaWQiOiI0NjgiLCJMaW5lQ29sb3IiOm51bGwsIkxpbmVXZWlnaHQiOjAuMCwiTGluZVR5cGUiOjAsIlBhcmVudFN0eWxlIjpudWxsfSwiUGFyZW50U3R5bGUiOm51bGx9LCJEYXRlRm9ybWF0Ijp7IiRyZWYiOiI1NyJ9LCJXZWVrTnVtYmVyaW5nIjp7IiRpZCI6IjQ2OSIsIkZvcm1hdCI6MCwiSXNWaXNpYmxlIjpmYWxzZSwiTGFzdEtub3duVmlzaWJpbGl0eVN0YXRlIjpmYWxzZX0sIklzVmlzaWJsZSI6dHJ1ZSwiUGFyZW50U3R5bGUiOm51bGx9LCJJbmRleCI6MTIsIlNtYXJ0RHVyYXRpb25BY3RpdmF0ZWQiOmZhbHNlLCJEYXRlRm9ybWF0Ijp7IiRyZWYiOiI1NyJ9LCJXZWVrTnVtYmVyaW5nIjp7IiRpZCI6IjQ3MCIsIkZvcm1hdCI6MCwiSXNWaXNpYmxlIjpmYWxzZSwiTGFzdEtub3duVmlzaWJpbGl0eVN0YXRlIjpmYWxzZX0sIklkIjoiMTk2ZTQ2MWYtYTNiOS00YmVkLThiYzUtNmRjOTllNjc2ZGViIiwiSW1wb3J0SWQiOm51bGwsIlRpdGxlIjoiQ2FyIFJlc2VydmF0aW9uIiwiTm90ZSI6bnVsbCwiSHlwZXJsaW5rIjp7IiRpZCI6IjQ3MSIsIkFkZHJlc3MiOiIiLCJTdWJBZGRyZXNzIjoiIn0sIklzQ2hhbmdlZCI6ZmFsc2UsIklzTmV3IjpmYWxzZX19XSwiX21pbGVzdG9uZXMiOltdLCJJZCI6IjAwMDAwMDAwLTAwMDAtMDAwMC0wMDAwLTAwMDAwMDAwMDAwMCIsIklzU2luZ2xlSXRlbVJvdyI6dHJ1ZX1dLCJJbmRleCI6MTAsIklkIjoiMmU2Y2QxM2ItOTkzNC00NTNmLTk1NjktYzA0ZTVlNjVhNmViIiwiSGVhZGVyVGV4dCI6bnVsbCwiSXNEZWZhdWx0Ijp0cnVlLCJTdHlsZSI6eyIkaWQiOiI0NzIiLCJIZWFkZXJTdHlsZSI6eyIkaWQiOiI0NzMiLCJUZXh0U3R5bGUiOnsiJGlkIjoiNDc0IiwiRm9udFNldHRpbmdzIjp7IiRpZCI6IjQ3NSIsIkZvbnRTaXplIjoxMSwiRm9udE5hbWUiOiJDYWxpYnJpIiwiSXNCb2xkIjpmYWxzZSwiSXNJdGFsaWMiOmZhbHNlLCJJc1VuZGVybGluZWQiOmZhbHNlLCJQYXJlbnRTdHlsZSI6bnVsbH0sIkF1dG9TaXplIjoyLCJGb3JlZ3JvdW5kIjp7IiRpZCI6IjQ3NiIsIkNvbG9yIjp7IiRpZCI6IjQ3NyIsIkEiOjI1NSwiUiI6MCwiRyI6MCwiQiI6MH19LCJNYXhXaWR0aCI6MC4wLCJNYXhIZWlnaHQiOiJJbmZpbml0eSIsIlNtYXJ0Rm9yZWdyb3VuZElzQWN0aXZlIjpmYWxzZSwiSG9yaXpvbnRhbEFsaWdubWVudCI6MCwiVmVydGljYWxBbGlnbm1lbnQiOjAsIlNtYXJ0Rm9yZWdyb3VuZCI6bnVsbCwiQmFja2dyb3VuZEZpbGxUeXBlIjowLCJNYXJnaW4iOnsiJGlkIjoiNDc4IiwiVG9wIjowLjAsIkxlZnQiOjAuMCwiUmlnaHQiOjAuMCwiQm90dG9tIjowLjB9LCJQYWRkaW5nIjp7IiRpZCI6IjQ3OSIsIlRvcCI6MC4wLCJMZWZ0IjowLjAsIlJpZ2h0IjowLjAsIkJvdHRvbSI6MC4wfSwiQmFja2dyb3VuZCI6bnVsbCwiSXNWaXNpYmxlIjp0cnVlLCJXaWR0aCI6MC4wLCJIZWlnaHQiOjAuMCwiQm9yZGVyU3R5bGUiOm51bGwsIlBhcmVudFN0eWxlIjpudWxsfSwiUmVjdGFuZ2xlU3R5bGUiOnsiJGlkIjoiNDgwIiwiTWFyZ2luIjp7IiRpZCI6IjQ4MSIsIlRvcCI6MC4wLCJMZWZ0IjowLjAsIlJpZ2h0IjowLjAsIkJvdHRvbSI6MC4wfSwiUGFkZGluZyI6eyIkaWQiOiI0ODIiLCJUb3AiOjAuMCwiTGVmdCI6MC4wLCJSaWdodCI6MC4wLCJCb3R0b20iOjAuMH0sIkJhY2tncm91bmQiOnsiJGlkIjoiNDgzIiwiQ29sb3IiOnsiJGlkIjoiNDg0IiwiQSI6NjMsIlIiOjE2NSwiRyI6MTY1LCJCIjoxNjV9fSwiSXNWaXNpYmxlIjp0cnVlLCJXaWR0aCI6MC4wLCJIZWlnaHQiOjAuMCwiQm9yZGVyU3R5bGUiOnsiJGlkIjoiNDg1IiwiTGluZUNvbG9yIjp7IiRpZCI6IjQ4NiIsIiR0eXBlIjoiTkxSRS5Db21tb24uRG9tLlNvbGlkQ29sb3JCcnVzaCwgTkxSRS5Db21tb24iLCJDb2xvciI6eyIkaWQiOiI0ODciLCJBIjoyNTUsIlIiOjI1NSwiRyI6MCwiQiI6MH19LCJMaW5lV2VpZ2h0IjowLjAsIkxpbmVUeXBlIjowLCJQYXJlbnRTdHlsZSI6bnVsbH0sIlBhcmVudFN0eWxlIjpudWxsfSwiTWFyZ2luIjp7IiRpZCI6IjQ4OCIsIlRvcCI6MC4wLCJMZWZ0IjowLjAsIlJpZ2h0IjowLjAsIkJvdHRvbSI6MC4wfSwiUGFkZGluZyI6eyIkaWQiOiI0ODkiLCJUb3AiOjAuMCwiTGVmdCI6MC4wLCJSaWdodCI6MC4wLCJCb3R0b20iOjAuMH0sIkJhY2tncm91bmQiOm51bGwsIklzVmlzaWJsZSI6dHJ1ZSwiV2lkdGgiOjAuMCwiSGVpZ2h0IjowLjAsIkJvcmRlclN0eWxlIjpudWxsLCJQYXJlbnRTdHlsZSI6bnVsbH0sIkJhY2tncm91bmRTdHlsZSI6eyIkaWQiOiI0OTAiLCJNYXJnaW4iOnsiJGlkIjoiNDkxIiwiVG9wIjowLjAsIkxlZnQiOjAuMCwiUmlnaHQiOjAuMCwiQm90dG9tIjowLjB9LCJQYWRkaW5nIjp7IiRpZCI6IjQ5MiIsIlRvcCI6MC4wLCJMZWZ0IjowLjAsIlJpZ2h0IjowLjAsIkJvdHRvbSI6MC4wfSwiQmFja2dyb3VuZCI6eyIkaWQiOiI0OTMiLCJDb2xvciI6eyIkaWQiOiI0OTQiLCJBIjo1MSwiUiI6MTY1LCJHIjoxNjUsIkIiOjE2NX19LCJJc1Zpc2libGUiOnRydWUsIldpZHRoIjowLjAsIkhlaWdodCI6MC4wLCJCb3JkZXJTdHlsZSI6eyIkaWQiOiI0OTUiLCJMaW5lQ29sb3IiOnsiJGlkIjoiNDk2IiwiJHR5cGUiOiJOTFJFLkNvbW1vbi5Eb20uU29saWRDb2xvckJydXNoLCBOTFJFLkNvbW1vbiIsIkNvbG9yIjp7IiRpZCI6IjQ5NyIsIkEiOjI1NSwiUiI6MjU1LCJHIjowLCJCIjowfX0sIkxpbmVXZWlnaHQiOjAuMCwiTGluZVR5cGUiOjAsIlBhcmVudFN0eWxlIjpudWxsfSwiUGFyZW50U3R5bGUiOm51bGx9LCJNYXJnaW4iOnsiJGlkIjoiNDk4IiwiVG9wIjowLjAsIkxlZnQiOjAuMCwiUmlnaHQiOjAuMCwiQm90dG9tIjowLjB9LCJQYWRkaW5nIjp7IiRpZCI6IjQ5OSIsIlRvcCI6MC4wLCJMZWZ0IjowLjAsIlJpZ2h0IjowLjAsIkJvdHRvbSI6MC4wfSwiSXNWaXNpYmxlIjpmYWxzZSwiV2lkdGgiOjAuMCwiSGVpZ2h0IjowLjAsIkJvcmRlclN0eWxlIjpudWxsLCJQYXJlbnRTdHlsZSI6bnVsbH19XSwiSWQiOiJmODM4MTRkNC1kYjVmLTQ0NDYtYTY4Ni1iZjY4MDZhN2ZlYzkiLCJJbmRleCI6MTAsIkhlYWRlclRleHQiOiJVc2VyIEZlYXR1cmVzIiwiU3R5bGUiOnsiJGlkIjoiNTAwIiwiSGVhZGVyU3R5bGUiOnsiJGlkIjoiNTAxIiwiVGV4dElzVmVydGljYWwiOmZhbHNlLCJUZXh0U3R5bGUiOnsiJGlkIjoiNTAyIiwiRm9udFNldHRpbmdzIjp7IiRpZCI6IjUwMyIsIkZvbnRTaXplIjoxMiwiRm9udE5hbWUiOiJDYWxpYnJpIiwiSXNCb2xkIjpmYWxzZSwiSXNJdGFsaWMiOmZhbHNlLCJJc1VuZGVybGluZWQiOmZhbHNlLCJQYXJlbnRTdHlsZSI6bnVsbH0sIkF1dG9TaXplIjoyLCJGb3JlZ3JvdW5kIjp7IiRyZWYiOiIxMjYifSwiTWF4V2lkdGgiOjE2MC4wLCJNYXhIZWlnaHQiOiJJbmZpbml0eSIsIlNtYXJ0Rm9yZWdyb3VuZElzQWN0aXZlIjpmYWxzZSwiSG9yaXpvbnRhbEFsaWdubWVudCI6MCwiVmVydGljYWxBbGlnbm1lbnQiOjAsIlNtYXJ0Rm9yZWdyb3VuZCI6bnVsbCwiQmFja2dyb3VuZEZpbGxUeXBlIjowLCJNYXJnaW4iOnsiJHJlZiI6IjEyOCJ9LCJQYWRkaW5nIjp7IiRyZWYiOiIxMjkifSwiQmFja2dyb3VuZCI6bnVsbCwiSXNWaXNpYmxlIjp0cnVlLCJXaWR0aCI6MC4wLCJIZWlnaHQiOjAuMCwiQm9yZGVyU3R5bGUiOm51bGwsIlBhcmVudFN0eWxlIjpudWxsfSwiUmVjdGFuZ2xlU3R5bGUiOnsiJGlkIjoiNTA0IiwiTWFyZ2luIjp7IiRpZCI6IjUwNSIsIlRvcCI6MC4wLCJMZWZ0IjowLjAsIlJpZ2h0IjowLjAsIkJvdHRvbSI6MC4wfSwiUGFkZGluZyI6eyIkaWQiOiI1MDYiLCJUb3AiOjAuMCwiTGVmdCI6MC4wLCJSaWdodCI6MC4wLCJCb3R0b20iOjAuMH0sIkJhY2tncm91bmQiOnsiJGlkIjoiNTA3IiwiQ29sb3IiOnsiJGlkIjoiNTA4IiwiQSI6MjU1LCJSIjoxNjUsIkciOjE2NSwiQiI6MTY1fX0sIklzVmlzaWJsZSI6dHJ1ZSwiV2lkdGgiOjAuMCwiSGVpZ2h0IjowLjAsIkJvcmRlclN0eWxlIjp7IiRpZCI6IjUwOSIsIkxpbmVDb2xvciI6eyIkaWQiOiI1MTAiLCIkdHlwZSI6Ik5MUkUuQ29tbW9uLkRvbS5Tb2xpZENvbG9yQnJ1c2gsIE5MUkUuQ29tbW9uIiwiQ29sb3IiOnsiJGlkIjoiNTExIiwiQSI6MjU1LCJSIjoyNTUsIkciOjAsIkIiOjB9fSwiTGluZVdlaWdodCI6MC4wLCJMaW5lVHlwZSI6MCwiUGFyZW50U3R5bGUiOm51bGx9LCJQYXJlbnRTdHlsZSI6bnVsbH0sIk1hcmdpbiI6eyIkaWQiOiI1MTIiLCJUb3AiOjAuMCwiTGVmdCI6MC4wLCJSaWdodCI6MC4wLCJCb3R0b20iOjAuMH0sIlBhZGRpbmciOnsiJGlkIjoiNTEzIiwiVG9wIjowLjAsIkxlZnQiOjAuMCwiUmlnaHQiOjAuMCwiQm90dG9tIjowLjB9LCJCYWNrZ3JvdW5kIjpudWxsLCJJc1Zpc2libGUiOnRydWUsIldpZHRoIjowLjAsIkhlaWdodCI6MC4wLCJCb3JkZXJTdHlsZSI6bnVsbCwiUGFyZW50U3R5bGUiOm51bGx9LCJCYWNrZ3JvdW5kU3R5bGUiOnsiJGlkIjoiNTE0IiwiTWFyZ2luIjp7IiRpZCI6IjUxNSIsIlRvcCI6MC4wLCJMZWZ0IjowLjAsIlJpZ2h0IjowLjAsIkJvdHRvbSI6MC4wfSwiUGFkZGluZyI6eyIkaWQiOiI1MTYiLCJUb3AiOjAuMCwiTGVmdCI6MC4wLCJSaWdodCI6MC4wLCJCb3R0b20iOjAuMH0sIkJhY2tncm91bmQiOnsiJGlkIjoiNTE3IiwiQ29sb3IiOnsiJGlkIjoiNTE4IiwiQSI6NTEsIlIiOjE2NSwiRyI6MTY1LCJCIjoxNjV9fSwiSXNWaXNpYmxlIjp0cnVlLCJXaWR0aCI6MC4wLCJIZWlnaHQiOjAuMCwiQm9yZGVyU3R5bGUiOnsiJGlkIjoiNTE5IiwiTGluZUNvbG9yIjp7IiRpZCI6IjUyMCIsIiR0eXBlIjoiTkxSRS5Db21tb24uRG9tLlNvbGlkQ29sb3JCcnVzaCwgTkxSRS5Db21tb24iLCJDb2xvciI6eyIkaWQiOiI1MjEiLCJBIjoyNTUsIlIiOjI1NSwiRyI6MCwiQiI6MH19LCJMaW5lV2VpZ2h0IjowLjAsIkxpbmVUeXBlIjowLCJQYXJlbnRTdHlsZSI6bnVsbH0sIlBhcmVudFN0eWxlIjpudWxsfSwiSXNBYm92ZVRpbWViYW5kIjpmYWxzZSwiTWFyZ2luIjp7IiRpZCI6IjUyMiIsIlRvcCI6MC4wLCJMZWZ0IjowLjAsIlJpZ2h0IjowLjAsIkJvdHRvbSI6MC4wfSwiUGFkZGluZyI6eyIkaWQiOiI1MjMiLCJUb3AiOjAuMCwiTGVmdCI6MC4wLCJSaWdodCI6MC4wLCJCb3R0b20iOjAuMH0sIklzVmlzaWJsZSI6dHJ1ZSwiV2lkdGgiOjAuMCwiSGVpZ2h0IjowLjAsIkJvcmRlclN0eWxlIjp7IiRpZCI6IjUyNCIsIkxpbmVDb2xvciI6bnVsbCwiTGluZVdlaWdodCI6MC4wLCJMaW5lVHlwZSI6MCwiUGFyZW50U3R5bGUiOm51bGx9LCJQYXJlbnRTdHlsZSI6bnVsbH19XSwiQ3VsdHVyZUluZm9OYW1lIjoiZW4tVVMiLCJTdHlsZU5hbWUiOm51bGwsIlZlcnNpb24iOnsiJGlkIjoiNTI1IiwiVmVyc2lvbiI6IjMuNi4xIiwiT3JpZ2luYWxBc3NlbWJseVZlcnNpb24iOiI2LjA2LjAyLjAwIiwiRWRpdGlvbiI6bnVsbCwiTGFzdFNhdmVkRWRpdGlvbiI6MCwiSXNQbHVzRWRpdGlvbiI6ZmFsc2UsIklzUHJvRWRpdGlvbiI6ZmFsc2V9LCJFZmZlY3QiOjEsIlN0eWxlIjp7IiRpZCI6IjUyNiIsIlRpbWViYW5kU3R5bGUiOnsiJGlkIjoiNTI3IiwiU2NhbGVNYXJraW5nIjowLCJTaGFwZSI6MCwiU2hhcGVTdHlsZSI6eyIkaWQiOiI1MjgiLCJNYXJnaW4iOnsiJGlkIjoiNTI5IiwiVG9wIjowLjAsIkxlZnQiOjEwLjAsIlJpZ2h0IjoxMC4wLCJCb3R0b20iOjAuMH0sIlBhZGRpbmciOnsiJGlkIjoiNTMwIiwiVG9wIjo1LjAsIkxlZnQiOjEzLjAsIlJpZ2h0IjoxMy4wLCJCb3R0b20iOjUuMH0sIkJhY2tncm91bmQiOnsiJGlkIjoiNTMxIiwiQ29sb3IiOnsiJGlkIjoiNTMyIiwiQSI6MjU1LCJSIjo2OCwiRyI6ODQsIkIiOjEwNn19LCJJc1Zpc2libGUiOnRydWUsIldpZHRoIjo4NTguMCwiSGVpZ2h0IjozMC4wLCJCb3JkZXJTdHlsZSI6eyIkaWQiOiI1MzMiLCJMaW5lQ29sb3IiOnsiJGlkIjoiNTM0IiwiJHR5cGUiOiJOTFJFLkNvbW1vbi5Eb20uU29saWRDb2xvckJydXNoLCBOTFJFLkNvbW1vbiIsIkNvbG9yIjp7IiRpZCI6IjUzNSIsIkEiOjI1NSwiUiI6MjU1LCJHIjowLCJCIjowfX0sIkxpbmVXZWlnaHQiOjAuMCwiTGluZVR5cGUiOjAsIlBhcmVudFN0eWxlIjpudWxsfSwiUGFyZW50U3R5bGUiOm51bGx9LCJNaWRkbGVUaWVyU2hhcGVTdHlsZSI6eyIkaWQiOiI1MzYiLCJNYXJnaW4iOnsiJGlkIjoiNTM3IiwiVG9wIjowLjAsIkxlZnQiOjEwLjAsIlJpZ2h0IjoxMC4wLCJCb3R0b20iOjAuMH0sIlBhZGRpbmciOnsiJGlkIjoiNTM4IiwiVG9wIjo1LjAsIkxlZnQiOjEzLjAsIlJpZ2h0IjoxMy4wLCJCb3R0b20iOjUuMH0sIkJhY2tncm91bmQiOnsiJGlkIjoiNTM5IiwiQ29sb3IiOnsiJGlkIjoiNTQwIiwiQSI6MjU1LCJSIjo2OCwiRyI6ODQsIkIiOjEwNn19LCJJc1Zpc2libGUiOnRydWUsIldpZHRoIjo4NTguMCwiSGVpZ2h0IjozMC4wLCJCb3JkZXJTdHlsZSI6eyIkaWQiOiI1NDEiLCJMaW5lQ29sb3IiOnsiJGlkIjoiNTQyIiwiJHR5cGUiOiJOTFJFLkNvbW1vbi5Eb20uU29saWRDb2xvckJydXNoLCBOTFJFLkNvbW1vbiIsIkNvbG9yIjp7IiRpZCI6IjU0MyIsIkEiOjI1NSwiUiI6MjU1LCJHIjowLCJCIjowfX0sIkxpbmVXZWlnaHQiOjAuMCwiTGluZVR5cGUiOjAsIlBhcmVudFN0eWxlIjpudWxsfSwiUGFyZW50U3R5bGUiOm51bGx9LCJCb3R0b21UaWVyU2hhcGVTdHlsZSI6eyIkaWQiOiI1NDQiLCJNYXJnaW4iOnsiJGlkIjoiNTQ1IiwiVG9wIjowLjAsIkxlZnQiOjEwLjAsIlJpZ2h0IjoxMC4wLCJCb3R0b20iOjAuMH0sIlBhZGRpbmciOnsiJGlkIjoiNTQ2IiwiVG9wIjo1LjAsIkxlZnQiOjEzLjAsIlJpZ2h0IjoxMy4wLCJCb3R0b20iOjUuMH0sIkJhY2tncm91bmQiOnsiJGlkIjoiNTQ3IiwiQ29sb3IiOnsiJGlkIjoiNTQ4IiwiQSI6MjU1LCJSIjo2OCwiRyI6ODQsIkIiOjEwNn19LCJJc1Zpc2libGUiOnRydWUsIldpZHRoIjo4NTguMCwiSGVpZ2h0IjozMC4wLCJCb3JkZXJTdHlsZSI6eyIkaWQiOiI1NDkiLCJMaW5lQ29sb3IiOnsiJGlkIjoiNTUwIiwiJHR5cGUiOiJOTFJFLkNvbW1vbi5Eb20uU29saWRDb2xvckJydXNoLCBOTFJFLkNvbW1vbiIsIkNvbG9yIjp7IiRpZCI6IjU1MSIsIkEiOjI1NSwiUiI6MjU1LCJHIjowLCJCIjowfX0sIkxpbmVXZWlnaHQiOjAuMCwiTGluZVR5cGUiOjAsIlBhcmVudFN0eWxlIjpudWxsfSwiUGFyZW50U3R5bGUiOm51bGx9LCJSaWdodEVuZENhcHNTdHlsZSI6eyIkaWQiOiI1NTIiLCJGb250U2V0dGluZ3MiOnsiJGlkIjoiNTUzIiwiRm9udFNpemUiOjE4LCJGb250TmFtZSI6IkNhbGlicmkiLCJJc0JvbGQiOnRydWUsIklzSXRhbGljIjpmYWxzZSwiSXNVbmRlcmxpbmVkIjpmYWxzZSwiUGFyZW50U3R5bGUiOm51bGx9LCJBdXRvU2l6ZSI6MCwiRm9yZWdyb3VuZCI6eyIkaWQiOiI1NTQiLCJDb2xvciI6eyIkaWQiOiI1NTUiLCJBIjoyNTUsIlIiOjIzNywiRyI6MTI1LCJCIjo0OX19LCJNYXhXaWR0aCI6IkluZmluaXR5IiwiTWF4SGVpZ2h0IjoiSW5maW5pdHkiLCJTbWFydEZvcmVncm91bmRJc0FjdGl2ZSI6ZmFsc2UsIkhvcml6b250YWxBbGlnbm1lbnQiOjAsIlZlcnRpY2FsQWxpZ25tZW50IjowLCJTbWFydEZvcmVncm91bmQiOm51bGwsIkJhY2tncm91bmRGaWxsVHlwZSI6MCwiTWFyZ2luIjp7IiRpZCI6IjU1NiIsIlRvcCI6MC4wLCJMZWZ0IjowLjAsIlJpZ2h0IjoyMC4wLCJCb3R0b20iOjAuMH0sIlBhZGRpbmciOnsiJGlkIjoiNTU3IiwiVG9wIjowLjAsIkxlZnQiOjAuMCwiUmlnaHQiOjAuMCwiQm90dG9tIjowLjB9LCJCYWNrZ3JvdW5kIjp7IiRpZCI6IjU1OCIsIkNvbG9yIjp7IiRyZWYiOiIxNSJ9fSwiSXNWaXNpYmxlIjp0cnVlLCJXaWR0aCI6MC4wLCJIZWlnaHQiOjAuMCwiQm9yZGVyU3R5bGUiOm51bGwsIlBhcmVudFN0eWxlIjpudWxsfSwiTGVmdEVuZENhcHNTdHlsZSI6eyIkaWQiOiI1NTkiLCJGb250U2V0dGluZ3MiOnsiJGlkIjoiNTYwIiwiRm9udFNpemUiOjE4LCJGb250TmFtZSI6IkNhbGlicmkiLCJJc0JvbGQiOnRydWUsIklzSXRhbGljIjpmYWxzZSwiSXNVbmRlcmxpbmVkIjpmYWxzZSwiUGFyZW50U3R5bGUiOm51bGx9LCJBdXRvU2l6ZSI6MCwiRm9yZWdyb3VuZCI6eyIkaWQiOiI1NjEiLCJDb2xvciI6eyIkaWQiOiI1NjIiLCJBIjoyNTUsIlIiOjIzNywiRyI6MTI1LCJCIjo0OX19LCJNYXhXaWR0aCI6IkluZmluaXR5IiwiTWF4SGVpZ2h0IjoiSW5maW5pdHkiLCJTbWFydEZvcmVncm91bmRJc0FjdGl2ZSI6ZmFsc2UsIkhvcml6b250YWxBbGlnbm1lbnQiOjAsIlZlcnRpY2FsQWxpZ25tZW50IjowLCJTbWFydEZvcmVncm91bmQiOm51bGwsIkJhY2tncm91bmRGaWxsVHlwZSI6MCwiTWFyZ2luIjp7IiRpZCI6IjU2MyIsIlRvcCI6MC4wLCJMZWZ0IjoxMTUuNTA2NjY2NjY2NjY2NjYsIlJpZ2h0IjowLjAsIkJvdHRvbSI6MC4wfSwiUGFkZGluZyI6eyIkaWQiOiI1NjQiLCJUb3AiOjAuMCwiTGVmdCI6MC4wLCJSaWdodCI6MC4wLCJCb3R0b20iOjAuMH0sIkJhY2tncm91bmQiOnsiJGlkIjoiNTY1IiwiQ29sb3IiOnsiJHJlZiI6IjE1In19LCJJc1Zpc2libGUiOmZhbHNlLCJXaWR0aCI6MC4wLCJIZWlnaHQiOjAuMCwiQm9yZGVyU3R5bGUiOm51bGwsIlBhcmVudFN0eWxlIjpudWxsfSwiVG9kYXlUZXh0U3R5bGUiOnsiJGlkIjoiNTY2IiwiRm9udFNldHRpbmdzIjp7IiRpZCI6IjU2NyIsIkZvbnRTaXplIjoxMiwiRm9udE5hbWUiOiJDYWxpYnJpIiwiSXNCb2xkIjpmYWxzZSwiSXNJdGFsaWMiOmZhbHNlLCJJc1VuZGVybGluZWQiOmZhbHNlLCJQYXJlbnRTdHlsZSI6bnVsbH0sIkF1dG9TaXplIjowLCJGb3JlZ3JvdW5kIjp7IiRpZCI6IjU2OCIsIkNvbG9yIjp7IiRpZCI6IjU2OSIsIkEiOjI1NSwiUiI6MCwiRyI6MCwiQiI6MH19LCJNYXhXaWR0aCI6MjAwLjAsIk1heEhlaWdodCI6IkluZmluaXR5IiwiU21hcnRGb3JlZ3JvdW5kSXNBY3RpdmUiOmZhbHNlLCJIb3Jpem9udGFsQWxpZ25tZW50IjowLCJWZXJ0aWNhbEFsaWdubWVudCI6MCwiU21hcnRGb3JlZ3JvdW5kIjpudWxsLCJCYWNrZ3JvdW5kRmlsbFR5cGUiOjAsIk1hcmdpbiI6eyIkaWQiOiI1NzAiLCJUb3AiOjAuMCwiTGVmdCI6MC4wLCJSaWdodCI6MC4wLCJCb3R0b20iOjAuMH0sIlBhZGRpbmciOnsiJGlkIjoiNTcxIiwiVG9wIjowLjAsIkxlZnQiOjAuMCwiUmlnaHQiOjAuMCwiQm90dG9tIjowLjB9LCJCYWNrZ3JvdW5kIjp7IiRpZCI6IjU3MiIsIkNvbG9yIjp7IiRyZWYiOiIxNSJ9fSwiSXNWaXNpYmxlIjp0cnVlLCJXaWR0aCI6MC4wLCJIZWlnaHQiOjAuMCwiQm9yZGVyU3R5bGUiOm51bGwsIlBhcmVudFN0eWxlIjpudWxsfSwiVG9kYXlNYXJrZXJTdHlsZSI6eyIkaWQiOiI1NzMiLCJNYXJnaW4iOnsiJGlkIjoiNTc0IiwiVG9wIjowLjAsIkxlZnQiOjAuMCwiUmlnaHQiOjAuMCwiQm90dG9tIjowLjB9LCJQYWRkaW5nIjp7IiRpZCI6IjU3NSIsIlRvcCI6MC4wLCJMZWZ0IjowLjAsIlJpZ2h0IjowLjAsIkJvdHRvbSI6MC4wfSwiQmFja2dyb3VuZCI6eyIkaWQiOiI1NzYiLCJDb2xvciI6eyIkaWQiOiI1NzciLCJBIjoyNTUsIlIiOjI1NSwiRyI6MCwiQiI6MH19LCJJc1Zpc2libGUiOnRydWUsIldpZHRoIjowLjAsIkhlaWdodCI6MC4wLCJCb3JkZXJTdHlsZSI6bnVsbCwiUGFyZW50U3R5bGUiOm51bGx9LCJTY2FsZVN0eWxlIjp7IiRpZCI6IjU3OCIsIlNoYXBlIjo0LCJTaG93U2VnbWVudFNlcGFyYXRvcnMiOnRydWUsIlNlZ21lbnRTZXBhcmF0b3JPcGFjaXR5IjozMCwiSGFzQmVlblZpc2libGVCZWZvcmUiOnRydWUsIkZvbnRTZXR0aW5ncyI6eyIkaWQiOiI1NzkiLCJGb250U2l6ZSI6MTIsIkZvbnROYW1lIjoiQ2FsaWJyaSIsIklzQm9sZCI6ZmFsc2UsIklzSXRhbGljIjpmYWxzZSwiSXNVbmRlcmxpbmVkIjpmYWxzZSwiUGFyZW50U3R5bGUiOm51bGx9LCJBdXRvU2l6ZSI6MCwiRm9yZWdyb3VuZCI6eyIkaWQiOiI1ODAiLCJDb2xvciI6eyIkaWQiOiI1ODEiLCJBIjoyNTUsIlIiOjI1NSwiRyI6MjU1LCJCIjoyNTV9fSwiTWF4V2lkdGgiOjIwMC4wLCJNYXhIZWlnaHQiOiJJbmZpbml0eSIsIlNtYXJ0Rm9yZWdyb3VuZElzQWN0aXZlIjpmYWxzZSwiSG9yaXpvbnRhbEFsaWdubWVudCI6MCwiVmVydGljYWxBbGlnbm1lbnQiOjEsIlNtYXJ0Rm9yZWdyb3VuZCI6bnVsbCwiQmFja2dyb3VuZEZpbGxUeXBlIjowLCJNYXJnaW4iOnsiJGlkIjoiNTgyIiwiVG9wIjowLjAsIkxlZnQiOjUuMCwiUmlnaHQiOjAuMCwiQm90dG9tIjowLjB9LCJQYWRkaW5nIjp7IiRpZCI6IjU4MyIsIlRvcCI6MC4wLCJMZWZ0IjowLjAsIlJpZ2h0IjowLjAsIkJvdHRvbSI6MC4wfSwiQmFja2dyb3VuZCI6eyIkaWQiOiI1ODQiLCJDb2xvciI6eyIkcmVmIjoiMTUifX0sIklzVmlzaWJsZSI6dHJ1ZSwiV2lkdGgiOjAuMCwiSGVpZ2h0IjowLjAsIkJvcmRlclN0eWxlIjpudWxsLCJQYXJlbnRTdHlsZSI6bnVsbH0sIlNpbmdsZVNjYWxlU2hhcGVTdHlsZSI6eyIkaWQiOiI1ODUiLCJTaGFwZSI6MCwiSGVpZ2h0IjowLjB9LCJNaWRkbGVUaWVyU2NhbGVTdHlsZSI6eyIkaWQiOiI1ODYiLCJTaGFwZSI6NCwiU2hvd1NlZ21lbnRTZXBhcmF0b3JzIjp0cnVlLCJTZWdtZW50U2VwYXJhdG9yT3BhY2l0eSI6MzAsIkhhc0JlZW5WaXNpYmxlQmVmb3JlIjpmYWxzZSwiRm9udFNldHRpbmdzIjp7IiRpZCI6IjU4NyIsIkZvbnRTaXplIjoxMiwiRm9udE5hbWUiOiJDYWxpYnJpIiwiSXNCb2xkIjpmYWxzZSwiSXNJdGFsaWMiOmZhbHNlLCJJc1VuZGVybGluZWQiOmZhbHNlLCJQYXJlbnRTdHlsZSI6bnVsbH0sIkF1dG9TaXplIjowLCJGb3JlZ3JvdW5kIjp7IiRpZCI6IjU4OCIsIkNvbG9yIjp7IiRpZCI6IjU4OSIsIkEiOjI1NSwiUiI6MjU1LCJHIjoyNTUsIkIiOjI1NX19LCJNYXhXaWR0aCI6MjAwLjAsIk1heEhlaWdodCI6IkluZmluaXR5IiwiU21hcnRGb3JlZ3JvdW5kSXNBY3RpdmUiOmZhbHNlLCJIb3Jpem9udGFsQWxpZ25tZW50IjowLCJWZXJ0aWNhbEFsaWdubWVudCI6MSwiU21hcnRGb3JlZ3JvdW5kIjpudWxsLCJCYWNrZ3JvdW5kRmlsbFR5cGUiOjAsIk1hcmdpbiI6eyIkaWQiOiI1OTAiLCJUb3AiOjAuMCwiTGVmdCI6NS4wLCJSaWdodCI6MC4wLCJCb3R0b20iOjAuMH0sIlBhZGRpbmciOnsiJGlkIjoiNTkxIiwiVG9wIjowLjAsIkxlZnQiOjAuMCwiUmlnaHQiOjAuMCwiQm90dG9tIjowLjB9LCJCYWNrZ3JvdW5kIjp7IiRpZCI6IjU5MiIsIkNvbG9yIjp7IiRpZCI6IjU5MyIsIkEiOjAsIlIiOjAsIkciOjAsIkIiOjB9fSwiSXNWaXNpYmxlIjpmYWxzZSwiV2lkdGgiOjAuMCwiSGVpZ2h0IjowLjAsIkJvcmRlclN0eWxlIjpudWxsLCJQYXJlbnRTdHlsZSI6bnVsbH0sIkJvdHRvbVRpZXJTY2FsZVN0eWxlIjp7IiRpZCI6IjU5NCIsIlNoYXBlIjo0LCJTaG93U2VnbWVudFNlcGFyYXRvcnMiOnRydWUsIlNlZ21lbnRTZXBhcmF0b3JPcGFjaXR5IjozMCwiSGFzQmVlblZpc2libGVCZWZvcmUiOmZhbHNlLCJGb250U2V0dGluZ3MiOnsiJGlkIjoiNTk1IiwiRm9udFNpemUiOjEyLCJGb250TmFtZSI6IkNhbGlicmkiLCJJc0JvbGQiOmZhbHNlLCJJc0l0YWxpYyI6ZmFsc2UsIklzVW5kZXJsaW5lZCI6ZmFsc2UsIlBhcmVudFN0eWxlIjpudWxsfSwiQXV0b1NpemUiOjAsIkZvcmVncm91bmQiOnsiJGlkIjoiNTk2IiwiQ29sb3IiOnsiJGlkIjoiNTk3IiwiQSI6MjU1LCJSIjoyNTUsIkciOjI1NSwiQiI6MjU1fX0sIk1heFdpZHRoIjoyMDAuMCwiTWF4SGVpZ2h0IjoiSW5maW5pdHkiLCJTbWFydEZvcmVncm91bmRJc0FjdGl2ZSI6ZmFsc2UsIkhvcml6b250YWxBbGlnbm1lbnQiOjAsIlZlcnRpY2FsQWxpZ25tZW50IjoxLCJTbWFydEZvcmVncm91bmQiOm51bGwsIkJhY2tncm91bmRGaWxsVHlwZSI6MCwiTWFyZ2luIjp7IiRpZCI6IjU5OCIsIlRvcCI6MC4wLCJMZWZ0Ijo1LjAsIlJpZ2h0IjowLjAsIkJvdHRvbSI6MC4wfSwiUGFkZGluZyI6eyIkaWQiOiI1OTkiLCJUb3AiOjAuMCwiTGVmdCI6MC4wLCJSaWdodCI6MC4wLCJCb3R0b20iOjAuMH0sIkJhY2tncm91bmQiOnsiJGlkIjoiNjAwIiwiQ29sb3IiOnsiJGlkIjoiNjAxIiwiQSI6MCwiUiI6MCwiRyI6MCwiQiI6MH19LCJJc1Zpc2libGUiOmZhbHNlLCJXaWR0aCI6MC4wLCJIZWlnaHQiOjAuMCwiQm9yZGVyU3R5bGUiOm51bGwsIlBhcmVudFN0eWxlIjpudWxsfSwiRWxhcHNlZFRpbWVCYWNrZ3JvdW5kIjp7IiRpZCI6IjYwMiIsIkNvbG9yIjp7IiRpZCI6IjYwMyIsIkEiOjc3LCJSIjoyNTUsIkciOjAsIkIiOjB9fSwiQXBwZW5kWWVhck9uWWVhckNoYW5nZSI6dHJ1ZSwiRWxhcHNlZFRpbWVGb3JtYXQiOjEsIlRvZGF5TWFya2VyUG9zaXRpb24iOjMsIlF1aWNrUG9zaXRpb24iOjMsIkFic29sdXRlUG9zaXRpb24iOjI0MC4wLCJNYXJnaW4iOnsiJGlkIjoiNjA0IiwiVG9wIjowLjAsIkxlZnQiOjEwLjAsIlJpZ2h0IjoxMC4wLCJCb3R0b20iOjAuMH0sIlBhZGRpbmciOnsiJGlkIjoiNjA1IiwiVG9wIjowLjAsIkxlZnQiOjAuMCwiUmlnaHQiOjAuMCwiQm90dG9tIjowLjB9LCJCYWNrZ3JvdW5kIjp7IiRpZCI6IjYwNiIsIkNvbG9yIjp7IiRpZCI6IjYwNyIsIkEiOjI1NSwiUiI6MTE1LCJHIjoxMTUsIkIiOjExNX19LCJJc1Zpc2libGUiOnRydWUsIldpZHRoIjowLjAsIkhlaWdodCI6MC4wLCJCb3JkZXJTdHlsZSI6bnVsbCwiUGFyZW50U3R5bGUiOm51bGx9LCJEZWZhdWx0TWlsZXN0b25lU3R5bGUiOnsiJGlkIjoiNjA4IiwiU2hhcGUiOjAsIkNvbm5lY3Rvck1hcmdpbiI6eyIkaWQiOiI2MDkiLCJUb3AiOjAuMCwiTGVmdCI6Mi4wLCJSaWdodCI6Mi4wLCJCb3R0b20iOjAuMH0sIkNvbm5lY3RvclN0eWxlIjp7IiRpZCI6IjYxMCIsIkxpbmVDb2xvciI6eyIkaWQiOiI2MTEiLCIkdHlwZSI6Ik5MUkUuQ29tbW9uLkRvbS5Tb2xpZENvbG9yQnJ1c2gsIE5MUkUuQ29tbW9uIiwiQ29sb3IiOnsiJGlkIjoiNjEyIiwiQSI6MTI3LCJSIjozMSwiRyI6NzMsIkIiOjEyNn19LCJMaW5lV2VpZ2h0IjoxLjAsIkxpbmVUeXBlIjowLCJQYXJlbnRTdHlsZSI6bnVsbH0sIklzQmVsb3dUaW1lYmFuZCI6ZmFsc2UsIlBvc2l0aW9uT25UYXNrIjowLCJIaWRlRGF0ZSI6ZmFsc2UsIlNoYXBlU2l6ZSI6MSwiU3BhY2luZyI6Mi4wLCJQYWRkaW5nIjp7IiRpZCI6IjYxMyIsIlRvcCI6Ny4wLCJMZWZ0IjozLjAsIlJpZ2h0IjowLjAsIkJvdHRvbSI6Mi4wfSwiU2hhcGVTdHlsZSI6eyIkaWQiOiI2MTQiLCJNYXJnaW4iOnsiJGlkIjoiNjE1IiwiVG9wIjowLjAsIkxlZnQiOjAuMCwiUmlnaHQiOjAuMCwiQm90dG9tIjowLjB9LCJQYWRkaW5nIjp7IiRpZCI6IjYxNiIsIlRvcCI6MC4wLCJMZWZ0IjowLjAsIlJpZ2h0IjowLjAsIkJvdHRvbSI6MC4wfSwiQmFja2dyb3VuZCI6eyIkaWQiOiI2MTciLCJDb2xvciI6eyIkaWQiOiI2MTgiLCJBIjoyNTUsIlIiOjAsIkciOjExNCwiQiI6MTg4fX0sIklzVmlzaWJsZSI6dHJ1ZSwiV2lkdGgiOjE4LjAsIkhlaWdodCI6MjAuMCwiQm9yZGVyU3R5bGUiOnsiJGlkIjoiNjE5IiwiTGluZUNvbG9yIjp7IiRpZCI6IjYyMCIsIiR0eXBlIjoiTkxSRS5Db21tb24uRG9tLlNvbGlkQ29sb3JCcnVzaCwgTkxSRS5Db21tb24iLCJDb2xvciI6eyIkaWQiOiI2MjEiLCJBIjoyNTUsIlIiOjI1NSwiRyI6MCwiQiI6MH19LCJMaW5lV2VpZ2h0IjowLjAsIkxpbmVUeXBlIjowLCJQYXJlbnRTdHlsZSI6bnVsbH0sIlBhcmVudFN0eWxlIjpudWxsfSwiVGl0bGVTdHlsZSI6eyIkaWQiOiI2MjIiLCJGb250U2V0dGluZ3MiOnsiJGlkIjoiNjIzIiwiRm9udFNpemUiOjExLCJGb250TmFtZSI6IkNhbGlicmkiLCJJc0JvbGQiOnRydWUsIklzSXRhbGljIjpmYWxzZSwiSXNVbmRlcmxpbmVkIjpmYWxzZSwiUGFyZW50U3R5bGUiOm51bGx9LCJBdXRvU2l6ZSI6MCwiRm9yZWdyb3VuZCI6eyIkaWQiOiI2MjQiLCJDb2xvciI6eyIkaWQiOiI2MjUiLCJBIjoyNTUsIlIiOjAsIkciOjAsIkIiOjB9fSwiTWF4V2lkdGgiOjIwMC4wLCJNYXhIZWlnaHQiOiJJbmZpbml0eSIsIlNtYXJ0Rm9yZWdyb3VuZElzQWN0aXZlIjpmYWxzZSwiSG9yaXpvbnRhbEFsaWdubWVudCI6MSwiVmVydGljYWxBbGlnbm1lbnQiOjAsIlNtYXJ0Rm9yZWdyb3VuZCI6bnVsbCwiQmFja2dyb3VuZEZpbGxUeXBlIjowLCJNYXJnaW4iOnsiJGlkIjoiNjI2IiwiVG9wIjowLjAsIkxlZnQiOjAuMCwiUmlnaHQiOjAuMCwiQm90dG9tIjowLjB9LCJQYWRkaW5nIjp7IiRpZCI6IjYyNyIsIlRvcCI6MC4wLCJMZWZ0IjowLjAsIlJpZ2h0IjowLjAsIkJvdHRvbSI6MC4wfSwiQmFja2dyb3VuZCI6eyIkaWQiOiI2MjgiLCJDb2xvciI6eyIkcmVmIjoiMTUifX0sIklzVmlzaWJsZSI6dHJ1ZSwiV2lkdGgiOjAuMCwiSGVpZ2h0IjowLjAsIkJvcmRlclN0eWxlIjpudWxsLCJQYXJlbnRTdHlsZSI6bnVsbH0sIkRhdGVTdHlsZSI6eyIkaWQiOiI2MjkiLCJGb250U2V0dGluZ3MiOnsiJGlkIjoiNjMwIiwiRm9udFNpemUiOjEwLCJGb250TmFtZSI6IkNhbGlicmkiLCJJc0JvbGQiOmZhbHNlLCJJc0l0YWxpYyI6ZmFsc2UsIklzVW5kZXJsaW5lZCI6ZmFsc2UsIlBhcmVudFN0eWxlIjpudWxsfSwiQXV0b1NpemUiOjAsIkZvcmVncm91bmQiOnsiJGlkIjoiNjMxIiwiQ29sb3IiOnsiJGlkIjoiNjMyIiwiQSI6MjU1LCJSIjo2OCwiRyI6ODQsIkIiOjEwNn19LCJNYXhXaWR0aCI6MjAwLjAsIk1heEhlaWdodCI6IkluZmluaXR5IiwiU21hcnRGb3JlZ3JvdW5kSXNBY3RpdmUiOmZhbHNlLCJIb3Jpem9udGFsQWxpZ25tZW50IjowLCJWZXJ0aWNhbEFsaWdubWVudCI6MCwiU21hcnRGb3JlZ3JvdW5kIjpudWxsLCJCYWNrZ3JvdW5kRmlsbFR5cGUiOjAsIk1hcmdpbiI6eyIkaWQiOiI2MzMiLCJUb3AiOjAuMCwiTGVmdCI6MC4wLCJSaWdodCI6MC4wLCJCb3R0b20iOjAuMH0sIlBhZGRpbmciOnsiJGlkIjoiNjM0IiwiVG9wIjowLjAsIkxlZnQiOjAuMCwiUmlnaHQiOjAuMCwiQm90dG9tIjowLjB9LCJCYWNrZ3JvdW5kIjp7IiRpZCI6IjYzNSIsIkNvbG9yIjp7IiRyZWYiOiIxNSJ9fSwiSXNWaXNpYmxlIjp0cnVlLCJXaWR0aCI6MC4wLCJIZWlnaHQiOjAuMCwiQm9yZGVyU3R5bGUiOm51bGwsIlBhcmVudFN0eWxlIjpudWxsfSwiRGF0ZUZvcm1hdCI6eyIkaWQiOiI2MzYiLCJGb3JtYXRTdHJpbmciOiJNTU0gZCIsIlNlcGFyYXRvciI6Ii8iLCJVc2VJbnRlcm5hdGlvbmFsRGF0ZUZvcm1hdCI6ZmFsc2UsIkRhdGVJc1Zpc2libGUiOnRydWUsIlRpbWVJc1Zpc2libGUiOmZhbHNlLCJIb3VyRGlnaXRzIjoxLCJBbVBtRGVzaWduYXRvciI6MiwiVHJpbTAwTWludXRlcyI6ZmFsc2UsIkxhc3RLbm93blZpc2liaWxpdHlTdGF0ZSI6bnVsbH0sIldlZWtOdW1iZXJpbmciOnsiJGlkIjoiNjM3IiwiRm9ybWF0IjowLCJJc1Zpc2libGUiOmZhbHNlLCJMYXN0S25vd25WaXNpYmlsaXR5U3RhdGUiOmZhbHNlfSwiSXNWaXNpYmxlIjp0cnVlLCJQYXJlbnRTdHlsZSI6bnVsbH0sIkRlZmF1bHRUYXNrU3R5bGUiOnsiJGlkIjoiNjM4IiwiU2hhcGUiOjIsIlNoYXBlVGhpY2tuZXNzIjoxLCJEdXJhdGlvbkZvcm1hdCI6MCwiSW5jbHVkZU5vbldvcmtpbmdEYXlzSW5EdXJhdGlvbiI6ZmFsc2UsIlBlcmNlbnRhZ2VDb21wbGV0ZVN0eWxlIjp7IiRpZCI6IjYzOSIsIkZvbnRTZXR0aW5ncyI6eyIkaWQiOiI2NDAiLCJGb250U2l6ZSI6MTAsIkZvbnROYW1lIjoiQ2FsaWJyaSIsIklzQm9sZCI6ZmFsc2UsIklzSXRhbGljIjpmYWxzZSwiSXNVbmRlcmxpbmVkIjpmYWxzZSwiUGFyZW50U3R5bGUiOm51bGx9LCJBdXRvU2l6ZSI6MCwiRm9yZWdyb3VuZCI6eyIkcmVmIjoiMTAifSwiTWF4V2lkdGgiOjIwMC4wLCJNYXhIZWlnaHQiOiJJbmZpbml0eSIsIlNtYXJ0Rm9yZWdyb3VuZElzQWN0aXZlIjpmYWxzZSwiSG9yaXpvbnRhbEFsaWdubWVudCI6MCwiVmVydGljYWxBbGlnbm1lbnQiOjAsIlNtYXJ0Rm9yZWdyb3VuZCI6bnVsbCwiQmFja2dyb3VuZEZpbGxUeXBlIjowLCJNYXJnaW4iOnsiJHJlZiI6IjEyIn0sIlBhZGRpbmciOnsiJHJlZiI6IjEzIn0sIkJhY2tncm91bmQiOnsiJHJlZiI6IjE0In0sIklzVmlzaWJsZSI6dHJ1ZSwiV2lkdGgiOjAuMCwiSGVpZ2h0IjowLjAsIkJvcmRlclN0eWxlIjpudWxsLCJQYXJlbnRTdHlsZSI6bnVsbH0sIkR1cmF0aW9uU3R5bGUiOnsiJGlkIjoiNjQxIiwiRm9udFNldHRpbmdzIjp7IiRpZCI6IjY0MiIsIkZvbnRTaXplIjoxMCwiRm9udE5hbWUiOiJDYWxpYnJpIiwiSXNCb2xkIjpmYWxzZSwiSXNJdGFsaWMiOmZhbHNlLCJJc1VuZGVybGluZWQiOmZhbHNlLCJQYXJlbnRTdHlsZSI6bnVsbH0sIkF1dG9TaXplIjowLCJGb3JlZ3JvdW5kIjp7IiRyZWYiOiIxOSJ9LCJNYXhXaWR0aCI6MjAwLjAsIk1heEhlaWdodCI6IkluZmluaXR5IiwiU21hcnRGb3JlZ3JvdW5kSXNBY3RpdmUiOmZhbHNlLCJIb3Jpem9udGFsQWxpZ25tZW50IjowLCJWZXJ0aWNhbEFsaWdubWVudCI6MCwiU21hcnRGb3JlZ3JvdW5kIjpudWxsLCJCYWNrZ3JvdW5kRmlsbFR5cGUiOjAsIk1hcmdpbiI6eyIkcmVmIjoiMjEifSwiUGFkZGluZyI6eyIkcmVmIjoiMjIifSwiQmFja2dyb3VuZCI6eyIkcmVmIjoiMjMifSwiSXNWaXNpYmxlIjp0cnVlLCJXaWR0aCI6MC4wLCJIZWlnaHQiOjAuMCwiQm9yZGVyU3R5bGUiOm51bGwsIlBhcmVudFN0eWxlIjpudWxsfSwiSG9yaXpvbnRhbENvbm5lY3RvclN0eWxlIjp7IiRpZCI6IjY0MyIsIkxpbmVDb2xvciI6eyIkcmVmIjoiMjYifSwiTGluZVdlaWdodCI6MS4wLCJMaW5lVHlwZSI6MCwiUGFyZW50U3R5bGUiOm51bGx9LCJWZXJ0aWNhbENvbm5lY3RvclN0eWxlIjp7IiRpZCI6IjY0NCIsIkxpbmVDb2xvciI6eyIkcmVmIjoiMjkifSwiTGluZVdlaWdodCI6MC4wLCJMaW5lVHlwZSI6MCwiUGFyZW50U3R5bGUiOm51bGx9LCJNYXJnaW4iOm51bGwsIlN0YXJ0RGF0ZVBvc2l0aW9uIjozLCJFbmREYXRlUG9zaXRpb24iOjQsIkRhdGVJc1Zpc2libGUiOnRydWUsIlRpdGxlUG9zaXRpb24iOjIsIkR1cmF0aW9uUG9zaXRpb24iOjYsIlBlcmNlbnRhZ2VDb21wbGV0ZWRQb3NpdGlvbiI6NiwiU3BhY2luZyI6NSwiSXNCZWxvd1RpbWViYW5kIjp0cnVlLCJQZXJjZW50YWdlQ29tcGxldGVTaGFwZU9wYWNpdHkiOjM1LCJTaGFwZVN0eWxlIjp7IiRpZCI6IjY0NSIsIk1hcmdpbiI6eyIkcmVmIjoiMzIifSwiUGFkZGluZyI6eyIkcmVmIjoiMzMifSwiQmFja2dyb3VuZCI6eyIkaWQiOiI2NDYiLCJDb2xvciI6eyIkaWQiOiI2NDciLCJBIjoyNTUsIlIiOjAsIkciOjExNCwiQiI6MTg4fX0sIklzVmlzaWJsZSI6dHJ1ZSwiV2lkdGgiOjAuMCwiSGVpZ2h0IjoxNi4wLCJCb3JkZXJTdHlsZSI6eyIkaWQiOiI2NDgiLCJMaW5lQ29sb3IiOnsiJGlkIjoiNjQ5IiwiJHR5cGUiOiJOTFJFLkNvbW1vbi5Eb20uU29saWRDb2xvckJydXNoLCBOTFJFLkNvbW1vbiIsIkNvbG9yIjp7IiRpZCI6IjY1MCIsIkEiOjI1NSwiUiI6MjU1LCJHIjowLCJCIjowfX0sIkxpbmVXZWlnaHQiOjAuMCwiTGluZVR5cGUiOjAsIlBhcmVudFN0eWxlIjpudWxsfSwiUGFyZW50U3R5bGUiOm51bGx9LCJUaXRsZVN0eWxlIjp7IiRpZCI6IjY1MSIsIkZvbnRTZXR0aW5ncyI6eyIkaWQiOiI2NTIiLCJGb250U2l6ZSI6MTEsIkZvbnROYW1lIjoiQ2FsaWJyaSIsIklzQm9sZCI6dHJ1ZSwiSXNJdGFsaWMiOmZhbHNlLCJJc1VuZGVybGluZWQiOmZhbHNlLCJQYXJlbnRTdHlsZSI6bnVsbH0sIkF1dG9TaXplIjowLCJGb3JlZ3JvdW5kIjp7IiRpZCI6IjY1MyIsIkNvbG9yIjp7IiRpZCI6IjY1NCIsIkEiOjI1NSwiUiI6MCwiRyI6MCwiQiI6MH19LCJNYXhXaWR0aCI6OTYwLjAsIk1heEhlaWdodCI6IkluZmluaXR5IiwiU21hcnRGb3JlZ3JvdW5kSXNBY3RpdmUiOmZhbHNlLCJIb3Jpem9udGFsQWxpZ25tZW50IjoxLCJWZXJ0aWNhbEFsaWdubWVudCI6MCwiU21hcnRGb3JlZ3JvdW5kIjpudWxsLCJCYWNrZ3JvdW5kRmlsbFR5cGUiOjAsIk1hcmdpbiI6eyIkcmVmIjoiNDMifSwiUGFkZGluZyI6eyIkcmVmIjoiNDQifSwiQmFja2dyb3VuZCI6eyIkaWQiOiI2NTUiLCJDb2xvciI6eyIkcmVmIjoiMTUifX0sIklzVmlzaWJsZSI6dHJ1ZSwiV2lkdGgiOjAuMCwiSGVpZ2h0IjowLjAsIkJvcmRlclN0eWxlIjpudWxsLCJQYXJlbnRTdHlsZSI6bnVsbH0sIkRhdGVTdHlsZSI6eyIkaWQiOiI2NTYiLCJGb250U2V0dGluZ3MiOnsiJGlkIjoiNjU3IiwiRm9udFNpemUiOjEwLCJGb250TmFtZSI6IkNhbGlicmkiLCJJc0JvbGQiOmZhbHNlLCJJc0l0YWxpYyI6ZmFsc2UsIklzVW5kZXJsaW5lZCI6ZmFsc2UsIlBhcmVudFN0eWxlIjpudWxsfSwiQXV0b1NpemUiOjAsIkZvcmVncm91bmQiOnsiJGlkIjoiNjU4IiwiQ29sb3IiOnsiJGlkIjoiNjU5IiwiQSI6MjU1LCJSIjo2OCwiRyI6ODQsIkIiOjEwNn19LCJNYXhXaWR0aCI6MjAwLjAsIk1heEhlaWdodCI6IkluZmluaXR5IiwiU21hcnRGb3JlZ3JvdW5kSXNBY3RpdmUiOmZhbHNlLCJIb3Jpem9udGFsQWxpZ25tZW50IjoxLCJWZXJ0aWNhbEFsaWdubWVudCI6MCwiU21hcnRGb3JlZ3JvdW5kIjpudWxsLCJCYWNrZ3JvdW5kRmlsbFR5cGUiOjAsIk1hcmdpbiI6eyIkcmVmIjoiNTIifSwiUGFkZGluZyI6eyIkcmVmIjoiNTMifSwiQmFja2dyb3VuZCI6eyIkaWQiOiI2NjAiLCJDb2xvciI6eyIkcmVmIjoiMTUifX0sIklzVmlzaWJsZSI6dHJ1ZSwiV2lkdGgiOjAuMCwiSGVpZ2h0IjowLjAsIkJvcmRlclN0eWxlIjpudWxsLCJQYXJlbnRTdHlsZSI6bnVsbH0sIkRhdGVGb3JtYXQiOnsiJGlkIjoiNjYxIiwiRm9ybWF0U3RyaW5nIjoiTU1NIGQiLCJTZXBhcmF0b3IiOiIvIiwiVXNlSW50ZXJuYXRpb25hbERhdGVGb3JtYXQiOmZhbHNlLCJEYXRlSXNWaXNpYmxlIjp0cnVlLCJUaW1lSXNWaXNpYmxlIjpmYWxzZSwiSG91ckRpZ2l0cyI6MSwiQW1QbURlc2lnbmF0b3IiOjIsIlRyaW0wME1pbnV0ZXMiOmZhbHNlLCJMYXN0S25vd25WaXNpYmlsaXR5U3RhdGUiOm51bGx9LCJXZWVrTnVtYmVyaW5nIjp7IiRpZCI6IjY2MiIsIkZvcm1hdCI6MCwiSXNWaXNpYmxlIjpmYWxzZSwiTGFzdEtub3duVmlzaWJpbGl0eVN0YXRlIjpmYWxzZX0sIklzVmlzaWJsZSI6dHJ1ZSwiUGFyZW50U3R5bGUiOm51bGwsIl9leHBsaWNpdGx5U2V0Ijp7IiRpZCI6IjY2MyIsIlNoYXBlU3R5bGUiOmZhbHNlLCJUaXRsZVN0eWxlIjpmYWxzZSwiRGF0ZVN0eWxlIjpmYWxzZSwiSG9yaXpvbnRhbENvbm5lY3RvclN0eWxlIjpmYWxzZSwiVmVydGljYWxDb25uZWN0b3JTdHlsZSI6ZmFsc2UsIlBlcmNlbnRhZ2VDb21wbGV0ZVNoYXBlT3BhY2l0eSI6ZmFsc2UsIlNoYXBlIjpmYWxzZSwiU2hhcGVUaGlja25lc3MiOmZhbHNlLCJEdXJhdGlvbkZvcm1hdCI6ZmFsc2UsIkluY2x1ZGVOb25Xb3JraW5nRGF5c0luRHVyYXRpb24iOmZhbHNlLCJNYXJnaW4iOmZhbHNlLCJTdGFydERhdGVQb3NpdGlvbiI6ZmFsc2UsIkVuZERhdGVQb3NpdGlvbiI6ZmFsc2UsIlRpdGxlUG9zaXRpb24iOmZhbHNlLCJEdXJhdGlvblBvc2l0aW9uIjpmYWxzZSwiUGVyY2VudGFnZUNvbXBsZXRlZFBvc2l0aW9uIjpmYWxzZSwiU3BhY2luZyI6ZmFsc2UsIklzQmVsb3dUaW1lYmFuZCI6ZmFsc2UsIkRhdGVGb3JtYXQiOmZhbHNlLCJXZWVrTnVtYmVyaW5nIjpmYWxzZSwiSXNWaXNpYmxlIjpmYWxzZX19LCJHcmlkbGluZVBhbmVsU3R5bGUiOnsiJGlkIjoiNjY0IiwiR3JpZGxpbmVTdHlsZSI6eyIkaWQiOiI2NjUiLCJMaW5lQ29sb3IiOnsiJGlkIjoiNjY2IiwiJHR5cGUiOiJOTFJFLkNvbW1vbi5Eb20uU29saWRDb2xvckJydXNoLCBOTFJFLkNvbW1vbiIsIkNvbG9yIjp7IiRpZCI6IjY2NyIsIkEiOjM4LCJSIjo5MSwiRyI6MTU1LCJCIjoyMTN9fSwiTGluZVdlaWdodCI6MS4wLCJMaW5lVHlwZSI6MCwiUGFyZW50U3R5bGUiOm51bGx9LCJNYXJnaW4iOnsiJGlkIjoiNjY4IiwiVG9wIjowLjAsIkxlZnQiOjAuMCwiUmlnaHQiOjAuMCwiQm90dG9tIjowLjB9LCJQYWRkaW5nIjp7IiRpZCI6IjY2OSIsIlRvcCI6MC4wLCJMZWZ0IjowLjAsIlJpZ2h0IjowLjAsIkJvdHRvbSI6MC4wfSwiQmFja2dyb3VuZCI6bnVsbCwiSXNWaXNpYmxlIjp0cnVlLCJXaWR0aCI6MC4wLCJIZWlnaHQiOjAuMCwiQm9yZGVyU3R5bGUiOnsiJGlkIjoiNjcwIiwiTGluZUNvbG9yIjpudWxsLCJMaW5lV2VpZ2h0IjowLjAsIkxpbmVUeXBlIjowLCJQYXJlbnRTdHlsZSI6bnVsbH0sIlBhcmVudFN0eWxlIjpudWxsfSwiQWN0aXZpdHlMaW5lUGFuZWxTdHlsZSI6eyIkaWQiOiI2NzEiLCJBY3Rpdml0eUxpbmVTdHlsZSI6eyIkaWQiOiI2NzIiLCJMaW5lQ29sb3IiOnsiJGlkIjoiNjczIiwiJHR5cGUiOiJOTFJFLkNvbW1vbi5Eb20uU29saWRDb2xvckJydXNoLCBOTFJFLkNvbW1vbiIsIkNvbG9yIjp7IiRpZCI6IjY3NCIsIkEiOjM4LCJSIjo2OCwiRyI6MTE0LCJCIjoxOTZ9fSwiTGluZVdlaWdodCI6MS4wLCJMaW5lVHlwZSI6MCwiUGFyZW50U3R5bGUiOm51bGx9LCJNYXJnaW4iOnsiJGlkIjoiNjc1IiwiVG9wIjowLjAsIkxlZnQiOjAuMCwiUmlnaHQiOjAuMCwiQm90dG9tIjowLjB9LCJQYWRkaW5nIjp7IiRpZCI6IjY3NiIsIlRvcCI6MC4wLCJMZWZ0IjowLjAsIlJpZ2h0IjowLjAsIkJvdHRvbSI6MC4wfSwiQmFja2dyb3VuZCI6bnVsbCwiSXNWaXNpYmxlIjp0cnVlLCJXaWR0aCI6MC4wLCJIZWlnaHQiOjAuMCwiQm9yZGVyU3R5bGUiOnsiJGlkIjoiNjc3IiwiTGluZUNvbG9yIjpudWxsLCJMaW5lV2VpZ2h0IjowLjAsIkxpbmVUeXBlIjowLCJQYXJlbnRTdHlsZSI6bnVsbH0sIlBhcmVudFN0eWxlIjpudWxsfSwiU2hvd0VsYXBzZWRUaW1lR3JhZGllbnRTdHlsZSI6ZmFsc2UsIlRpbWViYW5kUmVzZXJ2ZWRMZWZ0QXJlYVN0eWxlIjp7IiRpZCI6IjY3OCIsIkFjdGl2aXR5SGVhZGVyV2lkdGgiOjc2LjAsIklzU2V0IjpmYWxzZX0sIkRlZmF1bHRTd2ltbGFuZVN0eWxlIjpudWxsfSwiU2NhbGUiOm51bGwsIlNjYWxlVjIiOnsiJGlkIjoiNjc5IiwiU3RhcnREYXRlIjoiMDAwMS0wMS0wMVQwMDowMDowMCIsIkVuZERhdGUiOiIyMDIyLTA2LTMwVDIzOjU5OjAwIiwiQXV0b0RhdGVSYW5nZSI6dHJ1ZSwiV29ya2luZ0RheXMiOjMxLCJGaXNjYWxZZWFyIjp7IiRpZCI6IjY4MCIsIlN0YXJ0TW9udGgiOjEsIlVzZVN0YXJ0aW5nWWVhckZvck51bWJlcmluZyI6dHJ1ZSwiU2hvd0Zpc2NhbFllYXJMYWJlbCI6dHJ1ZX0sIlRvZGF5TWFya2VyVGV4dCI6IlRvZGF5IiwiQXV0b1NjYWxlVHlwZSI6dHJ1ZSwiVGltZWJhbmRTY2FsZXMiOnsiJGlkIjoiNjgxIiwiVG9wU2NhbGVMYXllciI6eyIkaWQiOiI2ODIiLCJGb3JtYXQiOiJkIiwiVHlwZSI6MH0sIk1pZGRsZVNjYWxlTGF5ZXIiOnsiJGlkIjoiNjgzIiwiRm9ybWF0IjpudWxsLCJUeXBlIjowfSwiQm90dG9tU2NhbGVMYXllciI6eyIkaWQiOiI2ODQiLCJGb3JtYXQiOm51bGwsIlR5cGUiOjB9fX0sIk1pbGVzdG9uZXMiOltdLCJUYXNrcyI6W10sIlN3aW1sYW5lcyI6W10sIk1zUHJvamVjdEl0ZW1zVHJlZSI6eyIkaWQiOiI2ODUiLCJSb290Ijp7IkltcG9ydElkIjpudWxsLCJJc0ltcG9ydGVkIjpmYWxzZSwiQ2hpbGRyZW4iOltdfX0sIk1ldGFkYXRhIjp7IiRpZCI6IjY4NiIsIlNvdXJjZVRlbXBsYXRlIjoie1wiJGlkXCI6XCIxXCIsXCJJZFwiOlwiYzExZjZmNDktN2RiOC00NWZkLWJhMzItYmZjYWVhNDkyZjM5XCIsXCJDdWx0dXJlSW5mb05hbWVcIjpcImVuLVVTXCIsXCJWZXJzaW9uXCI6e1wiJGlkXCI6XCIyXCIsXCJUZW1wbGF0ZURvbVZlcnNpb25cIjpcIjEuMi4wXCJ9LFwiRWZmZWN0XCI6MSxcIlN0eWxlXCI6e1wiJGlkXCI6XCIzXCIsXCJUaW1lYmFuZFN0eWxlXCI6e1wiJGlkXCI6XCI0XCIsXCJTY2FsZU1hcmtpbmdcIjowLFwiU2hhcGVcIjoxMyxcIlNoYXBlU3R5bGVcIjp7XCIkaWRcIjpcIjVcIixcIk1hcmdpblwiOntcIiRpZFwiOlwiNlwiLFwiVG9wXCI6MC4wLFwiTGVmdFwiOjEwLjAsXCJSaWdodFwiOjEwLjAsXCJCb3R0b21cIjowLjB9LFwiUGFkZGluZ1wiOntcIiRpZFwiOlwiN1wiLFwiVG9wXCI6NS4wLFwiTGVmdFwiOjEzLjAsXCJSaWdodFwiOjEzLjAsXCJCb3R0b21cIjo1LjB9LFwiQmFja2dyb3VuZFwiOntcIiRpZFwiOlwiOFwiLFwiQ29sb3JcIjp7XCIkaWRcIjpcIjlcIixcIkFcIjoyNTUsXCJSXCI6NjgsXCJHXCI6ODQsXCJCXCI6MTA2fX0sXCJJc1Zpc2libGVcIjp0cnVlLFwiV2lkdGhcIjo4NTguMCxcIkhlaWdodFwiOjMwLjAsXCJCb3JkZXJTdHlsZVwiOntcIiRpZFwiOlwiMTBcIixcIkxpbmVDb2xvclwiOntcIiRpZFwiOlwiMTFcIixcIiR0eXBlXCI6XCJOTFJFLkNvbW1vbi5Eb20uU29saWRDb2xvckJydXNoLCBOTFJFLkNvbW1vblwiLFwiQ29sb3JcIjp7XCIkaWRcIjpcIjEyXCIsXCJBXCI6MjU1LFwiUlwiOjI1NSxcIkdcIjowLFwiQlwiOjB9fSxcIkxpbmVXZWlnaHRcIjowLjAsXCJMaW5lVHlwZVwiOjB9fSxcIk1pZGRsZVRpZXJTaGFwZVN0eWxlXCI6e1wiJGlkXCI6XCIxM1wiLFwiTWFyZ2luXCI6e1wiJGlkXCI6XCIxNFwiLFwiVG9wXCI6MC4wLFwiTGVmdFwiOjEwLjAsXCJSaWdodFwiOjEwLjAsXCJCb3R0b21cIjowLjB9LFwiUGFkZGluZ1wiOntcIiRpZFwiOlwiMTVcIixcIlRvcFwiOjUuMCxcIkxlZnRcIjoxMy4wLFwiUmlnaHRcIjoxMy4wLFwiQm90dG9tXCI6NS4wfSxcIkJhY2tncm91bmRcIjp7XCIkaWRcIjpcIjE2XCIsXCJDb2xvclwiOntcIiRpZFwiOlwiMTdcIixcIkFcIjoyNTUsXCJSXCI6NjgsXCJHXCI6ODQsXCJCXCI6MTA2fX0sXCJJc1Zpc2libGVcIjp0cnVlLFwiV2lkdGhcIjo4NTguMCxcIkhlaWdodFwiOjMwLjAsXCJCb3JkZXJTdHlsZVwiOntcIiRpZFwiOlwiMThcIixcIkxpbmVDb2xvclwiOntcIiRpZFwiOlwiMTlcIixcIiR0eXBlXCI6XCJOTFJFLkNvbW1vbi5Eb20uU29saWRDb2xvckJydXNoLCBOTFJFLkNvbW1vblwiLFwiQ29sb3JcIjp7XCIkaWRcIjpcIjIwXCIsXCJBXCI6MjU1LFwiUlwiOjI1NSxcIkdcIjowLFwiQlwiOjB9fSxcIkxpbmVXZWlnaHRcIjowLjAsXCJMaW5lVHlwZVwiOjB9fSxcIkJvdHRvbVRpZXJTaGFwZVN0eWxlXCI6e1wiJGlkXCI6XCIyMVwiLFwiTWFyZ2luXCI6e1wiJGlkXCI6XCIyMlwiLFwiVG9wXCI6MC4wLFwiTGVmdFwiOjEwLjAsXCJSaWdodFwiOjEwLjAsXCJCb3R0b21cIjowLjB9LFwiUGFkZGluZ1wiOntcIiRpZFwiOlwiMjNcIixcIlRvcFwiOjUuMCxcIkxlZnRcIjoxMy4wLFwiUmlnaHRcIjoxMy4wLFwiQm90dG9tXCI6NS4wfSxcIkJhY2tncm91bmRcIjp7XCIkaWRcIjpcIjI0XCIsXCJDb2xvclwiOntcIiRpZFwiOlwiMjVcIixcIkFcIjoyNTUsXCJSXCI6NjgsXCJHXCI6ODQsXCJCXCI6MTA2fX0sXCJJc1Zpc2libGVcIjp0cnVlLFwiV2lkdGhcIjo4NTguMCxcIkhlaWdodFwiOjMwLjAsXCJCb3JkZXJTdHlsZVwiOntcIiRpZFwiOlwiMjZcIixcIkxpbmVDb2xvclwiOntcIiRpZFwiOlwiMjdcIixcIiR0eXBlXCI6XCJOTFJFLkNvbW1vbi5Eb20uU29saWRDb2xvckJydXNoLCBOTFJFLkNvbW1vblwiLFwiQ29sb3JcIjp7XCIkaWRcIjpcIjI4XCIsXCJBXCI6MjU1LFwiUlwiOjI1NSxcIkdcIjowLFwiQlwiOjB9fSxcIkxpbmVXZWlnaHRcIjowLjAsXCJMaW5lVHlwZVwiOjB9fSxcIlJpZ2h0RW5kQ2Fwc1N0eWxlXCI6e1wiJGlkXCI6XCIyOVwiLFwiRm9udFNldHRpbmdzXCI6e1wiJGlkXCI6XCIzMFwiLFwiRm9udFNpemVcIjoxOCxcIkZvbnROYW1lXCI6XCJDYWxpYnJpXCIsXCJJc0JvbGRcIjp0cnVlLFwiSXNJdGFsaWNcIjpmYWxzZSxcIklzVW5kZXJsaW5lZFwiOmZhbHNlfSxcIkF1dG9TaXplXCI6MCxcIkZvcmVncm91bmRcIjp7XCIkaWRcIjpcIjMxXCIsXCJDb2xvclwiOntcIiRpZFwiOlwiMzJcIixcIkFcIjoyNTUsXCJSXCI6MjM3LFwiR1wiOjEyNSxcIkJcIjo0OX19LFwiQmFja2dyb3VuZEZpbGxUeXBlXCI6MCxcIk1heFdpZHRoXCI6XCJJbmZpbml0eVwiLFwiTWF4SGVpZ2h0XCI6XCJJbmZpbml0eVwiLFwiU21hcnRGb3JlZ3JvdW5kSXNBY3RpdmVcIjpmYWxzZSxcIkhvcml6b250YWxBbGlnbm1lbnRcIjowLFwiVmVydGljYWxBbGlnbm1lbnRcIjowLFwiU21hcnRGb3JlZ3JvdW5kXCI6bnVsbCxcIk1hcmdpblwiOntcIiRpZFwiOlwiMzNcIixcIlRvcFwiOjAuMCxcIkxlZnRcIjowLjAsXCJSaWdodFwiOjIwLjAsXCJCb3R0b21cIjowLjB9LFwiUGFkZGluZ1wiOntcIiRpZFwiOlwiMzRcIixcIlRvcFwiOjAuMCxcIkxlZnRcIjowLjAsXCJSaWdodFwiOjAuMCxcIkJvdHRvbVwiOjAuMH0sXCJCYWNrZ3JvdW5kXCI6e1wiJGlkXCI6XCIzNVwiLFwiQ29sb3JcIjp7XCIkaWRcIjpcIjM2XCIsXCJBXCI6MCxcIlJcIjowLFwiR1wiOjAsXCJCXCI6MH19LFwiSXNWaXNpYmxlXCI6dHJ1ZSxcIldpZHRoXCI6MC4wLFwiSGVpZ2h0XCI6MC4wLFwiQm9yZGVyU3R5bGVcIjpudWxsfSxcIkxlZnRFbmRDYXBzU3R5bGVcIjp7XCIkaWRcIjpcIjM3XCIsXCJGb250U2V0dGluZ3NcIjp7XCIkaWRcIjpcIjM4XCIsXCJGb250U2l6ZVwiOjE4LFwiRm9udE5hbWVcIjpcIkNhbGlicmlcIixcIklzQm9sZFwiOnRydWUsXCJJc0l0YWxpY1wiOmZhbHNlLFwiSXNVbmRlcmxpbmVkXCI6ZmFsc2V9LFwiQXV0b1NpemVcIjowLFwiRm9yZWdyb3VuZFwiOntcIiRpZFwiOlwiMzlcIixcIkNvbG9yXCI6e1wiJGlkXCI6XCI0MFwiLFwiQVwiOjI1NSxcIlJcIjoyMzcsXCJHXCI6MTI1LFwiQlwiOjQ5fX0sXCJCYWNrZ3JvdW5kRmlsbFR5cGVcIjowLFwiTWF4V2lkdGhcIjpcIkluZmluaXR5XCIsXCJNYXhIZWlnaHRcIjpcIkluZmluaXR5XCIsXCJTbWFydEZvcmVncm91bmRJc0FjdGl2ZVwiOmZhbHNlLFwiSG9yaXpvbnRhbEFsaWdubWVudFwiOjAsXCJWZXJ0aWNhbEFsaWdubWVudFwiOjAsXCJTbWFydEZvcmVncm91bmRcIjpudWxsLFwiTWFyZ2luXCI6e1wiJGlkXCI6XCI0MVwiLFwiVG9wXCI6MC4wLFwiTGVmdFwiOjIwLjAsXCJSaWdodFwiOjAuMCxcIkJvdHRvbVwiOjAuMH0sXCJQYWRkaW5nXCI6e1wiJGlkXCI6XCI0MlwiLFwiVG9wXCI6MC4wLFwiTGVmdFwiOjAuMCxcIlJpZ2h0XCI6MC4wLFwiQm90dG9tXCI6MC4wfSxcIkJhY2tncm91bmRcIjp7XCIkaWRcIjpcIjQzXCIsXCJDb2xvclwiOntcIiRyZWZcIjpcIjM2XCJ9fSxcIklzVmlzaWJsZVwiOmZhbHNlLFwiV2lkdGhcIjowLjAsXCJIZWlnaHRcIjowLjAsXCJCb3JkZXJTdHlsZVwiOm51bGx9LFwiVG9kYXlUZXh0U3R5bGVcIjp7XCIkaWRcIjpcIjQ0XCIsXCJGb250U2V0dGluZ3NcIjp7XCIkaWRcIjpcIjQ1XCIsXCJGb250U2l6ZVwiOjEyLFwiRm9udE5hbWVcIjpcIkNhbGlicmlcIixcIklzQm9sZFwiOmZhbHNlLFwiSXNJdGFsaWNcIjpmYWxzZSxcIklzVW5kZXJsaW5lZFwiOmZhbHNlfSxcIkF1dG9TaXplXCI6MCxcIkZvcmVncm91bmRcIjp7XCIkaWRcIjpcIjQ2XCIsXCJDb2xvclwiOntcIiRpZFwiOlwiNDdcIixcIkFcIjoyNTUsXCJSXCI6MCxcIkdcIjowLFwiQlwiOjB9fSxcIkJhY2tncm91bmRGaWxsVHlwZVwiOjAsXCJNYXhXaWR0aFwiOjIwMC4wLFwiTWF4SGVpZ2h0XCI6XCJJbmZpbml0eVwiLFwiU21hcnRGb3JlZ3JvdW5kSXNBY3RpdmVcIjpmYWxzZSxcIkhvcml6b250YWxBbGlnbm1lbnRcIjowLFwiVmVydGljYWxBbGlnbm1lbnRcIjowLFwiU21hcnRGb3JlZ3JvdW5kXCI6bnVsbCxcIk1hcmdpblwiOntcIiRpZFwiOlwiNDhcIixcIlRvcFwiOjAuMCxcIkxlZnRcIjowLjAsXCJSaWdodFwiOjAuMCxcIkJvdHRvbVwiOjAuMH0sXCJQYWRkaW5nXCI6e1wiJGlkXCI6XCI0OVwiLFwiVG9wXCI6MC4wLFwiTGVmdFwiOjAuMCxcIlJpZ2h0XCI6MC4wLFwiQm90dG9tXCI6MC4wfSxcIkJhY2tncm91bmRcIjp7XCIkaWRcIjpcIjUwXCIsXCJDb2xvclwiOntcIiRyZWZcIjpcIjM2XCJ9fSxcIklzVmlzaWJsZVwiOnRydWUsXCJXaWR0aFwiOjAuMCxcIkhlaWdodFwiOjAuMCxcIkJvcmRlclN0eWxlXCI6bnVsbH0sXCJUb2RheU1hcmtlclN0eWxlXCI6e1wiJGlkXCI6XCI1MVwiLFwiTWFyZ2luXCI6e1wiJGlkXCI6XCI1MlwiLFwiVG9wXCI6MC4wLFwiTGVmdFwiOjAuMCxcIlJpZ2h0XCI6MC4wLFwiQm90dG9tXCI6MC4wfSxcIlBhZGRpbmdcIjp7XCIkaWRcIjpcIjUzXCIsXCJUb3BcIjowLjAsXCJMZWZ0XCI6MC4wLFwiUmlnaHRcIjowLjAsXCJCb3R0b21cIjowLjB9LFwiQmFja2dyb3VuZFwiOntcIiRpZFwiOlwiNTRcIixcIkNvbG9yXCI6e1wiJGlkXCI6XCI1NVwiLFwiQVwiOjI1NSxcIlJcIjoyNTUsXCJHXCI6MCxcIkJcIjowfX0sXCJJc1Zpc2libGVcIjp0cnVlLFwiV2lkdGhcIjowLjAsXCJIZWlnaHRcIjowLjAsXCJCb3JkZXJTdHlsZVwiOm51bGx9LFwiU2NhbGVTdHlsZVwiOntcIiRpZFwiOlwiNTZcIixcIlNob3dTZWdtZW50U2VwYXJhdG9yc1wiOnRydWUsXCJTZWdtZW50U2VwYXJhdG9yT3BhY2l0eVwiOjMwLFwiU2hhcGVcIjo0LFwiSGFzQmVlblZpc2libGVCZWZvcmVcIjp0cnVlLFwiRm9udFNldHRpbmdzXCI6e1wiJGlkXCI6XCI1N1wiLFwiRm9udFNpemVcIjoxMixcIkZvbnROYW1lXCI6XCJDYWxpYnJpXCIsXCJJc0JvbGRcIjpmYWxzZSxcIklzSXRhbGljXCI6ZmFsc2UsXCJJc1VuZGVybGluZWRcIjpmYWxzZX0sXCJBdXRvU2l6ZVwiOjAsXCJGb3JlZ3JvdW5kXCI6e1wiJGlkXCI6XCI1OFwiLFwiQ29sb3JcIjp7XCIkaWRcIjpcIjU5XCIsXCJBXCI6MjU1LFwiUlwiOjI1NSxcIkdcIjoyNTUsXCJCXCI6MjU1fX0sXCJCYWNrZ3JvdW5kRmlsbFR5cGVcIjowLFwiTWF4V2lkdGhcIjoyMDAuMCxcIk1heEhlaWdodFwiOlwiSW5maW5pdHlcIixcIlNtYXJ0Rm9yZWdyb3VuZElzQWN0aXZlXCI6ZmFsc2UsXCJIb3Jpem9udGFsQWxpZ25tZW50XCI6MCxcIlZlcnRpY2FsQWxpZ25tZW50XCI6MSxcIlNtYXJ0Rm9yZWdyb3VuZFwiOm51bGwsXCJNYXJnaW5cIjp7XCIkaWRcIjpcIjYwXCIsXCJUb3BcIjowLjAsXCJMZWZ0XCI6NS4wLFwiUmlnaHRcIjowLjAsXCJCb3R0b21cIjowLjB9LFwiUGFkZGluZ1wiOntcIiRpZFwiOlwiNjFcIixcIlRvcFwiOjAuMCxcIkxlZnRcIjowLjAsXCJSaWdodFwiOjAuMCxcIkJvdHRvbVwiOjAuMH0sXCJCYWNrZ3JvdW5kXCI6e1wiJGlkXCI6XCI2MlwiLFwiQ29sb3JcIjp7XCIkcmVmXCI6XCIzNlwifX0sXCJJc1Zpc2libGVcIjp0cnVlLFwiV2lkdGhcIjowLjAsXCJIZWlnaHRcIjowLjAsXCJCb3JkZXJTdHlsZVwiOm51bGx9LFwiTWlkZGxlVGllclNjYWxlU3R5bGVcIjp7XCIkaWRcIjpcIjYzXCIsXCJTaG93U2VnbWVudFNlcGFyYXRvcnNcIjp0cnVlLFwiU2VnbWVudFNlcGFyYXRvck9wYWNpdHlcIjozMCxcIlNoYXBlXCI6NCxcIkhhc0JlZW5WaXNpYmxlQmVmb3JlXCI6ZmFsc2UsXCJGb250U2V0dGluZ3NcIjp7XCIkaWRcIjpcIjY0XCIsXCJGb250U2l6ZVwiOjEyLFwiRm9udE5hbWVcIjpcIkNhbGlicmlcIixcIklzQm9sZFwiOmZhbHNlLFwiSXNJdGFsaWNcIjpmYWxzZSxcIklzVW5kZXJsaW5lZFwiOmZhbHNlfSxcIkF1dG9TaXplXCI6MCxcIkZvcmVncm91bmRcIjp7XCIkaWRcIjpcIjY1XCIsXCJDb2xvclwiOntcIiRpZFwiOlwiNjZcIixcIkFcIjoyNTUsXCJSXCI6MjU1LFwiR1wiOjI1NSxcIkJcIjoyNTV9fSxcIkJhY2tncm91bmRGaWxsVHlwZVwiOjAsXCJNYXhXaWR0aFwiOjIwMC4wLFwiTWF4SGVpZ2h0XCI6XCJJbmZpbml0eVwiLFwiU21hcnRGb3JlZ3JvdW5kSXNBY3RpdmVcIjpmYWxzZSxcIkhvcml6b250YWxBbGlnbm1lbnRcIjowLFwiVmVydGljYWxBbGlnbm1lbnRcIjoxLFwiU21hcnRGb3JlZ3JvdW5kXCI6bnVsbCxcIk1hcmdpblwiOntcIiRpZFwiOlwiNjdcIixcIlRvcFwiOjAuMCxcIkxlZnRcIjo1LjAsXCJSaWdodFwiOjAuMCxcIkJvdHRvbVwiOjAuMH0sXCJQYWRkaW5nXCI6e1wiJGlkXCI6XCI2OFwiLFwiVG9wXCI6MC4wLFwiTGVmdFwiOjAuMCxcIlJpZ2h0XCI6MC4wLFwiQm90dG9tXCI6MC4wfSxcIkJhY2tncm91bmRcIjp7XCIkaWRcIjpcIjY5XCIsXCJDb2xvclwiOntcIiRpZFwiOlwiNzBcIixcIkFcIjowLFwiUlwiOjAsXCJHXCI6MCxcIkJcIjowfX0sXCJJc1Zpc2libGVcIjpmYWxzZSxcIldpZHRoXCI6MC4wLFwiSGVpZ2h0XCI6MC4wLFwiQm9yZGVyU3R5bGVcIjpudWxsfSxcIkJvdHRvbVRpZXJTY2FsZVN0eWxlXCI6e1wiJGlkXCI6XCI3MVwiLFwiU2hvd1NlZ21lbnRTZXBhcmF0b3JzXCI6dHJ1ZSxcIlNlZ21lbnRTZXBhcmF0b3JPcGFjaXR5XCI6MzAsXCJTaGFwZVwiOjQsXCJIYXNCZWVuVmlzaWJsZUJlZm9yZVwiOmZhbHNlLFwiRm9udFNldHRpbmdzXCI6e1wiJGlkXCI6XCI3MlwiLFwiRm9udFNpemVcIjoxMixcIkZvbnROYW1lXCI6XCJDYWxpYnJpXCIsXCJJc0JvbGRcIjpmYWxzZSxcIklzSXRhbGljXCI6ZmFsc2UsXCJJc1VuZGVybGluZWRcIjpmYWxzZX0sXCJBdXRvU2l6ZVwiOjAsXCJGb3JlZ3JvdW5kXCI6e1wiJGlkXCI6XCI3M1wiLFwiQ29sb3JcIjp7XCIkaWRcIjpcIjc0XCIsXCJBXCI6MjU1LFwiUlwiOjI1NSxcIkdcIjoyNTUsXCJCXCI6MjU1fX0sXCJCYWNrZ3JvdW5kRmlsbFR5cGVcIjowLFwiTWF4V2lkdGhcIjoyMDAuMCxcIk1heEhlaWdodFwiOlwiSW5maW5pdHlcIixcIlNtYXJ0Rm9yZWdyb3VuZElzQWN0aXZlXCI6ZmFsc2UsXCJIb3Jpem9udGFsQWxpZ25tZW50XCI6MCxcIlZlcnRpY2FsQWxpZ25tZW50XCI6MSxcIlNtYXJ0Rm9yZWdyb3VuZFwiOm51bGwsXCJNYXJnaW5cIjp7XCIkaWRcIjpcIjc1XCIsXCJUb3BcIjowLjAsXCJMZWZ0XCI6NS4wLFwiUmlnaHRcIjowLjAsXCJCb3R0b21cIjowLjB9LFwiUGFkZGluZ1wiOntcIiRpZFwiOlwiNzZcIixcIlRvcFwiOjAuMCxcIkxlZnRcIjowLjAsXCJSaWdodFwiOjAuMCxcIkJvdHRvbVwiOjAuMH0sXCJCYWNrZ3JvdW5kXCI6e1wiJGlkXCI6XCI3N1wiLFwiQ29sb3JcIjp7XCIkaWRcIjpcIjc4XCIsXCJBXCI6MCxcIlJcIjowLFwiR1wiOjAsXCJCXCI6MH19LFwiSXNWaXNpYmxlXCI6ZmFsc2UsXCJXaWR0aFwiOjAuMCxcIkhlaWdodFwiOjAuMCxcIkJvcmRlclN0eWxlXCI6bnVsbH0sXCJTaW5nbGVTY2FsZVNoYXBlU3R5bGVcIjpudWxsLFwiRWxhcHNlZFRpbWVCYWNrZ3JvdW5kXCI6e1wiJGlkXCI6XCI3OVwiLFwiQ29sb3JcIjp7XCIkaWRcIjpcIjgwXCIsXCJBXCI6NzcsXCJSXCI6MjU1LFwiR1wiOjAsXCJCXCI6MH19LFwiQXBwZW5kWWVhck9uWWVhckNoYW5nZVwiOnRydWUsXCJFbGFwc2VkVGltZUZvcm1hdFwiOjEsXCJUb2RheU1hcmtlclBvc2l0aW9uXCI6MyxcIlF1aWNrUG9zaXRpb25cIjoxLFwiQWJzb2x1dGVQb3NpdGlvblwiOjI0MC4wLFwiTWFyZ2luXCI6e1wiJGlkXCI6XCI4MVwiLFwiVG9wXCI6MC4wLFwiTGVmdFwiOjEwLjAsXCJSaWdodFwiOjEwLjAsXCJCb3R0b21cIjowLjB9LFwiUGFkZGluZ1wiOntcIiRpZFwiOlwiODJcIixcIlRvcFwiOjAuMCxcIkxlZnRcIjowLjAsXCJSaWdodFwiOjAuMCxcIkJvdHRvbVwiOjAuMH0sXCJCYWNrZ3JvdW5kXCI6e1wiJGlkXCI6XCI4M1wiLFwiQ29sb3JcIjp7XCIkaWRcIjpcIjg0XCIsXCJBXCI6MjU1LFwiUlwiOjExNSxcIkdcIjoxMTUsXCJCXCI6MTE1fX0sXCJJc1Zpc2libGVcIjp0cnVlLFwiV2lkdGhcIjowLjAsXCJIZWlnaHRcIjowLjAsXCJCb3JkZXJTdHlsZVwiOm51bGx9LFwiRGVmYXVsdE1pbGVzdG9uZVN0eWxlXCI6e1wiJGlkXCI6XCI4NVwiLFwiU2hhcGVcIjowLFwiQ29ubmVjdG9yTWFyZ2luXCI6e1wiJGlkXCI6XCI4NlwiLFwiVG9wXCI6MC4wLFwiTGVmdFwiOjIuMCxcIlJpZ2h0XCI6Mi4wLFwiQm90dG9tXCI6MC4wfSxcIkNvbm5lY3RvclN0eWxlXCI6e1wiJGlkXCI6XCI4N1wiLFwiTGluZUNvbG9yXCI6e1wiJGlkXCI6XCI4OFwiLFwiJHR5cGVcIjpcIk5MUkUuQ29tbW9uLkRvbS5Tb2xpZENvbG9yQnJ1c2gsIE5MUkUuQ29tbW9uXCIsXCJDb2xvclwiOntcIiRpZFwiOlwiODlcIixcIkFcIjoxMjcsXCJSXCI6MzEsXCJHXCI6NzMsXCJCXCI6MTI2fX0sXCJMaW5lV2VpZ2h0XCI6MS4wLFwiTGluZVR5cGVcIjowfSxcIklzQmVsb3dUaW1lYmFuZFwiOmZhbHNlLFwiSGlkZURhdGVcIjpmYWxzZSxcIlNoYXBlU2l6ZVwiOjEsXCJTcGFjaW5nXCI6Mi4wLFwiUGFkZGluZ1wiOntcIiRpZFwiOlwiOTBcIixcIlRvcFwiOjcuMCxcIkxlZnRcIjozLjAsXCJSaWdodFwiOjAuMCxcIkJvdHRvbVwiOjIuMH0sXCJQb3NpdGlvblwiOm51bGwsXCJQb3NpdGlvbk9uVGFza1wiOjAsXCJTaGFwZVN0eWxlXCI6e1wiJGlkXCI6XCI5MVwiLFwiTWFyZ2luXCI6e1wiJGlkXCI6XCI5MlwiLFwiVG9wXCI6MC4wLFwiTGVmdFwiOjAuMCxcIlJpZ2h0XCI6MC4wLFwiQm90dG9tXCI6MC4wfSxcIlBhZGRpbmdcIjp7XCIkaWRcIjpcIjkzXCIsXCJUb3BcIjowLjAsXCJMZWZ0XCI6MC4wLFwiUmlnaHRcIjowLjAsXCJCb3R0b21cIjowLjB9LFwiQmFja2dyb3VuZFwiOntcIiRpZFwiOlwiOTRcIixcIkNvbG9yXCI6e1wiJGlkXCI6XCI5NVwiLFwiQVwiOjI1NSxcIlJcIjowLFwiR1wiOjExNCxcIkJcIjoxODh9fSxcIklzVmlzaWJsZVwiOnRydWUsXCJXaWR0aFwiOjE4LjAsXCJIZWlnaHRcIjoyMC4wLFwiQm9yZGVyU3R5bGVcIjp7XCIkaWRcIjpcIjk2XCIsXCJMaW5lQ29sb3JcIjp7XCIkaWRcIjpcIjk3XCIsXCIkdHlwZVwiOlwiTkxSRS5Db21tb24uRG9tLlNvbGlkQ29sb3JCcnVzaCwgTkxSRS5Db21tb25cIixcIkNvbG9yXCI6e1wiJGlkXCI6XCI5OFwiLFwiQVwiOjI1NSxcIlJcIjoyNTUsXCJHXCI6MCxcIkJcIjowfX0sXCJMaW5lV2VpZ2h0XCI6MC4wLFwiTGluZVR5cGVcIjowfX0sXCJUaXRsZVN0eWxlXCI6e1wiJGlkXCI6XCI5OVwiLFwiRm9udFNldHRpbmdzXCI6e1wiJGlkXCI6XCIxMDBcIixcIkZvbnRTaXplXCI6MTEsXCJGb250TmFtZVwiOlwiQ2FsaWJyaVwiLFwiSXNCb2xkXCI6dHJ1ZSxcIklzSXRhbGljXCI6ZmFsc2UsXCJJc1VuZGVybGluZWRcIjpmYWxzZX0sXCJBdXRvU2l6ZVwiOjAsXCJGb3JlZ3JvdW5kXCI6e1wiJGlkXCI6XCIxMDFcIixcIkNvbG9yXCI6e1wiJGlkXCI6XCIxMDJcIixcIkFcIjoyNTUsXCJSXCI6MCxcIkdcIjowLFwiQlwiOjB9fSxcIkJhY2tncm91bmRGaWxsVHlwZVwiOjAsXCJNYXhXaWR0aFwiOjIwMC4wLFwiTWF4SGVpZ2h0XCI6XCJJbmZpbml0eVwiLFwiU21hcnRGb3JlZ3JvdW5kSXNBY3RpdmVcIjpmYWxzZSxcIkhvcml6b250YWxBbGlnbm1lbnRcIjoxLFwiVmVydGljYWxBbGlnbm1lbnRcIjowLFwiU21hcnRGb3JlZ3JvdW5kXCI6bnVsbCxcIk1hcmdpblwiOntcIiRpZFwiOlwiMTAzXCIsXCJUb3BcIjowLjAsXCJMZWZ0XCI6MC4wLFwiUmlnaHRcIjowLjAsXCJCb3R0b21cIjowLjB9LFwiUGFkZGluZ1wiOntcIiRpZFwiOlwiMTA0XCIsXCJUb3BcIjowLjAsXCJMZWZ0XCI6MC4wLFwiUmlnaHRcIjowLjAsXCJCb3R0b21cIjowLjB9LFwiQmFja2dyb3VuZFwiOntcIiRpZFwiOlwiMTA1XCIsXCJDb2xvclwiOntcIiRyZWZcIjpcIjM2XCJ9fSxcIklzVmlzaWJsZVwiOnRydWUsXCJXaWR0aFwiOjAuMCxcIkhlaWdodFwiOjAuMCxcIkJvcmRlclN0eWxlXCI6bnVsbH0sXCJEYXRlU3R5bGVcIjp7XCIkaWRcIjpcIjEwNlwiLFwiRm9udFNldHRpbmdzXCI6e1wiJGlkXCI6XCIxMDdcIixcIkZvbnRTaXplXCI6MTAsXCJGb250TmFtZVwiOlwiQ2FsaWJyaVwiLFwiSXNCb2xkXCI6ZmFsc2UsXCJJc0l0YWxpY1wiOmZhbHNlLFwiSXNVbmRlcmxpbmVkXCI6ZmFsc2V9LFwiQXV0b1NpemVcIjowLFwiRm9yZWdyb3VuZFwiOntcIiRpZFwiOlwiMTA4XCIsXCJDb2xvclwiOntcIiRpZFwiOlwiMTA5XCIsXCJBXCI6MjU1LFwiUlwiOjY4LFwiR1wiOjg0LFwiQlwiOjEwNn19LFwiQmFja2dyb3VuZEZpbGxUeXBlXCI6MCxcIk1heFdpZHRoXCI6MjAwLjAsXCJNYXhIZWlnaHRcIjpcIkluZmluaXR5XCIsXCJTbWFydEZvcmVncm91bmRJc0FjdGl2ZVwiOmZhbHNlLFwiSG9yaXpvbnRhbEFsaWdubWVudFwiOjAsXCJWZXJ0aWNhbEFsaWdubWVudFwiOjAsXCJTbWFydEZvcmVncm91bmRcIjpudWxsLFwiTWFyZ2luXCI6e1wiJGlkXCI6XCIxMTBcIixcIlRvcFwiOjAuMCxcIkxlZnRcIjowLjAsXCJSaWdodFwiOjAuMCxcIkJvdHRvbVwiOjAuMH0sXCJQYWRkaW5nXCI6e1wiJGlkXCI6XCIxMTFcIixcIlRvcFwiOjAuMCxcIkxlZnRcIjowLjAsXCJSaWdodFwiOjAuMCxcIkJvdHRvbVwiOjAuMH0sXCJCYWNrZ3JvdW5kXCI6e1wiJGlkXCI6XCIxMTJcIixcIkNvbG9yXCI6e1wiJHJlZlwiOlwiMzZcIn19LFwiSXNWaXNpYmxlXCI6dHJ1ZSxcIldpZHRoXCI6MC4wLFwiSGVpZ2h0XCI6MC4wLFwiQm9yZGVyU3R5bGVcIjpudWxsfSxcIkRhdGVGb3JtYXRcIjp7XCIkaWRcIjpcIjExM1wiLFwiRm9ybWF0U3RyaW5nXCI6XCJNTU0gZFwiLFwiU2VwYXJhdG9yXCI6XCIvXCIsXCJVc2VJbnRlcm5hdGlvbmFsRGF0ZUZvcm1hdFwiOmZhbHNlLFwiRGF0ZUlzVmlzaWJsZVwiOnRydWUsXCJUaW1lSXNWaXNpYmxlXCI6ZmFsc2UsXCJIb3VyRGlnaXRzXCI6MSxcIkFtUG1EZXNpZ25hdG9yXCI6MixcIlRyaW0wME1pbnV0ZXNcIjpmYWxzZSxcIkxhc3RLbm93blZpc2liaWxpdHlTdGF0ZVwiOm51bGx9LFwiSXNWaXNpYmxlXCI6dHJ1ZX0sXCJEZWZhdWx0VGFza1N0eWxlXCI6e1wiJGlkXCI6XCIxMTRcIixcIlNoYXBlXCI6MixcIlNoYXBlVGhpY2tuZXNzXCI6MSxcIkR1cmF0aW9uRm9ybWF0XCI6MCxcIlBlcmNlbnRhZ2VDb21wbGV0ZVN0eWxlXCI6e1wiJGlkXCI6XCIxMTVcIixcIkZvbnRTZXR0aW5nc1wiOntcIiRpZFwiOlwiMTE2XCIsXCJGb250U2l6ZVwiOjEwLFwiRm9udE5hbWVcIjpcIkNhbGlicmlcIixcIklzQm9sZFwiOmZhbHNlLFwiSXNJdGFsaWNcIjpmYWxzZSxcIklzVW5kZXJsaW5lZFwiOmZhbHNlfSxcIkF1dG9TaXplXCI6MCxcIkZvcmVncm91bmRcIjp7XCIkaWRcIjpcIjExN1wiLFwiQ29sb3JcIjp7XCIkaWRcIjpcIjExOFwiLFwiQVwiOjI1NSxcIlJcIjoyMzcsXCJHXCI6MTI1LFwiQlwiOjQ5fX0sXCJCYWNrZ3JvdW5kRmlsbFR5cGVcIjowLFwiTWF4V2lkdGhcIjoyMDAuMCxcIk1heEhlaWdodFwiOlwiSW5maW5pdHlcIixcIlNtYXJ0Rm9yZWdyb3VuZElzQWN0aXZlXCI6ZmFsc2UsXCJIb3Jpem9udGFsQWxpZ25tZW50XCI6MCxcIlZlcnRpY2FsQWxpZ25tZW50XCI6MCxcIlNtYXJ0Rm9yZWdyb3VuZFwiOm51bGwsXCJNYXJnaW5cIjp7XCIkaWRcIjpcIjExOVwiLFwiVG9wXCI6MC4wLFwiTGVmdFwiOjAuMCxcIlJpZ2h0XCI6MC4wLFwiQm90dG9tXCI6MC4wfSxcIlBhZGRpbmdcIjp7XCIkaWRcIjpcIjEyMFwiLFwiVG9wXCI6MC4wLFwiTGVmdFwiOjAuMCxcIlJpZ2h0XCI6MC4wLFwiQm90dG9tXCI6MC4wfSxcIkJhY2tncm91bmRcIjp7XCIkaWRcIjpcIjEyMVwiLFwiQ29sb3JcIjp7XCIkcmVmXCI6XCIzNlwifX0sXCJJc1Zpc2libGVcIjp0cnVlLFwiV2lkdGhcIjowLjAsXCJIZWlnaHRcIjowLjAsXCJCb3JkZXJTdHlsZVwiOm51bGx9LFwiRHVyYXRpb25TdHlsZVwiOntcIiRpZFwiOlwiMTIyXCIsXCJGb250U2V0dGluZ3NcIjp7XCIkaWRcIjpcIjEyM1wiLFwiRm9udFNpemVcIjoxMCxcIkZvbnROYW1lXCI6XCJDYWxpYnJpXCIsXCJJc0JvbGRcIjpmYWxzZSxcIklzSXRhbGljXCI6ZmFsc2UsXCJJc1VuZGVybGluZWRcIjpmYWxzZX0sXCJBdXRvU2l6ZVwiOjAsXCJGb3JlZ3JvdW5kXCI6e1wiJGlkXCI6XCIxMjRcIixcIkNvbG9yXCI6e1wiJGlkXCI6XCIxMjVcIixcIkFcIjoyNTUsXCJSXCI6MjM3LFwiR1wiOjEyNSxcIkJcIjo0OX19LFwiQmFja2dyb3VuZEZpbGxUeXBlXCI6MCxcIk1heFdpZHRoXCI6MjAwLjAsXCJNYXhIZWlnaHRcIjpcIkluZmluaXR5XCIsXCJTbWFydEZvcmVncm91bmRJc0FjdGl2ZVwiOmZhbHNlLFwiSG9yaXpvbnRhbEFsaWdubWVudFwiOjAsXCJWZXJ0aWNhbEFsaWdubWVudFwiOjAsXCJTbWFydEZvcmVncm91bmRcIjpudWxsLFwiTWFyZ2luXCI6e1wiJGlkXCI6XCIxMjZcIixcIlRvcFwiOjAuMCxcIkxlZnRcIjowLjAsXCJSaWdodFwiOjAuMCxcIkJvdHRvbVwiOjAuMH0sXCJQYWRkaW5nXCI6e1wiJGlkXCI6XCIxMjdcIixcIlRvcFwiOjAuMCxcIkxlZnRcIjowLjAsXCJSaWdodFwiOjAuMCxcIkJvdHRvbVwiOjAuMH0sXCJCYWNrZ3JvdW5kXCI6e1wiJGlkXCI6XCIxMjhcIixcIkNvbG9yXCI6e1wiJHJlZlwiOlwiMzZcIn19LFwiSXNWaXNpYmxlXCI6dHJ1ZSxcIldpZHRoXCI6MC4wLFwiSGVpZ2h0XCI6MC4wLFwiQm9yZGVyU3R5bGVcIjpudWxsfSxcIkhvcml6b250YWxDb25uZWN0b3JTdHlsZVwiOntcIiRpZFwiOlwiMTI5XCIsXCJMaW5lQ29sb3JcIjp7XCIkaWRcIjpcIjEzMFwiLFwiJHR5cGVcIjpcIk5MUkUuQ29tbW9uLkRvbS5Tb2xpZENvbG9yQnJ1c2gsIE5MUkUuQ29tbW9uXCIsXCJDb2xvclwiOntcIiRpZFwiOlwiMTMxXCIsXCJBXCI6MjU1LFwiUlwiOjIwNCxcIkdcIjoyMDQsXCJCXCI6MjA0fX0sXCJMaW5lV2VpZ2h0XCI6MS4wLFwiTGluZVR5cGVcIjowfSxcIlZlcnRpY2FsQ29ubmVjdG9yU3R5bGVcIjp7XCIkaWRcIjpcIjEzMlwiLFwiTGluZUNvbG9yXCI6e1wiJGlkXCI6XCIxMzNcIixcIiR0eXBlXCI6XCJOTFJFLkNvbW1vbi5Eb20uU29saWRDb2xvckJydXNoLCBOTFJFLkNvbW1vblwiLFwiQ29sb3JcIjp7XCIkaWRcIjpcIjEzNFwiLFwiQVwiOjI1NSxcIlJcIjoyMDQsXCJHXCI6MjA0LFwiQlwiOjIwNH19LFwiTGluZVdlaWdodFwiOjAuMCxcIkxpbmVUeXBlXCI6MH0sXCJNYXJnaW5cIjpudWxsLFwiU3RhcnREYXRlUG9zaXRpb25cIjozLFwiRW5kRGF0ZVBvc2l0aW9uXCI6NCxcIlRpdGxlUG9zaXRpb25cIjoyLFwiRHVyYXRpb25Qb3NpdGlvblwiOjYsXCJQZXJjZW50YWdlQ29tcGxldGVkUG9zaXRpb25cIjo2LFwiU3BhY2luZ1wiOjUsXCJJc0JlbG93VGltZWJhbmRcIjp0cnVlLFwiUGVyY2VudGFnZUNvbXBsZXRlU2hhcGVPcGFjaXR5XCI6MzUsXCJHcm91cE5hbWVcIjpudWxsLFwiQXR0YWNoZWRNaWxlc3RvbmVzU3R5bGVzXCI6bnVsbCxcIlNoYXBlU3R5bGVcIjp7XCIkaWRcIjpcIjEzNVwiLFwiTWFyZ2luXCI6e1wiJGlkXCI6XCIxMzZcIixcIlRvcFwiOjAuMCxcIkxlZnRcIjo0LjAsXCJSaWdodFwiOjQuMCxcIkJvdHRvbVwiOjAuMH0sXCJQYWRkaW5nXCI6e1wiJGlkXCI6XCIxMzdcIixcIlRvcFwiOjAuMCxcIkxlZnRcIjowLjAsXCJSaWdodFwiOjAuMCxcIkJvdHRvbVwiOjAuMH0sXCJCYWNrZ3JvdW5kXCI6e1wiJGlkXCI6XCIxMzhcIixcIkNvbG9yXCI6e1wiJGlkXCI6XCIxMzlcIixcIkFcIjoyNTUsXCJSXCI6MCxcIkdcIjoxMTQsXCJCXCI6MTg4fX0sXCJJc1Zpc2libGVcIjp0cnVlLFwiV2lkdGhcIjowLjAsXCJIZWlnaHRcIjoxNi4wLFwiQm9yZGVyU3R5bGVcIjp7XCIkaWRcIjpcIjE0MFwiLFwiTGluZUNvbG9yXCI6e1wiJGlkXCI6XCIxNDFcIixcIiR0eXBlXCI6XCJOTFJFLkNvbW1vbi5Eb20uU29saWRDb2xvckJydXNoLCBOTFJFLkNvbW1vblwiLFwiQ29sb3JcIjp7XCIkaWRcIjpcIjE0MlwiLFwiQVwiOjI1NSxcIlJcIjoyNTUsXCJHXCI6MCxcIkJcIjowfX0sXCJMaW5lV2VpZ2h0XCI6MC4wLFwiTGluZVR5cGVcIjowfX0sXCJUaXRsZVN0eWxlXCI6e1wiJGlkXCI6XCIxNDNcIixcIkZvbnRTZXR0aW5nc1wiOntcIiRpZFwiOlwiMTQ0XCIsXCJGb250U2l6ZVwiOjExLFwiRm9udE5hbWVcIjpcIkNhbGlicmlcIixcIklzQm9sZFwiOnRydWUsXCJJc0l0YWxpY1wiOmZhbHNlLFwiSXNVbmRlcmxpbmVkXCI6ZmFsc2V9LFwiQXV0b1NpemVcIjowLFwiRm9yZWdyb3VuZFwiOntcIiRpZFwiOlwiMTQ1XCIsXCJDb2xvclwiOntcIiRpZFwiOlwiMTQ2XCIsXCJBXCI6MjU1LFwiUlwiOjAsXCJHXCI6MCxcIkJcIjowfX0sXCJCYWNrZ3JvdW5kRmlsbFR5cGVcIjowLFwiTWF4V2lkdGhcIjo5NjAuMCxcIk1heEhlaWdodFwiOlwiSW5maW5pdHlcIixcIlNtYXJ0Rm9yZWdyb3VuZElzQWN0aXZlXCI6ZmFsc2UsXCJIb3Jpem9udGFsQWxpZ25tZW50XCI6MSxcIlZlcnRpY2FsQWxpZ25tZW50XCI6MCxcIlNtYXJ0Rm9yZWdyb3VuZFwiOm51bGwsXCJNYXJnaW5cIjp7XCIkaWRcIjpcIjE0N1wiLFwiVG9wXCI6MC4wLFwiTGVmdFwiOjAuMCxcIlJpZ2h0XCI6MC4wLFwiQm90dG9tXCI6MC4wfSxcIlBhZGRpbmdcIjp7XCIkaWRcIjpcIjE0OFwiLFwiVG9wXCI6MC4wLFwiTGVmdFwiOjAuMCxcIlJpZ2h0XCI6MC4wLFwiQm90dG9tXCI6MC4wfSxcIkJhY2tncm91bmRcIjp7XCIkaWRcIjpcIjE0OVwiLFwiQ29sb3JcIjp7XCIkcmVmXCI6XCIzNlwifX0sXCJJc1Zpc2libGVcIjp0cnVlLFwiV2lkdGhcIjowLjAsXCJIZWlnaHRcIjowLjAsXCJCb3JkZXJTdHlsZVwiOm51bGx9LFwiRGF0ZVN0eWxlXCI6e1wiJGlkXCI6XCIxNTBcIixcIkZvbnRTZXR0aW5nc1wiOntcIiRpZFwiOlwiMTUxXCIsXCJGb250U2l6ZVwiOjEwLFwiRm9udE5hbWVcIjpcIkNhbGlicmlcIixcIklzQm9sZFwiOmZhbHNlLFwiSXNJdGFsaWNcIjpmYWxzZSxcIklzVW5kZXJsaW5lZFwiOmZhbHNlfSxcIkF1dG9TaXplXCI6MCxcIkZvcmVncm91bmRcIjp7XCIkaWRcIjpcIjE1MlwiLFwiQ29sb3JcIjp7XCIkaWRcIjpcIjE1M1wiLFwiQVwiOjI1NSxcIlJcIjo2OCxcIkdcIjo4NCxcIkJcIjoxMDZ9fSxcIkJhY2tncm91bmRGaWxsVHlwZVwiOjAsXCJNYXhXaWR0aFwiOjIwMC4wLFwiTWF4SGVpZ2h0XCI6XCJJbmZpbml0eVwiLFwiU21hcnRGb3JlZ3JvdW5kSXNBY3RpdmVcIjpmYWxzZSxcIkhvcml6b250YWxBbGlnbm1lbnRcIjoxLFwiVmVydGljYWxBbGlnbm1lbnRcIjowLFwiU21hcnRGb3JlZ3JvdW5kXCI6bnVsbCxcIk1hcmdpblwiOntcIiRpZFwiOlwiMTU0XCIsXCJUb3BcIjowLjAsXCJMZWZ0XCI6MC4wLFwiUmlnaHRcIjowLjAsXCJCb3R0b21cIjowLjB9LFwiUGFkZGluZ1wiOntcIiRpZFwiOlwiMTU1XCIsXCJUb3BcIjowLjAsXCJMZWZ0XCI6MC4wLFwiUmlnaHRcIjowLjAsXCJCb3R0b21cIjowLjB9LFwiQmFja2dyb3VuZFwiOntcIiRpZFwiOlwiMTU2XCIsXCJDb2xvclwiOntcIiRyZWZcIjpcIjM2XCJ9fSxcIklzVmlzaWJsZVwiOnRydWUsXCJXaWR0aFwiOjAuMCxcIkhlaWdodFwiOjAuMCxcIkJvcmRlclN0eWxlXCI6bnVsbH0sXCJEYXRlRm9ybWF0XCI6e1wiJGlkXCI6XCIxNTdcIixcIkZvcm1hdFN0cmluZ1wiOlwiTU1NIGRcIixcIlNlcGFyYXRvclwiOlwiL1wiLFwiVXNlSW50ZXJuYXRpb25hbERhdGVGb3JtYXRcIjpmYWxzZSxcIkRhdGVJc1Zpc2libGVcIjp0cnVlLFwiVGltZUlzVmlzaWJsZVwiOmZhbHNlLFwiSG91ckRpZ2l0c1wiOjEsXCJBbVBtRGVzaWduYXRvclwiOjIsXCJUcmltMDBNaW51dGVzXCI6ZmFsc2UsXCJMYXN0S25vd25WaXNpYmlsaXR5U3RhdGVcIjpudWxsfSxcIklzVmlzaWJsZVwiOnRydWV9LFwiU2hvd0VsYXBzZWRUaW1lR3JhZGllbnRTdHlsZVwiOmZhbHNlLFwiVGltZWJhbmRSZXNlcnZlZExlZnRBcmVhU3R5bGVcIjpudWxsLFwiRGVmYXVsdFN3aW1sYW5lU3R5bGVcIjp7XCIkaWRcIjpcIjE1OFwiLFwiSGVhZGVyU3R5bGVcIjp7XCIkaWRcIjpcIjE1OVwiLFwiVGV4dFN0eWxlXCI6e1wiJGlkXCI6XCIxNjBcIixcIkZvbnRTZXR0aW5nc1wiOntcIiRpZFwiOlwiMTYxXCIsXCJGb250U2l6ZVwiOjEyLFwiRm9udE5hbWVcIjpcIkNhbGlicmlcIixcIklzQm9sZFwiOmZhbHNlLFwiSXNJdGFsaWNcIjpmYWxzZSxcIklzVW5kZXJsaW5lZFwiOmZhbHNlfSxcIkF1dG9TaXplXCI6MCxcIkZvcmVncm91bmRcIjp7XCIkaWRcIjpcIjE2MlwiLFwiQ29sb3JcIjp7XCIkaWRcIjpcIjE2M1wiLFwiQVwiOjI1NSxcIlJcIjozMixcIkdcIjo1NixcIkJcIjoxMDB9fSxcIkJhY2tncm91bmRGaWxsVHlwZVwiOjAsXCJNYXhXaWR0aFwiOjAuMCxcIk1heEhlaWdodFwiOjAuMCxcIlNtYXJ0Rm9yZWdyb3VuZElzQWN0aXZlXCI6ZmFsc2UsXCJIb3Jpem9udGFsQWxpZ25tZW50XCI6MCxcIlZlcnRpY2FsQWxpZ25tZW50XCI6MCxcIlNtYXJ0Rm9yZWdyb3VuZFwiOm51bGwsXCJNYXJnaW5cIjp7XCIkaWRcIjpcIjE2NFwiLFwiVG9wXCI6MC4wLFwiTGVmdFwiOjAuMCxcIlJpZ2h0XCI6MC4wLFwiQm90dG9tXCI6MC4wfSxcIlBhZGRpbmdcIjp7XCIkaWRcIjpcIjE2NVwiLFwiVG9wXCI6MC4wLFwiTGVmdFwiOjAuMCxcIlJpZ2h0XCI6MC4wLFwiQm90dG9tXCI6MC4wfSxcIkJhY2tncm91bmRcIjpudWxsLFwiSXNWaXNpYmxlXCI6ZmFsc2UsXCJXaWR0aFwiOjAuMCxcIkhlaWdodFwiOjAuMCxcIkJvcmRlclN0eWxlXCI6bnVsbH0sXCJSZWN0YW5nbGVTdHlsZVwiOntcIiRpZFwiOlwiMTY2XCIsXCJNYXJnaW5cIjp7XCIkaWRcIjpcIjE2N1wiLFwiVG9wXCI6MC4wLFwiTGVmdFwiOjAuMCxcIlJpZ2h0XCI6MC4wLFwiQm90dG9tXCI6MC4wfSxcIlBhZGRpbmdcIjp7XCIkaWRcIjpcIjE2OFwiLFwiVG9wXCI6MC4wLFwiTGVmdFwiOjAuMCxcIlJpZ2h0XCI6MC4wLFwiQm90dG9tXCI6MC4wfSxcIkJhY2tncm91bmRcIjp7XCIkaWRcIjpcIjE2OVwiLFwiQ29sb3JcIjp7XCIkaWRcIjpcIjE3MFwiLFwiQVwiOjEyNyxcIlJcIjo5MSxcIkdcIjoxNTUsXCJCXCI6MjEzfX0sXCJJc1Zpc2libGVcIjpmYWxzZSxcIldpZHRoXCI6MC4wLFwiSGVpZ2h0XCI6MC4wLFwiQm9yZGVyU3R5bGVcIjp7XCIkaWRcIjpcIjE3MVwiLFwiTGluZUNvbG9yXCI6e1wiJGlkXCI6XCIxNzJcIixcIiR0eXBlXCI6XCJOTFJFLkNvbW1vbi5Eb20uU29saWRDb2xvckJydXNoLCBOTFJFLkNvbW1vblwiLFwiQ29sb3JcIjp7XCIkaWRcIjpcIjE3M1wiLFwiQVwiOjI1NSxcIlJcIjoyNTUsXCJHXCI6MCxcIkJcIjowfX0sXCJMaW5lV2VpZ2h0XCI6MC4wLFwiTGluZVR5cGVcIjowfX0sXCJUZXh0SXNWZXJ0aWNhbFwiOmZhbHNlfSxcIkJhY2tncm91bmRTdHlsZVwiOntcIiRpZFwiOlwiMTc0XCIsXCJNYXJnaW5cIjp7XCIkaWRcIjpcIjE3NVwiLFwiVG9wXCI6MC4wLFwiTGVmdFwiOjAuMCxcIlJpZ2h0XCI6MC4wLFwiQm90dG9tXCI6MC4wfSxcIlBhZGRpbmdcIjp7XCIkaWRcIjpcIjE3NlwiLFwiVG9wXCI6MC4wLFwiTGVmdFwiOjAuMCxcIlJpZ2h0XCI6MC4wLFwiQm90dG9tXCI6MC4wfSxcIkJhY2tncm91bmRcIjp7XCIkaWRcIjpcIjE3N1wiLFwiQ29sb3JcIjp7XCIkaWRcIjpcIjE3OFwiLFwiQVwiOjM4LFwiUlwiOjkxLFwiR1wiOjE1NSxcIkJcIjoyMTN9fSxcIklzVmlzaWJsZVwiOnRydWUsXCJXaWR0aFwiOjAuMCxcIkhlaWdodFwiOjAuMCxcIkJvcmRlclN0eWxlXCI6e1wiJGlkXCI6XCIxNzlcIixcIkxpbmVDb2xvclwiOntcIiRpZFwiOlwiMTgwXCIsXCIkdHlwZVwiOlwiTkxSRS5Db21tb24uRG9tLlNvbGlkQ29sb3JCcnVzaCwgTkxSRS5Db21tb25cIixcIkNvbG9yXCI6e1wiJGlkXCI6XCIxODFcIixcIkFcIjoyNTUsXCJSXCI6MjU1LFwiR1wiOjAsXCJCXCI6MH19LFwiTGluZVdlaWdodFwiOjAuMCxcIkxpbmVUeXBlXCI6MH19LFwiSXNBYm92ZVRpbWViYW5kXCI6ZmFsc2V9LFwiQ3VzdG9tTWlsZXN0b25lU3R5bGVMaXN0XCI6W10sXCJDdXN0b21UYXNrU3R5bGVMaXN0XCI6W10sXCJDdXN0b21Td2ltbGFuZURlZmluaXRpb25TdHlsZUxpc3RcIjpbXSxcIkN1c3RvbVN3aW1sYW5lVjJTdHlsZUxpc3RcIjpbXSxcIkdyaWRsaW5lUGFuZWxTdHlsZVwiOntcIiRpZFwiOlwiMTgyXCIsXCJHcmlkbGluZVN0eWxlXCI6e1wiJGlkXCI6XCIxODNcIixcIkxpbmVDb2xvclwiOntcIiRpZFwiOlwiMTg0XCIsXCIkdHlwZVwiOlwiTkxSRS5Db21tb24uRG9tLlNvbGlkQ29sb3JCcnVzaCwgTkxSRS5Db21tb25cIixcIkNvbG9yXCI6e1wiJGlkXCI6XCIxODVcIixcIkFcIjozOCxcIlJcIjo5MSxcIkdcIjoxNTUsXCJCXCI6MjEzfX0sXCJMaW5lV2VpZ2h0XCI6MS4wLFwiTGluZVR5cGVcIjowfSxcIklzVmlzaWJsZVwiOnRydWV9LFwiQWN0aXZpdHlMaW5lUGFuZWxTdHlsZVwiOntcIiRpZFwiOlwiMTg2XCIsXCJBY3Rpdml0eUxpbmVTdHlsZVwiOntcIiRpZFwiOlwiMTg3XCIsXCJMaW5lQ29sb3JcIjp7XCIkaWRcIjpcIjE4OFwiLFwiJHR5cGVcIjpcIk5MUkUuQ29tbW9uLkRvbS5Tb2xpZENvbG9yQnJ1c2gsIE5MUkUuQ29tbW9uXCIsXCJDb2xvclwiOntcIiRpZFwiOlwiMTg5XCIsXCJBXCI6MzgsXCJSXCI6NjgsXCJHXCI6MTE0LFwiQlwiOjE5Nn19LFwiTGluZVdlaWdodFwiOjEuMCxcIkxpbmVUeXBlXCI6MH0sXCJJc1Zpc2libGVcIjp0cnVlfX0sXCJTY2FsZVwiOntcIiRpZFwiOlwiMTkwXCIsXCJTdGFydERhdGVcIjpcIjAwMDEtMDEtMDFUMDA6MDA6MDBcIixcIkVuZERhdGVcIjpcIjAwMDEtMDEtMDFUMDA6MDA6MDBcIixcIkZvcm1hdFwiOlwid1wiLFwiVHlwZVwiOjEsXCJBdXRvRGF0ZVJhbmdlXCI6dHJ1ZSxcIldvcmtpbmdEYXlzXCI6MzEsXCJUb2RheU1hcmtlclRleHRcIjpcIlRvZGF5XCIsXCJBdXRvU2NhbGVUeXBlXCI6dHJ1ZX0sXCJTY2FsZVYyXCI6e1wiJGlkXCI6XCIxOTFcIixcIlN0YXJ0RGF0ZVwiOlwiMDAwMS0wMS0wMVQwMDowMDowMFwiLFwiRW5kRGF0ZVwiOlwiMDAwMS0wMS0wMVQwMDowMDowMFwiLFwiQXV0b0RhdGVSYW5nZVwiOnRydWUsXCJXb3JraW5nRGF5c1wiOjMxLFwiVG9kYXlNYXJrZXJUZXh0XCI6XCJUb2RheVwiLFwiQXV0b1NjYWxlVHlwZVwiOnRydWUsXCJUaW1lYmFuZFNjYWxlc1wiOntcIiRpZFwiOlwiMTkyXCIsXCJUb3BTY2FsZUxheWVyXCI6e1wiJGlkXCI6XCIxOTNcIixcIkZvcm1hdFwiOlwid1wiLFwiVHlwZVwiOjF9LFwiTWlkZGxlU2NhbGVMYXllclwiOntcIiRpZFwiOlwiMTk0XCIsXCJGb3JtYXRcIjpudWxsLFwiVHlwZVwiOjB9LFwiQm90dG9tU2NhbGVMYXllclwiOntcIiRpZFwiOlwiMTk1XCIsXCJGb3JtYXRcIjpudWxsLFwiVHlwZVwiOjB9fX0sXCJNaWxlc3RvbmVzXCI6W10sXCJUYXNrc1wiOltdLFwiU3dpbWxhbmVzXCI6W10sXCJTd2ltbGFuZXNWMlwiOltdLFwiU2V0dGluZ3NcIjp7XCIkaWRcIjpcIjE5NlwiLFwiSW1wYU9wdGlvbnNcIjp7XCIkaWRcIjpcIjE5N1wiLFwiTGVmdFRvUmlnaHRcIjpmYWxzZSxcIlBheWxvYWRPcHRpb25zXCI6Mn19LFwiVGltZUNvbmZpZ3VyYXRpb25cIjp7XCIkaWRcIjpcIjE5OFwiLFwiVXNlVGltZVwiOmZhbHNlLFwiV29ya0RheVN0YXJ0XCI6XCIwMDowMDowMFwiLFwiV29ya0RheUVuZFwiOlwiMjM6NTk6MDBcIn19IiwiUmVjZW50Q29sb3JzQ29sbGVjdGlvbiI6IltcIiNGRjFBQUE0MlwiXSJ9LCJTZXR0aW5ncyI6eyIkaWQiOiI2ODciLCJJbXBhT3B0aW9ucyI6eyIkaWQiOiI2ODgiLCJMZWZ0VG9SaWdodCI6ZmFsc2UsIlBheWxvYWRPcHRpb25zIjoyfSwiVXNlQ29tcHJlc3Npb24iOmZhbHNlLCJDb21wcmVzaW9uUGVyY2VudGFnZSI6NTAuMCwiSW5hY3RpdmVJbnRlcnZhbFdpZHRoVGhyZXNob2xkIjozMC4wLCJJbmFjdGl2ZUludGVydmFsV2lkdGgiOjEuMCwiU3BsaXRUYXNrcyI6ZmFsc2UsIlVzZUNsdXN0ZXIiOmZhbHNlLCJFcHNpbG9uIjo1LjAsIk1pblBvaW50c1RvRm9ybUFDbHVzdGVyIjoyLCJHZW5lcmF0ZUludmlzaWJsZVNoYXBlcyI6ZmFsc2UsIlNtYXJ0VGltZWxpbmVUYXNrUGVyY2VudGFnZUZpdCI6ZmFsc2V9LCJJc05ldyI6ZmFsc2UsIkltcG9ydFR5cGUiOjAsIkZpbGVQYXRoIjpudWxsLCJUaW1lQ29uZmlndXJhdGlvbiI6eyIkaWQiOiI2ODkiLCJVc2VUaW1lIjpmYWxzZSwiV29ya0RheVN0YXJ0IjoiMDA6MDA6MDAiLCJXb3JrRGF5RW5kIjoiMjM6NTk6MDAifSwiTGFzdFVzZWRUZW1wbGF0ZUlkIjoiYzExZjZmNDktN2RiOC00NWZkLWJhMzItYmZjYWVhNDkyZjM5IiwiRmlyc3RXZWVrT2ZZZWFyIjowLCJQbGFjZU1pbGVzdG9uZUF0VGhlQmVnaW5uaW5nT2ZUaGVEYXkiOmZhbHNlfQ=="/>
+  <p:tag name="__PART_0" val="eyIkaWQiOiIxIiwiX3N3aW1sYW5lc1YyIjpbeyIkaWQiOiIyIiwiX2FjdGl2aXRpZXMiOlt7IiRpZCI6IjMiLCJfcm93cyI6W3siJGlkIjoiNCIsIl90YXNrcyI6W3siJGlkIjoiNSIsIl9hdHRhY2hlZE1pbGVzdG9uZXMiOltdLCJUYXNrRGVmaW5pdGlvbiI6eyIkaWQiOiI2IiwiR3JvdXBOYW1lIjpudWxsLCJTdGFydERhdGUiOiIyMDIyLTA1LTExVDAwOjAwOjAwWiIsIkVuZERhdGUiOiIyMDIyLTA1LTE0VDIzOjU5OjAwWiIsIlBlcmNlbnRhZ2VDb21wbGV0ZSI6bnVsbCwiU3R5bGUiOnsiJGlkIjoiNyIsIlNoYXBlIjoyLCJTaGFwZVRoaWNrbmVzcyI6MSwiRHVyYXRpb25Gb3JtYXQiOjAsIkluY2x1ZGVOb25Xb3JraW5nRGF5c0luRHVyYXRpb24iOmZhbHNlLCJQZXJjZW50YWdlQ29tcGxldGVTdHlsZSI6eyIkaWQiOiI4IiwiRm9udFNldHRpbmdzIjp7IiRpZCI6IjkiLCJGb250U2l6ZSI6MTAsIkZvbnROYW1lIjoiQ2FsaWJyaSIsIklzQm9sZCI6ZmFsc2UsIklzSXRhbGljIjpmYWxzZSwiSXNVbmRlcmxpbmVkIjpmYWxzZSwiUGFyZW50U3R5bGUiOm51bGx9LCJBdXRvU2l6ZSI6MCwiRm9yZWdyb3VuZCI6eyIkaWQiOiIxMCIsIkNvbG9yIjp7IiRpZCI6IjExIiwiQSI6MjU1LCJSIjoyMzcsIkciOjEyNSwiQiI6NDl9fSwiTWF4V2lkdGgiOjIwMC4wLCJNYXhIZWlnaHQiOiJJbmZpbml0eSIsIlNtYXJ0Rm9yZWdyb3VuZElzQWN0aXZlIjpmYWxzZSwiSG9yaXpvbnRhbEFsaWdubWVudCI6MCwiVmVydGljYWxBbGlnbm1lbnQiOjAsIlNtYXJ0Rm9yZWdyb3VuZCI6bnVsbCwiQmFja2dyb3VuZEZpbGxUeXBlIjowLCJNYXJnaW4iOnsiJGlkIjoiMTIiLCJUb3AiOjAuMCwiTGVmdCI6MC4wLCJSaWdodCI6MC4wLCJCb3R0b20iOjAuMH0sIlBhZGRpbmciOnsiJGlkIjoiMTMiLCJUb3AiOjAuMCwiTGVmdCI6MC4wLCJSaWdodCI6MC4wLCJCb3R0b20iOjAuMH0sIkJhY2tncm91bmQiOnsiJGlkIjoiMTQiLCJDb2xvciI6eyIkaWQiOiIxNSIsIkEiOjg5LCJSIjowLCJHIjowLCJCIjowfX0sIklzVmlzaWJsZSI6dHJ1ZSwiV2lkdGgiOjAuMCwiSGVpZ2h0IjowLjAsIkJvcmRlclN0eWxlIjp7IiRpZCI6IjE2IiwiTGluZUNvbG9yIjpudWxsLCJMaW5lV2VpZ2h0IjowLjAsIkxpbmVUeXBlIjowLCJQYXJlbnRTdHlsZSI6bnVsbH0sIlBhcmVudFN0eWxlIjpudWxsfSwiRHVyYXRpb25TdHlsZSI6eyIkaWQiOiIxNyIsIkZvbnRTZXR0aW5ncyI6eyIkaWQiOiIxOCIsIkZvbnRTaXplIjoxMCwiRm9udE5hbWUiOiJDYWxpYnJpIiwiSXNCb2xkIjpmYWxzZSwiSXNJdGFsaWMiOmZhbHNlLCJJc1VuZGVybGluZWQiOmZhbHNlLCJQYXJlbnRTdHlsZSI6bnVsbH0sIkF1dG9TaXplIjowLCJGb3JlZ3JvdW5kIjp7IiRpZCI6IjE5IiwiQ29sb3IiOnsiJGlkIjoiMjAiLCJBIjoyNTUsIlIiOjIzNywiRyI6MTI1LCJCIjo0OX19LCJNYXhXaWR0aCI6MjAwLjAsIk1heEhlaWdodCI6IkluZmluaXR5IiwiU21hcnRGb3JlZ3JvdW5kSXNBY3RpdmUiOmZhbHNlLCJIb3Jpem9udGFsQWxpZ25tZW50IjowLCJWZXJ0aWNhbEFsaWdubWVudCI6MCwiU21hcnRGb3JlZ3JvdW5kIjpudWxsLCJCYWNrZ3JvdW5kRmlsbFR5cGUiOjAsIk1hcmdpbiI6eyIkaWQiOiIyMSIsIlRvcCI6MC4wLCJMZWZ0IjowLjAsIlJpZ2h0IjowLjAsIkJvdHRvbSI6MC4wfSwiUGFkZGluZyI6eyIkaWQiOiIyMiIsIlRvcCI6MC4wLCJMZWZ0IjowLjAsIlJpZ2h0IjowLjAsIkJvdHRvbSI6MC4wfSwiQmFja2dyb3VuZCI6eyIkaWQiOiIyMyIsIkNvbG9yIjp7IiRyZWYiOiIxNSJ9fSwiSXNWaXNpYmxlIjp0cnVlLCJXaWR0aCI6MC4wLCJIZWlnaHQiOjAuMCwiQm9yZGVyU3R5bGUiOnsiJGlkIjoiMjQiLCJMaW5lQ29sb3IiOm51bGwsIkxpbmVXZWlnaHQiOjAuMCwiTGluZVR5cGUiOjAsIlBhcmVudFN0eWxlIjpudWxsfSwiUGFyZW50U3R5bGUiOm51bGx9LCJIb3Jpem9udGFsQ29ubmVjdG9yU3R5bGUiOnsiJGlkIjoiMjUiLCJMaW5lQ29sb3IiOnsiJGlkIjoiMjYiLCIkdHlwZSI6Ik5MUkUuQ29tbW9uLkRvbS5Tb2xpZENvbG9yQnJ1c2gsIE5MUkUuQ29tbW9uIiwiQ29sb3IiOnsiJGlkIjoiMjciLCJBIjoyNTUsIlIiOjIwNCwiRyI6MjA0LCJCIjoyMDR9fSwiTGluZVdlaWdodCI6MS4wLCJMaW5lVHlwZSI6MCwiUGFyZW50U3R5bGUiOm51bGx9LCJWZXJ0aWNhbENvbm5lY3RvclN0eWxlIjp7IiRpZCI6IjI4IiwiTGluZUNvbG9yIjp7IiRpZCI6IjI5IiwiJHR5cGUiOiJOTFJFLkNvbW1vbi5Eb20uU29saWRDb2xvckJydXNoLCBOTFJFLkNvbW1vbiIsIkNvbG9yIjp7IiRpZCI6IjMwIiwiQSI6MjU1LCJSIjoyMDQsIkciOjIwNCwiQiI6MjA0fX0sIkxpbmVXZWlnaHQiOjAuMCwiTGluZVR5cGUiOjAsIlBhcmVudFN0eWxlIjpudWxsfSwiTWFyZ2luIjpudWxsLCJTdGFydERhdGVQb3NpdGlvbiI6MywiRW5kRGF0ZVBvc2l0aW9uIjo0LCJEYXRlSXNWaXNpYmxlIjp0cnVlLCJUaXRsZVBvc2l0aW9uIjoyLCJEdXJhdGlvblBvc2l0aW9uIjo2LCJQZXJjZW50YWdlQ29tcGxldGVkUG9zaXRpb24iOjYsIlNwYWNpbmciOjUsIklzQmVsb3dUaW1lYmFuZCI6dHJ1ZSwiUGVyY2VudGFnZUNvbXBsZXRlU2hhcGVPcGFjaXR5IjozNSwiU2hhcGVTdHlsZSI6eyIkaWQiOiIzMSIsIk1hcmdpbiI6eyIkaWQiOiIzMiIsIlRvcCI6MC4wLCJMZWZ0Ijo0LjAsIlJpZ2h0Ijo0LjAsIkJvdHRvbSI6MC4wfSwiUGFkZGluZyI6eyIkaWQiOiIzMyIsIlRvcCI6MC4wLCJMZWZ0IjowLjAsIlJpZ2h0IjowLjAsIkJvdHRvbSI6MC4wfSwiQmFja2dyb3VuZCI6eyIkaWQiOiIzNCIsIkNvbG9yIjp7IiRpZCI6IjM1IiwiQSI6MjU1LCJSIjo5MSwiRyI6MTU1LCJCIjoyMTN9fSwiSXNWaXNpYmxlIjp0cnVlLCJXaWR0aCI6MC4wLCJIZWlnaHQiOjE2LjAsIkJvcmRlclN0eWxlIjp7IiRpZCI6IjM2IiwiTGluZUNvbG9yIjp7IiRpZCI6IjM3IiwiJHR5cGUiOiJOTFJFLkNvbW1vbi5Eb20uU29saWRDb2xvckJydXNoLCBOTFJFLkNvbW1vbiIsIkNvbG9yIjp7IiRpZCI6IjM4IiwiQSI6MjU1LCJSIjoyNTUsIkciOjAsIkIiOjB9fSwiTGluZVdlaWdodCI6MC4wLCJMaW5lVHlwZSI6MCwiUGFyZW50U3R5bGUiOm51bGx9LCJQYXJlbnRTdHlsZSI6bnVsbH0sIlRpdGxlU3R5bGUiOnsiJGlkIjoiMzkiLCJGb250U2V0dGluZ3MiOnsiJGlkIjoiNDAiLCJGb250U2l6ZSI6MTEsIkZvbnROYW1lIjoiQ2FsaWJyaSIsIklzQm9sZCI6dHJ1ZSwiSXNJdGFsaWMiOmZhbHNlLCJJc1VuZGVybGluZWQiOmZhbHNlLCJQYXJlbnRTdHlsZSI6bnVsbH0sIkF1dG9TaXplIjowLCJGb3JlZ3JvdW5kIjp7IiRpZCI6IjQxIiwiQ29sb3IiOnsiJGlkIjoiNDIiLCJBIjoyNTUsIlIiOjAsIkciOjAsIkIiOjB9fSwiTWF4V2lkdGgiOjcyMC4wLCJNYXhIZWlnaHQiOiJJbmZpbml0eSIsIlNtYXJ0Rm9yZWdyb3VuZElzQWN0aXZlIjpmYWxzZSwiSG9yaXpvbnRhbEFsaWdubWVudCI6MSwiVmVydGljYWxBbGlnbm1lbnQiOjAsIlNtYXJ0Rm9yZWdyb3VuZCI6bnVsbCwiQmFja2dyb3VuZEZpbGxUeXBlIjowLCJNYXJnaW4iOnsiJGlkIjoiNDMiLCJUb3AiOjAuMCwiTGVmdCI6MC4wLCJSaWdodCI6MC4wLCJCb3R0b20iOjAuMH0sIlBhZGRpbmciOnsiJGlkIjoiNDQiLCJUb3AiOjAuMCwiTGVmdCI6MC4wLCJSaWdodCI6MC4wLCJCb3R0b20iOjAuMH0sIkJhY2tncm91bmQiOnsiJGlkIjoiNDUiLCJDb2xvciI6eyIkaWQiOiI0NiIsIkEiOjAsIlIiOjI1NSwiRyI6MjU1LCJCIjoyNTV9fSwiSXNWaXNpYmxlIjp0cnVlLCJXaWR0aCI6MC4wLCJIZWlnaHQiOjAuMCwiQm9yZGVyU3R5bGUiOnsiJGlkIjoiNDciLCJMaW5lQ29sb3IiOm51bGwsIkxpbmVXZWlnaHQiOjAuMCwiTGluZVR5cGUiOjAsIlBhcmVudFN0eWxlIjpudWxsfSwiUGFyZW50U3R5bGUiOm51bGx9LCJEYXRlU3R5bGUiOnsiJGlkIjoiNDgiLCJGb250U2V0dGluZ3MiOnsiJGlkIjoiNDkiLCJGb250U2l6ZSI6MTAsIkZvbnROYW1lIjoiQ2FsaWJyaSIsIklzQm9sZCI6ZmFsc2UsIklzSXRhbGljIjpmYWxzZSwiSXNVbmRlcmxpbmVkIjpmYWxzZSwiUGFyZW50U3R5bGUiOm51bGx9LCJBdXRvU2l6ZSI6MCwiRm9yZWdyb3VuZCI6eyIkaWQiOiI1MCIsIkNvbG9yIjp7IiRpZCI6IjUxIiwiQSI6MjU1LCJSIjo2OCwiRyI6ODQsIkIiOjEwNn19LCJNYXhXaWR0aCI6MjAwLjAsIk1heEhlaWdodCI6IkluZmluaXR5IiwiU21hcnRGb3JlZ3JvdW5kSXNBY3RpdmUiOmZhbHNlLCJIb3Jpem9udGFsQWxpZ25tZW50IjoxLCJWZXJ0aWNhbEFsaWdubWVudCI6MCwiU21hcnRGb3JlZ3JvdW5kIjpudWxsLCJCYWNrZ3JvdW5kRmlsbFR5cGUiOjAsIk1hcmdpbiI6eyIkaWQiOiI1MiIsIlRvcCI6MC4wLCJMZWZ0IjowLjAsIlJpZ2h0IjowLjAsIkJvdHRvbSI6MC4wfSwiUGFkZGluZyI6eyIkaWQiOiI1MyIsIlRvcCI6MC4wLCJMZWZ0IjowLjAsIlJpZ2h0IjowLjAsIkJvdHRvbSI6MC4wfSwiQmFja2dyb3VuZCI6eyIkaWQiOiI1NCIsIkNvbG9yIjp7IiRpZCI6IjU1IiwiQSI6MCwiUiI6MjU1LCJHIjoyNTUsIkIiOjI1NX19LCJJc1Zpc2libGUiOnRydWUsIldpZHRoIjowLjAsIkhlaWdodCI6MC4wLCJCb3JkZXJTdHlsZSI6eyIkaWQiOiI1NiIsIkxpbmVDb2xvciI6bnVsbCwiTGluZVdlaWdodCI6MC4wLCJMaW5lVHlwZSI6MCwiUGFyZW50U3R5bGUiOm51bGx9LCJQYXJlbnRTdHlsZSI6bnVsbH0sIkRhdGVGb3JtYXQiOnsiJGlkIjoiNTciLCJGb3JtYXRTdHJpbmciOiJNTU0gZCIsIlNlcGFyYXRvciI6Ii8iLCJVc2VJbnRlcm5hdGlvbmFsRGF0ZUZvcm1hdCI6ZmFsc2UsIkRhdGVJc1Zpc2libGUiOnRydWUsIlRpbWVJc1Zpc2libGUiOmZhbHNlLCJIb3VyRGlnaXRzIjoxLCJBbVBtRGVzaWduYXRvciI6MiwiVHJpbTAwTWludXRlcyI6ZmFsc2UsIkxhc3RLbm93blZpc2liaWxpdHlTdGF0ZSI6bnVsbH0sIldlZWtOdW1iZXJpbmciOnsiJGlkIjoiNTgiLCJGb3JtYXQiOjAsIklzVmlzaWJsZSI6ZmFsc2UsIkxhc3RLbm93blZpc2liaWxpdHlTdGF0ZSI6ZmFsc2V9LCJJc1Zpc2libGUiOnRydWUsIlBhcmVudFN0eWxlIjpudWxsfSwiSW5kZXgiOjEsIlNtYXJ0RHVyYXRpb25BY3RpdmF0ZWQiOmZhbHNlLCJEYXRlRm9ybWF0Ijp7IiRyZWYiOiI1NyJ9LCJXZWVrTnVtYmVyaW5nIjp7IiRpZCI6IjU5IiwiRm9ybWF0IjowLCJJc1Zpc2libGUiOmZhbHNlLCJMYXN0S25vd25WaXNpYmlsaXR5U3RhdGUiOmZhbHNlfSwiSWQiOiIwMTk0YjRhYy04MGQzLTQ2NWEtODJmNi03NjE4NjYwNjM5ZTciLCJJbXBvcnRJZCI6bnVsbCwiVGl0bGUiOiJSZWdpc3RyYXRpb24gUGFnZSIsIk5vdGUiOm51bGwsIkh5cGVybGluayI6eyIkaWQiOiI2MCIsIkFkZHJlc3MiOiIiLCJTdWJBZGRyZXNzIjoiIn0sIklzQ2hhbmdlZCI6ZmFsc2UsIklzTmV3IjpmYWxzZX19XSwiX21pbGVzdG9uZXMiOltdLCJJZCI6IjAwMDAwMDAwLTAwMDAtMDAwMC0wMDAwLTAwMDAwMDAwMDAwMCIsIklzU2luZ2xlSXRlbVJvdyI6dHJ1ZX0seyIkaWQiOiI2MSIsIl90YXNrcyI6W3siJGlkIjoiNjIiLCJfYXR0YWNoZWRNaWxlc3RvbmVzIjpbXSwiVGFza0RlZmluaXRpb24iOnsiJGlkIjoiNjMiLCJHcm91cE5hbWUiOm51bGwsIlN0YXJ0RGF0ZSI6IjIwMjItMDUtMTBUMDA6MDA6MDBaIiwiRW5kRGF0ZSI6IjIwMjItMDUtMTNUMjM6NTk6MDBaIiwiUGVyY2VudGFnZUNvbXBsZXRlIjpudWxsLCJTdHlsZSI6eyIkaWQiOiI2NCIsIlNoYXBlIjoyLCJTaGFwZVRoaWNrbmVzcyI6MSwiRHVyYXRpb25Gb3JtYXQiOjAsIkluY2x1ZGVOb25Xb3JraW5nRGF5c0luRHVyYXRpb24iOmZhbHNlLCJQZXJjZW50YWdlQ29tcGxldGVTdHlsZSI6eyIkaWQiOiI2NSIsIkZvbnRTZXR0aW5ncyI6eyIkaWQiOiI2NiIsIkZvbnRTaXplIjoxMCwiRm9udE5hbWUiOiJDYWxpYnJpIiwiSXNCb2xkIjpmYWxzZSwiSXNJdGFsaWMiOmZhbHNlLCJJc1VuZGVybGluZWQiOmZhbHNlLCJQYXJlbnRTdHlsZSI6bnVsbH0sIkF1dG9TaXplIjowLCJGb3JlZ3JvdW5kIjp7IiRyZWYiOiIxMCJ9LCJNYXhXaWR0aCI6MjAwLjAsIk1heEhlaWdodCI6IkluZmluaXR5IiwiU21hcnRGb3JlZ3JvdW5kSXNBY3RpdmUiOmZhbHNlLCJIb3Jpem9udGFsQWxpZ25tZW50IjowLCJWZXJ0aWNhbEFsaWdubWVudCI6MCwiU21hcnRGb3JlZ3JvdW5kIjpudWxsLCJCYWNrZ3JvdW5kRmlsbFR5cGUiOjAsIk1hcmdpbiI6eyIkcmVmIjoiMTIifSwiUGFkZGluZyI6eyIkcmVmIjoiMTMifSwiQmFja2dyb3VuZCI6eyIkcmVmIjoiMTQifSwiSXNWaXNpYmxlIjp0cnVlLCJXaWR0aCI6MC4wLCJIZWlnaHQiOjAuMCwiQm9yZGVyU3R5bGUiOnsiJGlkIjoiNjciLCJMaW5lQ29sb3IiOm51bGwsIkxpbmVXZWlnaHQiOjAuMCwiTGluZVR5cGUiOjAsIlBhcmVudFN0eWxlIjpudWxsfSwiUGFyZW50U3R5bGUiOm51bGx9LCJEdXJhdGlvblN0eWxlIjp7IiRpZCI6IjY4IiwiRm9udFNldHRpbmdzIjp7IiRpZCI6IjY5IiwiRm9udFNpemUiOjEwLCJGb250TmFtZSI6IkNhbGlicmkiLCJJc0JvbGQiOmZhbHNlLCJJc0l0YWxpYyI6ZmFsc2UsIklzVW5kZXJsaW5lZCI6ZmFsc2UsIlBhcmVudFN0eWxlIjpudWxsfSwiQXV0b1NpemUiOjAsIkZvcmVncm91bmQiOnsiJHJlZiI6IjE5In0sIk1heFdpZHRoIjoyMDAuMCwiTWF4SGVpZ2h0IjoiSW5maW5pdHkiLCJTbWFydEZvcmVncm91bmRJc0FjdGl2ZSI6ZmFsc2UsIkhvcml6b250YWxBbGlnbm1lbnQiOjAsIlZlcnRpY2FsQWxpZ25tZW50IjowLCJTbWFydEZvcmVncm91bmQiOm51bGwsIkJhY2tncm91bmRGaWxsVHlwZSI6MCwiTWFyZ2luIjp7IiRyZWYiOiIyMSJ9LCJQYWRkaW5nIjp7IiRyZWYiOiIyMiJ9LCJCYWNrZ3JvdW5kIjp7IiRyZWYiOiIyMyJ9LCJJc1Zpc2libGUiOnRydWUsIldpZHRoIjowLjAsIkhlaWdodCI6MC4wLCJCb3JkZXJTdHlsZSI6eyIkaWQiOiI3MCIsIkxpbmVDb2xvciI6bnVsbCwiTGluZVdlaWdodCI6MC4wLCJMaW5lVHlwZSI6MCwiUGFyZW50U3R5bGUiOm51bGx9LCJQYXJlbnRTdHlsZSI6bnVsbH0sIkhvcml6b250YWxDb25uZWN0b3JTdHlsZSI6eyIkaWQiOiI3MSIsIkxpbmVDb2xvciI6eyIkcmVmIjoiMjYifSwiTGluZVdlaWdodCI6MS4wLCJMaW5lVHlwZSI6MCwiUGFyZW50U3R5bGUiOm51bGx9LCJWZXJ0aWNhbENvbm5lY3RvclN0eWxlIjp7IiRpZCI6IjcyIiwiTGluZUNvbG9yIjp7IiRyZWYiOiIyOSJ9LCJMaW5lV2VpZ2h0IjowLjAsIkxpbmVUeXBlIjowLCJQYXJlbnRTdHlsZSI6bnVsbH0sIk1hcmdpbiI6bnVsbCwiU3RhcnREYXRlUG9zaXRpb24iOjMsIkVuZERhdGVQb3NpdGlvbiI6NCwiRGF0ZUlzVmlzaWJsZSI6dHJ1ZSwiVGl0bGVQb3NpdGlvbiI6MiwiRHVyYXRpb25Qb3NpdGlvbiI6NiwiUGVyY2VudGFnZUNvbXBsZXRlZFBvc2l0aW9uIjo2LCJTcGFjaW5nIjo1LCJJc0JlbG93VGltZWJhbmQiOnRydWUsIlBlcmNlbnRhZ2VDb21wbGV0ZVNoYXBlT3BhY2l0eSI6MzUsIlNoYXBlU3R5bGUiOnsiJGlkIjoiNzMiLCJNYXJnaW4iOnsiJHJlZiI6IjMyIn0sIlBhZGRpbmciOnsiJHJlZiI6IjMzIn0sIkJhY2tncm91bmQiOnsiJGlkIjoiNzQiLCJDb2xvciI6eyIkaWQiOiI3NSIsIkEiOjI1NSwiUiI6OTEsIkciOjE1NSwiQiI6MjEzfX0sIklzVmlzaWJsZSI6dHJ1ZSwiV2lkdGgiOjAuMCwiSGVpZ2h0IjoxNi4wLCJCb3JkZXJTdHlsZSI6eyIkaWQiOiI3NiIsIkxpbmVDb2xvciI6eyIkcmVmIjoiMzcifSwiTGluZVdlaWdodCI6MC4wLCJMaW5lVHlwZSI6MCwiUGFyZW50U3R5bGUiOm51bGx9LCJQYXJlbnRTdHlsZSI6bnVsbH0sIlRpdGxlU3R5bGUiOnsiJGlkIjoiNzciLCJGb250U2V0dGluZ3MiOnsiJGlkIjoiNzgiLCJGb250U2l6ZSI6MTEsIkZvbnROYW1lIjoiQ2FsaWJyaSIsIklzQm9sZCI6dHJ1ZSwiSXNJdGFsaWMiOmZhbHNlLCJJc1VuZGVybGluZWQiOmZhbHNlLCJQYXJlbnRTdHlsZSI6bnVsbH0sIkF1dG9TaXplIjowLCJGb3JlZ3JvdW5kIjp7IiRpZCI6Ijc5IiwiQ29sb3IiOnsiJGlkIjoiODAiLCJBIjoyNTUsIlIiOjAsIkciOjAsIkIiOjB9fSwiTWF4V2lkdGgiOjcyMC4wLCJNYXhIZWlnaHQiOiJJbmZpbml0eSIsIlNtYXJ0Rm9yZWdyb3VuZElzQWN0aXZlIjpmYWxzZSwiSG9yaXpvbnRhbEFsaWdubWVudCI6MSwiVmVydGljYWxBbGlnbm1lbnQiOjAsIlNtYXJ0Rm9yZWdyb3VuZCI6bnVsbCwiQmFja2dyb3VuZEZpbGxUeXBlIjowLCJNYXJnaW4iOnsiJHJlZiI6IjQzIn0sIlBhZGRpbmciOnsiJHJlZiI6IjQ0In0sIkJhY2tncm91bmQiOnsiJGlkIjoiODEiLCJDb2xvciI6eyIkaWQiOiI4MiIsIkEiOjAsIlIiOjI1NSwiRyI6MjU1LCJCIjoyNTV9fSwiSXNWaXNpYmxlIjp0cnVlLCJXaWR0aCI6MC4wLCJIZWlnaHQiOjAuMCwiQm9yZGVyU3R5bGUiOnsiJGlkIjoiODMiLCJMaW5lQ29sb3IiOm51bGwsIkxpbmVXZWlnaHQiOjAuMCwiTGluZVR5cGUiOjAsIlBhcmVudFN0eWxlIjpudWxsfSwiUGFyZW50U3R5bGUiOm51bGx9LCJEYXRlU3R5bGUiOnsiJGlkIjoiODQiLCJGb250U2V0dGluZ3MiOnsiJGlkIjoiODUiLCJGb250U2l6ZSI6MTAsIkZvbnROYW1lIjoiQ2FsaWJyaSIsIklzQm9sZCI6ZmFsc2UsIklzSXRhbGljIjpmYWxzZSwiSXNVbmRlcmxpbmVkIjpmYWxzZSwiUGFyZW50U3R5bGUiOm51bGx9LCJBdXRvU2l6ZSI6MCwiRm9yZWdyb3VuZCI6eyIkaWQiOiI4NiIsIkNvbG9yIjp7IiRpZCI6Ijg3IiwiQSI6MjU1LCJSIjo2OCwiRyI6ODQsIkIiOjEwNn19LCJNYXhXaWR0aCI6MjAwLjAsIk1heEhlaWdodCI6IkluZmluaXR5IiwiU21hcnRGb3JlZ3JvdW5kSXNBY3RpdmUiOmZhbHNlLCJIb3Jpem9udGFsQWxpZ25tZW50IjoxLCJWZXJ0aWNhbEFsaWdubWVudCI6MCwiU21hcnRGb3JlZ3JvdW5kIjpudWxsLCJCYWNrZ3JvdW5kRmlsbFR5cGUiOjAsIk1hcmdpbiI6eyIkcmVmIjoiNTIifSwiUGFkZGluZyI6eyIkcmVmIjoiNTMifSwiQmFja2dyb3VuZCI6eyIkaWQiOiI4OCIsIkNvbG9yIjp7IiRpZCI6Ijg5IiwiQSI6MCwiUiI6MjU1LCJHIjoyNTUsIkIiOjI1NX19LCJJc1Zpc2libGUiOnRydWUsIldpZHRoIjowLjAsIkhlaWdodCI6MC4wLCJCb3JkZXJTdHlsZSI6eyIkaWQiOiI5MCIsIkxpbmVDb2xvciI6bnVsbCwiTGluZVdlaWdodCI6MC4wLCJMaW5lVHlwZSI6MCwiUGFyZW50U3R5bGUiOm51bGx9LCJQYXJlbnRTdHlsZSI6bnVsbH0sIkRhdGVGb3JtYXQiOnsiJHJlZiI6IjU3In0sIldlZWtOdW1iZXJpbmciOnsiJGlkIjoiOTEiLCJGb3JtYXQiOjAsIklzVmlzaWJsZSI6ZmFsc2UsIkxhc3RLbm93blZpc2liaWxpdHlTdGF0ZSI6ZmFsc2V9LCJJc1Zpc2libGUiOnRydWUsIlBhcmVudFN0eWxlIjpudWxsfSwiSW5kZXgiOjIsIlNtYXJ0RHVyYXRpb25BY3RpdmF0ZWQiOmZhbHNlLCJEYXRlRm9ybWF0Ijp7IiRyZWYiOiI1NyJ9LCJXZWVrTnVtYmVyaW5nIjp7IiRpZCI6IjkyIiwiRm9ybWF0IjowLCJJc1Zpc2libGUiOmZhbHNlLCJMYXN0S25vd25WaXNpYmlsaXR5U3RhdGUiOmZhbHNlfSwiSWQiOiJjMjU5NGE2OC01MDg3LTQ2MTgtOWQxNS1mZWYxNjBmYjczOGQiLCJJbXBvcnRJZCI6bnVsbCwiVGl0bGUiOiJMb2dpbiBQYWdlIiwiTm90ZSI6bnVsbCwiSHlwZXJsaW5rIjp7IiRpZCI6IjkzIiwiQWRkcmVzcyI6IiIsIlN1YkFkZHJlc3MiOiIifSwiSXNDaGFuZ2VkIjpmYWxzZSwiSXNOZXciOmZhbHNlfX1dLCJfbWlsZXN0b25lcyI6W10sIklkIjoiMDAwMDAwMDAtMDAwMC0wMDAwLTAwMDAtMDAwMDAwMDAwMDAwIiwiSXNTaW5nbGVJdGVtUm93Ijp0cnVlfV0sIkluZGV4IjowLCJJZCI6ImE5NWFlMGE4LTgxYzAtNDdkYy1hYzM5LTMxZTZmNzIwMTYzNyIsIkhlYWRlclRleHQiOm51bGwsIklzRGVmYXVsdCI6dHJ1ZSwiU3R5bGUiOnsiJGlkIjoiOTQiLCJIZWFkZXJTdHlsZSI6eyIkaWQiOiI5NSIsIlRleHRTdHlsZSI6eyIkaWQiOiI5NiIsIkZvbnRTZXR0aW5ncyI6eyIkaWQiOiI5NyIsIkZvbnRTaXplIjoxMSwiRm9udE5hbWUiOiJDYWxpYnJpIiwiSXNCb2xkIjpmYWxzZSwiSXNJdGFsaWMiOmZhbHNlLCJJc1VuZGVybGluZWQiOmZhbHNlLCJQYXJlbnRTdHlsZSI6bnVsbH0sIkF1dG9TaXplIjoyLCJGb3JlZ3JvdW5kIjp7IiRpZCI6Ijk4IiwiQ29sb3IiOnsiJGlkIjoiOTkiLCJBIjoyNTUsIlIiOjAsIkciOjAsIkIiOjB9fSwiTWF4V2lkdGgiOjAuMCwiTWF4SGVpZ2h0IjoiSW5maW5pdHkiLCJTbWFydEZvcmVncm91bmRJc0FjdGl2ZSI6ZmFsc2UsIkhvcml6b250YWxBbGlnbm1lbnQiOjAsIlZlcnRpY2FsQWxpZ25tZW50IjowLCJTbWFydEZvcmVncm91bmQiOm51bGwsIkJhY2tncm91bmRGaWxsVHlwZSI6MCwiTWFyZ2luIjp7IiRpZCI6IjEwMCIsIlRvcCI6MC4wLCJMZWZ0IjowLjAsIlJpZ2h0IjowLjAsIkJvdHRvbSI6MC4wfSwiUGFkZGluZyI6eyIkaWQiOiIxMDEiLCJUb3AiOjAuMCwiTGVmdCI6MC4wLCJSaWdodCI6MC4wLCJCb3R0b20iOjAuMH0sIkJhY2tncm91bmQiOm51bGwsIklzVmlzaWJsZSI6dHJ1ZSwiV2lkdGgiOjAuMCwiSGVpZ2h0IjowLjAsIkJvcmRlclN0eWxlIjpudWxsLCJQYXJlbnRTdHlsZSI6bnVsbH0sIlJlY3RhbmdsZVN0eWxlIjp7IiRpZCI6IjEwMiIsIk1hcmdpbiI6eyIkaWQiOiIxMDMiLCJUb3AiOjAuMCwiTGVmdCI6MC4wLCJSaWdodCI6MC4wLCJCb3R0b20iOjAuMH0sIlBhZGRpbmciOnsiJGlkIjoiMTA0IiwiVG9wIjowLjAsIkxlZnQiOjAuMCwiUmlnaHQiOjAuMCwiQm90dG9tIjowLjB9LCJCYWNrZ3JvdW5kIjp7IiRpZCI6IjEwNSIsIkNvbG9yIjp7IiRpZCI6IjEwNiIsIkEiOjYzLCJSIjo5MSwiRyI6MTU1LCJCIjoyMTN9fSwiSXNWaXNpYmxlIjp0cnVlLCJXaWR0aCI6MC4wLCJIZWlnaHQiOjAuMCwiQm9yZGVyU3R5bGUiOnsiJGlkIjoiMTA3IiwiTGluZUNvbG9yIjp7IiRpZCI6IjEwOCIsIiR0eXBlIjoiTkxSRS5Db21tb24uRG9tLlNvbGlkQ29sb3JCcnVzaCwgTkxSRS5Db21tb24iLCJDb2xvciI6eyIkaWQiOiIxMDkiLCJBIjoyNTUsIlIiOjI1NSwiRyI6MCwiQiI6MH19LCJMaW5lV2VpZ2h0IjowLjAsIkxpbmVUeXBlIjowLCJQYXJlbnRTdHlsZSI6bnVsbH0sIlBhcmVudFN0eWxlIjpudWxsfSwiTWFyZ2luIjp7IiRpZCI6IjExMCIsIlRvcCI6MC4wLCJMZWZ0IjowLjAsIlJpZ2h0IjowLjAsIkJvdHRvbSI6MC4wfSwiUGFkZGluZyI6eyIkaWQiOiIxMTEiLCJUb3AiOjAuMCwiTGVmdCI6MC4wLCJSaWdodCI6MC4wLCJCb3R0b20iOjAuMH0sIkJhY2tncm91bmQiOm51bGwsIklzVmlzaWJsZSI6dHJ1ZSwiV2lkdGgiOjAuMCwiSGVpZ2h0IjowLjAsIkJvcmRlclN0eWxlIjpudWxsLCJQYXJlbnRTdHlsZSI6bnVsbH0sIkJhY2tncm91bmRTdHlsZSI6eyIkaWQiOiIxMTIiLCJNYXJnaW4iOnsiJGlkIjoiMTEzIiwiVG9wIjowLjAsIkxlZnQiOjAuMCwiUmlnaHQiOjAuMCwiQm90dG9tIjowLjB9LCJQYWRkaW5nIjp7IiRpZCI6IjExNCIsIlRvcCI6MC4wLCJMZWZ0IjowLjAsIlJpZ2h0IjowLjAsIkJvdHRvbSI6MC4wfSwiQmFja2dyb3VuZCI6eyIkaWQiOiIxMTUiLCJDb2xvciI6eyIkaWQiOiIxMTYiLCJBIjo1MSwiUiI6MTY1LCJHIjoxNjUsIkIiOjE2NX19LCJJc1Zpc2libGUiOnRydWUsIldpZHRoIjowLjAsIkhlaWdodCI6MC4wLCJCb3JkZXJTdHlsZSI6eyIkaWQiOiIxMTciLCJMaW5lQ29sb3IiOnsiJGlkIjoiMTE4IiwiJHR5cGUiOiJOTFJFLkNvbW1vbi5Eb20uU29saWRDb2xvckJydXNoLCBOTFJFLkNvbW1vbiIsIkNvbG9yIjp7IiRpZCI6IjExOSIsIkEiOjI1NSwiUiI6MjU1LCJHIjowLCJCIjowfX0sIkxpbmVXZWlnaHQiOjAuMCwiTGluZVR5cGUiOjAsIlBhcmVudFN0eWxlIjpudWxsfSwiUGFyZW50U3R5bGUiOm51bGx9LCJNYXJnaW4iOnsiJGlkIjoiMTIwIiwiVG9wIjowLjAsIkxlZnQiOjAuMCwiUmlnaHQiOjAuMCwiQm90dG9tIjowLjB9LCJQYWRkaW5nIjp7IiRpZCI6IjEyMSIsIlRvcCI6MC4wLCJMZWZ0IjowLjAsIlJpZ2h0IjowLjAsIkJvdHRvbSI6MC4wfSwiSXNWaXNpYmxlIjpmYWxzZSwiV2lkdGgiOjAuMCwiSGVpZ2h0IjowLjAsIkJvcmRlclN0eWxlIjpudWxsLCJQYXJlbnRTdHlsZSI6bnVsbH19XSwiSWQiOiI5M2IwYjA4Zi1mZTBiLTQ3NjMtYmY0ZC1mOTM4ZjM4ZGY3MTciLCJJbmRleCI6MCwiSGVhZGVyVGV4dCI6IkF1dGhlbnRpY2F0aW9uIiwiU3R5bGUiOnsiJGlkIjoiMTIyIiwiSGVhZGVyU3R5bGUiOnsiJGlkIjoiMTIzIiwiVGV4dElzVmVydGljYWwiOmZhbHNlLCJUZXh0U3R5bGUiOnsiJGlkIjoiMTI0IiwiRm9udFNldHRpbmdzIjp7IiRpZCI6IjEyNSIsIkZvbnRTaXplIjoxMiwiRm9udE5hbWUiOiJDYWxpYnJpIiwiSXNCb2xkIjpmYWxzZSwiSXNJdGFsaWMiOmZhbHNlLCJJc1VuZGVybGluZWQiOmZhbHNlLCJQYXJlbnRTdHlsZSI6bnVsbH0sIkF1dG9TaXplIjoyLCJGb3JlZ3JvdW5kIjp7IiRpZCI6IjEyNiIsIkNvbG9yIjp7IiRpZCI6IjEyNyIsIkEiOjI1NSwiUiI6MjU1LCJHIjoyNTUsIkIiOjI1NX19LCJNYXhXaWR0aCI6MTYwLjAsIk1heEhlaWdodCI6IkluZmluaXR5IiwiU21hcnRGb3JlZ3JvdW5kSXNBY3RpdmUiOmZhbHNlLCJIb3Jpem9udGFsQWxpZ25tZW50IjowLCJWZXJ0aWNhbEFsaWdubWVudCI6MCwiU21hcnRGb3JlZ3JvdW5kIjpudWxsLCJCYWNrZ3JvdW5kRmlsbFR5cGUiOjAsIk1hcmdpbiI6eyIkaWQiOiIxMjgiLCJUb3AiOjAuMCwiTGVmdCI6MC4wLCJSaWdodCI6MC4wLCJCb3R0b20iOjAuMH0sIlBhZGRpbmciOnsiJGlkIjoiMTI5IiwiVG9wIjowLjAsIkxlZnQiOjAuMCwiUmlnaHQiOjAuMCwiQm90dG9tIjowLjB9LCJCYWNrZ3JvdW5kIjpudWxsLCJJc1Zpc2libGUiOnRydWUsIldpZHRoIjowLjAsIkhlaWdodCI6MC4wLCJCb3JkZXJTdHlsZSI6bnVsbCwiUGFyZW50U3R5bGUiOm51bGx9LCJSZWN0YW5nbGVTdHlsZSI6eyIkaWQiOiIxMzAiLCJNYXJnaW4iOnsiJGlkIjoiMTMxIiwiVG9wIjowLjAsIkxlZnQiOjAuMCwiUmlnaHQiOjAuMCwiQm90dG9tIjowLjB9LCJQYWRkaW5nIjp7IiRpZCI6IjEzMiIsIlRvcCI6MC4wLCJMZWZ0IjowLjAsIlJpZ2h0IjowLjAsIkJvdHRvbSI6MC4wfSwiQmFja2dyb3VuZCI6eyIkaWQiOiIxMzMiLCJDb2xvciI6eyIkaWQiOiIxMzQiLCJBIjoyNTUsIlIiOjkxLCJHIjoxNTUsIkIiOjIxM319LCJJc1Zpc2libGUiOnRydWUsIldpZHRoIjowLjAsIkhlaWdodCI6MC4wLCJCb3JkZXJTdHlsZSI6eyIkaWQiOiIxMzUiLCJMaW5lQ29sb3IiOnsiJGlkIjoiMTM2IiwiJHR5cGUiOiJOTFJFLkNvbW1vbi5Eb20uU29saWRDb2xvckJydXNoLCBOTFJFLkNvbW1vbiIsIkNvbG9yIjp7IiRpZCI6IjEzNyIsIkEiOjI1NSwiUiI6MjU1LCJHIjowLCJCIjowfX0sIkxpbmVXZWlnaHQiOjAuMCwiTGluZVR5cGUiOjAsIlBhcmVudFN0eWxlIjpudWxsfSwiUGFyZW50U3R5bGUiOm51bGx9LCJNYXJnaW4iOnsiJGlkIjoiMTM4IiwiVG9wIjowLjAsIkxlZnQiOjAuMCwiUmlnaHQiOjAuMCwiQm90dG9tIjowLjB9LCJQYWRkaW5nIjp7IiRpZCI6IjEzOSIsIlRvcCI6MC4wLCJMZWZ0IjowLjAsIlJpZ2h0IjowLjAsIkJvdHRvbSI6MC4wfSwiQmFja2dyb3VuZCI6bnVsbCwiSXNWaXNpYmxlIjp0cnVlLCJXaWR0aCI6MC4wLCJIZWlnaHQiOjAuMCwiQm9yZGVyU3R5bGUiOm51bGwsIlBhcmVudFN0eWxlIjpudWxsfSwiQmFja2dyb3VuZFN0eWxlIjp7IiRpZCI6IjE0MCIsIk1hcmdpbiI6eyIkaWQiOiIxNDEiLCJUb3AiOjAuMCwiTGVmdCI6MC4wLCJSaWdodCI6MC4wLCJCb3R0b20iOjAuMH0sIlBhZGRpbmciOnsiJGlkIjoiMTQyIiwiVG9wIjowLjAsIkxlZnQiOjAuMCwiUmlnaHQiOjAuMCwiQm90dG9tIjowLjB9LCJCYWNrZ3JvdW5kIjp7IiRpZCI6IjE0MyIsIkNvbG9yIjp7IiRpZCI6IjE0NCIsIkEiOjUxLCJSIjoxNjUsIkciOjE2NSwiQiI6MTY1fX0sIklzVmlzaWJsZSI6dHJ1ZSwiV2lkdGgiOjAuMCwiSGVpZ2h0IjowLjAsIkJvcmRlclN0eWxlIjp7IiRpZCI6IjE0NSIsIkxpbmVDb2xvciI6eyIkaWQiOiIxNDYiLCIkdHlwZSI6Ik5MUkUuQ29tbW9uLkRvbS5Tb2xpZENvbG9yQnJ1c2gsIE5MUkUuQ29tbW9uIiwiQ29sb3IiOnsiJGlkIjoiMTQ3IiwiQSI6MjU1LCJSIjoyNTUsIkciOjAsIkIiOjB9fSwiTGluZVdlaWdodCI6MC4wLCJMaW5lVHlwZSI6MCwiUGFyZW50U3R5bGUiOm51bGx9LCJQYXJlbnRTdHlsZSI6bnVsbH0sIklzQWJvdmVUaW1lYmFuZCI6ZmFsc2UsIk1hcmdpbiI6eyIkaWQiOiIxNDgiLCJUb3AiOjAuMCwiTGVmdCI6MC4wLCJSaWdodCI6MC4wLCJCb3R0b20iOjAuMH0sIlBhZGRpbmciOnsiJGlkIjoiMTQ5IiwiVG9wIjowLjAsIkxlZnQiOjAuMCwiUmlnaHQiOjAuMCwiQm90dG9tIjowLjB9LCJJc1Zpc2libGUiOnRydWUsIldpZHRoIjowLjAsIkhlaWdodCI6MC4wLCJCb3JkZXJTdHlsZSI6eyIkaWQiOiIxNTAiLCJMaW5lQ29sb3IiOm51bGwsIkxpbmVXZWlnaHQiOjAuMCwiTGluZVR5cGUiOjAsIlBhcmVudFN0eWxlIjpudWxsfSwiUGFyZW50U3R5bGUiOm51bGx9fSx7IiRpZCI6IjE1MSIsIl9hY3Rpdml0aWVzIjpbeyIkaWQiOiIxNTIiLCJfcm93cyI6W3siJGlkIjoiMTUzIiwiX3Rhc2tzIjpbeyIkaWQiOiIxNTQiLCJfYXR0YWNoZWRNaWxlc3RvbmVzIjpbXSwiVGFza0RlZmluaXRpb24iOnsiJGlkIjoiMTU1IiwiR3JvdXBOYW1lIjpudWxsLCJTdGFydERhdGUiOiIyMDIyLTA1LTA1VDAwOjAwOjAwWiIsIkVuZERhdGUiOiIyMDIyLTA1LTA2VDIzOjU5OjAwWiIsIlBlcmNlbnRhZ2VDb21wbGV0ZSI6bnVsbCwiU3R5bGUiOnsiJGlkIjoiMTU2IiwiU2hhcGUiOjIsIlNoYXBlVGhpY2tuZXNzIjoxLCJEdXJhdGlvbkZvcm1hdCI6MCwiSW5jbHVkZU5vbldvcmtpbmdEYXlzSW5EdXJhdGlvbiI6ZmFsc2UsIlBlcmNlbnRhZ2VDb21wbGV0ZVN0eWxlIjp7IiRpZCI6IjE1NyIsIkZvbnRTZXR0aW5ncyI6eyIkaWQiOiIxNTgiLCJGb250U2l6ZSI6MTAsIkZvbnROYW1lIjoiQ2FsaWJyaSIsIklzQm9sZCI6ZmFsc2UsIklzSXRhbGljIjpmYWxzZSwiSXNVbmRlcmxpbmVkIjpmYWxzZSwiUGFyZW50U3R5bGUiOm51bGx9LCJBdXRvU2l6ZSI6MCwiRm9yZWdyb3VuZCI6eyIkcmVmIjoiMTAifSwiTWF4V2lkdGgiOjIwMC4wLCJNYXhIZWlnaHQiOiJJbmZpbml0eSIsIlNtYXJ0Rm9yZWdyb3VuZElzQWN0aXZlIjpmYWxzZSwiSG9yaXpvbnRhbEFsaWdubWVudCI6MCwiVmVydGljYWxBbGlnbm1lbnQiOjAsIlNtYXJ0Rm9yZWdyb3VuZCI6bnVsbCwiQmFja2dyb3VuZEZpbGxUeXBlIjowLCJNYXJnaW4iOnsiJHJlZiI6IjEyIn0sIlBhZGRpbmciOnsiJHJlZiI6IjEzIn0sIkJhY2tncm91bmQiOnsiJHJlZiI6IjE0In0sIklzVmlzaWJsZSI6dHJ1ZSwiV2lkdGgiOjAuMCwiSGVpZ2h0IjowLjAsIkJvcmRlclN0eWxlIjp7IiRpZCI6IjE1OSIsIkxpbmVDb2xvciI6bnVsbCwiTGluZVdlaWdodCI6MC4wLCJMaW5lVHlwZSI6MCwiUGFyZW50U3R5bGUiOm51bGx9LCJQYXJlbnRTdHlsZSI6bnVsbH0sIkR1cmF0aW9uU3R5bGUiOnsiJGlkIjoiMTYwIiwiRm9udFNldHRpbmdzIjp7IiRpZCI6IjE2MSIsIkZvbnRTaXplIjoxMCwiRm9udE5hbWUiOiJDYWxpYnJpIiwiSXNCb2xkIjpmYWxzZSwiSXNJdGFsaWMiOmZhbHNlLCJJc1VuZGVybGluZWQiOmZhbHNlLCJQYXJlbnRTdHlsZSI6bnVsbH0sIkF1dG9TaXplIjowLCJGb3JlZ3JvdW5kIjp7IiRyZWYiOiIxOSJ9LCJNYXhXaWR0aCI6MjAwLjAsIk1heEhlaWdodCI6IkluZmluaXR5IiwiU21hcnRGb3JlZ3JvdW5kSXNBY3RpdmUiOmZhbHNlLCJIb3Jpem9udGFsQWxpZ25tZW50IjowLCJWZXJ0aWNhbEFsaWdubWVudCI6MCwiU21hcnRGb3JlZ3JvdW5kIjpudWxsLCJCYWNrZ3JvdW5kRmlsbFR5cGUiOjAsIk1hcmdpbiI6eyIkcmVmIjoiMjEifSwiUGFkZGluZyI6eyIkcmVmIjoiMjIifSwiQmFja2dyb3VuZCI6eyIkcmVmIjoiMjMifSwiSXNWaXNpYmxlIjp0cnVlLCJXaWR0aCI6MC4wLCJIZWlnaHQiOjAuMCwiQm9yZGVyU3R5bGUiOnsiJGlkIjoiMTYyIiwiTGluZUNvbG9yIjpudWxsLCJMaW5lV2VpZ2h0IjowLjAsIkxpbmVUeXBlIjowLCJQYXJlbnRTdHlsZSI6bnVsbH0sIlBhcmVudFN0eWxlIjpudWxsfSwiSG9yaXpvbnRhbENvbm5lY3RvclN0eWxlIjp7IiRpZCI6IjE2MyIsIkxpbmVDb2xvciI6eyIkcmVmIjoiMjYifSwiTGluZVdlaWdodCI6MS4wLCJMaW5lVHlwZSI6MCwiUGFyZW50U3R5bGUiOm51bGx9LCJWZXJ0aWNhbENvbm5lY3RvclN0eWxlIjp7IiRpZCI6IjE2NCIsIkxpbmVDb2xvciI6eyIkcmVmIjoiMjkifSwiTGluZVdlaWdodCI6MC4wLCJMaW5lVHlwZSI6MCwiUGFyZW50U3R5bGUiOm51bGx9LCJNYXJnaW4iOm51bGwsIlN0YXJ0RGF0ZVBvc2l0aW9uIjozLCJFbmREYXRlUG9zaXRpb24iOjQsIkRhdGVJc1Zpc2libGUiOnRydWUsIlRpdGxlUG9zaXRpb24iOjIsIkR1cmF0aW9uUG9zaXRpb24iOjYsIlBlcmNlbnRhZ2VDb21wbGV0ZWRQb3NpdGlvbiI6NiwiU3BhY2luZyI6NSwiSXNCZWxvd1RpbWViYW5kIjp0cnVlLCJQZXJjZW50YWdlQ29tcGxldGVTaGFwZU9wYWNpdHkiOjM1LCJTaGFwZVN0eWxlIjp7IiRpZCI6IjE2NSIsIk1hcmdpbiI6eyIkcmVmIjoiMzIifSwiUGFkZGluZyI6eyIkcmVmIjoiMzMifSwiQmFja2dyb3VuZCI6eyIkaWQiOiIxNjYiLCJDb2xvciI6eyIkaWQiOiIxNjciLCJBIjoyNTUsIlIiOjkxLCJHIjoxNTUsIkIiOjIxM319LCJJc1Zpc2libGUiOnRydWUsIldpZHRoIjowLjAsIkhlaWdodCI6MTYuMCwiQm9yZGVyU3R5bGUiOnsiJGlkIjoiMTY4IiwiTGluZUNvbG9yIjp7IiRyZWYiOiIzNyJ9LCJMaW5lV2VpZ2h0IjowLjAsIkxpbmVUeXBlIjowLCJQYXJlbnRTdHlsZSI6bnVsbH0sIlBhcmVudFN0eWxlIjpudWxsfSwiVGl0bGVTdHlsZSI6eyIkaWQiOiIxNjkiLCJGb250U2V0dGluZ3MiOnsiJGlkIjoiMTcwIiwiRm9udFNpemUiOjExLCJGb250TmFtZSI6IkNhbGlicmkiLCJJc0JvbGQiOnRydWUsIklzSXRhbGljIjpmYWxzZSwiSXNVbmRlcmxpbmVkIjpmYWxzZSwiUGFyZW50U3R5bGUiOm51bGx9LCJBdXRvU2l6ZSI6MCwiRm9yZWdyb3VuZCI6eyIkaWQiOiIxNzEiLCJDb2xvciI6eyIkaWQiOiIxNzIiLCJBIjoyNTUsIlIiOjAsIkciOjAsIkIiOjB9fSwiTWF4V2lkdGgiOjcyMC4wLCJNYXhIZWlnaHQiOiJJbmZpbml0eSIsIlNtYXJ0Rm9yZWdyb3VuZElzQWN0aXZlIjpmYWxzZSwiSG9yaXpvbnRhbEFsaWdubWVudCI6MSwiVmVydGljYWxBbGlnbm1lbnQiOjAsIlNtYXJ0Rm9yZWdyb3VuZCI6bnVsbCwiQmFja2dyb3VuZEZpbGxUeXBlIjowLCJNYXJnaW4iOnsiJHJlZiI6IjQzIn0sIlBhZGRpbmciOnsiJHJlZiI6IjQ0In0sIkJhY2tncm91bmQiOnsiJGlkIjoiMTczIiwiQ29sb3IiOnsiJGlkIjoiMTc0IiwiQSI6MCwiUiI6MjU1LCJHIjoyNTUsIkIiOjI1NX19LCJJc1Zpc2libGUiOnRydWUsIldpZHRoIjowLjAsIkhlaWdodCI6MC4wLCJCb3JkZXJTdHlsZSI6eyIkaWQiOiIxNzUiLCJMaW5lQ29sb3IiOm51bGwsIkxpbmVXZWlnaHQiOjAuMCwiTGluZVR5cGUiOjAsIlBhcmVudFN0eWxlIjpudWxsfSwiUGFyZW50U3R5bGUiOm51bGx9LCJEYXRlU3R5bGUiOnsiJGlkIjoiMTc2IiwiRm9udFNldHRpbmdzIjp7IiRpZCI6IjE3NyIsIkZvbnRTaXplIjoxMCwiRm9udE5hbWUiOiJDYWxpYnJpIiwiSXNCb2xkIjpmYWxzZSwiSXNJdGFsaWMiOmZhbHNlLCJJc1VuZGVybGluZWQiOmZhbHNlLCJQYXJlbnRTdHlsZSI6bnVsbH0sIkF1dG9TaXplIjowLCJGb3JlZ3JvdW5kIjp7IiRpZCI6IjE3OCIsIkNvbG9yIjp7IiRpZCI6IjE3OSIsIkEiOjI1NSwiUiI6NjgsIkciOjg0LCJCIjoxMDZ9fSwiTWF4V2lkdGgiOjIwMC4wLCJNYXhIZWlnaHQiOiJJbmZpbml0eSIsIlNtYXJ0Rm9yZWdyb3VuZElzQWN0aXZlIjpmYWxzZSwiSG9yaXpvbnRhbEFsaWdubWVudCI6MSwiVmVydGljYWxBbGlnbm1lbnQiOjAsIlNtYXJ0Rm9yZWdyb3VuZCI6bnVsbCwiQmFja2dyb3VuZEZpbGxUeXBlIjowLCJNYXJnaW4iOnsiJHJlZiI6IjUyIn0sIlBhZGRpbmciOnsiJHJlZiI6IjUzIn0sIkJhY2tncm91bmQiOnsiJGlkIjoiMTgwIiwiQ29sb3IiOnsiJGlkIjoiMTgxIiwiQSI6MCwiUiI6MjU1LCJHIjoyNTUsIkIiOjI1NX19LCJJc1Zpc2libGUiOnRydWUsIldpZHRoIjowLjAsIkhlaWdodCI6MC4wLCJCb3JkZXJTdHlsZSI6eyIkaWQiOiIxODIiLCJMaW5lQ29sb3IiOm51bGwsIkxpbmVXZWlnaHQiOjAuMCwiTGluZVR5cGUiOjAsIlBhcmVudFN0eWxlIjpudWxsfSwiUGFyZW50U3R5bGUiOm51bGx9LCJEYXRlRm9ybWF0Ijp7IiRyZWYiOiI1NyJ9LCJXZWVrTnVtYmVyaW5nIjp7IiRpZCI6IjE4MyIsIkZvcm1hdCI6MCwiSXNWaXNpYmxlIjpmYWxzZSwiTGFzdEtub3duVmlzaWJpbGl0eVN0YXRlIjpmYWxzZX0sIklzVmlzaWJsZSI6dHJ1ZSwiUGFyZW50U3R5bGUiOm51bGx9LCJJbmRleCI6NCwiU21hcnREdXJhdGlvbkFjdGl2YXRlZCI6ZmFsc2UsIkRhdGVGb3JtYXQiOnsiJHJlZiI6IjU3In0sIldlZWtOdW1iZXJpbmciOnsiJGlkIjoiMTg0IiwiRm9ybWF0IjowLCJJc1Zpc2libGUiOmZhbHNlLCJMYXN0S25vd25WaXNpYmlsaXR5U3RhdGUiOmZhbHNlfSwiSWQiOiJlMTQwODEyMS04ZDRhLTQ0YTgtYWJjZS00OWU2ZjFhNzM3NDciLCJJbXBvcnRJZCI6bnVsbCwiVGl0bGUiOiJBZG1pbiBIb21lIFBhZ2UiLCJOb3RlIjpudWxsLCJIeXBlcmxpbmsiOnsiJGlkIjoiMTg1IiwiQWRkcmVzcyI6IiIsIlN1YkFkZHJlc3MiOiIifSwiSXNDaGFuZ2VkIjpmYWxzZSwiSXNOZXciOmZhbHNlfX1dLCJfbWlsZXN0b25lcyI6W10sIklkIjoiMDAwMDAwMDAtMDAwMC0wMDAwLTAwMDAtMDAwMDAwMDAwMDAwIiwiSXNTaW5nbGVJdGVtUm93Ijp0cnVlfSx7IiRpZCI6IjE4NiIsIl90YXNrcyI6W3siJGlkIjoiMTg3IiwiX2F0dGFjaGVkTWlsZXN0b25lcyI6W10sIlRhc2tEZWZpbml0aW9uIjp7IiRpZCI6IjE4OCIsIkdyb3VwTmFtZSI6bnVsbCwiU3RhcnREYXRlIjoiMjAyMi0wNS0wNlQwMDowMDowMFoiLCJFbmREYXRlIjoiMjAyMi0wNS0wOVQyMzo1OTowMFoiLCJQZXJjZW50YWdlQ29tcGxldGUiOm51bGwsIlN0eWxlIjp7IiRpZCI6IjE4OSIsIlNoYXBlIjoyLCJTaGFwZVRoaWNrbmVzcyI6MSwiRHVyYXRpb25Gb3JtYXQiOjAsIkluY2x1ZGVOb25Xb3JraW5nRGF5c0luRHVyYXRpb24iOmZhbHNlLCJQZXJjZW50YWdlQ29tcGxldGVTdHlsZSI6eyIkaWQiOiIxOTAiLCJGb250U2V0dGluZ3MiOnsiJGlkIjoiMTkxIiwiRm9udFNpemUiOjEwLCJGb250TmFtZSI6IkNhbGlicmkiLCJJc0JvbGQiOmZhbHNlLCJJc0l0YWxpYyI6ZmFsc2UsIklzVW5kZXJsaW5lZCI6ZmFsc2UsIlBhcmVudFN0eWxlIjpudWxsfSwiQXV0b1NpemUiOjAsIkZvcmVncm91bmQiOnsiJHJlZiI6IjEwIn0sIk1heFdpZHRoIjoyMDAuMCwiTWF4SGVpZ2h0IjoiSW5maW5pdHkiLCJTbWFydEZvcmVncm91bmRJc0FjdGl2ZSI6ZmFsc2UsIkhvcml6b250YWxBbGlnbm1lbnQiOjAsIlZlcnRpY2FsQWxpZ25tZW50IjowLCJTbWFydEZvcmVncm91bmQiOm51bGwsIkJhY2tncm91bmRGaWxsVHlwZSI6MCwiTWFyZ2luIjp7IiRyZWYiOiIxMiJ9LCJQYWRkaW5nIjp7IiRyZWYiOiIxMyJ9LCJCYWNrZ3JvdW5kIjp7IiRyZWYiOiIxNCJ9LCJJc1Zpc2libGUiOnRydWUsIldpZHRoIjowLjAsIkhlaWdodCI6MC4wLCJCb3JkZXJTdHlsZSI6eyIkaWQiOiIxOTIiLCJMaW5lQ29sb3IiOm51bGwsIkxpbmVXZWlnaHQiOjAuMCwiTGluZVR5cGUiOjAsIlBhcmVudFN0eWxlIjpudWxsfSwiUGFyZW50U3R5bGUiOm51bGx9LCJEdXJhdGlvblN0eWxlIjp7IiRpZCI6IjE5MyIsIkZvbnRTZXR0aW5ncyI6eyIkaWQiOiIxOTQiLCJGb250U2l6ZSI6MTAsIkZvbnROYW1lIjoiQ2FsaWJyaSIsIklzQm9sZCI6ZmFsc2UsIklzSXRhbGljIjpmYWxzZSwiSXNVbmRlcmxpbmVkIjpmYWxzZSwiUGFyZW50U3R5bGUiOm51bGx9LCJBdXRvU2l6ZSI6MCwiRm9yZWdyb3VuZCI6eyIkcmVmIjoiMTkifSwiTWF4V2lkdGgiOjIwMC4wLCJNYXhIZWlnaHQiOiJJbmZpbml0eSIsIlNtYXJ0Rm9yZWdyb3VuZElzQWN0aXZlIjpmYWxzZSwiSG9yaXpvbnRhbEFsaWdubWVudCI6MCwiVmVydGljYWxBbGlnbm1lbnQiOjAsIlNtYXJ0Rm9yZWdyb3VuZCI6bnVsbCwiQmFja2dyb3VuZEZpbGxUeXBlIjowLCJNYXJnaW4iOnsiJHJlZiI6IjIxIn0sIlBhZGRpbmciOnsiJHJlZiI6IjIyIn0sIkJhY2tncm91bmQiOnsiJHJlZiI6IjIzIn0sIklzVmlzaWJsZSI6dHJ1ZSwiV2lkdGgiOjAuMCwiSGVpZ2h0IjowLjAsIkJvcmRlclN0eWxlIjp7IiRpZCI6IjE5NSIsIkxpbmVDb2xvciI6bnVsbCwiTGluZVdlaWdodCI6MC4wLCJMaW5lVHlwZSI6MCwiUGFyZW50U3R5bGUiOm51bGx9LCJQYXJlbnRTdHlsZSI6bnVsbH0sIkhvcml6b250YWxDb25uZWN0b3JTdHlsZSI6eyIkaWQiOiIxOTYiLCJMaW5lQ29sb3IiOnsiJHJlZiI6IjI2In0sIkxpbmVXZWlnaHQiOjEuMCwiTGluZVR5cGUiOjAsIlBhcmVudFN0eWxlIjpudWxsfSwiVmVydGljYWxDb25uZWN0b3JTdHlsZSI6eyIkaWQiOiIxOTciLCJMaW5lQ29sb3IiOnsiJHJlZiI6IjI5In0sIkxpbmVXZWlnaHQiOjAuMCwiTGluZVR5cGUiOjAsIlBhcmVudFN0eWxlIjpudWxsfSwiTWFyZ2luIjpudWxsLCJTdGFydERhdGVQb3NpdGlvbiI6MywiRW5kRGF0ZVBvc2l0aW9uIjo0LCJEYXRlSXNWaXNpYmxlIjp0cnVlLCJUaXRsZVBvc2l0aW9uIjoyLCJEdXJhdGlvblBvc2l0aW9uIjo2LCJQZXJjZW50YWdlQ29tcGxldGVkUG9zaXRpb24iOjYsIlNwYWNpbmciOjUsIklzQmVsb3dUaW1lYmFuZCI6dHJ1ZSwiUGVyY2VudGFnZUNvbXBsZXRlU2hhcGVPcGFjaXR5IjozNSwiU2hhcGVTdHlsZSI6eyIkaWQiOiIxOTgiLCJNYXJnaW4iOnsiJHJlZiI6IjMyIn0sIlBhZGRpbmciOnsiJHJlZiI6IjMzIn0sIkJhY2tncm91bmQiOnsiJGlkIjoiMTk5IiwiQ29sb3IiOnsiJGlkIjoiMjAwIiwiQSI6MjU1LCJSIjo5MSwiRyI6MTU1LCJCIjoyMTN9fSwiSXNWaXNpYmxlIjp0cnVlLCJXaWR0aCI6MC4wLCJIZWlnaHQiOjE2LjAsIkJvcmRlclN0eWxlIjp7IiRpZCI6IjIwMSIsIkxpbmVDb2xvciI6eyIkcmVmIjoiMzcifSwiTGluZVdlaWdodCI6MC4wLCJMaW5lVHlwZSI6MCwiUGFyZW50U3R5bGUiOm51bGx9LCJQYXJlbnRTdHlsZSI6bnVsbH0sIlRpdGxlU3R5bGUiOnsiJGlkIjoiMjAyIiwiRm9udFNldHRpbmdzIjp7IiRpZCI6IjIwMyIsIkZvbnRTaXplIjoxMSwiRm9udE5hbWUiOiJDYWxpYnJpIiwiSXNCb2xkIjp0cnVlLCJJc0l0YWxpYyI6ZmFsc2UsIklzVW5kZXJsaW5lZCI6ZmFsc2UsIlBhcmVudFN0eWxlIjpudWxsfSwiQXV0b1NpemUiOjAsIkZvcmVncm91bmQiOnsiJGlkIjoiMjA0IiwiQ29sb3IiOnsiJGlkIjoiMjA1IiwiQSI6MjU1LCJSIjowLCJHIjowLCJCIjowfX0sIk1heFdpZHRoIjo3MjAuMCwiTWF4SGVpZ2h0IjoiSW5maW5pdHkiLCJTbWFydEZvcmVncm91bmRJc0FjdGl2ZSI6ZmFsc2UsIkhvcml6b250YWxBbGlnbm1lbnQiOjEsIlZlcnRpY2FsQWxpZ25tZW50IjowLCJTbWFydEZvcmVncm91bmQiOm51bGwsIkJhY2tncm91bmRGaWxsVHlwZSI6MCwiTWFyZ2luIjp7IiRyZWYiOiI0MyJ9LCJQYWRkaW5nIjp7IiRyZWYiOiI0NCJ9LCJCYWNrZ3JvdW5kIjp7IiRpZCI6IjIwNiIsIkNvbG9yIjp7IiRpZCI6IjIwNyIsIkEiOjAsIlIiOjI1NSwiRyI6MjU1LCJCIjoyNTV9fSwiSXNWaXNpYmxlIjp0cnVlLCJXaWR0aCI6MC4wLCJIZWlnaHQiOjAuMCwiQm9yZGVyU3R5bGUiOnsiJGlkIjoiMjA4IiwiTGluZUNvbG9yIjpudWxsLCJMaW5lV2VpZ2h0IjowLjAsIkxpbmVUeXBlIjowLCJQYXJlbnRTdHlsZSI6bnVsbH0sIlBhcmVudFN0eWxlIjpudWxsfSwiRGF0ZVN0eWxlIjp7IiRpZCI6IjIwOSIsIkZvbnRTZXR0aW5ncyI6eyIkaWQiOiIyMTAiLCJGb250U2l6ZSI6MTAsIkZvbnROYW1lIjoiQ2FsaWJyaSIsIklzQm9sZCI6ZmFsc2UsIklzSXRhbGljIjpmYWxzZSwiSXNVbmRlcmxpbmVkIjpmYWxzZSwiUGFyZW50U3R5bGUiOm51bGx9LCJBdXRvU2l6ZSI6MCwiRm9yZWdyb3VuZCI6eyIkaWQiOiIyMTEiLCJDb2xvciI6eyIkaWQiOiIyMTIiLCJBIjoyNTUsIlIiOjY4LCJHIjo4NCwiQiI6MTA2fX0sIk1heFdpZHRoIjoyMDAuMCwiTWF4SGVpZ2h0IjoiSW5maW5pdHkiLCJTbWFydEZvcmVncm91bmRJc0FjdGl2ZSI6ZmFsc2UsIkhvcml6b250YWxBbGlnbm1lbnQiOjEsIlZlcnRpY2FsQWxpZ25tZW50IjowLCJTbWFydEZvcmVncm91bmQiOm51bGwsIkJhY2tncm91bmRGaWxsVHlwZSI6MCwiTWFyZ2luIjp7IiRyZWYiOiI1MiJ9LCJQYWRkaW5nIjp7IiRyZWYiOiI1MyJ9LCJCYWNrZ3JvdW5kIjp7IiRpZCI6IjIxMyIsIkNvbG9yIjp7IiRpZCI6IjIxNCIsIkEiOjAsIlIiOjI1NSwiRyI6MjU1LCJCIjoyNTV9fSwiSXNWaXNpYmxlIjp0cnVlLCJXaWR0aCI6MC4wLCJIZWlnaHQiOjAuMCwiQm9yZGVyU3R5bGUiOnsiJGlkIjoiMjE1IiwiTGluZUNvbG9yIjpudWxsLCJMaW5lV2VpZ2h0IjowLjAsIkxpbmVUeXBlIjowLCJQYXJlbnRTdHlsZSI6bnVsbH0sIlBhcmVudFN0eWxlIjpudWxsfSwiRGF0ZUZvcm1hdCI6eyIkcmVmIjoiNTcifSwiV2Vla051bWJlcmluZyI6eyIkaWQiOiIyMTYiLCJGb3JtYXQiOjAsIklzVmlzaWJsZSI6ZmFsc2UsIkxhc3RLbm93blZpc2liaWxpdHlTdGF0ZSI6ZmFsc2V9LCJJc1Zpc2libGUiOnRydWUsIlBhcmVudFN0eWxlIjpudWxsfSwiSW5kZXgiOjUsIlNtYXJ0RHVyYXRpb25BY3RpdmF0ZWQiOmZhbHNlLCJEYXRlRm9ybWF0Ijp7IiRyZWYiOiI1NyJ9LCJXZWVrTnVtYmVyaW5nIjp7IiRpZCI6IjIxNyIsIkZvcm1hdCI6MCwiSXNWaXNpYmxlIjpmYWxzZSwiTGFzdEtub3duVmlzaWJpbGl0eVN0YXRlIjpmYWxzZX0sIklkIjoiZmQwMmQ2MWItNmU0MS00YmUwLTgxYWEtODE4N2FjZTJkYzVlIiwiSW1wb3J0SWQiOm51bGwsIlRpdGxlIjoiQWRkIEFkbWluIiwiTm90ZSI6bnVsbCwiSHlwZXJsaW5rIjp7IiRpZCI6IjIxOCIsIkFkZHJlc3MiOiIiLCJTdWJBZGRyZXNzIjoiIn0sIklzQ2hhbmdlZCI6ZmFsc2UsIklzTmV3IjpmYWxzZX19XSwiX21pbGVzdG9uZXMiOltdLCJJZCI6IjAwMDAwMDAwLTAwMDAtMDAwMC0wMDAwLTAwMDAwMDAwMDAwMCIsIklzU2luZ2xlSXRlbVJvdyI6dHJ1ZX0seyIkaWQiOiIyMTkiLCJfdGFza3MiOlt7IiRpZCI6IjIyMCIsIl9hdHRhY2hlZE1pbGVzdG9uZXMiOltdLCJUYXNrRGVmaW5pdGlvbiI6eyIkaWQiOiIyMjEiLCJHcm91cE5hbWUiOm51bGwsIlN0YXJ0RGF0ZSI6IjIwMjItMDUtMTFUMDA6MDA6MDBaIiwiRW5kRGF0ZSI6IjIwMjItMDUtMTNUMjM6NTk6MDBaIiwiUGVyY2VudGFnZUNvbXBsZXRlIjpudWxsLCJTdHlsZSI6eyIkaWQiOiIyMjIiLCJTaGFwZSI6MiwiU2hhcGVUaGlja25lc3MiOjEsIkR1cmF0aW9uRm9ybWF0IjowLCJJbmNsdWRlTm9uV29ya2luZ0RheXNJbkR1cmF0aW9uIjpmYWxzZSwiUGVyY2VudGFnZUNvbXBsZXRlU3R5bGUiOnsiJGlkIjoiMjIzIiwiRm9udFNldHRpbmdzIjp7IiRpZCI6IjIyNCIsIkZvbnRTaXplIjoxMCwiRm9udE5hbWUiOiJDYWxpYnJpIiwiSXNCb2xkIjpmYWxzZSwiSXNJdGFsaWMiOmZhbHNlLCJJc1VuZGVybGluZWQiOmZhbHNlLCJQYXJlbnRTdHlsZSI6bnVsbH0sIkF1dG9TaXplIjowLCJGb3JlZ3JvdW5kIjp7IiRyZWYiOiIxMCJ9LCJNYXhXaWR0aCI6MjAwLjAsIk1heEhlaWdodCI6IkluZmluaXR5IiwiU21hcnRGb3JlZ3JvdW5kSXNBY3RpdmUiOmZhbHNlLCJIb3Jpem9udGFsQWxpZ25tZW50IjowLCJWZXJ0aWNhbEFsaWdubWVudCI6MCwiU21hcnRGb3JlZ3JvdW5kIjpudWxsLCJCYWNrZ3JvdW5kRmlsbFR5cGUiOjAsIk1hcmdpbiI6eyIkcmVmIjoiMTIifSwiUGFkZGluZyI6eyIkcmVmIjoiMTMifSwiQmFja2dyb3VuZCI6eyIkcmVmIjoiMTQifSwiSXNWaXNpYmxlIjp0cnVlLCJXaWR0aCI6MC4wLCJIZWlnaHQiOjAuMCwiQm9yZGVyU3R5bGUiOnsiJGlkIjoiMjI1IiwiTGluZUNvbG9yIjpudWxsLCJMaW5lV2VpZ2h0IjowLjAsIkxpbmVUeXBlIjowLCJQYXJlbnRTdHlsZSI6bnVsbH0sIlBhcmVudFN0eWxlIjpudWxsfSwiRHVyYXRpb25TdHlsZSI6eyIkaWQiOiIyMjYiLCJGb250U2V0dGluZ3MiOnsiJGlkIjoiMjI3IiwiRm9udFNpemUiOjEwLCJGb250TmFtZSI6IkNhbGlicmkiLCJJc0JvbGQiOmZhbHNlLCJJc0l0YWxpYyI6ZmFsc2UsIklzVW5kZXJsaW5lZCI6ZmFsc2UsIlBhcmVudFN0eWxlIjpudWxsfSwiQXV0b1NpemUiOjAsIkZvcmVncm91bmQiOnsiJHJlZiI6IjE5In0sIk1heFdpZHRoIjoyMDAuMCwiTWF4SGVpZ2h0IjoiSW5maW5pdHkiLCJTbWFydEZvcmVncm91bmRJc0FjdGl2ZSI6ZmFsc2UsIkhvcml6b250YWxBbGlnbm1lbnQiOjAsIlZlcnRpY2FsQWxpZ25tZW50IjowLCJTbWFydEZvcmVncm91bmQiOm51bGwsIkJhY2tncm91bmRGaWxsVHlwZSI6MCwiTWFyZ2luIjp7IiRyZWYiOiIyMSJ9LCJQYWRkaW5nIjp7IiRyZWYiOiIyMiJ9LCJCYWNrZ3JvdW5kIjp7IiRyZWYiOiIyMyJ9LCJJc1Zpc2libGUiOnRydWUsIldpZHRoIjowLjAsIkhlaWdodCI6MC4wLCJCb3JkZXJTdHlsZSI6eyIkaWQiOiIyMjgiLCJMaW5lQ29sb3IiOm51bGwsIkxpbmVXZWlnaHQiOjAuMCwiTGluZVR5cGUiOjAsIlBhcmVudFN0eWxlIjpudWxsfSwiUGFyZW50U3R5bGUiOm51bGx9LCJIb3Jpem9udGFsQ29ubmVjdG9yU3R5bGUiOnsiJGlkIjoiMjI5IiwiTGluZUNvbG9yIjp7IiRyZWYiOiIyNiJ9LCJMaW5lV2VpZ2h0IjoxLjAsIkxpbmVUeXBlIjowLCJQYXJlbnRTdHlsZSI6bnVsbH0sIlZlcnRpY2FsQ29ubmVjdG9yU3R5bGUiOnsiJGlkIjoiMjMwIiwiTGluZUNvbG9yIjp7IiRyZWYiOiIyOSJ9LCJMaW5lV2VpZ2h0IjowLjAsIkxpbmVUeXBlIjowLCJQYXJlbnRTdHlsZSI6bnVsbH0sIk1hcmdpbiI6bnVsbCwiU3RhcnREYXRlUG9zaXRpb24iOjMsIkVuZERhdGVQb3NpdGlvbiI6NCwiRGF0ZUlzVmlzaWJsZSI6dHJ1ZSwiVGl0bGVQb3NpdGlvbiI6MiwiRHVyYXRpb25Qb3NpdGlvbiI6NiwiUGVyY2VudGFnZUNvbXBsZXRlZFBvc2l0aW9uIjo2LCJTcGFjaW5nIjo1LCJJc0JlbG93VGltZWJhbmQiOnRydWUsIlBlcmNlbnRhZ2VDb21wbGV0ZVNoYXBlT3BhY2l0eSI6MzUsIlNoYXBlU3R5bGUiOnsiJGlkIjoiMjMxIiwiTWFyZ2luIjp7IiRyZWYiOiIzMiJ9LCJQYWRkaW5nIjp7IiRyZWYiOiIzMyJ9LCJCYWNrZ3JvdW5kIjp7IiRpZCI6IjIzMiIsIkNvbG9yIjp7IiRpZCI6IjIzMyIsIkEiOjI1NSwiUiI6OTEsIkciOjE1NSwiQiI6MjEzfX0sIklzVmlzaWJsZSI6dHJ1ZSwiV2lkdGgiOjAuMCwiSGVpZ2h0IjoxNi4wLCJCb3JkZXJTdHlsZSI6eyIkaWQiOiIyMzQiLCJMaW5lQ29sb3IiOnsiJHJlZiI6IjM3In0sIkxpbmVXZWlnaHQiOjAuMCwiTGluZVR5cGUiOjAsIlBhcmVudFN0eWxlIjpudWxsfSwiUGFyZW50U3R5bGUiOm51bGx9LCJUaXRsZVN0eWxlIjp7IiRpZCI6IjIzNSIsIkZvbnRTZXR0aW5ncyI6eyIkaWQiOiIyMzYiLCJGb250U2l6ZSI6MTEsIkZvbnROYW1lIjoiQ2FsaWJyaSIsIklzQm9sZCI6dHJ1ZSwiSXNJdGFsaWMiOmZhbHNlLCJJc1VuZGVybGluZWQiOmZhbHNlLCJQYXJlbnRTdHlsZSI6bnVsbH0sIkF1dG9TaXplIjowLCJGb3JlZ3JvdW5kIjp7IiRpZCI6IjIzNyIsIkNvbG9yIjp7IiRpZCI6IjIzOCIsIkEiOjI1NSwiUiI6MCwiRyI6MCwiQiI6MH19LCJNYXhXaWR0aCI6NzIwLjAsIk1heEhlaWdodCI6IkluZmluaXR5IiwiU21hcnRGb3JlZ3JvdW5kSXNBY3RpdmUiOmZhbHNlLCJIb3Jpem9udGFsQWxpZ25tZW50IjoxLCJWZXJ0aWNhbEFsaWdubWVudCI6MCwiU21hcnRGb3JlZ3JvdW5kIjpudWxsLCJCYWNrZ3JvdW5kRmlsbFR5cGUiOjAsIk1hcmdpbiI6eyIkcmVmIjoiNDMifSwiUGFkZGluZyI6eyIkcmVmIjoiNDQifSwiQmFja2dyb3VuZCI6eyIkaWQiOiIyMzkiLCJDb2xvciI6eyIkaWQiOiIyNDAiLCJBIjowLCJSIjoyNTUsIkciOjI1NSwiQiI6MjU1fX0sIklzVmlzaWJsZSI6dHJ1ZSwiV2lkdGgiOjAuMCwiSGVpZ2h0IjowLjAsIkJvcmRlclN0eWxlIjp7IiRpZCI6IjI0MSIsIkxpbmVDb2xvciI6bnVsbCwiTGluZVdlaWdodCI6MC4wLCJMaW5lVHlwZSI6MCwiUGFyZW50U3R5bGUiOm51bGx9LCJQYXJlbnRTdHlsZSI6bnVsbH0sIkRhdGVTdHlsZSI6eyIkaWQiOiIyNDIiLCJGb250U2V0dGluZ3MiOnsiJGlkIjoiMjQzIiwiRm9udFNpemUiOjEwLCJGb250TmFtZSI6IkNhbGlicmkiLCJJc0JvbGQiOmZhbHNlLCJJc0l0YWxpYyI6ZmFsc2UsIklzVW5kZXJsaW5lZCI6ZmFsc2UsIlBhcmVudFN0eWxlIjpudWxsfSwiQXV0b1NpemUiOjAsIkZvcmVncm91bmQiOnsiJGlkIjoiMjQ0IiwiQ29sb3IiOnsiJGlkIjoiMjQ1IiwiQSI6MjU1LCJSIjo2OCwiRyI6ODQsIkIiOjEwNn19LCJNYXhXaWR0aCI6MjAwLjAsIk1heEhlaWdodCI6IkluZmluaXR5IiwiU21hcnRGb3JlZ3JvdW5kSXNBY3RpdmUiOmZhbHNlLCJIb3Jpem9udGFsQWxpZ25tZW50IjoxLCJWZXJ0aWNhbEFsaWdubWVudCI6MCwiU21hcnRGb3JlZ3JvdW5kIjpudWxsLCJCYWNrZ3JvdW5kRmlsbFR5cGUiOjAsIk1hcmdpbiI6eyIkcmVmIjoiNTIifSwiUGFkZGluZyI6eyIkcmVmIjoiNTMifSwiQmFja2dyb3VuZCI6eyIkaWQiOiIyNDYiLCJDb2xvciI6eyIkaWQiOiIyNDciLCJBIjowLCJSIjoyNTUsIkciOjI1NSwiQiI6MjU1fX0sIklzVmlzaWJsZSI6dHJ1ZSwiV2lkdGgiOjAuMCwiSGVpZ2h0IjowLjAsIkJvcmRlclN0eWxlIjp7IiRpZCI6IjI0OCIsIkxpbmVDb2xvciI6bnVsbCwiTGluZVdlaWdodCI6MC4wLCJMaW5lVHlwZSI6MCwiUGFyZW50U3R5bGUiOm51bGx9LCJQYXJlbnRTdHlsZSI6bnVsbH0sIkRhdGVGb3JtYXQiOnsiJHJlZiI6IjU3In0sIldlZWtOdW1iZXJpbmciOnsiJGlkIjoiMjQ5IiwiRm9ybWF0IjowLCJJc1Zpc2libGUiOmZhbHNlLCJMYXN0S25vd25WaXNpYmlsaXR5U3RhdGUiOmZhbHNlfSwiSXNWaXNpYmxlIjp0cnVlLCJQYXJlbnRTdHlsZSI6bnVsbH0sIkluZGV4Ijo2LCJTbWFydER1cmF0aW9uQWN0aXZhdGVkIjpmYWxzZSwiRGF0ZUZvcm1hdCI6eyIkcmVmIjoiNTcifSwiV2Vla051bWJlcmluZyI6eyIkaWQiOiIyNTAiLCJGb3JtYXQiOjAsIklzVmlzaWJsZSI6ZmFsc2UsIkxhc3RLbm93blZpc2liaWxpdHlTdGF0ZSI6ZmFsc2V9LCJJZCI6ImZlNDk4MDlkLWFlYTgtNDJhNy05MmJkLWE4ZTUyMDg4NDYwYiIsIkltcG9ydElkIjpudWxsLCJUaXRsZSI6IkFkZCBVc2VyIiwiTm90ZSI6bnVsbCwiSHlwZXJsaW5rIjp7IiRpZCI6IjI1MSIsIkFkZHJlc3MiOiIiLCJTdWJBZGRyZXNzIjoiIn0sIklzQ2hhbmdlZCI6ZmFsc2UsIklzTmV3IjpmYWxzZX19XSwiX21pbGVzdG9uZXMiOltdLCJJZCI6IjAwMDAwMDAwLTAwMDAtMDAwMC0wMDAwLTAwMDAwMDAwMDAwMCIsIklzU2luZ2xlSXRlbVJvdyI6dHJ1ZX0seyIkaWQiOiIyNTIiLCJfdGFza3MiOlt7IiRpZCI6IjI1MyIsIl9hdHRhY2hlZE1pbGVzdG9uZXMiOltdLCJUYXNrRGVmaW5pdGlvbiI6eyIkaWQiOiIyNTQiLCJHcm91cE5hbWUiOm51bGwsIlN0YXJ0RGF0ZSI6IjIwMjItMDUtMDlUMDA6MDA6MDBaIiwiRW5kRGF0ZSI6IjIwMjItMDUtMTNUMjM6NTk6MDBaIiwiUGVyY2VudGFnZUNvbXBsZXRlIjpudWxsLCJTdHlsZSI6eyIkaWQiOiIyNTUiLCJTaGFwZSI6MiwiU2hhcGVUaGlja25lc3MiOjEsIkR1cmF0aW9uRm9ybWF0IjowLCJJbmNsdWRlTm9uV29ya2luZ0RheXNJbkR1cmF0aW9uIjpmYWxzZSwiUGVyY2VudGFnZUNvbXBsZXRlU3R5bGUiOnsiJGlkIjoiMjU2IiwiRm9udFNldHRpbmdzIjp7IiRpZCI6IjI1NyIsIkZvbnRTaXplIjoxMCwiRm9udE5hbWUiOiJDYWxpYnJpIiwiSXNCb2xkIjpmYWxzZSwiSXNJdGFsaWMiOmZhbHNlLCJJc1VuZGVybGluZWQiOmZhbHNlLCJQYXJlbnRTdHlsZSI6bnVsbH0sIkF1dG9TaXplIjowLCJGb3JlZ3JvdW5kIjp7IiRyZWYiOiIxMCJ9LCJNYXhXaWR0aCI6MjAwLjAsIk1heEhlaWdodCI6IkluZmluaXR5IiwiU21hcnRGb3JlZ3JvdW5kSXNBY3RpdmUiOmZhbHNlLCJIb3Jpem9udGFsQWxpZ25tZW50IjowLCJWZXJ0aWNhbEFsaWdubWVudCI6MCwiU21hcnRGb3JlZ3JvdW5kIjpudWxsLCJCYWNrZ3JvdW5kRmlsbFR5cGUiOjAsIk1hcmdpbiI6eyIkcmVmIjoiMTIifSwiUGFkZGluZyI6eyIkcmVmIjoiMTMifSwiQmFja2dyb3VuZCI6eyIkcmVmIjoiMTQifSwiSXNWaXNpYmxlIjp0cnVlLCJXaWR0aCI6MC4wLCJIZWlnaHQiOjAuMCwiQm9yZGVyU3R5bGUiOnsiJGlkIjoiMjU4IiwiTGluZUNvbG9yIjpudWxsLCJMaW5lV2VpZ2h0IjowLjAsIkxpbmVUeXBlIjowLCJQYXJlbnRTdHlsZSI6bnVsbH0sIlBhcmVudFN0eWxlIjpudWxsfSwiRHVyYXRpb25TdHlsZSI6eyIkaWQiOiIyNTkiLCJGb250U2V0dGluZ3MiOnsiJGlkIjoiMjYwIiwiRm9udFNpemUiOjEwLCJGb250TmFtZSI6IkNhbGlicmkiLCJJc0JvbGQiOmZhbHNlLCJJc0l0YWxpYyI6ZmFsc2UsIklzVW5kZXJsaW5lZCI6ZmFsc2UsIlBhcmVudFN0eWxlIjpudWxsfSwiQXV0b1NpemUiOjAsIkZvcmVncm91bmQiOnsiJHJlZiI6IjE5In0sIk1heFdpZHRoIjoyMDAuMCwiTWF4SGVpZ2h0IjoiSW5maW5pdHkiLCJTbWFydEZvcmVncm91bmRJc0FjdGl2ZSI6ZmFsc2UsIkhvcml6b250YWxBbGlnbm1lbnQiOjAsIlZlcnRpY2FsQWxpZ25tZW50IjowLCJTbWFydEZvcmVncm91bmQiOm51bGwsIkJhY2tncm91bmRGaWxsVHlwZSI6MCwiTWFyZ2luIjp7IiRyZWYiOiIyMSJ9LCJQYWRkaW5nIjp7IiRyZWYiOiIyMiJ9LCJCYWNrZ3JvdW5kIjp7IiRyZWYiOiIyMyJ9LCJJc1Zpc2libGUiOnRydWUsIldpZHRoIjowLjAsIkhlaWdodCI6MC4wLCJCb3JkZXJTdHlsZSI6eyIkaWQiOiIyNjEiLCJMaW5lQ29sb3IiOm51bGwsIkxpbmVXZWlnaHQiOjAuMCwiTGluZVR5cGUiOjAsIlBhcmVudFN0eWxlIjpudWxsfSwiUGFyZW50U3R5bGUiOm51bGx9LCJIb3Jpem9udGFsQ29ubmVjdG9yU3R5bGUiOnsiJGlkIjoiMjYyIiwiTGluZUNvbG9yIjp7IiRyZWYiOiIyNiJ9LCJMaW5lV2VpZ2h0IjoxLjAsIkxpbmVUeXBlIjowLCJQYXJlbnRTdHlsZSI6bnVsbH0sIlZlcnRpY2FsQ29ubmVjdG9yU3R5bGUiOnsiJGlkIjoiMjYzIiwiTGluZUNvbG9yIjp7IiRyZWYiOiIyOSJ9LCJMaW5lV2VpZ2h0IjowLjAsIkxpbmVUeXBlIjowLCJQYXJlbnRTdHlsZSI6bnVsbH0sIk1hcmdpbiI6bnVsbCwiU3RhcnREYXRlUG9zaXRpb24iOjMsIkVuZERhdGVQb3NpdGlvbiI6NCwiRGF0ZUlzVmlzaWJsZSI6dHJ1ZSwiVGl0bGVQb3NpdGlvbiI6MiwiRHVyYXRpb25Qb3NpdGlvbiI6NiwiUGVyY2VudGFnZUNvbXBsZXRlZFBvc2l0aW9uIjo2LCJTcGFjaW5nIjo1LCJJc0JlbG93VGltZWJhbmQiOnRydWUsIlBlcmNlbnRhZ2VDb21wbGV0ZVNoYXBlT3BhY2l0eSI6MzUsIlNoYXBlU3R5bGUiOnsiJGlkIjoiMjY0IiwiTWFyZ2luIjp7IiRyZWYiOiIzMiJ9LCJQYWRkaW5nIjp7IiRyZWYiOiIzMyJ9LCJCYWNrZ3JvdW5kIjp7IiRpZCI6IjI2NSIsIkNvbG9yIjp7IiRpZCI6IjI2NiIsIkEiOjI1NSwiUiI6OTEsIkciOjE1NSwiQiI6MjEzfX0sIklzVmlzaWJsZSI6dHJ1ZSwiV2lkdGgiOjAuMCwiSGVpZ2h0IjoxNi4wLCJCb3JkZXJTdHlsZSI6eyIkaWQiOiIyNjciLCJMaW5lQ29sb3IiOnsiJHJlZiI6IjM3In0sIkxpbmVXZWlnaHQiOjAuMCwiTGluZVR5cGUiOjAsIlBhcmVudFN0eWxlIjpudWxsfSwiUGFyZW50U3R5bGUiOm51bGx9LCJUaXRsZVN0eWxlIjp7IiRpZCI6IjI2OCIsIkZvbnRTZXR0aW5ncyI6eyIkaWQiOiIyNjkiLCJGb250U2l6ZSI6MTEsIkZvbnROYW1lIjoiQ2FsaWJyaSIsIklzQm9sZCI6dHJ1ZSwiSXNJdGFsaWMiOmZhbHNlLCJJc1VuZGVybGluZWQiOmZhbHNlLCJQYXJlbnRTdHlsZSI6bnVsbH0sIkF1dG9TaXplIjowLCJGb3JlZ3JvdW5kIjp7IiRpZCI6IjI3MCIsIkNvbG9yIjp7IiRpZCI6IjI3MSIsIkEiOjI1NSwiUiI6MCwiRyI6MCwiQiI6MH19LCJNYXhXaWR0aCI6NzIwLjAsIk1heEhlaWdodCI6IkluZmluaXR5IiwiU21hcnRGb3JlZ3JvdW5kSXNBY3RpdmUiOmZhbHNlLCJIb3Jpem9udGFsQWxpZ25tZW50IjoxLCJWZXJ0aWNhbEFsaWdubWVudCI6MCwiU21hcnRGb3JlZ3JvdW5kIjpudWxsLCJCYWNrZ3JvdW5kRmlsbFR5cGUiOjAsIk1hcmdpbiI6eyIkcmVmIjoiNDMifSwiUGFkZGluZyI6eyIkcmVmIjoiNDQifSwiQmFja2dyb3VuZCI6eyIkaWQiOiIyNzIiLCJDb2xvciI6eyIkaWQiOiIyNzMiLCJBIjowLCJSIjoyNTUsIkciOjI1NSwiQiI6MjU1fX0sIklzVmlzaWJsZSI6dHJ1ZSwiV2lkdGgiOjAuMCwiSGVpZ2h0IjowLjAsIkJvcmRlclN0eWxlIjp7IiRpZCI6IjI3NCIsIkxpbmVDb2xvciI6bnVsbCwiTGluZVdlaWdodCI6MC4wLCJMaW5lVHlwZSI6MCwiUGFyZW50U3R5bGUiOm51bGx9LCJQYXJlbnRTdHlsZSI6bnVsbH0sIkRhdGVTdHlsZSI6eyIkaWQiOiIyNzUiLCJGb250U2V0dGluZ3MiOnsiJGlkIjoiMjc2IiwiRm9udFNpemUiOjEwLCJGb250TmFtZSI6IkNhbGlicmkiLCJJc0JvbGQiOmZhbHNlLCJJc0l0YWxpYyI6ZmFsc2UsIklzVW5kZXJsaW5lZCI6ZmFsc2UsIlBhcmVudFN0eWxlIjpudWxsfSwiQXV0b1NpemUiOjAsIkZvcmVncm91bmQiOnsiJGlkIjoiMjc3IiwiQ29sb3IiOnsiJGlkIjoiMjc4IiwiQSI6MjU1LCJSIjo2OCwiRyI6ODQsIkIiOjEwNn19LCJNYXhXaWR0aCI6MjAwLjAsIk1heEhlaWdodCI6IkluZmluaXR5IiwiU21hcnRGb3JlZ3JvdW5kSXNBY3RpdmUiOmZhbHNlLCJIb3Jpem9udGFsQWxpZ25tZW50IjoxLCJWZXJ0aWNhbEFsaWdubWVudCI6MCwiU21hcnRGb3JlZ3JvdW5kIjpudWxsLCJCYWNrZ3JvdW5kRmlsbFR5cGUiOjAsIk1hcmdpbiI6eyIkcmVmIjoiNTIifSwiUGFkZGluZyI6eyIkcmVmIjoiNTMifSwiQmFja2dyb3VuZCI6eyIkaWQiOiIyNzkiLCJDb2xvciI6eyIkaWQiOiIyODAiLCJBIjowLCJSIjoyNTUsIkciOjI1NSwiQiI6MjU1fX0sIklzVmlzaWJsZSI6dHJ1ZSwiV2lkdGgiOjAuMCwiSGVpZ2h0IjowLjAsIkJvcmRlclN0eWxlIjp7IiRpZCI6IjI4MSIsIkxpbmVDb2xvciI6bnVsbCwiTGluZVdlaWdodCI6MC4wLCJMaW5lVHlwZSI6MCwiUGFyZW50U3R5bGUiOm51bGx9LCJQYXJlbnRTdHlsZSI6bnVsbH0sIkRhdGVGb3JtYXQiOnsiJHJlZiI6IjU3In0sIldlZWtOdW1iZXJpbmciOnsiJGlkIjoiMjgyIiwiRm9ybWF0IjowLCJJc1Zpc2libGUiOmZhbHNlLCJMYXN0S25vd25WaXNpYmlsaXR5U3RhdGUiOmZhbHNlfSwiSXNWaXNpYmxlIjp0cnVlLCJQYXJlbnRTdHlsZSI6bnVsbH0sIkluZGV4Ijo3LCJTbWFydER1cmF0aW9uQWN0aXZhdGVkIjpmYWxzZSwiRGF0ZUZvcm1hdCI6eyIkcmVmIjoiNTcifSwiV2Vla051bWJlcmluZyI6eyIkaWQiOiIyODMiLCJGb3JtYXQiOjAsIklzVmlzaWJsZSI6ZmFsc2UsIkxhc3RLbm93blZpc2liaWxpdHlTdGF0ZSI6ZmFsc2V9LCJJZCI6IjBkNDAwYTAyLTAyYjAtNDI2NC1iNTJmLTExMDgxZWVmNmVhMCIsIkltcG9ydElkIjpudWxsLCJUaXRsZSI6IkFkZCBDYXIiLCJOb3RlIjpudWxsLCJIeXBlcmxpbmsiOnsiJGlkIjoiMjg0IiwiQWRkcmVzcyI6IiIsIlN1YkFkZHJlc3MiOiIifSwiSXNDaGFuZ2VkIjpmYWxzZSwiSXNOZXciOmZhbHNlfX1dLCJfbWlsZXN0b25lcyI6W10sIklkIjoiMDAwMDAwMDAtMDAwMC0wMDAwLTAwMDAtMDAwMDAwMDAwMDAwIiwiSXNTaW5nbGVJdGVtUm93Ijp0cnVlfSx7IiRpZCI6IjI4NSIsIl90YXNrcyI6W3siJGlkIjoiMjg2IiwiX2F0dGFjaGVkTWlsZXN0b25lcyI6W10sIlRhc2tEZWZpbml0aW9uIjp7IiRpZCI6IjI4NyIsIkdyb3VwTmFtZSI6bnVsbCwiU3RhcnREYXRlIjoiMjAyMi0wNS0xMFQwMDowMDowMFoiLCJFbmREYXRlIjoiMjAyMi0wNS0xM1QyMzo1OTowMFoiLCJQZXJjZW50YWdlQ29tcGxldGUiOm51bGwsIlN0eWxlIjp7IiRpZCI6IjI4OCIsIlNoYXBlIjoyLCJTaGFwZVRoaWNrbmVzcyI6MSwiRHVyYXRpb25Gb3JtYXQiOjAsIkluY2x1ZGVOb25Xb3JraW5nRGF5c0luRHVyYXRpb24iOmZhbHNlLCJQZXJjZW50YWdlQ29tcGxldGVTdHlsZSI6eyIkaWQiOiIyODkiLCJGb250U2V0dGluZ3MiOnsiJGlkIjoiMjkwIiwiRm9udFNpemUiOjEwLCJGb250TmFtZSI6IkNhbGlicmkiLCJJc0JvbGQiOmZhbHNlLCJJc0l0YWxpYyI6ZmFsc2UsIklzVW5kZXJsaW5lZCI6ZmFsc2UsIlBhcmVudFN0eWxlIjpudWxsfSwiQXV0b1NpemUiOjAsIkZvcmVncm91bmQiOnsiJHJlZiI6IjEwIn0sIk1heFdpZHRoIjoyMDAuMCwiTWF4SGVpZ2h0IjoiSW5maW5pdHkiLCJTbWFydEZvcmVncm91bmRJc0FjdGl2ZSI6ZmFsc2UsIkhvcml6b250YWxBbGlnbm1lbnQiOjAsIlZlcnRpY2FsQWxpZ25tZW50IjowLCJTbWFydEZvcmVncm91bmQiOm51bGwsIkJhY2tncm91bmRGaWxsVHlwZSI6MCwiTWFyZ2luIjp7IiRyZWYiOiIxMiJ9LCJQYWRkaW5nIjp7IiRyZWYiOiIxMyJ9LCJCYWNrZ3JvdW5kIjp7IiRyZWYiOiIxNCJ9LCJJc1Zpc2libGUiOnRydWUsIldpZHRoIjowLjAsIkhlaWdodCI6MC4wLCJCb3JkZXJTdHlsZSI6eyIkaWQiOiIyOTEiLCJMaW5lQ29sb3IiOm51bGwsIkxpbmVXZWlnaHQiOjAuMCwiTGluZVR5cGUiOjAsIlBhcmVudFN0eWxlIjpudWxsfSwiUGFyZW50U3R5bGUiOm51bGx9LCJEdXJhdGlvblN0eWxlIjp7IiRpZCI6IjI5MiIsIkZvbnRTZXR0aW5ncyI6eyIkaWQiOiIyOTMiLCJGb250U2l6ZSI6MTAsIkZvbnROYW1lIjoiQ2FsaWJyaSIsIklzQm9sZCI6ZmFsc2UsIklzSXRhbGljIjpmYWxzZSwiSXNVbmRlcmxpbmVkIjpmYWxzZSwiUGFyZW50U3R5bGUiOm51bGx9LCJBdXRvU2l6ZSI6MCwiRm9yZWdyb3VuZCI6eyIkcmVmIjoiMTkifSwiTWF4V2lkdGgiOjIwMC4wLCJNYXhIZWlnaHQiOiJJbmZpbml0eSIsIlNtYXJ0Rm9yZWdyb3VuZElzQWN0aXZlIjpmYWxzZSwiSG9yaXpvbnRhbEFsaWdubWVudCI6MCwiVmVydGljYWxBbGlnbm1lbnQiOjAsIlNtYXJ0Rm9yZWdyb3VuZCI6bnVsbCwiQmFja2dyb3VuZEZpbGxUeXBlIjowLCJNYXJnaW4iOnsiJHJlZiI6IjIxIn0sIlBhZGRpbmciOnsiJHJlZiI6IjIyIn0sIkJhY2tncm91bmQiOnsiJHJlZiI6IjIzIn0sIklzVmlzaWJsZSI6dHJ1ZSwiV2lkdGgiOjAuMCwiSGVpZ2h0IjowLjAsIkJvcmRlclN0eWxlIjp7IiRpZCI6IjI5NCIsIkxpbmVDb2xvciI6bnVsbCwiTGluZVdlaWdodCI6MC4wLCJMaW5lVHlwZSI6MCwiUGFyZW50U3R5bGUiOm51bGx9LCJQYXJlbnRTdHlsZSI6bnVsbH0sIkhvcml6b250YWxDb25uZWN0b3JTdHlsZSI6eyIkaWQiOiIyOTUiLCJMaW5lQ29sb3IiOnsiJHJlZiI6IjI2In0sIkxpbmVXZWlnaHQiOjEuMCwiTGluZVR5cGUiOjAsIlBhcmVudFN0eWxlIjpudWxsfSwiVmVydGljYWxDb25uZWN0b3JTdHlsZSI6eyIkaWQiOiIyOTYiLCJMaW5lQ29sb3IiOnsiJHJlZiI6IjI5In0sIkxpbmVXZWlnaHQiOjAuMCwiTGluZVR5cGUiOjAsIlBhcmVudFN0eWxlIjpudWxsfSwiTWFyZ2luIjpudWxsLCJTdGFydERhdGVQb3NpdGlvbiI6MywiRW5kRGF0ZVBvc2l0aW9uIjo0LCJEYXRlSXNWaXNpYmxlIjp0cnVlLCJUaXRsZVBvc2l0aW9uIjoyLCJEdXJhdGlvblBvc2l0aW9uIjo2LCJQZXJjZW50YWdlQ29tcGxldGVkUG9zaXRpb24iOjYsIlNwYWNpbmciOjUsIklzQmVsb3dUaW1lYmFuZCI6dHJ1ZSwiUGVyY2VudGFnZUNvbXBsZXRlU2hhcGVPcGFjaXR5IjozNSwiU2hhcGVTdHlsZSI6eyIkaWQiOiIyOTciLCJNYXJnaW4iOnsiJHJlZiI6IjMyIn0sIlBhZGRpbmciOnsiJHJlZiI6IjMzIn0sIkJhY2tncm91bmQiOnsiJGlkIjoiMjk4IiwiQ29sb3IiOnsiJGlkIjoiMjk5IiwiQSI6MjU1LCJSIjo5MSwiRyI6MTU1LCJCIjoyMTN9fSwiSXNWaXNpYmxlIjp0cnVlLCJXaWR0aCI6MC4wLCJIZWlnaHQiOjE2LjAsIkJvcmRlclN0eWxlIjp7IiRpZCI6IjMwMCIsIkxpbmVDb2xvciI6eyIkcmVmIjoiMzcifSwiTGluZVdlaWdodCI6MC4wLCJMaW5lVHlwZSI6MCwiUGFyZW50U3R5bGUiOm51bGx9LCJQYXJlbnRTdHlsZSI6bnVsbH0sIlRpdGxlU3R5bGUiOnsiJGlkIjoiMzAxIiwiRm9udFNldHRpbmdzIjp7IiRpZCI6IjMwMiIsIkZvbnRTaXplIjoxMSwiRm9udE5hbWUiOiJDYWxpYnJpIiwiSXNCb2xkIjp0cnVlLCJJc0l0YWxpYyI6ZmFsc2UsIklzVW5kZXJsaW5lZCI6ZmFsc2UsIlBhcmVudFN0eWxlIjpudWxsfSwiQXV0b1NpemUiOjAsIkZvcmVncm91bmQiOnsiJGlkIjoiMzAzIiwiQ29sb3IiOnsiJGlkIjoiMzA0IiwiQSI6MjU1LCJSIjowLCJHIjowLCJCIjowfX0sIk1heFdpZHRoIjo3MjAuMCwiTWF4SGVpZ2h0IjoiSW5maW5pdHkiLCJTbWFydEZvcmVncm91bmRJc0FjdGl2ZSI6ZmFsc2UsIkhvcml6b250YWxBbGlnbm1lbnQiOjEsIlZlcnRpY2FsQWxpZ25tZW50IjowLCJTbWFydEZvcmVncm91bmQiOm51bGwsIkJhY2tncm91bmRGaWxsVHlwZSI6MCwiTWFyZ2luIjp7IiRyZWYiOiI0MyJ9LCJQYWRkaW5nIjp7IiRyZWYiOiI0NCJ9LCJCYWNrZ3JvdW5kIjp7IiRpZCI6IjMwNSIsIkNvbG9yIjp7IiRpZCI6IjMwNiIsIkEiOjAsIlIiOjI1NSwiRyI6MjU1LCJCIjoyNTV9fSwiSXNWaXNpYmxlIjp0cnVlLCJXaWR0aCI6MC4wLCJIZWlnaHQiOjAuMCwiQm9yZGVyU3R5bGUiOnsiJGlkIjoiMzA3IiwiTGluZUNvbG9yIjpudWxsLCJMaW5lV2VpZ2h0IjowLjAsIkxpbmVUeXBlIjowLCJQYXJlbnRTdHlsZSI6bnVsbH0sIlBhcmVudFN0eWxlIjpudWxsfSwiRGF0ZVN0eWxlIjp7IiRpZCI6IjMwOCIsIkZvbnRTZXR0aW5ncyI6eyIkaWQiOiIzMDkiLCJGb250U2l6ZSI6MTAsIkZvbnROYW1lIjoiQ2FsaWJyaSIsIklzQm9sZCI6ZmFsc2UsIklzSXRhbGljIjpmYWxzZSwiSXNVbmRlcmxpbmVkIjpmYWxzZSwiUGFyZW50U3R5bGUiOm51bGx9LCJBdXRvU2l6ZSI6MCwiRm9yZWdyb3VuZCI6eyIkaWQiOiIzMTAiLCJDb2xvciI6eyIkaWQiOiIzMTEiLCJBIjoyNTUsIlIiOjY4LCJHIjo4NCwiQiI6MTA2fX0sIk1heFdpZHRoIjoyMDAuMCwiTWF4SGVpZ2h0IjoiSW5maW5pdHkiLCJTbWFydEZvcmVncm91bmRJc0FjdGl2ZSI6ZmFsc2UsIkhvcml6b250YWxBbGlnbm1lbnQiOjEsIlZlcnRpY2FsQWxpZ25tZW50IjowLCJTbWFydEZvcmVncm91bmQiOm51bGwsIkJhY2tncm91bmRGaWxsVHlwZSI6MCwiTWFyZ2luIjp7IiRyZWYiOiI1MiJ9LCJQYWRkaW5nIjp7IiRyZWYiOiI1MyJ9LCJCYWNrZ3JvdW5kIjp7IiRpZCI6IjMxMiIsIkNvbG9yIjp7IiRpZCI6IjMxMyIsIkEiOjAsIlIiOjI1NSwiRyI6MjU1LCJCIjoyNTV9fSwiSXNWaXNpYmxlIjp0cnVlLCJXaWR0aCI6MC4wLCJIZWlnaHQiOjAuMCwiQm9yZGVyU3R5bGUiOnsiJGlkIjoiMzE0IiwiTGluZUNvbG9yIjpudWxsLCJMaW5lV2VpZ2h0IjowLjAsIkxpbmVUeXBlIjowLCJQYXJlbnRTdHlsZSI6bnVsbH0sIlBhcmVudFN0eWxlIjpudWxsfSwiRGF0ZUZvcm1hdCI6eyIkcmVmIjoiNTcifSwiV2Vla051bWJlcmluZyI6eyIkaWQiOiIzMTUiLCJGb3JtYXQiOjAsIklzVmlzaWJsZSI6ZmFsc2UsIkxhc3RLbm93blZpc2liaWxpdHlTdGF0ZSI6ZmFsc2V9LCJJc1Zpc2libGUiOnRydWUsIlBhcmVudFN0eWxlIjpudWxsfSwiSW5kZXgiOjgsIlNtYXJ0RHVyYXRpb25BY3RpdmF0ZWQiOmZhbHNlLCJEYXRlRm9ybWF0Ijp7IiRyZWYiOiI1NyJ9LCJXZWVrTnVtYmVyaW5nIjp7IiRpZCI6IjMxNiIsIkZvcm1hdCI6MCwiSXNWaXNpYmxlIjpmYWxzZSwiTGFzdEtub3duVmlzaWJpbGl0eVN0YXRlIjpmYWxzZX0sIklkIjoiMWNhMTNjYTUtYTk1Yy00OTM3LWI2ZGEtMzIxNDkxNmIzMGJhIiwiSW1wb3J0SWQiOm51bGwsIlRpdGxlIjoiRGVsZXRlIENhciIsIk5vdGUiOm51bGwsIkh5cGVybGluayI6eyIkaWQiOiIzMTciLCJBZGRyZXNzIjoiIiwiU3ViQWRkcmVzcyI6IiJ9LCJJc0NoYW5nZWQiOmZhbHNlLCJJc05ldyI6ZmFsc2V9fV0sIl9taWxlc3RvbmVzIjpbXSwiSWQiOiIwMDAwMDAwMC0wMDAwLTAwMDAtMDAwMC0wMDAwMDAwMDAwMDAiLCJJc1NpbmdsZUl0ZW1Sb3ciOnRydWV9LHsiJGlkIjoiMzE4IiwiX3Rhc2tzIjpbeyIkaWQiOiIzMTkiLCJfYXR0YWNoZWRNaWxlc3RvbmVzIjpbXSwiVGFza0RlZmluaXRpb24iOnsiJGlkIjoiMzIwIiwiR3JvdXBOYW1lIjpudWxsLCJTdGFydERhdGUiOiIyMDIyLTA1LTEyVDAwOjAwOjAwWiIsIkVuZERhdGUiOiIyMDIyLTA1LTEzVDIzOjU5OjAwWiIsIlBlcmNlbnRhZ2VDb21wbGV0ZSI6bnVsbCwiU3R5bGUiOnsiJGlkIjoiMzIxIiwiU2hhcGUiOjIsIlNoYXBlVGhpY2tuZXNzIjoxLCJEdXJhdGlvbkZvcm1hdCI6MCwiSW5jbHVkZU5vbldvcmtpbmdEYXlzSW5EdXJhdGlvbiI6ZmFsc2UsIlBlcmNlbnRhZ2VDb21wbGV0ZVN0eWxlIjp7IiRpZCI6IjMyMiIsIkZvbnRTZXR0aW5ncyI6eyIkaWQiOiIzMjMiLCJGb250U2l6ZSI6MTAsIkZvbnROYW1lIjoiQ2FsaWJyaSIsIklzQm9sZCI6ZmFsc2UsIklzSXRhbGljIjpmYWxzZSwiSXNVbmRlcmxpbmVkIjpmYWxzZSwiUGFyZW50U3R5bGUiOm51bGx9LCJBdXRvU2l6ZSI6MCwiRm9yZWdyb3VuZCI6eyIkcmVmIjoiMTAifSwiTWF4V2lkdGgiOjIwMC4wLCJNYXhIZWlnaHQiOiJJbmZpbml0eSIsIlNtYXJ0Rm9yZWdyb3VuZElzQWN0aXZlIjpmYWxzZSwiSG9yaXpvbnRhbEFsaWdubWVudCI6MCwiVmVydGljYWxBbGlnbm1lbnQiOjAsIlNtYXJ0Rm9yZWdyb3VuZCI6bnVsbCwiQmFja2dyb3VuZEZpbGxUeXBlIjowLCJNYXJnaW4iOnsiJHJlZiI6IjEyIn0sIlBhZGRpbmciOnsiJHJlZiI6IjEzIn0sIkJhY2tncm91bmQiOnsiJHJlZiI6IjE0In0sIklzVmlzaWJsZSI6dHJ1ZSwiV2lkdGgiOjAuMCwiSGVpZ2h0IjowLjAsIkJvcmRlclN0eWxlIjp7IiRpZCI6IjMyNCIsIkxpbmVDb2xvciI6bnVsbCwiTGluZVdlaWdodCI6MC4wLCJMaW5lVHlwZSI6MCwiUGFyZW50U3R5bGUiOm51bGx9LCJQYXJlbnRTdHlsZSI6bnVsbH0sIkR1cmF0aW9uU3R5bGUiOnsiJGlkIjoiMzI1IiwiRm9udFNldHRpbmdzIjp7IiRpZCI6IjMyNiIsIkZvbnRTaXplIjoxMCwiRm9udE5hbWUiOiJDYWxpYnJpIiwiSXNCb2xkIjpmYWxzZSwiSXNJdGFsaWMiOmZhbHNlLCJJc1VuZGVybGluZWQiOmZhbHNlLCJQYXJlbnRTdHlsZSI6bnVsbH0sIkF1dG9TaXplIjowLCJGb3JlZ3JvdW5kIjp7IiRyZWYiOiIxOSJ9LCJNYXhXaWR0aCI6MjAwLjAsIk1heEhlaWdodCI6IkluZmluaXR5IiwiU21hcnRGb3JlZ3JvdW5kSXNBY3RpdmUiOmZhbHNlLCJIb3Jpem9udGFsQWxpZ25tZW50IjowLCJWZXJ0aWNhbEFsaWdubWVudCI6MCwiU21hcnRGb3JlZ3JvdW5kIjpudWxsLCJCYWNrZ3JvdW5kRmlsbFR5cGUiOjAsIk1hcmdpbiI6eyIkcmVmIjoiMjEifSwiUGFkZGluZyI6eyIkcmVmIjoiMjIifSwiQmFja2dyb3VuZCI6eyIkcmVmIjoiMjMifSwiSXNWaXNpYmxlIjp0cnVlLCJXaWR0aCI6MC4wLCJIZWlnaHQiOjAuMCwiQm9yZGVyU3R5bGUiOnsiJGlkIjoiMzI3IiwiTGluZUNvbG9yIjpudWxsLCJMaW5lV2VpZ2h0IjowLjAsIkxpbmVUeXBlIjowLCJQYXJlbnRTdHlsZSI6bnVsbH0sIlBhcmVudFN0eWxlIjpudWxsfSwiSG9yaXpvbnRhbENvbm5lY3RvclN0eWxlIjp7IiRpZCI6IjMyOCIsIkxpbmVDb2xvciI6eyIkcmVmIjoiMjYifSwiTGluZVdlaWdodCI6MS4wLCJMaW5lVHlwZSI6MCwiUGFyZW50U3R5bGUiOm51bGx9LCJWZXJ0aWNhbENvbm5lY3RvclN0eWxlIjp7IiRpZCI6IjMyOSIsIkxpbmVDb2xvciI6eyIkcmVmIjoiMjkifSwiTGluZVdlaWdodCI6MC4wLCJMaW5lVHlwZSI6MCwiUGFyZW50U3R5bGUiOm51bGx9LCJNYXJnaW4iOm51bGwsIlN0YXJ0RGF0ZVBvc2l0aW9uIjozLCJFbmREYXRlUG9zaXRpb24iOjQsIkRhdGVJc1Zpc2libGUiOnRydWUsIlRpdGxlUG9zaXRpb24iOjIsIkR1cmF0aW9uUG9zaXRpb24iOjYsIlBlcmNlbnRhZ2VDb21wbGV0ZWRQb3NpdGlvbiI6NiwiU3BhY2luZyI6NSwiSXNCZWxvd1RpbWViYW5kIjp0cnVlLCJQZXJjZW50YWdlQ29tcGxldGVTaGFwZU9wYWNpdHkiOjM1LCJTaGFwZVN0eWxlIjp7IiRpZCI6IjMzMCIsIk1hcmdpbiI6eyIkcmVmIjoiMzIifSwiUGFkZGluZyI6eyIkcmVmIjoiMzMifSwiQmFja2dyb3VuZCI6eyIkaWQiOiIzMzEiLCJDb2xvciI6eyIkaWQiOiIzMzIiLCJBIjoyNTUsIlIiOjkxLCJHIjoxNTUsIkIiOjIxM319LCJJc1Zpc2libGUiOnRydWUsIldpZHRoIjowLjAsIkhlaWdodCI6MTYuMCwiQm9yZGVyU3R5bGUiOnsiJGlkIjoiMzMzIiwiTGluZUNvbG9yIjp7IiRyZWYiOiIzNyJ9LCJMaW5lV2VpZ2h0IjowLjAsIkxpbmVUeXBlIjowLCJQYXJlbnRTdHlsZSI6bnVsbH0sIlBhcmVudFN0eWxlIjpudWxsfSwiVGl0bGVTdHlsZSI6eyIkaWQiOiIzMzQiLCJGb250U2V0dGluZ3MiOnsiJGlkIjoiMzM1IiwiRm9udFNpemUiOjExLCJGb250TmFtZSI6IkNhbGlicmkiLCJJc0JvbGQiOnRydWUsIklzSXRhbGljIjpmYWxzZSwiSXNVbmRlcmxpbmVkIjpmYWxzZSwiUGFyZW50U3R5bGUiOm51bGx9LCJBdXRvU2l6ZSI6MCwiRm9yZWdyb3VuZCI6eyIkaWQiOiIzMzYiLCJDb2xvciI6eyIkaWQiOiIzMzciLCJBIjoyNTUsIlIiOjAsIkciOjAsIkIiOjB9fSwiTWF4V2lkdGgiOjcyMC4wLCJNYXhIZWlnaHQiOiJJbmZpbml0eSIsIlNtYXJ0Rm9yZWdyb3VuZElzQWN0aXZlIjpmYWxzZSwiSG9yaXpvbnRhbEFsaWdubWVudCI6MSwiVmVydGljYWxBbGlnbm1lbnQiOjAsIlNtYXJ0Rm9yZWdyb3VuZCI6bnVsbCwiQmFja2dyb3VuZEZpbGxUeXBlIjowLCJNYXJnaW4iOnsiJHJlZiI6IjQzIn0sIlBhZGRpbmciOnsiJHJlZiI6IjQ0In0sIkJhY2tncm91bmQiOnsiJGlkIjoiMzM4IiwiQ29sb3IiOnsiJGlkIjoiMzM5IiwiQSI6MCwiUiI6MjU1LCJHIjoyNTUsIkIiOjI1NX19LCJJc1Zpc2libGUiOnRydWUsIldpZHRoIjowLjAsIkhlaWdodCI6MC4wLCJCb3JkZXJTdHlsZSI6eyIkaWQiOiIzNDAiLCJMaW5lQ29sb3IiOm51bGwsIkxpbmVXZWlnaHQiOjAuMCwiTGluZVR5cGUiOjAsIlBhcmVudFN0eWxlIjpudWxsfSwiUGFyZW50U3R5bGUiOm51bGx9LCJEYXRlU3R5bGUiOnsiJGlkIjoiMzQxIiwiRm9udFNldHRpbmdzIjp7IiRpZCI6IjM0MiIsIkZvbnRTaXplIjoxMCwiRm9udE5hbWUiOiJDYWxpYnJpIiwiSXNCb2xkIjpmYWxzZSwiSXNJdGFsaWMiOmZhbHNlLCJJc1VuZGVybGluZWQiOmZhbHNlLCJQYXJlbnRTdHlsZSI6bnVsbH0sIkF1dG9TaXplIjowLCJGb3JlZ3JvdW5kIjp7IiRpZCI6IjM0MyIsIkNvbG9yIjp7IiRpZCI6IjM0NCIsIkEiOjI1NSwiUiI6NjgsIkciOjg0LCJCIjoxMDZ9fSwiTWF4V2lkdGgiOjIwMC4wLCJNYXhIZWlnaHQiOiJJbmZpbml0eSIsIlNtYXJ0Rm9yZWdyb3VuZElzQWN0aXZlIjpmYWxzZSwiSG9yaXpvbnRhbEFsaWdubWVudCI6MSwiVmVydGljYWxBbGlnbm1lbnQiOjAsIlNtYXJ0Rm9yZWdyb3VuZCI6bnVsbCwiQmFja2dyb3VuZEZpbGxUeXBlIjowLCJNYXJnaW4iOnsiJHJlZiI6IjUyIn0sIlBhZGRpbmciOnsiJHJlZiI6IjUzIn0sIkJhY2tncm91bmQiOnsiJGlkIjoiMzQ1IiwiQ29sb3IiOnsiJGlkIjoiMzQ2IiwiQSI6MCwiUiI6MjU1LCJHIjoyNTUsIkIiOjI1NX19LCJJc1Zpc2libGUiOnRydWUsIldpZHRoIjowLjAsIkhlaWdodCI6MC4wLCJCb3JkZXJTdHlsZSI6eyIkaWQiOiIzNDciLCJMaW5lQ29sb3IiOm51bGwsIkxpbmVXZWlnaHQiOjAuMCwiTGluZVR5cGUiOjAsIlBhcmVudFN0eWxlIjpudWxsfSwiUGFyZW50U3R5bGUiOm51bGx9LCJEYXRlRm9ybWF0Ijp7IiRyZWYiOiI1NyJ9LCJXZWVrTnVtYmVyaW5nIjp7IiRpZCI6IjM0OCIsIkZvcm1hdCI6MCwiSXNWaXNpYmxlIjpmYWxzZSwiTGFzdEtub3duVmlzaWJpbGl0eVN0YXRlIjpmYWxzZX0sIklzVmlzaWJsZSI6dHJ1ZSwiUGFyZW50U3R5bGUiOm51bGx9LCJJbmRleCI6OSwiU21hcnREdXJhdGlvbkFjdGl2YXRlZCI6ZmFsc2UsIkRhdGVGb3JtYXQiOnsiJHJlZiI6IjU3In0sIldlZWtOdW1iZXJpbmciOnsiJGlkIjoiMzQ5IiwiRm9ybWF0IjowLCJJc1Zpc2libGUiOmZhbHNlLCJMYXN0S25vd25WaXNpYmlsaXR5U3RhdGUiOmZhbHNlfSwiSWQiOiI4YjM4NDM3Yi05NmFlLTQ3YzItYTg5ZS0yZjlhNDExYzhjMjgiLCJJbXBvcnRJZCI6bnVsbCwiVGl0bGUiOiJVcGRhdGUgQ2FyIiwiTm90ZSI6bnVsbCwiSHlwZXJsaW5rIjp7IiRpZCI6IjM1MCIsIkFkZHJlc3MiOiIiLCJTdWJBZGRyZXNzIjoiIn0sIklzQ2hhbmdlZCI6ZmFsc2UsIklzTmV3IjpmYWxzZX19XSwiX21pbGVzdG9uZXMiOltdLCJJZCI6IjAwMDAwMDAwLTAwMDAtMDAwMC0wMDAwLTAwMDAwMDAwMDAwMCIsIklzU2luZ2xlSXRlbVJvdyI6dHJ1ZX1dLCJJbmRleCI6MywiSWQiOiJkYzA3NmZjZC1kMWJlLTQyMDctYjVmOS0zODE1YjM4Y2Q5MWUiLCJIZWFkZXJUZXh0IjpudWxsLCJJc0RlZmF1bHQiOnRydWUsIlN0eWxlIjp7IiRpZCI6IjM1MSIsIkhlYWRlclN0eWxlIjp7IiRpZCI6IjM1MiIsIlRleHRTdHlsZSI6eyIkaWQiOiIzNTMiLCJGb250U2V0dGluZ3MiOnsiJGlkIjoiMzU0IiwiRm9udFNpemUiOjExLCJGb250TmFtZSI6IkNhbGlicmkiLCJJc0JvbGQiOmZhbHNlLCJJc0l0YWxpYyI6ZmFsc2UsIklzVW5kZXJsaW5lZCI6ZmFsc2UsIlBhcmVudFN0eWxlIjpudWxsfSwiQXV0b1NpemUiOjIsIkZvcmVncm91bmQiOnsiJGlkIjoiMzU1IiwiQ29sb3IiOnsiJGlkIjoiMzU2IiwiQSI6MjU1LCJSIjowLCJHIjowLCJCIjowfX0sIk1heFdpZHRoIjowLjAsIk1heEhlaWdodCI6IkluZmluaXR5IiwiU21hcnRGb3JlZ3JvdW5kSXNBY3RpdmUiOmZhbHNlLCJIb3Jpem9udGFsQWxpZ25tZW50IjowLCJWZXJ0aWNhbEFsaWdubWVudCI6MCwiU21hcnRGb3JlZ3JvdW5kIjpudWxsLCJCYWNrZ3JvdW5kRmlsbFR5cGUiOjAsIk1hcmdpbiI6eyIkaWQiOiIzNTciLCJUb3AiOjAuMCwiTGVmdCI6MC4wLCJSaWdodCI6MC4wLCJCb3R0b20iOjAuMH0sIlBhZGRpbmciOnsiJGlkIjoiMzU4IiwiVG9wIjowLjAsIkxlZnQiOjAuMCwiUmlnaHQiOjAuMCwiQm90dG9tIjowLjB9LCJCYWNrZ3JvdW5kIjpudWxsLCJJc1Zpc2libGUiOnRydWUsIldpZHRoIjowLjAsIkhlaWdodCI6MC4wLCJCb3JkZXJTdHlsZSI6bnVsbCwiUGFyZW50U3R5bGUiOm51bGx9LCJSZWN0YW5nbGVTdHlsZSI6eyIkaWQiOiIzNTkiLCJNYXJnaW4iOnsiJGlkIjoiMzYwIiwiVG9wIjowLjAsIkxlZnQiOjAuMCwiUmlnaHQiOjAuMCwiQm90dG9tIjowLjB9LCJQYWRkaW5nIjp7IiRpZCI6IjM2MSIsIlRvcCI6MC4wLCJMZWZ0IjowLjAsIlJpZ2h0IjowLjAsIkJvdHRvbSI6MC4wfSwiQmFja2dyb3VuZCI6eyIkaWQiOiIzNjIiLCJDb2xvciI6eyIkaWQiOiIzNjMiLCJBIjo2MywiUiI6MjM3LCJHIjoxMjUsIkIiOjQ5fX0sIklzVmlzaWJsZSI6dHJ1ZSwiV2lkdGgiOjAuMCwiSGVpZ2h0IjowLjAsIkJvcmRlclN0eWxlIjp7IiRpZCI6IjM2NCIsIkxpbmVDb2xvciI6eyIkaWQiOiIzNjUiLCIkdHlwZSI6Ik5MUkUuQ29tbW9uLkRvbS5Tb2xpZENvbG9yQnJ1c2gsIE5MUkUuQ29tbW9uIiwiQ29sb3IiOnsiJGlkIjoiMzY2IiwiQSI6MjU1LCJSIjoyNTUsIkciOjAsIkIiOjB9fSwiTGluZVdlaWdodCI6MC4wLCJMaW5lVHlwZSI6MCwiUGFyZW50U3R5bGUiOm51bGx9LCJQYXJlbnRTdHlsZSI6bnVsbH0sIk1hcmdpbiI6eyIkaWQiOiIzNjciLCJUb3AiOjAuMCwiTGVmdCI6MC4wLCJSaWdodCI6MC4wLCJCb3R0b20iOjAuMH0sIlBhZGRpbmciOnsiJGlkIjoiMzY4IiwiVG9wIjowLjAsIkxlZnQiOjAuMCwiUmlnaHQiOjAuMCwiQm90dG9tIjowLjB9LCJCYWNrZ3JvdW5kIjpudWxsLCJJc1Zpc2libGUiOnRydWUsIldpZHRoIjowLjAsIkhlaWdodCI6MC4wLCJCb3JkZXJTdHlsZSI6bnVsbCwiUGFyZW50U3R5bGUiOm51bGx9LCJCYWNrZ3JvdW5kU3R5bGUiOnsiJGlkIjoiMzY5IiwiTWFyZ2luIjp7IiRpZCI6IjM3MCIsIlRvcCI6MC4wLCJMZWZ0IjowLjAsIlJpZ2h0IjowLjAsIkJvdHRvbSI6MC4wfSwiUGFkZGluZyI6eyIkaWQiOiIzNzEiLCJUb3AiOjAuMCwiTGVmdCI6MC4wLCJSaWdodCI6MC4wLCJCb3R0b20iOjAuMH0sIkJhY2tncm91bmQiOnsiJGlkIjoiMzcyIiwiQ29sb3IiOnsiJGlkIjoiMzczIiwiQSI6NTEsIlIiOjE2NSwiRyI6MTY1LCJCIjoxNjV9fSwiSXNWaXNpYmxlIjp0cnVlLCJXaWR0aCI6MC4wLCJIZWlnaHQiOjAuMCwiQm9yZGVyU3R5bGUiOnsiJGlkIjoiMzc0IiwiTGluZUNvbG9yIjp7IiRpZCI6IjM3NSIsIiR0eXBlIjoiTkxSRS5Db21tb24uRG9tLlNvbGlkQ29sb3JCcnVzaCwgTkxSRS5Db21tb24iLCJDb2xvciI6eyIkaWQiOiIzNzYiLCJBIjoyNTUsIlIiOjI1NSwiRyI6MCwiQiI6MH19LCJMaW5lV2VpZ2h0IjowLjAsIkxpbmVUeXBlIjowLCJQYXJlbnRTdHlsZSI6bnVsbH0sIlBhcmVudFN0eWxlIjpudWxsfSwiTWFyZ2luIjp7IiRpZCI6IjM3NyIsIlRvcCI6MC4wLCJMZWZ0IjowLjAsIlJpZ2h0IjowLjAsIkJvdHRvbSI6MC4wfSwiUGFkZGluZyI6eyIkaWQiOiIzNzgiLCJUb3AiOjAuMCwiTGVmdCI6MC4wLCJSaWdodCI6MC4wLCJCb3R0b20iOjAuMH0sIklzVmlzaWJsZSI6ZmFsc2UsIldpZHRoIjowLjAsIkhlaWdodCI6MC4wLCJCb3JkZXJTdHlsZSI6bnVsbCwiUGFyZW50U3R5bGUiOm51bGx9fV0sIklkIjoiZTIwYWM2YzMtY2EwZi00NWRkLWJiNDktNWIxOGFiYTE4YTNkIiwiSW5kZXgiOjMsIkhlYWRlclRleHQiOiJBZG1pbiBGZWF0dXJlcyIsIlN0eWxlIjp7IiRpZCI6IjM3OSIsIkhlYWRlclN0eWxlIjp7IiRpZCI6IjM4MCIsIlRleHRJc1ZlcnRpY2FsIjpmYWxzZSwiVGV4dFN0eWxlIjp7IiRpZCI6IjM4MSIsIkZvbnRTZXR0aW5ncyI6eyIkaWQiOiIzODIiLCJGb250U2l6ZSI6MTIsIkZvbnROYW1lIjoiQ2FsaWJyaSIsIklzQm9sZCI6ZmFsc2UsIklzSXRhbGljIjpmYWxzZSwiSXNVbmRlcmxpbmVkIjpmYWxzZSwiUGFyZW50U3R5bGUiOm51bGx9LCJBdXRvU2l6ZSI6MiwiRm9yZWdyb3VuZCI6eyIkcmVmIjoiMTI2In0sIk1heFdpZHRoIjoxNjAuMCwiTWF4SGVpZ2h0IjoiSW5maW5pdHkiLCJTbWFydEZvcmVncm91bmRJc0FjdGl2ZSI6ZmFsc2UsIkhvcml6b250YWxBbGlnbm1lbnQiOjAsIlZlcnRpY2FsQWxpZ25tZW50IjowLCJTbWFydEZvcmVncm91bmQiOm51bGwsIkJhY2tncm91bmRGaWxsVHlwZSI6MCwiTWFyZ2luIjp7IiRyZWYiOiIxMjgifSwiUGFkZGluZyI6eyIkcmVmIjoiMTI5In0sIkJhY2tncm91bmQiOm51bGwsIklzVmlzaWJsZSI6dHJ1ZSwiV2lkdGgiOjAuMCwiSGVpZ2h0IjowLjAsIkJvcmRlclN0eWxlIjpudWxsLCJQYXJlbnRTdHlsZSI6bnVsbH0sIlJlY3RhbmdsZVN0eWxlIjp7IiRpZCI6IjM4MyIsIk1hcmdpbiI6eyIkaWQiOiIzODQiLCJUb3AiOjAuMCwiTGVmdCI6MC4wLCJSaWdodCI6MC4wLCJCb3R0b20iOjAuMH0sIlBhZGRpbmciOnsiJGlkIjoiMzg1IiwiVG9wIjowLjAsIkxlZnQiOjAuMCwiUmlnaHQiOjAuMCwiQm90dG9tIjowLjB9LCJCYWNrZ3JvdW5kIjp7IiRpZCI6IjM4NiIsIkNvbG9yIjp7IiRpZCI6IjM4NyIsIkEiOjI1NSwiUiI6MjM3LCJHIjoxMjUsIkIiOjQ5fX0sIklzVmlzaWJsZSI6dHJ1ZSwiV2lkdGgiOjAuMCwiSGVpZ2h0IjowLjAsIkJvcmRlclN0eWxlIjp7IiRpZCI6IjM4OCIsIkxpbmVDb2xvciI6eyIkaWQiOiIzODkiLCIkdHlwZSI6Ik5MUkUuQ29tbW9uLkRvbS5Tb2xpZENvbG9yQnJ1c2gsIE5MUkUuQ29tbW9uIiwiQ29sb3IiOnsiJGlkIjoiMzkwIiwiQSI6MjU1LCJSIjoyNTUsIkciOjAsIkIiOjB9fSwiTGluZVdlaWdodCI6MC4wLCJMaW5lVHlwZSI6MCwiUGFyZW50U3R5bGUiOm51bGx9LCJQYXJlbnRTdHlsZSI6bnVsbH0sIk1hcmdpbiI6eyIkaWQiOiIzOTEiLCJUb3AiOjAuMCwiTGVmdCI6MC4wLCJSaWdodCI6MC4wLCJCb3R0b20iOjAuMH0sIlBhZGRpbmciOnsiJGlkIjoiMzkyIiwiVG9wIjowLjAsIkxlZnQiOjAuMCwiUmlnaHQiOjAuMCwiQm90dG9tIjowLjB9LCJCYWNrZ3JvdW5kIjpudWxsLCJJc1Zpc2libGUiOnRydWUsIldpZHRoIjowLjAsIkhlaWdodCI6MC4wLCJCb3JkZXJTdHlsZSI6bnVsbCwiUGFyZW50U3R5bGUiOm51bGx9LCJCYWNrZ3JvdW5kU3R5bGUiOnsiJGlkIjoiMzkzIiwiTWFyZ2luIjp7IiRpZCI6IjM5NCIsIlRvcCI6MC4wLCJMZWZ0IjowLjAsIlJpZ2h0IjowLjAsIkJvdHRvbSI6MC4wfSwiUGFkZGluZyI6eyIkaWQiOiIzOTUiLCJUb3AiOjAuMCwiTGVmdCI6MC4wLCJSaWdodCI6MC4wLCJCb3R0b20iOjAuMH0sIkJhY2tncm91bmQiOnsiJGlkIjoiMzk2IiwiQ29sb3IiOnsiJGlkIjoiMzk3IiwiQSI6NTEsIlIiOjE2NSwiRyI6MTY1LCJCIjoxNjV9fSwiSXNWaXNpYmxlIjp0cnVlLCJXaWR0aCI6MC4wLCJIZWlnaHQiOjAuMCwiQm9yZGVyU3R5bGUiOnsiJGlkIjoiMzk4IiwiTGluZUNvbG9yIjp7IiRpZCI6IjM5OSIsIiR0eXBlIjoiTkxSRS5Db21tb24uRG9tLlNvbGlkQ29sb3JCcnVzaCwgTkxSRS5Db21tb24iLCJDb2xvciI6eyIkaWQiOiI0MDAiLCJBIjoyNTUsIlIiOjI1NSwiRyI6MCwiQiI6MH19LCJMaW5lV2VpZ2h0IjowLjAsIkxpbmVUeXBlIjowLCJQYXJlbnRTdHlsZSI6bnVsbH0sIlBhcmVudFN0eWxlIjpudWxsfSwiSXNBYm92ZVRpbWViYW5kIjpmYWxzZSwiTWFyZ2luIjp7IiRpZCI6IjQwMSIsIlRvcCI6MC4wLCJMZWZ0IjowLjAsIlJpZ2h0IjowLjAsIkJvdHRvbSI6MC4wfSwiUGFkZGluZyI6eyIkaWQiOiI0MDIiLCJUb3AiOjAuMCwiTGVmdCI6MC4wLCJSaWdodCI6MC4wLCJCb3R0b20iOjAuMH0sIklzVmlzaWJsZSI6dHJ1ZSwiV2lkdGgiOjAuMCwiSGVpZ2h0IjowLjAsIkJvcmRlclN0eWxlIjp7IiRpZCI6IjQwMyIsIkxpbmVDb2xvciI6bnVsbCwiTGluZVdlaWdodCI6MC4wLCJMaW5lVHlwZSI6MCwiUGFyZW50U3R5bGUiOm51bGx9LCJQYXJlbnRTdHlsZSI6bnVsbH19LHsiJGlkIjoiNDA0IiwiX2FjdGl2aXRpZXMiOlt7IiRpZCI6IjQwNSIsIl9yb3dzIjpbeyIkaWQiOiI0MDYiLCJfdGFza3MiOlt7IiRpZCI6IjQwNyIsIl9hdHRhY2hlZE1pbGVzdG9uZXMiOltdLCJUYXNrRGVmaW5pdGlvbiI6eyIkaWQiOiI0MDgiLCJHcm91cE5hbWUiOm51bGwsIlN0YXJ0RGF0ZSI6IjIwMjItMDUtMDZUMDA6MDA6MDBaIiwiRW5kRGF0ZSI6IjIwMjItMDUtMDhUMjM6NTk6MDBaIiwiUGVyY2VudGFnZUNvbXBsZXRlIjpudWxsLCJTdHlsZSI6eyIkaWQiOiI0MDkiLCJTaGFwZSI6MiwiU2hhcGVUaGlja25lc3MiOjEsIkR1cmF0aW9uRm9ybWF0IjowLCJJbmNsdWRlTm9uV29ya2luZ0RheXNJbkR1cmF0aW9uIjpmYWxzZSwiUGVyY2VudGFnZUNvbXBsZXRlU3R5bGUiOnsiJGlkIjoiNDEwIiwiRm9udFNldHRpbmdzIjp7IiRpZCI6IjQxMSIsIkZvbnRTaXplIjoxMCwiRm9udE5hbWUiOiJDYWxpYnJpIiwiSXNCb2xkIjpmYWxzZSwiSXNJdGFsaWMiOmZhbHNlLCJJc1VuZGVybGluZWQiOmZhbHNlLCJQYXJlbnRTdHlsZSI6bnVsbH0sIkF1dG9TaXplIjowLCJGb3JlZ3JvdW5kIjp7IiRyZWYiOiIxMCJ9LCJNYXhXaWR0aCI6MjAwLjAsIk1heEhlaWdodCI6IkluZmluaXR5IiwiU21hcnRGb3JlZ3JvdW5kSXNBY3RpdmUiOmZhbHNlLCJIb3Jpem9udGFsQWxpZ25tZW50IjowLCJWZXJ0aWNhbEFsaWdubWVudCI6MCwiU21hcnRGb3JlZ3JvdW5kIjpudWxsLCJCYWNrZ3JvdW5kRmlsbFR5cGUiOjAsIk1hcmdpbiI6eyIkcmVmIjoiMTIifSwiUGFkZGluZyI6eyIkcmVmIjoiMTMifSwiQmFja2dyb3VuZCI6eyIkcmVmIjoiMTQifSwiSXNWaXNpYmxlIjp0cnVlLCJXaWR0aCI6MC4wLCJIZWlnaHQiOjAuMCwiQm9yZGVyU3R5bGUiOnsiJGlkIjoiNDEyIiwiTGluZUNvbG9yIjpudWxsLCJMaW5lV2VpZ2h0IjowLjAsIkxpbmVUeXBlIjowLCJQYXJlbnRTdHlsZSI6bnVsbH0sIlBhcmVudFN0eWxlIjpudWxsfSwiRHVyYXRpb25TdHlsZSI6eyIkaWQiOiI0MTMiLCJGb250U2V0dGluZ3MiOnsiJGlkIjoiNDE0IiwiRm9udFNpemUiOjEwLCJGb250TmFtZSI6IkNhbGlicmkiLCJJc0JvbGQiOmZhbHNlLCJJc0l0YWxpYyI6ZmFsc2UsIklzVW5kZXJsaW5lZCI6ZmFsc2UsIlBhcmVudFN0eWxlIjpudWxsfSwiQXV0b1NpemUiOjAsIkZvcmVncm91bmQiOnsiJHJlZiI6IjE5In0sIk1heFdpZHRoIjoyMDAuMCwiTWF4SGVpZ2h0IjoiSW5maW5pdHkiLCJTbWFydEZvcmVncm91bmRJc0FjdGl2ZSI6ZmFsc2UsIkhvcml6b250YWxBbGlnbm1lbnQiOjAsIlZlcnRpY2FsQWxpZ25tZW50IjowLCJTbWFydEZvcmVncm91bmQiOm51bGwsIkJhY2tncm91bmRGaWxsVHlwZSI6MCwiTWFyZ2luIjp7IiRyZWYiOiIyMSJ9LCJQYWRkaW5nIjp7IiRyZWYiOiIyMiJ9LCJCYWNrZ3JvdW5kIjp7IiRyZWYiOiIyMyJ9LCJJc1Zpc2libGUiOnRydWUsIldpZHRoIjowLjAsIkhlaWdodCI6MC4wLCJCb3JkZXJTdHlsZSI6eyIkaWQiOiI0MTUiLCJMaW5lQ29sb3IiOm51bGwsIkxpbmVXZWlnaHQiOjAuMCwiTGluZVR5cGUiOjAsIlBhcmVudFN0eWxlIjpudWxsfSwiUGFyZW50U3R5bGUiOm51bGx9LCJIb3Jpem9udGFsQ29ubmVjdG9yU3R5bGUiOnsiJGlkIjoiNDE2IiwiTGluZUNvbG9yIjp7IiRyZWYiOiIyNiJ9LCJMaW5lV2VpZ2h0IjoxLjAsIkxpbmVUeXBlIjowLCJQYXJlbnRTdHlsZSI6bnVsbH0sIlZlcnRpY2FsQ29ubmVjdG9yU3R5bGUiOnsiJGlkIjoiNDE3IiwiTGluZUNvbG9yIjp7IiRyZWYiOiIyOSJ9LCJMaW5lV2VpZ2h0IjowLjAsIkxpbmVUeXBlIjowLCJQYXJlbnRTdHlsZSI6bnVsbH0sIk1hcmdpbiI6bnVsbCwiU3RhcnREYXRlUG9zaXRpb24iOjMsIkVuZERhdGVQb3NpdGlvbiI6NCwiRGF0ZUlzVmlzaWJsZSI6dHJ1ZSwiVGl0bGVQb3NpdGlvbiI6MiwiRHVyYXRpb25Qb3NpdGlvbiI6NiwiUGVyY2VudGFnZUNvbXBsZXRlZFBvc2l0aW9uIjo2LCJTcGFjaW5nIjo1LCJJc0JlbG93VGltZWJhbmQiOnRydWUsIlBlcmNlbnRhZ2VDb21wbGV0ZVNoYXBlT3BhY2l0eSI6MzUsIlNoYXBlU3R5bGUiOnsiJGlkIjoiNDE4IiwiTWFyZ2luIjp7IiRyZWYiOiIzMiJ9LCJQYWRkaW5nIjp7IiRyZWYiOiIzMyJ9LCJCYWNrZ3JvdW5kIjp7IiRpZCI6IjQxOSIsIkNvbG9yIjp7IiRpZCI6IjQyMCIsIkEiOjI1NSwiUiI6OTEsIkciOjE1NSwiQiI6MjEzfX0sIklzVmlzaWJsZSI6dHJ1ZSwiV2lkdGgiOjAuMCwiSGVpZ2h0IjoxNi4wLCJCb3JkZXJTdHlsZSI6eyIkaWQiOiI0MjEiLCJMaW5lQ29sb3IiOnsiJHJlZiI6IjM3In0sIkxpbmVXZWlnaHQiOjAuMCwiTGluZVR5cGUiOjAsIlBhcmVudFN0eWxlIjpudWxsfSwiUGFyZW50U3R5bGUiOm51bGx9LCJUaXRsZVN0eWxlIjp7IiRpZCI6IjQyMiIsIkZvbnRTZXR0aW5ncyI6eyIkaWQiOiI0MjMiLCJGb250U2l6ZSI6MTEsIkZvbnROYW1lIjoiQ2FsaWJyaSIsIklzQm9sZCI6dHJ1ZSwiSXNJdGFsaWMiOmZhbHNlLCJJc1VuZGVybGluZWQiOmZhbHNlLCJQYXJlbnRTdHlsZSI6bnVsbH0sIkF1dG9TaXplIjowLCJGb3JlZ3JvdW5kIjp7IiRpZCI6IjQyNCIsIkNvbG9yIjp7IiRpZCI6IjQyNSIsIkEiOjI1NSwiUiI6MCwiRyI6MCwiQiI6MH19LCJNYXhXaWR0aCI6NzIwLjAsIk1heEhlaWdodCI6IkluZmluaXR5IiwiU21hcnRGb3JlZ3JvdW5kSXNBY3RpdmUiOmZhbHNlLCJIb3Jpem9udGFsQWxpZ25tZW50IjoxLCJWZXJ0aWNhbEFsaWdubWVudCI6MCwiU21hcnRGb3JlZ3JvdW5kIjpudWxsLCJCYWNrZ3JvdW5kRmlsbFR5cGUiOjAsIk1hcmdpbiI6eyIkcmVmIjoiNDMifSwiUGFkZGluZyI6eyIkcmVmIjoiNDQifSwiQmFja2dyb3VuZCI6eyIkaWQiOiI0MjYiLCJDb2xvciI6eyIkaWQiOiI0MjciLCJBIjowLCJSIjoyNTUsIkciOjI1NSwiQiI6MjU1fX0sIklzVmlzaWJsZSI6dHJ1ZSwiV2lkdGgiOjAuMCwiSGVpZ2h0IjowLjAsIkJvcmRlclN0eWxlIjp7IiRpZCI6IjQyOCIsIkxpbmVDb2xvciI6bnVsbCwiTGluZVdlaWdodCI6MC4wLCJMaW5lVHlwZSI6MCwiUGFyZW50U3R5bGUiOm51bGx9LCJQYXJlbnRTdHlsZSI6bnVsbH0sIkRhdGVTdHlsZSI6eyIkaWQiOiI0MjkiLCJGb250U2V0dGluZ3MiOnsiJGlkIjoiNDMwIiwiRm9udFNpemUiOjEwLCJGb250TmFtZSI6IkNhbGlicmkiLCJJc0JvbGQiOmZhbHNlLCJJc0l0YWxpYyI6ZmFsc2UsIklzVW5kZXJsaW5lZCI6ZmFsc2UsIlBhcmVudFN0eWxlIjpudWxsfSwiQXV0b1NpemUiOjAsIkZvcmVncm91bmQiOnsiJGlkIjoiNDMxIiwiQ29sb3IiOnsiJGlkIjoiNDMyIiwiQSI6MjU1LCJSIjo2OCwiRyI6ODQsIkIiOjEwNn19LCJNYXhXaWR0aCI6MjAwLjAsIk1heEhlaWdodCI6IkluZmluaXR5IiwiU21hcnRGb3JlZ3JvdW5kSXNBY3RpdmUiOmZhbHNlLCJIb3Jpem9udGFsQWxpZ25tZW50IjoxLCJWZXJ0aWNhbEFsaWdubWVudCI6MCwiU21hcnRGb3JlZ3JvdW5kIjpudWxsLCJCYWNrZ3JvdW5kRmlsbFR5cGUiOjAsIk1hcmdpbiI6eyIkcmVmIjoiNTIifSwiUGFkZGluZyI6eyIkcmVmIjoiNTMifSwiQmFja2dyb3VuZCI6eyIkaWQiOiI0MzMiLCJDb2xvciI6eyIkaWQiOiI0MzQiLCJBIjowLCJSIjoyNTUsIkciOjI1NSwiQiI6MjU1fX0sIklzVmlzaWJsZSI6dHJ1ZSwiV2lkdGgiOjAuMCwiSGVpZ2h0IjowLjAsIkJvcmRlclN0eWxlIjp7IiRpZCI6IjQzNSIsIkxpbmVDb2xvciI6bnVsbCwiTGluZVdlaWdodCI6MC4wLCJMaW5lVHlwZSI6MCwiUGFyZW50U3R5bGUiOm51bGx9LCJQYXJlbnRTdHlsZSI6bnVsbH0sIkRhdGVGb3JtYXQiOnsiJHJlZiI6IjU3In0sIldlZWtOdW1iZXJpbmciOnsiJGlkIjoiNDM2IiwiRm9ybWF0IjowLCJJc1Zpc2libGUiOmZhbHNlLCJMYXN0S25vd25WaXNpYmlsaXR5U3RhdGUiOmZhbHNlfSwiSXNWaXNpYmxlIjp0cnVlLCJQYXJlbnRTdHlsZSI6bnVsbH0sIkluZGV4IjoxMSwiU21hcnREdXJhdGlvbkFjdGl2YXRlZCI6ZmFsc2UsIkRhdGVGb3JtYXQiOnsiJHJlZiI6IjU3In0sIldlZWtOdW1iZXJpbmciOnsiJGlkIjoiNDM3IiwiRm9ybWF0IjowLCJJc1Zpc2libGUiOmZhbHNlLCJMYXN0S25vd25WaXNpYmlsaXR5U3RhdGUiOmZhbHNlfSwiSWQiOiI0OTFhNWQ3Yy1kMmM5LTQyMmYtOWZhMy1jNmEzYjY2ZmEwZGIiLCJJbXBvcnRJZCI6bnVsbCwiVGl0bGUiOiJVc2VyIEhvbWUgUGFnZSIsIk5vdGUiOm51bGwsIkh5cGVybGluayI6eyIkaWQiOiI0MzgiLCJBZGRyZXNzIjoiIiwiU3ViQWRkcmVzcyI6IiJ9LCJJc0NoYW5nZWQiOmZhbHNlLCJJc05ldyI6ZmFsc2V9fV0sIl9taWxlc3RvbmVzIjpbXSwiSWQiOiIwMDAwMDAwMC0wMDAwLTAwMDAtMDAwMC0wMDAwMDAwMDAwMDAiLCJJc1NpbmdsZUl0ZW1Sb3ciOnRydWV9LHsiJGlkIjoiNDM5IiwiX3Rhc2tzIjpbeyIkaWQiOiI0NDAiLCJfYXR0YWNoZWRNaWxlc3RvbmVzIjpbXSwiVGFza0RlZmluaXRpb24iOnsiJGlkIjoiNDQxIiwiR3JvdXBOYW1lIjpudWxsLCJTdGFydERhdGUiOiIyMDIyLTA1LTA5VDAwOjAwOjAwWiIsIkVuZERhdGUiOiIyMDIyLTA1LTEzVDIzOjU5OjAwWiIsIlBlcmNlbnRhZ2VDb21wbGV0ZSI6bnVsbCwiU3R5bGUiOnsiJGlkIjoiNDQyIiwiU2hhcGUiOjIsIlNoYXBlVGhpY2tuZXNzIjoxLCJEdXJhdGlvbkZvcm1hdCI6MCwiSW5jbHVkZU5vbldvcmtpbmdEYXlzSW5EdXJhdGlvbiI6ZmFsc2UsIlBlcmNlbnRhZ2VDb21wbGV0ZVN0eWxlIjp7IiRpZCI6IjQ0MyIsIkZvbnRTZXR0aW5ncyI6eyIkaWQiOiI0NDQiLCJGb250U2l6ZSI6MTAsIkZvbnROYW1lIjoiQ2FsaWJyaSIsIklzQm9sZCI6ZmFsc2UsIklzSXRhbGljIjpmYWxzZSwiSXNVbmRlcmxpbmVkIjpmYWxzZSwiUGFyZW50U3R5bGUiOm51bGx9LCJBdXRvU2l6ZSI6MCwiRm9yZWdyb3VuZCI6eyIkcmVmIjoiMTAifSwiTWF4V2lkdGgiOjIwMC4wLCJNYXhIZWlnaHQiOiJJbmZpbml0eSIsIlNtYXJ0Rm9yZWdyb3VuZElzQWN0aXZlIjpmYWxzZSwiSG9yaXpvbnRhbEFsaWdubWVudCI6MCwiVmVydGljYWxBbGlnbm1lbnQiOjAsIlNtYXJ0Rm9yZWdyb3VuZCI6bnVsbCwiQmFja2dyb3VuZEZpbGxUeXBlIjowLCJNYXJnaW4iOnsiJHJlZiI6IjEyIn0sIlBhZGRpbmciOnsiJHJlZiI6IjEzIn0sIkJhY2tncm91bmQiOnsiJHJlZiI6IjE0In0sIklzVmlzaWJsZSI6dHJ1ZSwiV2lkdGgiOjAuMCwiSGVpZ2h0IjowLjAsIkJvcmRlclN0eWxlIjp7IiRpZCI6IjQ0NSIsIkxpbmVDb2xvciI6bnVsbCwiTGluZVdlaWdodCI6MC4wLCJMaW5lVHlwZSI6MCwiUGFyZW50U3R5bGUiOm51bGx9LCJQYXJlbnRTdHlsZSI6bnVsbH0sIkR1cmF0aW9uU3R5bGUiOnsiJGlkIjoiNDQ2IiwiRm9udFNldHRpbmdzIjp7IiRpZCI6IjQ0NyIsIkZvbnRTaXplIjoxMCwiRm9udE5hbWUiOiJDYWxpYnJpIiwiSXNCb2xkIjpmYWxzZSwiSXNJdGFsaWMiOmZhbHNlLCJJc1VuZGVybGluZWQiOmZhbHNlLCJQYXJlbnRTdHlsZSI6bnVsbH0sIkF1dG9TaXplIjowLCJGb3JlZ3JvdW5kIjp7IiRyZWYiOiIxOSJ9LCJNYXhXaWR0aCI6MjAwLjAsIk1heEhlaWdodCI6IkluZmluaXR5IiwiU21hcnRGb3JlZ3JvdW5kSXNBY3RpdmUiOmZhbHNlLCJIb3Jpem9udGFsQWxpZ25tZW50IjowLCJWZXJ0aWNhbEFsaWdubWVudCI6MCwiU21hcnRGb3JlZ3JvdW5kIjpudWxsLCJCYWNrZ3JvdW5kRmlsbFR5cGUiOjAsIk1hcmdpbiI6eyIkcmVmIjoiMjEifSwiUGFkZGluZyI6eyIkcmVmIjoiMjIifSwiQmFja2dyb3VuZCI6eyIkcmVmIjoiMjMifSwiSXNWaXNpYmxlIjp0cnVlLCJXaWR0aCI6MC4wLCJIZWlnaHQiOjAuMCwiQm9yZGVyU3R5bGUiOnsiJGlkIjoiNDQ4IiwiTGluZUNvbG9yIjpudWxsLCJMaW5lV2VpZ2h0IjowLjAsIkxpbmVUeXBlIjowLCJQYXJlbnRTdHlsZSI6bnVsbH0sIlBhcmVudFN0eWxlIjpudWxsfSwiSG9yaXpvbnRhbENvbm5lY3RvclN0eWxlIjp7IiRpZCI6IjQ0OSIsIkxpbmVDb2xvciI6eyIkcmVmIjoiMjYifSwiTGluZVdlaWdodCI6MS4wLCJMaW5lVHlwZSI6MCwiUGFyZW50U3R5bGUiOm51bGx9LCJWZXJ0aWNhbENvbm5lY3RvclN0eWxlIjp7IiRpZCI6IjQ1MCIsIkxpbmVDb2xvciI6eyIkcmVmIjoiMjkifSwiTGluZVdlaWdodCI6MC4wLCJMaW5lVHlwZSI6MCwiUGFyZW50U3R5bGUiOm51bGx9LCJNYXJnaW4iOm51bGwsIlN0YXJ0RGF0ZVBvc2l0aW9uIjozLCJFbmREYXRlUG9zaXRpb24iOjQsIkRhdGVJc1Zpc2libGUiOnRydWUsIlRpdGxlUG9zaXRpb24iOjIsIkR1cmF0aW9uUG9zaXRpb24iOjYsIlBlcmNlbnRhZ2VDb21wbGV0ZWRQb3NpdGlvbiI6NiwiU3BhY2luZyI6NSwiSXNCZWxvd1RpbWViYW5kIjp0cnVlLCJQZXJjZW50YWdlQ29tcGxldGVTaGFwZU9wYWNpdHkiOjM1LCJTaGFwZVN0eWxlIjp7IiRpZCI6IjQ1MSIsIk1hcmdpbiI6eyIkcmVmIjoiMzIifSwiUGFkZGluZyI6eyIkcmVmIjoiMzMifSwiQmFja2dyb3VuZCI6eyIkaWQiOiI0NTIiLCJDb2xvciI6eyIkaWQiOiI0NTMiLCJBIjoyNTUsIlIiOjkxLCJHIjoxNTUsIkIiOjIxM319LCJJc1Zpc2libGUiOnRydWUsIldpZHRoIjowLjAsIkhlaWdodCI6MTYuMCwiQm9yZGVyU3R5bGUiOnsiJGlkIjoiNDU0IiwiTGluZUNvbG9yIjp7IiRyZWYiOiIzNyJ9LCJMaW5lV2VpZ2h0IjowLjAsIkxpbmVUeXBlIjowLCJQYXJlbnRTdHlsZSI6bnVsbH0sIlBhcmVudFN0eWxlIjpudWxsfSwiVGl0bGVTdHlsZSI6eyIkaWQiOiI0NTUiLCJGb250U2V0dGluZ3MiOnsiJGlkIjoiNDU2IiwiRm9udFNpemUiOjExLCJGb250TmFtZSI6IkNhbGlicmkiLCJJc0JvbGQiOnRydWUsIklzSXRhbGljIjpmYWxzZSwiSXNVbmRlcmxpbmVkIjpmYWxzZSwiUGFyZW50U3R5bGUiOm51bGx9LCJBdXRvU2l6ZSI6MCwiRm9yZWdyb3VuZCI6eyIkaWQiOiI0NTciLCJDb2xvciI6eyIkaWQiOiI0NTgiLCJBIjoyNTUsIlIiOjAsIkciOjAsIkIiOjB9fSwiTWF4V2lkdGgiOjcyMC4wLCJNYXhIZWlnaHQiOiJJbmZpbml0eSIsIlNtYXJ0Rm9yZWdyb3VuZElzQWN0aXZlIjpmYWxzZSwiSG9yaXpvbnRhbEFsaWdubWVudCI6MSwiVmVydGljYWxBbGlnbm1lbnQiOjAsIlNtYXJ0Rm9yZWdyb3VuZCI6bnVsbCwiQmFja2dyb3VuZEZpbGxUeXBlIjowLCJNYXJnaW4iOnsiJHJlZiI6IjQzIn0sIlBhZGRpbmciOnsiJHJlZiI6IjQ0In0sIkJhY2tncm91bmQiOnsiJGlkIjoiNDU5IiwiQ29sb3IiOnsiJGlkIjoiNDYwIiwiQSI6MCwiUiI6MjU1LCJHIjoyNTUsIkIiOjI1NX19LCJJc1Zpc2libGUiOnRydWUsIldpZHRoIjowLjAsIkhlaWdodCI6MC4wLCJCb3JkZXJTdHlsZSI6eyIkaWQiOiI0NjEiLCJMaW5lQ29sb3IiOm51bGwsIkxpbmVXZWlnaHQiOjAuMCwiTGluZVR5cGUiOjAsIlBhcmVudFN0eWxlIjpudWxsfSwiUGFyZW50U3R5bGUiOm51bGx9LCJEYXRlU3R5bGUiOnsiJGlkIjoiNDYyIiwiRm9udFNldHRpbmdzIjp7IiRpZCI6IjQ2MyIsIkZvbnRTaXplIjoxMCwiRm9udE5hbWUiOiJDYWxpYnJpIiwiSXNCb2xkIjpmYWxzZSwiSXNJdGFsaWMiOmZhbHNlLCJJc1VuZGVybGluZWQiOmZhbHNlLCJQYXJlbnRTdHlsZSI6bnVsbH0sIkF1dG9TaXplIjowLCJGb3JlZ3JvdW5kIjp7IiRpZCI6IjQ2NCIsIkNvbG9yIjp7IiRpZCI6IjQ2NSIsIkEiOjI1NSwiUiI6NjgsIkciOjg0LCJCIjoxMDZ9fSwiTWF4V2lkdGgiOjIwMC4wLCJNYXhIZWlnaHQiOiJJbmZpbml0eSIsIlNtYXJ0Rm9yZWdyb3VuZElzQWN0aXZlIjpmYWxzZSwiSG9yaXpvbnRhbEFsaWdubWVudCI6MSwiVmVydGljYWxBbGlnbm1lbnQiOjAsIlNtYXJ0Rm9yZWdyb3VuZCI6bnVsbCwiQmFja2dyb3VuZEZpbGxUeXBlIjowLCJNYXJnaW4iOnsiJHJlZiI6IjUyIn0sIlBhZGRpbmciOnsiJHJlZiI6IjUzIn0sIkJhY2tncm91bmQiOnsiJGlkIjoiNDY2IiwiQ29sb3IiOnsiJGlkIjoiNDY3IiwiQSI6MCwiUiI6MjU1LCJHIjoyNTUsIkIiOjI1NX19LCJJc1Zpc2libGUiOnRydWUsIldpZHRoIjowLjAsIkhlaWdodCI6MC4wLCJCb3JkZXJTdHlsZSI6eyIkaWQiOiI0NjgiLCJMaW5lQ29sb3IiOm51bGwsIkxpbmVXZWlnaHQiOjAuMCwiTGluZVR5cGUiOjAsIlBhcmVudFN0eWxlIjpudWxsfSwiUGFyZW50U3R5bGUiOm51bGx9LCJEYXRlRm9ybWF0Ijp7IiRyZWYiOiI1NyJ9LCJXZWVrTnVtYmVyaW5nIjp7IiRpZCI6IjQ2OSIsIkZvcm1hdCI6MCwiSXNWaXNpYmxlIjpmYWxzZSwiTGFzdEtub3duVmlzaWJpbGl0eVN0YXRlIjpmYWxzZX0sIklzVmlzaWJsZSI6dHJ1ZSwiUGFyZW50U3R5bGUiOm51bGx9LCJJbmRleCI6MTIsIlNtYXJ0RHVyYXRpb25BY3RpdmF0ZWQiOmZhbHNlLCJEYXRlRm9ybWF0Ijp7IiRyZWYiOiI1NyJ9LCJXZWVrTnVtYmVyaW5nIjp7IiRpZCI6IjQ3MCIsIkZvcm1hdCI6MCwiSXNWaXNpYmxlIjpmYWxzZSwiTGFzdEtub3duVmlzaWJpbGl0eVN0YXRlIjpmYWxzZX0sIklkIjoiMTk2ZTQ2MWYtYTNiOS00YmVkLThiYzUtNmRjOTllNjc2ZGViIiwiSW1wb3J0SWQiOm51bGwsIlRpdGxlIjoiQ2FyIFJlc2VydmF0aW9uIiwiTm90ZSI6bnVsbCwiSHlwZXJsaW5rIjp7IiRpZCI6IjQ3MSIsIkFkZHJlc3MiOiIiLCJTdWJBZGRyZXNzIjoiIn0sIklzQ2hhbmdlZCI6ZmFsc2UsIklzTmV3IjpmYWxzZX19XSwiX21pbGVzdG9uZXMiOltdLCJJZCI6IjAwMDAwMDAwLTAwMDAtMDAwMC0wMDAwLTAwMDAwMDAwMDAwMCIsIklzU2luZ2xlSXRlbVJvdyI6dHJ1ZX1dLCJJbmRleCI6MTAsIklkIjoiMmU2Y2QxM2ItOTkzNC00NTNmLTk1NjktYzA0ZTVlNjVhNmViIiwiSGVhZGVyVGV4dCI6bnVsbCwiSXNEZWZhdWx0Ijp0cnVlLCJTdHlsZSI6eyIkaWQiOiI0NzIiLCJIZWFkZXJTdHlsZSI6eyIkaWQiOiI0NzMiLCJUZXh0U3R5bGUiOnsiJGlkIjoiNDc0IiwiRm9udFNldHRpbmdzIjp7IiRpZCI6IjQ3NSIsIkZvbnRTaXplIjoxMSwiRm9udE5hbWUiOiJDYWxpYnJpIiwiSXNCb2xkIjpmYWxzZSwiSXNJdGFsaWMiOmZhbHNlLCJJc1VuZGVybGluZWQiOmZhbHNlLCJQYXJlbnRTdHlsZSI6bnVsbH0sIkF1dG9TaXplIjoyLCJGb3JlZ3JvdW5kIjp7IiRpZCI6IjQ3NiIsIkNvbG9yIjp7IiRpZCI6IjQ3NyIsIkEiOjI1NSwiUiI6MCwiRyI6MCwiQiI6MH19LCJNYXhXaWR0aCI6MC4wLCJNYXhIZWlnaHQiOiJJbmZpbml0eSIsIlNtYXJ0Rm9yZWdyb3VuZElzQWN0aXZlIjpmYWxzZSwiSG9yaXpvbnRhbEFsaWdubWVudCI6MCwiVmVydGljYWxBbGlnbm1lbnQiOjAsIlNtYXJ0Rm9yZWdyb3VuZCI6bnVsbCwiQmFja2dyb3VuZEZpbGxUeXBlIjowLCJNYXJnaW4iOnsiJGlkIjoiNDc4IiwiVG9wIjowLjAsIkxlZnQiOjAuMCwiUmlnaHQiOjAuMCwiQm90dG9tIjowLjB9LCJQYWRkaW5nIjp7IiRpZCI6IjQ3OSIsIlRvcCI6MC4wLCJMZWZ0IjowLjAsIlJpZ2h0IjowLjAsIkJvdHRvbSI6MC4wfSwiQmFja2dyb3VuZCI6bnVsbCwiSXNWaXNpYmxlIjp0cnVlLCJXaWR0aCI6MC4wLCJIZWlnaHQiOjAuMCwiQm9yZGVyU3R5bGUiOm51bGwsIlBhcmVudFN0eWxlIjpudWxsfSwiUmVjdGFuZ2xlU3R5bGUiOnsiJGlkIjoiNDgwIiwiTWFyZ2luIjp7IiRpZCI6IjQ4MSIsIlRvcCI6MC4wLCJMZWZ0IjowLjAsIlJpZ2h0IjowLjAsIkJvdHRvbSI6MC4wfSwiUGFkZGluZyI6eyIkaWQiOiI0ODIiLCJUb3AiOjAuMCwiTGVmdCI6MC4wLCJSaWdodCI6MC4wLCJCb3R0b20iOjAuMH0sIkJhY2tncm91bmQiOnsiJGlkIjoiNDgzIiwiQ29sb3IiOnsiJGlkIjoiNDg0IiwiQSI6NjMsIlIiOjE2NSwiRyI6MTY1LCJCIjoxNjV9fSwiSXNWaXNpYmxlIjp0cnVlLCJXaWR0aCI6MC4wLCJIZWlnaHQiOjAuMCwiQm9yZGVyU3R5bGUiOnsiJGlkIjoiNDg1IiwiTGluZUNvbG9yIjp7IiRpZCI6IjQ4NiIsIiR0eXBlIjoiTkxSRS5Db21tb24uRG9tLlNvbGlkQ29sb3JCcnVzaCwgTkxSRS5Db21tb24iLCJDb2xvciI6eyIkaWQiOiI0ODciLCJBIjoyNTUsIlIiOjI1NSwiRyI6MCwiQiI6MH19LCJMaW5lV2VpZ2h0IjowLjAsIkxpbmVUeXBlIjowLCJQYXJlbnRTdHlsZSI6bnVsbH0sIlBhcmVudFN0eWxlIjpudWxsfSwiTWFyZ2luIjp7IiRpZCI6IjQ4OCIsIlRvcCI6MC4wLCJMZWZ0IjowLjAsIlJpZ2h0IjowLjAsIkJvdHRvbSI6MC4wfSwiUGFkZGluZyI6eyIkaWQiOiI0ODkiLCJUb3AiOjAuMCwiTGVmdCI6MC4wLCJSaWdodCI6MC4wLCJCb3R0b20iOjAuMH0sIkJhY2tncm91bmQiOm51bGwsIklzVmlzaWJsZSI6dHJ1ZSwiV2lkdGgiOjAuMCwiSGVpZ2h0IjowLjAsIkJvcmRlclN0eWxlIjpudWxsLCJQYXJlbnRTdHlsZSI6bnVsbH0sIkJhY2tncm91bmRTdHlsZSI6eyIkaWQiOiI0OTAiLCJNYXJnaW4iOnsiJGlkIjoiNDkxIiwiVG9wIjowLjAsIkxlZnQiOjAuMCwiUmlnaHQiOjAuMCwiQm90dG9tIjowLjB9LCJQYWRkaW5nIjp7IiRpZCI6IjQ5MiIsIlRvcCI6MC4wLCJMZWZ0IjowLjAsIlJpZ2h0IjowLjAsIkJvdHRvbSI6MC4wfSwiQmFja2dyb3VuZCI6eyIkaWQiOiI0OTMiLCJDb2xvciI6eyIkaWQiOiI0OTQiLCJBIjo1MSwiUiI6MTY1LCJHIjoxNjUsIkIiOjE2NX19LCJJc1Zpc2libGUiOnRydWUsIldpZHRoIjowLjAsIkhlaWdodCI6MC4wLCJCb3JkZXJTdHlsZSI6eyIkaWQiOiI0OTUiLCJMaW5lQ29sb3IiOnsiJGlkIjoiNDk2IiwiJHR5cGUiOiJOTFJFLkNvbW1vbi5Eb20uU29saWRDb2xvckJydXNoLCBOTFJFLkNvbW1vbiIsIkNvbG9yIjp7IiRpZCI6IjQ5NyIsIkEiOjI1NSwiUiI6MjU1LCJHIjowLCJCIjowfX0sIkxpbmVXZWlnaHQiOjAuMCwiTGluZVR5cGUiOjAsIlBhcmVudFN0eWxlIjpudWxsfSwiUGFyZW50U3R5bGUiOm51bGx9LCJNYXJnaW4iOnsiJGlkIjoiNDk4IiwiVG9wIjowLjAsIkxlZnQiOjAuMCwiUmlnaHQiOjAuMCwiQm90dG9tIjowLjB9LCJQYWRkaW5nIjp7IiRpZCI6IjQ5OSIsIlRvcCI6MC4wLCJMZWZ0IjowLjAsIlJpZ2h0IjowLjAsIkJvdHRvbSI6MC4wfSwiSXNWaXNpYmxlIjpmYWxzZSwiV2lkdGgiOjAuMCwiSGVpZ2h0IjowLjAsIkJvcmRlclN0eWxlIjpudWxsLCJQYXJlbnRTdHlsZSI6bnVsbH19XSwiSWQiOiJmODM4MTRkNC1kYjVmLTQ0NDYtYTY4Ni1iZjY4MDZhN2ZlYzkiLCJJbmRleCI6MTAsIkhlYWRlclRleHQiOiJVc2VyIEZlYXR1cmVzIiwiU3R5bGUiOnsiJGlkIjoiNTAwIiwiSGVhZGVyU3R5bGUiOnsiJGlkIjoiNTAxIiwiVGV4dElzVmVydGljYWwiOmZhbHNlLCJUZXh0U3R5bGUiOnsiJGlkIjoiNTAyIiwiRm9udFNldHRpbmdzIjp7IiRpZCI6IjUwMyIsIkZvbnRTaXplIjoxMiwiRm9udE5hbWUiOiJDYWxpYnJpIiwiSXNCb2xkIjpmYWxzZSwiSXNJdGFsaWMiOmZhbHNlLCJJc1VuZGVybGluZWQiOmZhbHNlLCJQYXJlbnRTdHlsZSI6bnVsbH0sIkF1dG9TaXplIjoyLCJGb3JlZ3JvdW5kIjp7IiRyZWYiOiIxMjYifSwiTWF4V2lkdGgiOjE2MC4wLCJNYXhIZWlnaHQiOiJJbmZpbml0eSIsIlNtYXJ0Rm9yZWdyb3VuZElzQWN0aXZlIjpmYWxzZSwiSG9yaXpvbnRhbEFsaWdubWVudCI6MCwiVmVydGljYWxBbGlnbm1lbnQiOjAsIlNtYXJ0Rm9yZWdyb3VuZCI6bnVsbCwiQmFja2dyb3VuZEZpbGxUeXBlIjowLCJNYXJnaW4iOnsiJHJlZiI6IjEyOCJ9LCJQYWRkaW5nIjp7IiRyZWYiOiIxMjkifSwiQmFja2dyb3VuZCI6bnVsbCwiSXNWaXNpYmxlIjp0cnVlLCJXaWR0aCI6MC4wLCJIZWlnaHQiOjAuMCwiQm9yZGVyU3R5bGUiOm51bGwsIlBhcmVudFN0eWxlIjpudWxsfSwiUmVjdGFuZ2xlU3R5bGUiOnsiJGlkIjoiNTA0IiwiTWFyZ2luIjp7IiRpZCI6IjUwNSIsIlRvcCI6MC4wLCJMZWZ0IjowLjAsIlJpZ2h0IjowLjAsIkJvdHRvbSI6MC4wfSwiUGFkZGluZyI6eyIkaWQiOiI1MDYiLCJUb3AiOjAuMCwiTGVmdCI6MC4wLCJSaWdodCI6MC4wLCJCb3R0b20iOjAuMH0sIkJhY2tncm91bmQiOnsiJGlkIjoiNTA3IiwiQ29sb3IiOnsiJGlkIjoiNTA4IiwiQSI6MjU1LCJSIjoxNjUsIkciOjE2NSwiQiI6MTY1fX0sIklzVmlzaWJsZSI6dHJ1ZSwiV2lkdGgiOjAuMCwiSGVpZ2h0IjowLjAsIkJvcmRlclN0eWxlIjp7IiRpZCI6IjUwOSIsIkxpbmVDb2xvciI6eyIkaWQiOiI1MTAiLCIkdHlwZSI6Ik5MUkUuQ29tbW9uLkRvbS5Tb2xpZENvbG9yQnJ1c2gsIE5MUkUuQ29tbW9uIiwiQ29sb3IiOnsiJGlkIjoiNTExIiwiQSI6MjU1LCJSIjoyNTUsIkciOjAsIkIiOjB9fSwiTGluZVdlaWdodCI6MC4wLCJMaW5lVHlwZSI6MCwiUGFyZW50U3R5bGUiOm51bGx9LCJQYXJlbnRTdHlsZSI6bnVsbH0sIk1hcmdpbiI6eyIkaWQiOiI1MTIiLCJUb3AiOjAuMCwiTGVmdCI6MC4wLCJSaWdodCI6MC4wLCJCb3R0b20iOjAuMH0sIlBhZGRpbmciOnsiJGlkIjoiNTEzIiwiVG9wIjowLjAsIkxlZnQiOjAuMCwiUmlnaHQiOjAuMCwiQm90dG9tIjowLjB9LCJCYWNrZ3JvdW5kIjpudWxsLCJJc1Zpc2libGUiOnRydWUsIldpZHRoIjowLjAsIkhlaWdodCI6MC4wLCJCb3JkZXJTdHlsZSI6bnVsbCwiUGFyZW50U3R5bGUiOm51bGx9LCJCYWNrZ3JvdW5kU3R5bGUiOnsiJGlkIjoiNTE0IiwiTWFyZ2luIjp7IiRpZCI6IjUxNSIsIlRvcCI6MC4wLCJMZWZ0IjowLjAsIlJpZ2h0IjowLjAsIkJvdHRvbSI6MC4wfSwiUGFkZGluZyI6eyIkaWQiOiI1MTYiLCJUb3AiOjAuMCwiTGVmdCI6MC4wLCJSaWdodCI6MC4wLCJCb3R0b20iOjAuMH0sIkJhY2tncm91bmQiOnsiJGlkIjoiNTE3IiwiQ29sb3IiOnsiJGlkIjoiNTE4IiwiQSI6NTEsIlIiOjE2NSwiRyI6MTY1LCJCIjoxNjV9fSwiSXNWaXNpYmxlIjp0cnVlLCJXaWR0aCI6MC4wLCJIZWlnaHQiOjAuMCwiQm9yZGVyU3R5bGUiOnsiJGlkIjoiNTE5IiwiTGluZUNvbG9yIjp7IiRpZCI6IjUyMCIsIiR0eXBlIjoiTkxSRS5Db21tb24uRG9tLlNvbGlkQ29sb3JCcnVzaCwgTkxSRS5Db21tb24iLCJDb2xvciI6eyIkaWQiOiI1MjEiLCJBIjoyNTUsIlIiOjI1NSwiRyI6MCwiQiI6MH19LCJMaW5lV2VpZ2h0IjowLjAsIkxpbmVUeXBlIjowLCJQYXJlbnRTdHlsZSI6bnVsbH0sIlBhcmVudFN0eWxlIjpudWxsfSwiSXNBYm92ZVRpbWViYW5kIjpmYWxzZSwiTWFyZ2luIjp7IiRpZCI6IjUyMiIsIlRvcCI6MC4wLCJMZWZ0IjowLjAsIlJpZ2h0IjowLjAsIkJvdHRvbSI6MC4wfSwiUGFkZGluZyI6eyIkaWQiOiI1MjMiLCJUb3AiOjAuMCwiTGVmdCI6MC4wLCJSaWdodCI6MC4wLCJCb3R0b20iOjAuMH0sIklzVmlzaWJsZSI6dHJ1ZSwiV2lkdGgiOjAuMCwiSGVpZ2h0IjowLjAsIkJvcmRlclN0eWxlIjp7IiRpZCI6IjUyNCIsIkxpbmVDb2xvciI6bnVsbCwiTGluZVdlaWdodCI6MC4wLCJMaW5lVHlwZSI6MCwiUGFyZW50U3R5bGUiOm51bGx9LCJQYXJlbnRTdHlsZSI6bnVsbH19XSwiQ3VsdHVyZUluZm9OYW1lIjoiZW4tVVMiLCJTdHlsZU5hbWUiOm51bGwsIlZlcnNpb24iOnsiJGlkIjoiNTI1IiwiVmVyc2lvbiI6IjMuNi4xIiwiT3JpZ2luYWxBc3NlbWJseVZlcnNpb24iOiI2LjA2LjAyLjAwIiwiRWRpdGlvbiI6bnVsbCwiTGFzdFNhdmVkRWRpdGlvbiI6MCwiSXNQbHVzRWRpdGlvbiI6ZmFsc2UsIklzUHJvRWRpdGlvbiI6ZmFsc2V9LCJFZmZlY3QiOjEsIlN0eWxlIjp7IiRpZCI6IjUyNiIsIlRpbWViYW5kU3R5bGUiOnsiJGlkIjoiNTI3IiwiU2NhbGVNYXJraW5nIjowLCJTaGFwZSI6MCwiU2hhcGVTdHlsZSI6eyIkaWQiOiI1MjgiLCJNYXJnaW4iOnsiJGlkIjoiNTI5IiwiVG9wIjowLjAsIkxlZnQiOjEwLjAsIlJpZ2h0IjoxMC4wLCJCb3R0b20iOjAuMH0sIlBhZGRpbmciOnsiJGlkIjoiNTMwIiwiVG9wIjo1LjAsIkxlZnQiOjEzLjAsIlJpZ2h0IjoxMy4wLCJCb3R0b20iOjUuMH0sIkJhY2tncm91bmQiOnsiJGlkIjoiNTMxIiwiQ29sb3IiOnsiJGlkIjoiNTMyIiwiQSI6MjU1LCJSIjo2OCwiRyI6ODQsIkIiOjEwNn19LCJJc1Zpc2libGUiOnRydWUsIldpZHRoIjo4NTguMCwiSGVpZ2h0IjozMC4wLCJCb3JkZXJTdHlsZSI6eyIkaWQiOiI1MzMiLCJMaW5lQ29sb3IiOnsiJGlkIjoiNTM0IiwiJHR5cGUiOiJOTFJFLkNvbW1vbi5Eb20uU29saWRDb2xvckJydXNoLCBOTFJFLkNvbW1vbiIsIkNvbG9yIjp7IiRpZCI6IjUzNSIsIkEiOjI1NSwiUiI6MjU1LCJHIjowLCJCIjowfX0sIkxpbmVXZWlnaHQiOjAuMCwiTGluZVR5cGUiOjAsIlBhcmVudFN0eWxlIjpudWxsfSwiUGFyZW50U3R5bGUiOm51bGx9LCJNaWRkbGVUaWVyU2hhcGVTdHlsZSI6eyIkaWQiOiI1MzYiLCJNYXJnaW4iOnsiJGlkIjoiNTM3IiwiVG9wIjowLjAsIkxlZnQiOjEwLjAsIlJpZ2h0IjoxMC4wLCJCb3R0b20iOjAuMH0sIlBhZGRpbmciOnsiJGlkIjoiNTM4IiwiVG9wIjo1LjAsIkxlZnQiOjEzLjAsIlJpZ2h0IjoxMy4wLCJCb3R0b20iOjUuMH0sIkJhY2tncm91bmQiOnsiJGlkIjoiNTM5IiwiQ29sb3IiOnsiJGlkIjoiNTQwIiwiQSI6MjU1LCJSIjo2OCwiRyI6ODQsIkIiOjEwNn19LCJJc1Zpc2libGUiOnRydWUsIldpZHRoIjo4NTguMCwiSGVpZ2h0IjozMC4wLCJCb3JkZXJTdHlsZSI6eyIkaWQiOiI1NDEiLCJMaW5lQ29sb3IiOnsiJGlkIjoiNTQyIiwiJHR5cGUiOiJOTFJFLkNvbW1vbi5Eb20uU29saWRDb2xvckJydXNoLCBOTFJFLkNvbW1vbiIsIkNvbG9yIjp7IiRpZCI6IjU0MyIsIkEiOjI1NSwiUiI6MjU1LCJHIjowLCJCIjowfX0sIkxpbmVXZWlnaHQiOjAuMCwiTGluZVR5cGUiOjAsIlBhcmVudFN0eWxlIjpudWxsfSwiUGFyZW50U3R5bGUiOm51bGx9LCJCb3R0b21UaWVyU2hhcGVTdHlsZSI6eyIkaWQiOiI1NDQiLCJNYXJnaW4iOnsiJGlkIjoiNTQ1IiwiVG9wIjowLjAsIkxlZnQiOjEwLjAsIlJpZ2h0IjoxMC4wLCJCb3R0b20iOjAuMH0sIlBhZGRpbmciOnsiJGlkIjoiNTQ2IiwiVG9wIjo1LjAsIkxlZnQiOjEzLjAsIlJpZ2h0IjoxMy4wLCJCb3R0b20iOjUuMH0sIkJhY2tncm91bmQiOnsiJGlkIjoiNTQ3IiwiQ29sb3IiOnsiJGlkIjoiNTQ4IiwiQSI6MjU1LCJSIjo2OCwiRyI6ODQsIkIiOjEwNn19LCJJc1Zpc2libGUiOnRydWUsIldpZHRoIjo4NTguMCwiSGVpZ2h0IjozMC4wLCJCb3JkZXJTdHlsZSI6eyIkaWQiOiI1NDkiLCJMaW5lQ29sb3IiOnsiJGlkIjoiNTUwIiwiJHR5cGUiOiJOTFJFLkNvbW1vbi5Eb20uU29saWRDb2xvckJydXNoLCBOTFJFLkNvbW1vbiIsIkNvbG9yIjp7IiRpZCI6IjU1MSIsIkEiOjI1NSwiUiI6MjU1LCJHIjowLCJCIjowfX0sIkxpbmVXZWlnaHQiOjAuMCwiTGluZVR5cGUiOjAsIlBhcmVudFN0eWxlIjpudWxsfSwiUGFyZW50U3R5bGUiOm51bGx9LCJSaWdodEVuZENhcHNTdHlsZSI6eyIkaWQiOiI1NTIiLCJGb250U2V0dGluZ3MiOnsiJGlkIjoiNTUzIiwiRm9udFNpemUiOjE4LCJGb250TmFtZSI6IkNhbGlicmkiLCJJc0JvbGQiOnRydWUsIklzSXRhbGljIjpmYWxzZSwiSXNVbmRlcmxpbmVkIjpmYWxzZSwiUGFyZW50U3R5bGUiOm51bGx9LCJBdXRvU2l6ZSI6MCwiRm9yZWdyb3VuZCI6eyIkaWQiOiI1NTQiLCJDb2xvciI6eyIkaWQiOiI1NTUiLCJBIjoyNTUsIlIiOjIzNywiRyI6MTI1LCJCIjo0OX19LCJNYXhXaWR0aCI6IkluZmluaXR5IiwiTWF4SGVpZ2h0IjoiSW5maW5pdHkiLCJTbWFydEZvcmVncm91bmRJc0FjdGl2ZSI6ZmFsc2UsIkhvcml6b250YWxBbGlnbm1lbnQiOjAsIlZlcnRpY2FsQWxpZ25tZW50IjowLCJTbWFydEZvcmVncm91bmQiOm51bGwsIkJhY2tncm91bmRGaWxsVHlwZSI6MCwiTWFyZ2luIjp7IiRpZCI6IjU1NiIsIlRvcCI6MC4wLCJMZWZ0IjowLjAsIlJpZ2h0IjoyMC4wLCJCb3R0b20iOjAuMH0sIlBhZGRpbmciOnsiJGlkIjoiNTU3IiwiVG9wIjowLjAsIkxlZnQiOjAuMCwiUmlnaHQiOjAuMCwiQm90dG9tIjowLjB9LCJCYWNrZ3JvdW5kIjp7IiRpZCI6IjU1OCIsIkNvbG9yIjp7IiRyZWYiOiIxNSJ9fSwiSXNWaXNpYmxlIjp0cnVlLCJXaWR0aCI6MC4wLCJIZWlnaHQiOjAuMCwiQm9yZGVyU3R5bGUiOm51bGwsIlBhcmVudFN0eWxlIjpudWxsfSwiTGVmdEVuZENhcHNTdHlsZSI6eyIkaWQiOiI1NTkiLCJGb250U2V0dGluZ3MiOnsiJGlkIjoiNTYwIiwiRm9udFNpemUiOjE4LCJGb250TmFtZSI6IkNhbGlicmkiLCJJc0JvbGQiOnRydWUsIklzSXRhbGljIjpmYWxzZSwiSXNVbmRlcmxpbmVkIjpmYWxzZSwiUGFyZW50U3R5bGUiOm51bGx9LCJBdXRvU2l6ZSI6MCwiRm9yZWdyb3VuZCI6eyIkaWQiOiI1NjEiLCJDb2xvciI6eyIkaWQiOiI1NjIiLCJBIjoyNTUsIlIiOjIzNywiRyI6MTI1LCJCIjo0OX19LCJNYXhXaWR0aCI6IkluZmluaXR5IiwiTWF4SGVpZ2h0IjoiSW5maW5pdHkiLCJTbWFydEZvcmVncm91bmRJc0FjdGl2ZSI6ZmFsc2UsIkhvcml6b250YWxBbGlnbm1lbnQiOjAsIlZlcnRpY2FsQWxpZ25tZW50IjowLCJTbWFydEZvcmVncm91bmQiOm51bGwsIkJhY2tncm91bmRGaWxsVHlwZSI6MCwiTWFyZ2luIjp7IiRpZCI6IjU2MyIsIlRvcCI6MC4wLCJMZWZ0IjoxMTUuNTA2NjY2NjY2NjY2NjYsIlJpZ2h0IjowLjAsIkJvdHRvbSI6MC4wfSwiUGFkZGluZyI6eyIkaWQiOiI1NjQiLCJUb3AiOjAuMCwiTGVmdCI6MC4wLCJSaWdodCI6MC4wLCJCb3R0b20iOjAuMH0sIkJhY2tncm91bmQiOnsiJGlkIjoiNTY1IiwiQ29sb3IiOnsiJHJlZiI6IjE1In19LCJJc1Zpc2libGUiOmZhbHNlLCJXaWR0aCI6MC4wLCJIZWlnaHQiOjAuMCwiQm9yZGVyU3R5bGUiOm51bGwsIlBhcmVudFN0eWxlIjpudWxsfSwiVG9kYXlUZXh0U3R5bGUiOnsiJGlkIjoiNTY2IiwiRm9udFNldHRpbmdzIjp7IiRpZCI6IjU2NyIsIkZvbnRTaXplIjoxMiwiRm9udE5hbWUiOiJDYWxpYnJpIiwiSXNCb2xkIjpmYWxzZSwiSXNJdGFsaWMiOmZhbHNlLCJJc1VuZGVybGluZWQiOmZhbHNlLCJQYXJlbnRTdHlsZSI6bnVsbH0sIkF1dG9TaXplIjowLCJGb3JlZ3JvdW5kIjp7IiRpZCI6IjU2OCIsIkNvbG9yIjp7IiRpZCI6IjU2OSIsIkEiOjI1NSwiUiI6MCwiRyI6MCwiQiI6MH19LCJNYXhXaWR0aCI6MjAwLjAsIk1heEhlaWdodCI6IkluZmluaXR5IiwiU21hcnRGb3JlZ3JvdW5kSXNBY3RpdmUiOmZhbHNlLCJIb3Jpem9udGFsQWxpZ25tZW50IjowLCJWZXJ0aWNhbEFsaWdubWVudCI6MCwiU21hcnRGb3JlZ3JvdW5kIjpudWxsLCJCYWNrZ3JvdW5kRmlsbFR5cGUiOjAsIk1hcmdpbiI6eyIkaWQiOiI1NzAiLCJUb3AiOjAuMCwiTGVmdCI6MC4wLCJSaWdodCI6MC4wLCJCb3R0b20iOjAuMH0sIlBhZGRpbmciOnsiJGlkIjoiNTcxIiwiVG9wIjowLjAsIkxlZnQiOjAuMCwiUmlnaHQiOjAuMCwiQm90dG9tIjowLjB9LCJCYWNrZ3JvdW5kIjp7IiRpZCI6IjU3MiIsIkNvbG9yIjp7IiRyZWYiOiIxNSJ9fSwiSXNWaXNpYmxlIjp0cnVlLCJXaWR0aCI6MC4wLCJIZWlnaHQiOjAuMCwiQm9yZGVyU3R5bGUiOm51bGwsIlBhcmVudFN0eWxlIjpudWxsfSwiVG9kYXlNYXJrZXJTdHlsZSI6eyIkaWQiOiI1NzMiLCJNYXJnaW4iOnsiJGlkIjoiNTc0IiwiVG9wIjowLjAsIkxlZnQiOjAuMCwiUmlnaHQiOjAuMCwiQm90dG9tIjowLjB9LCJQYWRkaW5nIjp7IiRpZCI6IjU3NSIsIlRvcCI6MC4wLCJMZWZ0IjowLjAsIlJpZ2h0IjowLjAsIkJvdHRvbSI6MC4wfSwiQmFja2dyb3VuZCI6eyIkaWQiOiI1NzYiLCJDb2xvciI6eyIkaWQiOiI1NzciLCJBIjoyNTUsIlIiOjI1NSwiRyI6MCwiQiI6MH19LCJJc1Zpc2libGUiOnRydWUsIldpZHRoIjowLjAsIkhlaWdodCI6MC4wLCJCb3JkZXJTdHlsZSI6bnVsbCwiUGFyZW50U3R5bGUiOm51bGx9LCJTY2FsZVN0eWxlIjp7IiRpZCI6IjU3OCIsIlNoYXBlIjo0LCJTaG93U2VnbWVudFNlcGFyYXRvcnMiOnRydWUsIlNlZ21lbnRTZXBhcmF0b3JPcGFjaXR5IjozMCwiSGFzQmVlblZpc2libGVCZWZvcmUiOnRydWUsIkZvbnRTZXR0aW5ncyI6eyIkaWQiOiI1NzkiLCJGb250U2l6ZSI6MTIsIkZvbnROYW1lIjoiQ2FsaWJyaSIsIklzQm9sZCI6ZmFsc2UsIklzSXRhbGljIjpmYWxzZSwiSXNVbmRlcmxpbmVkIjpmYWxzZSwiUGFyZW50U3R5bGUiOm51bGx9LCJBdXRvU2l6ZSI6MCwiRm9yZWdyb3VuZCI6eyIkaWQiOiI1ODAiLCJDb2xvciI6eyIkaWQiOiI1ODEiLCJBIjoyNTUsIlIiOjI1NSwiRyI6MjU1LCJCIjoyNTV9fSwiTWF4V2lkdGgiOjIwMC4wLCJNYXhIZWlnaHQiOiJJbmZpbml0eSIsIlNtYXJ0Rm9yZWdyb3VuZElzQWN0aXZlIjpmYWxzZSwiSG9yaXpvbnRhbEFsaWdubWVudCI6MCwiVmVydGljYWxBbGlnbm1lbnQiOjEsIlNtYXJ0Rm9yZWdyb3VuZCI6bnVsbCwiQmFja2dyb3VuZEZpbGxUeXBlIjowLCJNYXJnaW4iOnsiJGlkIjoiNTgyIiwiVG9wIjowLjAsIkxlZnQiOjUuMCwiUmlnaHQiOjAuMCwiQm90dG9tIjowLjB9LCJQYWRkaW5nIjp7IiRpZCI6IjU4MyIsIlRvcCI6MC4wLCJMZWZ0IjowLjAsIlJpZ2h0IjowLjAsIkJvdHRvbSI6MC4wfSwiQmFja2dyb3VuZCI6eyIkaWQiOiI1ODQiLCJDb2xvciI6eyIkcmVmIjoiMTUifX0sIklzVmlzaWJsZSI6dHJ1ZSwiV2lkdGgiOjAuMCwiSGVpZ2h0IjowLjAsIkJvcmRlclN0eWxlIjpudWxsLCJQYXJlbnRTdHlsZSI6bnVsbH0sIlNpbmdsZVNjYWxlU2hhcGVTdHlsZSI6eyIkaWQiOiI1ODUiLCJTaGFwZSI6MCwiSGVpZ2h0IjowLjB9LCJNaWRkbGVUaWVyU2NhbGVTdHlsZSI6eyIkaWQiOiI1ODYiLCJTaGFwZSI6NCwiU2hvd1NlZ21lbnRTZXBhcmF0b3JzIjp0cnVlLCJTZWdtZW50U2VwYXJhdG9yT3BhY2l0eSI6MzAsIkhhc0JlZW5WaXNpYmxlQmVmb3JlIjpmYWxzZSwiRm9udFNldHRpbmdzIjp7IiRpZCI6IjU4NyIsIkZvbnRTaXplIjoxMiwiRm9udE5hbWUiOiJDYWxpYnJpIiwiSXNCb2xkIjpmYWxzZSwiSXNJdGFsaWMiOmZhbHNlLCJJc1VuZGVybGluZWQiOmZhbHNlLCJQYXJlbnRTdHlsZSI6bnVsbH0sIkF1dG9TaXplIjowLCJGb3JlZ3JvdW5kIjp7IiRpZCI6IjU4OCIsIkNvbG9yIjp7IiRpZCI6IjU4OSIsIkEiOjI1NSwiUiI6MjU1LCJHIjoyNTUsIkIiOjI1NX19LCJNYXhXaWR0aCI6MjAwLjAsIk1heEhlaWdodCI6IkluZmluaXR5IiwiU21hcnRGb3JlZ3JvdW5kSXNBY3RpdmUiOmZhbHNlLCJIb3Jpem9udGFsQWxpZ25tZW50IjowLCJWZXJ0aWNhbEFsaWdubWVudCI6MSwiU21hcnRGb3JlZ3JvdW5kIjpudWxsLCJCYWNrZ3JvdW5kRmlsbFR5cGUiOjAsIk1hcmdpbiI6eyIkaWQiOiI1OTAiLCJUb3AiOjAuMCwiTGVmdCI6NS4wLCJSaWdodCI6MC4wLCJCb3R0b20iOjAuMH0sIlBhZGRpbmciOnsiJGlkIjoiNTkxIiwiVG9wIjowLjAsIkxlZnQiOjAuMCwiUmlnaHQiOjAuMCwiQm90dG9tIjowLjB9LCJCYWNrZ3JvdW5kIjp7IiRpZCI6IjU5MiIsIkNvbG9yIjp7IiRpZCI6IjU5MyIsIkEiOjAsIlIiOjAsIkciOjAsIkIiOjB9fSwiSXNWaXNpYmxlIjpmYWxzZSwiV2lkdGgiOjAuMCwiSGVpZ2h0IjowLjAsIkJvcmRlclN0eWxlIjpudWxsLCJQYXJlbnRTdHlsZSI6bnVsbH0sIkJvdHRvbVRpZXJTY2FsZVN0eWxlIjp7IiRpZCI6IjU5NCIsIlNoYXBlIjo0LCJTaG93U2VnbWVudFNlcGFyYXRvcnMiOnRydWUsIlNlZ21lbnRTZXBhcmF0b3JPcGFjaXR5IjozMCwiSGFzQmVlblZpc2libGVCZWZvcmUiOmZhbHNlLCJGb250U2V0dGluZ3MiOnsiJGlkIjoiNTk1IiwiRm9udFNpemUiOjEyLCJGb250TmFtZSI6IkNhbGlicmkiLCJJc0JvbGQiOmZhbHNlLCJJc0l0YWxpYyI6ZmFsc2UsIklzVW5kZXJsaW5lZCI6ZmFsc2UsIlBhcmVudFN0eWxlIjpudWxsfSwiQXV0b1NpemUiOjAsIkZvcmVncm91bmQiOnsiJGlkIjoiNTk2IiwiQ29sb3IiOnsiJGlkIjoiNTk3IiwiQSI6MjU1LCJSIjoyNTUsIkciOjI1NSwiQiI6MjU1fX0sIk1heFdpZHRoIjoyMDAuMCwiTWF4SGVpZ2h0IjoiSW5maW5pdHkiLCJTbWFydEZvcmVncm91bmRJc0FjdGl2ZSI6ZmFsc2UsIkhvcml6b250YWxBbGlnbm1lbnQiOjAsIlZlcnRpY2FsQWxpZ25tZW50IjoxLCJTbWFydEZvcmVncm91bmQiOm51bGwsIkJhY2tncm91bmRGaWxsVHlwZSI6MCwiTWFyZ2luIjp7IiRpZCI6IjU5OCIsIlRvcCI6MC4wLCJMZWZ0Ijo1LjAsIlJpZ2h0IjowLjAsIkJvdHRvbSI6MC4wfSwiUGFkZGluZyI6eyIkaWQiOiI1OTkiLCJUb3AiOjAuMCwiTGVmdCI6MC4wLCJSaWdodCI6MC4wLCJCb3R0b20iOjAuMH0sIkJhY2tncm91bmQiOnsiJGlkIjoiNjAwIiwiQ29sb3IiOnsiJGlkIjoiNjAxIiwiQSI6MCwiUiI6MCwiRyI6MCwiQiI6MH19LCJJc1Zpc2libGUiOmZhbHNlLCJXaWR0aCI6MC4wLCJIZWlnaHQiOjAuMCwiQm9yZGVyU3R5bGUiOm51bGwsIlBhcmVudFN0eWxlIjpudWxsfSwiRWxhcHNlZFRpbWVCYWNrZ3JvdW5kIjp7IiRpZCI6IjYwMiIsIkNvbG9yIjp7IiRpZCI6IjYwMyIsIkEiOjc3LCJSIjoyNTUsIkciOjAsIkIiOjB9fSwiQXBwZW5kWWVhck9uWWVhckNoYW5nZSI6dHJ1ZSwiRWxhcHNlZFRpbWVGb3JtYXQiOjEsIlRvZGF5TWFya2VyUG9zaXRpb24iOjMsIlF1aWNrUG9zaXRpb24iOjMsIkFic29sdXRlUG9zaXRpb24iOjI0MC4wLCJNYXJnaW4iOnsiJGlkIjoiNjA0IiwiVG9wIjowLjAsIkxlZnQiOjEwLjAsIlJpZ2h0IjoxMC4wLCJCb3R0b20iOjAuMH0sIlBhZGRpbmciOnsiJGlkIjoiNjA1IiwiVG9wIjowLjAsIkxlZnQiOjAuMCwiUmlnaHQiOjAuMCwiQm90dG9tIjowLjB9LCJCYWNrZ3JvdW5kIjp7IiRpZCI6IjYwNiIsIkNvbG9yIjp7IiRpZCI6IjYwNyIsIkEiOjI1NSwiUiI6MTE1LCJHIjoxMTUsIkIiOjExNX19LCJJc1Zpc2libGUiOnRydWUsIldpZHRoIjowLjAsIkhlaWdodCI6MC4wLCJCb3JkZXJTdHlsZSI6bnVsbCwiUGFyZW50U3R5bGUiOm51bGx9LCJEZWZhdWx0TWlsZXN0b25lU3R5bGUiOnsiJGlkIjoiNjA4IiwiU2hhcGUiOjAsIkNvbm5lY3Rvck1hcmdpbiI6eyIkaWQiOiI2MDkiLCJUb3AiOjAuMCwiTGVmdCI6Mi4wLCJSaWdodCI6Mi4wLCJCb3R0b20iOjAuMH0sIkNvbm5lY3RvclN0eWxlIjp7IiRpZCI6IjYxMCIsIkxpbmVDb2xvciI6eyIkaWQiOiI2MTEiLCIkdHlwZSI6Ik5MUkUuQ29tbW9uLkRvbS5Tb2xpZENvbG9yQnJ1c2gsIE5MUkUuQ29tbW9uIiwiQ29sb3IiOnsiJGlkIjoiNjEyIiwiQSI6MTI3LCJSIjozMSwiRyI6NzMsIkIiOjEyNn19LCJMaW5lV2VpZ2h0IjoxLjAsIkxpbmVUeXBlIjowLCJQYXJlbnRTdHlsZSI6bnVsbH0sIklzQmVsb3dUaW1lYmFuZCI6ZmFsc2UsIlBvc2l0aW9uT25UYXNrIjowLCJIaWRlRGF0ZSI6ZmFsc2UsIlNoYXBlU2l6ZSI6MSwiU3BhY2luZyI6Mi4wLCJQYWRkaW5nIjp7IiRpZCI6IjYxMyIsIlRvcCI6Ny4wLCJMZWZ0IjozLjAsIlJpZ2h0IjowLjAsIkJvdHRvbSI6Mi4wfSwiU2hhcGVTdHlsZSI6eyIkaWQiOiI2MTQiLCJNYXJnaW4iOnsiJGlkIjoiNjE1IiwiVG9wIjowLjAsIkxlZnQiOjAuMCwiUmlnaHQiOjAuMCwiQm90dG9tIjowLjB9LCJQYWRkaW5nIjp7IiRpZCI6IjYxNiIsIlRvcCI6MC4wLCJMZWZ0IjowLjAsIlJpZ2h0IjowLjAsIkJvdHRvbSI6MC4wfSwiQmFja2dyb3VuZCI6eyIkaWQiOiI2MTciLCJDb2xvciI6eyIkaWQiOiI2MTgiLCJBIjoyNTUsIlIiOjAsIkciOjExNCwiQiI6MTg4fX0sIklzVmlzaWJsZSI6dHJ1ZSwiV2lkdGgiOjE4LjAsIkhlaWdodCI6MjAuMCwiQm9yZGVyU3R5bGUiOnsiJGlkIjoiNjE5IiwiTGluZUNvbG9yIjp7IiRpZCI6IjYyMCIsIiR0eXBlIjoiTkxSRS5Db21tb24uRG9tLlNvbGlkQ29sb3JCcnVzaCwgTkxSRS5Db21tb24iLCJDb2xvciI6eyIkaWQiOiI2MjEiLCJBIjoyNTUsIlIiOjI1NSwiRyI6MCwiQiI6MH19LCJMaW5lV2VpZ2h0IjowLjAsIkxpbmVUeXBlIjowLCJQYXJlbnRTdHlsZSI6bnVsbH0sIlBhcmVudFN0eWxlIjpudWxsfSwiVGl0bGVTdHlsZSI6eyIkaWQiOiI2MjIiLCJGb250U2V0dGluZ3MiOnsiJGlkIjoiNjIzIiwiRm9udFNpemUiOjExLCJGb250TmFtZSI6IkNhbGlicmkiLCJJc0JvbGQiOnRydWUsIklzSXRhbGljIjpmYWxzZSwiSXNVbmRlcmxpbmVkIjpmYWxzZSwiUGFyZW50U3R5bGUiOm51bGx9LCJBdXRvU2l6ZSI6MCwiRm9yZWdyb3VuZCI6eyIkaWQiOiI2MjQiLCJDb2xvciI6eyIkaWQiOiI2MjUiLCJBIjoyNTUsIlIiOjAsIkciOjAsIkIiOjB9fSwiTWF4V2lkdGgiOjIwMC4wLCJNYXhIZWlnaHQiOiJJbmZpbml0eSIsIlNtYXJ0Rm9yZWdyb3VuZElzQWN0aXZlIjpmYWxzZSwiSG9yaXpvbnRhbEFsaWdubWVudCI6MSwiVmVydGljYWxBbGlnbm1lbnQiOjAsIlNtYXJ0Rm9yZWdyb3VuZCI6bnVsbCwiQmFja2dyb3VuZEZpbGxUeXBlIjowLCJNYXJnaW4iOnsiJGlkIjoiNjI2IiwiVG9wIjowLjAsIkxlZnQiOjAuMCwiUmlnaHQiOjAuMCwiQm90dG9tIjowLjB9LCJQYWRkaW5nIjp7IiRpZCI6IjYyNyIsIlRvcCI6MC4wLCJMZWZ0IjowLjAsIlJpZ2h0IjowLjAsIkJvdHRvbSI6MC4wfSwiQmFja2dyb3VuZCI6eyIkaWQiOiI2MjgiLCJDb2xvciI6eyIkcmVmIjoiMTUifX0sIklzVmlzaWJsZSI6dHJ1ZSwiV2lkdGgiOjAuMCwiSGVpZ2h0IjowLjAsIkJvcmRlclN0eWxlIjpudWxsLCJQYXJlbnRTdHlsZSI6bnVsbH0sIkRhdGVTdHlsZSI6eyIkaWQiOiI2MjkiLCJGb250U2V0dGluZ3MiOnsiJGlkIjoiNjMwIiwiRm9udFNpemUiOjEwLCJGb250TmFtZSI6IkNhbGlicmkiLCJJc0JvbGQiOmZhbHNlLCJJc0l0YWxpYyI6ZmFsc2UsIklzVW5kZXJsaW5lZCI6ZmFsc2UsIlBhcmVudFN0eWxlIjpudWxsfSwiQXV0b1NpemUiOjAsIkZvcmVncm91bmQiOnsiJGlkIjoiNjMxIiwiQ29sb3IiOnsiJGlkIjoiNjMyIiwiQSI6MjU1LCJSIjo2OCwiRyI6ODQsIkIiOjEwNn19LCJNYXhXaWR0aCI6MjAwLjAsIk1heEhlaWdodCI6IkluZmluaXR5IiwiU21hcnRGb3JlZ3JvdW5kSXNBY3RpdmUiOmZhbHNlLCJIb3Jpem9udGFsQWxpZ25tZW50IjowLCJWZXJ0aWNhbEFsaWdubWVudCI6MCwiU21hcnRGb3JlZ3JvdW5kIjpudWxsLCJCYWNrZ3JvdW5kRmlsbFR5cGUiOjAsIk1hcmdpbiI6eyIkaWQiOiI2MzMiLCJUb3AiOjAuMCwiTGVmdCI6MC4wLCJSaWdodCI6MC4wLCJCb3R0b20iOjAuMH0sIlBhZGRpbmciOnsiJGlkIjoiNjM0IiwiVG9wIjowLjAsIkxlZnQiOjAuMCwiUmlnaHQiOjAuMCwiQm90dG9tIjowLjB9LCJCYWNrZ3JvdW5kIjp7IiRpZCI6IjYzNSIsIkNvbG9yIjp7IiRyZWYiOiIxNSJ9fSwiSXNWaXNpYmxlIjp0cnVlLCJXaWR0aCI6MC4wLCJIZWlnaHQiOjAuMCwiQm9yZGVyU3R5bGUiOm51bGwsIlBhcmVudFN0eWxlIjpudWxsfSwiRGF0ZUZvcm1hdCI6eyIkaWQiOiI2MzYiLCJGb3JtYXRTdHJpbmciOiJNTU0gZCIsIlNlcGFyYXRvciI6Ii8iLCJVc2VJbnRlcm5hdGlvbmFsRGF0ZUZvcm1hdCI6ZmFsc2UsIkRhdGVJc1Zpc2libGUiOnRydWUsIlRpbWVJc1Zpc2libGUiOmZhbHNlLCJIb3VyRGlnaXRzIjoxLCJBbVBtRGVzaWduYXRvciI6MiwiVHJpbTAwTWludXRlcyI6ZmFsc2UsIkxhc3RLbm93blZpc2liaWxpdHlTdGF0ZSI6bnVsbH0sIldlZWtOdW1iZXJpbmciOnsiJGlkIjoiNjM3IiwiRm9ybWF0IjowLCJJc1Zpc2libGUiOmZhbHNlLCJMYXN0S25vd25WaXNpYmlsaXR5U3RhdGUiOmZhbHNlfSwiSXNWaXNpYmxlIjp0cnVlLCJQYXJlbnRTdHlsZSI6bnVsbH0sIkRlZmF1bHRUYXNrU3R5bGUiOnsiJGlkIjoiNjM4IiwiU2hhcGUiOjIsIlNoYXBlVGhpY2tuZXNzIjoxLCJEdXJhdGlvbkZvcm1hdCI6MCwiSW5jbHVkZU5vbldvcmtpbmdEYXlzSW5EdXJhdGlvbiI6ZmFsc2UsIlBlcmNlbnRhZ2VDb21wbGV0ZVN0eWxlIjp7IiRpZCI6IjYzOSIsIkZvbnRTZXR0aW5ncyI6eyIkaWQiOiI2NDAiLCJGb250U2l6ZSI6MTAsIkZvbnROYW1lIjoiQ2FsaWJyaSIsIklzQm9sZCI6ZmFsc2UsIklzSXRhbGljIjpmYWxzZSwiSXNVbmRlcmxpbmVkIjpmYWxzZSwiUGFyZW50U3R5bGUiOm51bGx9LCJBdXRvU2l6ZSI6MCwiRm9yZWdyb3VuZCI6eyIkcmVmIjoiMTAifSwiTWF4V2lkdGgiOjIwMC4wLCJNYXhIZWlnaHQiOiJJbmZpbml0eSIsIlNtYXJ0Rm9yZWdyb3VuZElzQWN0aXZlIjpmYWxzZSwiSG9yaXpvbnRhbEFsaWdubWVudCI6MCwiVmVydGljYWxBbGlnbm1lbnQiOjAsIlNtYXJ0Rm9yZWdyb3VuZCI6bnVsbCwiQmFja2dyb3VuZEZpbGxUeXBlIjowLCJNYXJnaW4iOnsiJHJlZiI6IjEyIn0sIlBhZGRpbmciOnsiJHJlZiI6IjEzIn0sIkJhY2tncm91bmQiOnsiJHJlZiI6IjE0In0sIklzVmlzaWJsZSI6dHJ1ZSwiV2lkdGgiOjAuMCwiSGVpZ2h0IjowLjAsIkJvcmRlclN0eWxlIjpudWxsLCJQYXJlbnRTdHlsZSI6bnVsbH0sIkR1cmF0aW9uU3R5bGUiOnsiJGlkIjoiNjQxIiwiRm9udFNldHRpbmdzIjp7IiRpZCI6IjY0MiIsIkZvbnRTaXplIjoxMCwiRm9udE5hbWUiOiJDYWxpYnJpIiwiSXNCb2xkIjpmYWxzZSwiSXNJdGFsaWMiOmZhbHNlLCJJc1VuZGVybGluZWQiOmZhbHNlLCJQYXJlbnRTdHlsZSI6bnVsbH0sIkF1dG9TaXplIjowLCJGb3JlZ3JvdW5kIjp7IiRyZWYiOiIxOSJ9LCJNYXhXaWR0aCI6MjAwLjAsIk1heEhlaWdodCI6IkluZmluaXR5IiwiU21hcnRGb3JlZ3JvdW5kSXNBY3RpdmUiOmZhbHNlLCJIb3Jpem9udGFsQWxpZ25tZW50IjowLCJWZXJ0aWNhbEFsaWdubWVudCI6MCwiU21hcnRGb3JlZ3JvdW5kIjpudWxsLCJCYWNrZ3JvdW5kRmlsbFR5cGUiOjAsIk1hcmdpbiI6eyIkcmVmIjoiMjEifSwiUGFkZGluZyI6eyIkcmVmIjoiMjIifSwiQmFja2dyb3VuZCI6eyIkcmVmIjoiMjMifSwiSXNWaXNpYmxlIjp0cnVlLCJXaWR0aCI6MC4wLCJIZWlnaHQiOjAuMCwiQm9yZGVyU3R5bGUiOm51bGwsIlBhcmVudFN0eWxlIjpudWxsfSwiSG9yaXpvbnRhbENvbm5lY3RvclN0eWxlIjp7IiRpZCI6IjY0MyIsIkxpbmVDb2xvciI6eyIkcmVmIjoiMjYifSwiTGluZVdlaWdodCI6MS4wLCJMaW5lVHlwZSI6MCwiUGFyZW50U3R5bGUiOm51bGx9LCJWZXJ0aWNhbENvbm5lY3RvclN0eWxlIjp7IiRpZCI6IjY0NCIsIkxpbmVDb2xvciI6eyIkcmVmIjoiMjkifSwiTGluZVdlaWdodCI6MC4wLCJMaW5lVHlwZSI6MCwiUGFyZW50U3R5bGUiOm51bGx9LCJNYXJnaW4iOm51bGwsIlN0YXJ0RGF0ZVBvc2l0aW9uIjozLCJFbmREYXRlUG9zaXRpb24iOjQsIkRhdGVJc1Zpc2libGUiOnRydWUsIlRpdGxlUG9zaXRpb24iOjIsIkR1cmF0aW9uUG9zaXRpb24iOjYsIlBlcmNlbnRhZ2VDb21wbGV0ZWRQb3NpdGlvbiI6NiwiU3BhY2luZyI6NSwiSXNCZWxvd1RpbWViYW5kIjp0cnVlLCJQZXJjZW50YWdlQ29tcGxldGVTaGFwZU9wYWNpdHkiOjM1LCJTaGFwZVN0eWxlIjp7IiRpZCI6IjY0NSIsIk1hcmdpbiI6eyIkcmVmIjoiMzIifSwiUGFkZGluZyI6eyIkcmVmIjoiMzMifSwiQmFja2dyb3VuZCI6eyIkaWQiOiI2NDYiLCJDb2xvciI6eyIkaWQiOiI2NDciLCJBIjoyNTUsIlIiOjAsIkciOjExNCwiQiI6MTg4fX0sIklzVmlzaWJsZSI6dHJ1ZSwiV2lkdGgiOjAuMCwiSGVpZ2h0IjoxNi4wLCJCb3JkZXJTdHlsZSI6eyIkaWQiOiI2NDgiLCJMaW5lQ29sb3IiOnsiJGlkIjoiNjQ5IiwiJHR5cGUiOiJOTFJFLkNvbW1vbi5Eb20uU29saWRDb2xvckJydXNoLCBOTFJFLkNvbW1vbiIsIkNvbG9yIjp7IiRpZCI6IjY1MCIsIkEiOjI1NSwiUiI6MjU1LCJHIjowLCJCIjowfX0sIkxpbmVXZWlnaHQiOjAuMCwiTGluZVR5cGUiOjAsIlBhcmVudFN0eWxlIjpudWxsfSwiUGFyZW50U3R5bGUiOm51bGx9LCJUaXRsZVN0eWxlIjp7IiRpZCI6IjY1MSIsIkZvbnRTZXR0aW5ncyI6eyIkaWQiOiI2NTIiLCJGb250U2l6ZSI6MTEsIkZvbnROYW1lIjoiQ2FsaWJyaSIsIklzQm9sZCI6dHJ1ZSwiSXNJdGFsaWMiOmZhbHNlLCJJc1VuZGVybGluZWQiOmZhbHNlLCJQYXJlbnRTdHlsZSI6bnVsbH0sIkF1dG9TaXplIjowLCJGb3JlZ3JvdW5kIjp7IiRpZCI6IjY1MyIsIkNvbG9yIjp7IiRpZCI6IjY1NCIsIkEiOjI1NSwiUiI6MCwiRyI6MCwiQiI6MH19LCJNYXhXaWR0aCI6OTYwLjAsIk1heEhlaWdodCI6IkluZmluaXR5IiwiU21hcnRGb3JlZ3JvdW5kSXNBY3RpdmUiOmZhbHNlLCJIb3Jpem9udGFsQWxpZ25tZW50IjoxLCJWZXJ0aWNhbEFsaWdubWVudCI6MCwiU21hcnRGb3JlZ3JvdW5kIjpudWxsLCJCYWNrZ3JvdW5kRmlsbFR5cGUiOjAsIk1hcmdpbiI6eyIkcmVmIjoiNDMifSwiUGFkZGluZyI6eyIkcmVmIjoiNDQifSwiQmFja2dyb3VuZCI6eyIkaWQiOiI2NTUiLCJDb2xvciI6eyIkcmVmIjoiMTUifX0sIklzVmlzaWJsZSI6dHJ1ZSwiV2lkdGgiOjAuMCwiSGVpZ2h0IjowLjAsIkJvcmRlclN0eWxlIjpudWxsLCJQYXJlbnRTdHlsZSI6bnVsbH0sIkRhdGVTdHlsZSI6eyIkaWQiOiI2NTYiLCJGb250U2V0dGluZ3MiOnsiJGlkIjoiNjU3IiwiRm9udFNpemUiOjEwLCJGb250TmFtZSI6IkNhbGlicmkiLCJJc0JvbGQiOmZhbHNlLCJJc0l0YWxpYyI6ZmFsc2UsIklzVW5kZXJsaW5lZCI6ZmFsc2UsIlBhcmVudFN0eWxlIjpudWxsfSwiQXV0b1NpemUiOjAsIkZvcmVncm91bmQiOnsiJGlkIjoiNjU4IiwiQ29sb3IiOnsiJGlkIjoiNjU5IiwiQSI6MjU1LCJSIjo2OCwiRyI6ODQsIkIiOjEwNn19LCJNYXhXaWR0aCI6MjAwLjAsIk1heEhlaWdodCI6IkluZmluaXR5IiwiU21hcnRGb3JlZ3JvdW5kSXNBY3RpdmUiOmZhbHNlLCJIb3Jpem9udGFsQWxpZ25tZW50IjoxLCJWZXJ0aWNhbEFsaWdubWVudCI6MCwiU21hcnRGb3JlZ3JvdW5kIjpudWxsLCJCYWNrZ3JvdW5kRmlsbFR5cGUiOjAsIk1hcmdpbiI6eyIkcmVmIjoiNTIifSwiUGFkZGluZyI6eyIkcmVmIjoiNTMifSwiQmFja2dyb3VuZCI6eyIkaWQiOiI2NjAiLCJDb2xvciI6eyIkcmVmIjoiMTUifX0sIklzVmlzaWJsZSI6dHJ1ZSwiV2lkdGgiOjAuMCwiSGVpZ2h0IjowLjAsIkJvcmRlclN0eWxlIjpudWxsLCJQYXJlbnRTdHlsZSI6bnVsbH0sIkRhdGVGb3JtYXQiOnsiJGlkIjoiNjYxIiwiRm9ybWF0U3RyaW5nIjoiTU1NIGQiLCJTZXBhcmF0b3IiOiIvIiwiVXNlSW50ZXJuYXRpb25hbERhdGVGb3JtYXQiOmZhbHNlLCJEYXRlSXNWaXNpYmxlIjp0cnVlLCJUaW1lSXNWaXNpYmxlIjpmYWxzZSwiSG91ckRpZ2l0cyI6MSwiQW1QbURlc2lnbmF0b3IiOjIsIlRyaW0wME1pbnV0ZXMiOmZhbHNlLCJMYXN0S25vd25WaXNpYmlsaXR5U3RhdGUiOm51bGx9LCJXZWVrTnVtYmVyaW5nIjp7IiRpZCI6IjY2MiIsIkZvcm1hdCI6MCwiSXNWaXNpYmxlIjpmYWxzZSwiTGFzdEtub3duVmlzaWJpbGl0eVN0YXRlIjpmYWxzZX0sIklzVmlzaWJsZSI6dHJ1ZSwiUGFyZW50U3R5bGUiOm51bGwsIl9leHBsaWNpdGx5U2V0Ijp7IiRpZCI6IjY2MyIsIlNoYXBlU3R5bGUiOmZhbHNlLCJUaXRsZVN0eWxlIjpmYWxzZSwiRGF0ZVN0eWxlIjpmYWxzZSwiSG9yaXpvbnRhbENvbm5lY3RvclN0eWxlIjpmYWxzZSwiVmVydGljYWxDb25uZWN0b3JTdHlsZSI6ZmFsc2UsIlBlcmNlbnRhZ2VDb21wbGV0ZVNoYXBlT3BhY2l0eSI6ZmFsc2UsIlNoYXBlIjpmYWxzZSwiU2hhcGVUaGlja25lc3MiOmZhbHNlLCJEdXJhdGlvbkZvcm1hdCI6ZmFsc2UsIkluY2x1ZGVOb25Xb3JraW5nRGF5c0luRHVyYXRpb24iOmZhbHNlLCJNYXJnaW4iOmZhbHNlLCJTdGFydERhdGVQb3NpdGlvbiI6ZmFsc2UsIkVuZERhdGVQb3NpdGlvbiI6ZmFsc2UsIlRpdGxlUG9zaXRpb24iOmZhbHNlLCJEdXJhdGlvblBvc2l0aW9uIjpmYWxzZSwiUGVyY2VudGFnZUNvbXBsZXRlZFBvc2l0aW9uIjpmYWxzZSwiU3BhY2luZyI6ZmFsc2UsIklzQmVsb3dUaW1lYmFuZCI6ZmFsc2UsIkRhdGVGb3JtYXQiOmZhbHNlLCJXZWVrTnVtYmVyaW5nIjpmYWxzZSwiSXNWaXNpYmxlIjpmYWxzZX19LCJHcmlkbGluZVBhbmVsU3R5bGUiOnsiJGlkIjoiNjY0IiwiR3JpZGxpbmVTdHlsZSI6eyIkaWQiOiI2NjUiLCJMaW5lQ29sb3IiOnsiJGlkIjoiNjY2IiwiJHR5cGUiOiJOTFJFLkNvbW1vbi5Eb20uU29saWRDb2xvckJydXNoLCBOTFJFLkNvbW1vbiIsIkNvbG9yIjp7IiRpZCI6IjY2NyIsIkEiOjM4LCJSIjo5MSwiRyI6MTU1LCJCIjoyMTN9fSwiTGluZVdlaWdodCI6MS4wLCJMaW5lVHlwZSI6MCwiUGFyZW50U3R5bGUiOm51bGx9LCJNYXJnaW4iOnsiJGlkIjoiNjY4IiwiVG9wIjowLjAsIkxlZnQiOjAuMCwiUmlnaHQiOjAuMCwiQm90dG9tIjowLjB9LCJQYWRkaW5nIjp7IiRpZCI6IjY2OSIsIlRvcCI6MC4wLCJMZWZ0IjowLjAsIlJpZ2h0IjowLjAsIkJvdHRvbSI6MC4wfSwiQmFja2dyb3VuZCI6bnVsbCwiSXNWaXNpYmxlIjp0cnVlLCJXaWR0aCI6MC4wLCJIZWlnaHQiOjAuMCwiQm9yZGVyU3R5bGUiOnsiJGlkIjoiNjcwIiwiTGluZUNvbG9yIjpudWxsLCJMaW5lV2VpZ2h0IjowLjAsIkxpbmVUeXBlIjowLCJQYXJlbnRTdHlsZSI6bnVsbH0sIlBhcmVudFN0eWxlIjpudWxsfSwiQWN0aXZpdHlMaW5lUGFuZWxTdHlsZSI6eyIkaWQiOiI2NzEiLCJBY3Rpdml0eUxpbmVTdHlsZSI6eyIkaWQiOiI2NzIiLCJMaW5lQ29sb3IiOnsiJGlkIjoiNjczIiwiJHR5cGUiOiJOTFJFLkNvbW1vbi5Eb20uU29saWRDb2xvckJydXNoLCBOTFJFLkNvbW1vbiIsIkNvbG9yIjp7IiRpZCI6IjY3NCIsIkEiOjM4LCJSIjo2OCwiRyI6MTE0LCJCIjoxOTZ9fSwiTGluZVdlaWdodCI6MS4wLCJMaW5lVHlwZSI6MCwiUGFyZW50U3R5bGUiOm51bGx9LCJNYXJnaW4iOnsiJGlkIjoiNjc1IiwiVG9wIjowLjAsIkxlZnQiOjAuMCwiUmlnaHQiOjAuMCwiQm90dG9tIjowLjB9LCJQYWRkaW5nIjp7IiRpZCI6IjY3NiIsIlRvcCI6MC4wLCJMZWZ0IjowLjAsIlJpZ2h0IjowLjAsIkJvdHRvbSI6MC4wfSwiQmFja2dyb3VuZCI6bnVsbCwiSXNWaXNpYmxlIjp0cnVlLCJXaWR0aCI6MC4wLCJIZWlnaHQiOjAuMCwiQm9yZGVyU3R5bGUiOnsiJGlkIjoiNjc3IiwiTGluZUNvbG9yIjpudWxsLCJMaW5lV2VpZ2h0IjowLjAsIkxpbmVUeXBlIjowLCJQYXJlbnRTdHlsZSI6bnVsbH0sIlBhcmVudFN0eWxlIjpudWxsfSwiU2hvd0VsYXBzZWRUaW1lR3JhZGllbnRTdHlsZSI6ZmFsc2UsIlRpbWViYW5kUmVzZXJ2ZWRMZWZ0QXJlYVN0eWxlIjp7IiRpZCI6IjY3OCIsIkFjdGl2aXR5SGVhZGVyV2lkdGgiOjc2LjAsIklzU2V0IjpmYWxzZX0sIkRlZmF1bHRTd2ltbGFuZVN0eWxlIjpudWxsfSwiU2NhbGUiOm51bGwsIlNjYWxlVjIiOnsiJGlkIjoiNjc5IiwiU3RhcnREYXRlIjoiMDAwMS0wMS0wMVQwMDowMDowMCIsIkVuZERhdGUiOiIyMDIyLTA2LTMwVDIzOjU5OjAwIiwiQXV0b0RhdGVSYW5nZSI6dHJ1ZSwiV29ya2luZ0RheXMiOjMxLCJGaXNjYWxZZWFyIjp7IiRpZCI6IjY4MCIsIlN0YXJ0TW9udGgiOjEsIlVzZVN0YXJ0aW5nWWVhckZvck51bWJlcmluZyI6dHJ1ZSwiU2hvd0Zpc2NhbFllYXJMYWJlbCI6dHJ1ZX0sIlRvZGF5TWFya2VyVGV4dCI6IlRvZGF5IiwiQXV0b1NjYWxlVHlwZSI6dHJ1ZSwiVGltZWJhbmRTY2FsZXMiOnsiJGlkIjoiNjgxIiwiVG9wU2NhbGVMYXllciI6eyIkaWQiOiI2ODIiLCJGb3JtYXQiOiJkIiwiVHlwZSI6MH0sIk1pZGRsZVNjYWxlTGF5ZXIiOnsiJGlkIjoiNjgzIiwiRm9ybWF0IjpudWxsLCJUeXBlIjowfSwiQm90dG9tU2NhbGVMYXllciI6eyIkaWQiOiI2ODQiLCJGb3JtYXQiOm51bGwsIlR5cGUiOjB9fX0sIk1pbGVzdG9uZXMiOltdLCJUYXNrcyI6W10sIlN3aW1sYW5lcyI6W10sIk1zUHJvamVjdEl0ZW1zVHJlZSI6eyIkaWQiOiI2ODUiLCJSb290Ijp7IkltcG9ydElkIjpudWxsLCJJc0ltcG9ydGVkIjpmYWxzZSwiQ2hpbGRyZW4iOltdfX0sIk1ldGFkYXRhIjp7IiRpZCI6IjY4NiIsIlNvdXJjZVRlbXBsYXRlIjoie1wiJGlkXCI6XCIxXCIsXCJJZFwiOlwiYzExZjZmNDktN2RiOC00NWZkLWJhMzItYmZjYWVhNDkyZjM5XCIsXCJDdWx0dXJlSW5mb05hbWVcIjpcImVuLVVTXCIsXCJWZXJzaW9uXCI6e1wiJGlkXCI6XCIyXCIsXCJUZW1wbGF0ZURvbVZlcnNpb25cIjpcIjEuMi4wXCJ9LFwiRWZmZWN0XCI6MSxcIlN0eWxlXCI6e1wiJGlkXCI6XCIzXCIsXCJUaW1lYmFuZFN0eWxlXCI6e1wiJGlkXCI6XCI0XCIsXCJTY2FsZU1hcmtpbmdcIjowLFwiU2hhcGVcIjoxMyxcIlNoYXBlU3R5bGVcIjp7XCIkaWRcIjpcIjVcIixcIk1hcmdpblwiOntcIiRpZFwiOlwiNlwiLFwiVG9wXCI6MC4wLFwiTGVmdFwiOjEwLjAsXCJSaWdodFwiOjEwLjAsXCJCb3R0b21cIjowLjB9LFwiUGFkZGluZ1wiOntcIiRpZFwiOlwiN1wiLFwiVG9wXCI6NS4wLFwiTGVmdFwiOjEzLjAsXCJSaWdodFwiOjEzLjAsXCJCb3R0b21cIjo1LjB9LFwiQmFja2dyb3VuZFwiOntcIiRpZFwiOlwiOFwiLFwiQ29sb3JcIjp7XCIkaWRcIjpcIjlcIixcIkFcIjoyNTUsXCJSXCI6NjgsXCJHXCI6ODQsXCJCXCI6MTA2fX0sXCJJc1Zpc2libGVcIjp0cnVlLFwiV2lkdGhcIjo4NTguMCxcIkhlaWdodFwiOjMwLjAsXCJCb3JkZXJTdHlsZVwiOntcIiRpZFwiOlwiMTBcIixcIkxpbmVDb2xvclwiOntcIiRpZFwiOlwiMTFcIixcIiR0eXBlXCI6XCJOTFJFLkNvbW1vbi5Eb20uU29saWRDb2xvckJydXNoLCBOTFJFLkNvbW1vblwiLFwiQ29sb3JcIjp7XCIkaWRcIjpcIjEyXCIsXCJBXCI6MjU1LFwiUlwiOjI1NSxcIkdcIjowLFwiQlwiOjB9fSxcIkxpbmVXZWlnaHRcIjowLjAsXCJMaW5lVHlwZVwiOjB9fSxcIk1pZGRsZVRpZXJTaGFwZVN0eWxlXCI6e1wiJGlkXCI6XCIxM1wiLFwiTWFyZ2luXCI6e1wiJGlkXCI6XCIxNFwiLFwiVG9wXCI6MC4wLFwiTGVmdFwiOjEwLjAsXCJSaWdodFwiOjEwLjAsXCJCb3R0b21cIjowLjB9LFwiUGFkZGluZ1wiOntcIiRpZFwiOlwiMTVcIixcIlRvcFwiOjUuMCxcIkxlZnRcIjoxMy4wLFwiUmlnaHRcIjoxMy4wLFwiQm90dG9tXCI6NS4wfSxcIkJhY2tncm91bmRcIjp7XCIkaWRcIjpcIjE2XCIsXCJDb2xvclwiOntcIiRpZFwiOlwiMTdcIixcIkFcIjoyNTUsXCJSXCI6NjgsXCJHXCI6ODQsXCJCXCI6MTA2fX0sXCJJc1Zpc2libGVcIjp0cnVlLFwiV2lkdGhcIjo4NTguMCxcIkhlaWdodFwiOjMwLjAsXCJCb3JkZXJTdHlsZVwiOntcIiRpZFwiOlwiMThcIixcIkxpbmVDb2xvclwiOntcIiRpZFwiOlwiMTlcIixcIiR0eXBlXCI6XCJOTFJFLkNvbW1vbi5Eb20uU29saWRDb2xvckJydXNoLCBOTFJFLkNvbW1vblwiLFwiQ29sb3JcIjp7XCIkaWRcIjpcIjIwXCIsXCJBXCI6MjU1LFwiUlwiOjI1NSxcIkdcIjowLFwiQlwiOjB9fSxcIkxpbmVXZWlnaHRcIjowLjAsXCJMaW5lVHlwZVwiOjB9fSxcIkJvdHRvbVRpZXJTaGFwZVN0eWxlXCI6e1wiJGlkXCI6XCIyMVwiLFwiTWFyZ2luXCI6e1wiJGlkXCI6XCIyMlwiLFwiVG9wXCI6MC4wLFwiTGVmdFwiOjEwLjAsXCJSaWdodFwiOjEwLjAsXCJCb3R0b21cIjowLjB9LFwiUGFkZGluZ1wiOntcIiRpZFwiOlwiMjNcIixcIlRvcFwiOjUuMCxcIkxlZnRcIjoxMy4wLFwiUmlnaHRcIjoxMy4wLFwiQm90dG9tXCI6NS4wfSxcIkJhY2tncm91bmRcIjp7XCIkaWRcIjpcIjI0XCIsXCJDb2xvclwiOntcIiRpZFwiOlwiMjVcIixcIkFcIjoyNTUsXCJSXCI6NjgsXCJHXCI6ODQsXCJCXCI6MTA2fX0sXCJJc1Zpc2libGVcIjp0cnVlLFwiV2lkdGhcIjo4NTguMCxcIkhlaWdodFwiOjMwLjAsXCJCb3JkZXJTdHlsZVwiOntcIiRpZFwiOlwiMjZcIixcIkxpbmVDb2xvclwiOntcIiRpZFwiOlwiMjdcIixcIiR0eXBlXCI6XCJOTFJFLkNvbW1vbi5Eb20uU29saWRDb2xvckJydXNoLCBOTFJFLkNvbW1vblwiLFwiQ29sb3JcIjp7XCIkaWRcIjpcIjI4XCIsXCJBXCI6MjU1LFwiUlwiOjI1NSxcIkdcIjowLFwiQlwiOjB9fSxcIkxpbmVXZWlnaHRcIjowLjAsXCJMaW5lVHlwZVwiOjB9fSxcIlJpZ2h0RW5kQ2Fwc1N0eWxlXCI6e1wiJGlkXCI6XCIyOVwiLFwiRm9udFNldHRpbmdzXCI6e1wiJGlkXCI6XCIzMFwiLFwiRm9udFNpemVcIjoxOCxcIkZvbnROYW1lXCI6XCJDYWxpYnJpXCIsXCJJc0JvbGRcIjp0cnVlLFwiSXNJdGFsaWNcIjpmYWxzZSxcIklzVW5kZXJsaW5lZFwiOmZhbHNlfSxcIkF1dG9TaXplXCI6MCxcIkZvcmVncm91bmRcIjp7XCIkaWRcIjpcIjMxXCIsXCJDb2xvclwiOntcIiRpZFwiOlwiMzJcIixcIkFcIjoyNTUsXCJSXCI6MjM3LFwiR1wiOjEyNSxcIkJcIjo0OX19LFwiQmFja2dyb3VuZEZpbGxUeXBlXCI6MCxcIk1heFdpZHRoXCI6XCJJbmZpbml0eVwiLFwiTWF4SGVpZ2h0XCI6XCJJbmZpbml0eVwiLFwiU21hcnRGb3JlZ3JvdW5kSXNBY3RpdmVcIjpmYWxzZSxcIkhvcml6b250YWxBbGlnbm1lbnRcIjowLFwiVmVydGljYWxBbGlnbm1lbnRcIjowLFwiU21hcnRGb3JlZ3JvdW5kXCI6bnVsbCxcIk1hcmdpblwiOntcIiRpZFwiOlwiMzNcIixcIlRvcFwiOjAuMCxcIkxlZnRcIjowLjAsXCJSaWdodFwiOjIwLjAsXCJCb3R0b21cIjowLjB9LFwiUGFkZGluZ1wiOntcIiRpZFwiOlwiMzRcIixcIlRvcFwiOjAuMCxcIkxlZnRcIjowLjAsXCJSaWdodFwiOjAuMCxcIkJvdHRvbVwiOjAuMH0sXCJCYWNrZ3JvdW5kXCI6e1wiJGlkXCI6XCIzNVwiLFwiQ29sb3JcIjp7XCIkaWRcIjpcIjM2XCIsXCJBXCI6MCxcIlJcIjowLFwiR1wiOjAsXCJCXCI6MH19LFwiSXNWaXNpYmxlXCI6dHJ1ZSxcIldpZHRoXCI6MC4wLFwiSGVpZ2h0XCI6MC4wLFwiQm9yZGVyU3R5bGVcIjpudWxsfSxcIkxlZnRFbmRDYXBzU3R5bGVcIjp7XCIkaWRcIjpcIjM3XCIsXCJGb250U2V0dGluZ3NcIjp7XCIkaWRcIjpcIjM4XCIsXCJGb250U2l6ZVwiOjE4LFwiRm9udE5hbWVcIjpcIkNhbGlicmlcIixcIklzQm9sZFwiOnRydWUsXCJJc0l0YWxpY1wiOmZhbHNlLFwiSXNVbmRlcmxpbmVkXCI6ZmFsc2V9LFwiQXV0b1NpemVcIjowLFwiRm9yZWdyb3VuZFwiOntcIiRpZFwiOlwiMzlcIixcIkNvbG9yXCI6e1wiJGlkXCI6XCI0MFwiLFwiQVwiOjI1NSxcIlJcIjoyMzcsXCJHXCI6MTI1LFwiQlwiOjQ5fX0sXCJCYWNrZ3JvdW5kRmlsbFR5cGVcIjowLFwiTWF4V2lkdGhcIjpcIkluZmluaXR5XCIsXCJNYXhIZWlnaHRcIjpcIkluZmluaXR5XCIsXCJTbWFydEZvcmVncm91bmRJc0FjdGl2ZVwiOmZhbHNlLFwiSG9yaXpvbnRhbEFsaWdubWVudFwiOjAsXCJWZXJ0aWNhbEFsaWdubWVudFwiOjAsXCJTbWFydEZvcmVncm91bmRcIjpudWxsLFwiTWFyZ2luXCI6e1wiJGlkXCI6XCI0MVwiLFwiVG9wXCI6MC4wLFwiTGVmdFwiOjIwLjAsXCJSaWdodFwiOjAuMCxcIkJvdHRvbVwiOjAuMH0sXCJQYWRkaW5nXCI6e1wiJGlkXCI6XCI0MlwiLFwiVG9wXCI6MC4wLFwiTGVmdFwiOjAuMCxcIlJpZ2h0XCI6MC4wLFwiQm90dG9tXCI6MC4wfSxcIkJhY2tncm91bmRcIjp7XCIkaWRcIjpcIjQzXCIsXCJDb2xvclwiOntcIiRyZWZcIjpcIjM2XCJ9fSxcIklzVmlzaWJsZVwiOmZhbHNlLFwiV2lkdGhcIjowLjAsXCJIZWlnaHRcIjowLjAsXCJCb3JkZXJTdHlsZVwiOm51bGx9LFwiVG9kYXlUZXh0U3R5bGVcIjp7XCIkaWRcIjpcIjQ0XCIsXCJGb250U2V0dGluZ3NcIjp7XCIkaWRcIjpcIjQ1XCIsXCJGb250U2l6ZVwiOjEyLFwiRm9udE5hbWVcIjpcIkNhbGlicmlcIixcIklzQm9sZFwiOmZhbHNlLFwiSXNJdGFsaWNcIjpmYWxzZSxcIklzVW5kZXJsaW5lZFwiOmZhbHNlfSxcIkF1dG9TaXplXCI6MCxcIkZvcmVncm91bmRcIjp7XCIkaWRcIjpcIjQ2XCIsXCJDb2xvclwiOntcIiRpZFwiOlwiNDdcIixcIkFcIjoyNTUsXCJSXCI6MCxcIkdcIjowLFwiQlwiOjB9fSxcIkJhY2tncm91bmRGaWxsVHlwZVwiOjAsXCJNYXhXaWR0aFwiOjIwMC4wLFwiTWF4SGVpZ2h0XCI6XCJJbmZpbml0eVwiLFwiU21hcnRGb3JlZ3JvdW5kSXNBY3RpdmVcIjpmYWxzZSxcIkhvcml6b250YWxBbGlnbm1lbnRcIjowLFwiVmVydGljYWxBbGlnbm1lbnRcIjowLFwiU21hcnRGb3JlZ3JvdW5kXCI6bnVsbCxcIk1hcmdpblwiOntcIiRpZFwiOlwiNDhcIixcIlRvcFwiOjAuMCxcIkxlZnRcIjowLjAsXCJSaWdodFwiOjAuMCxcIkJvdHRvbVwiOjAuMH0sXCJQYWRkaW5nXCI6e1wiJGlkXCI6XCI0OVwiLFwiVG9wXCI6MC4wLFwiTGVmdFwiOjAuMCxcIlJpZ2h0XCI6MC4wLFwiQm90dG9tXCI6MC4wfSxcIkJhY2tncm91bmRcIjp7XCIkaWRcIjpcIjUwXCIsXCJDb2xvclwiOntcIiRyZWZcIjpcIjM2XCJ9fSxcIklzVmlzaWJsZVwiOnRydWUsXCJXaWR0aFwiOjAuMCxcIkhlaWdodFwiOjAuMCxcIkJvcmRlclN0eWxlXCI6bnVsbH0sXCJUb2RheU1hcmtlclN0eWxlXCI6e1wiJGlkXCI6XCI1MVwiLFwiTWFyZ2luXCI6e1wiJGlkXCI6XCI1MlwiLFwiVG9wXCI6MC4wLFwiTGVmdFwiOjAuMCxcIlJpZ2h0XCI6MC4wLFwiQm90dG9tXCI6MC4wfSxcIlBhZGRpbmdcIjp7XCIkaWRcIjpcIjUzXCIsXCJUb3BcIjowLjAsXCJMZWZ0XCI6MC4wLFwiUmlnaHRcIjowLjAsXCJCb3R0b21cIjowLjB9LFwiQmFja2dyb3VuZFwiOntcIiRpZFwiOlwiNTRcIixcIkNvbG9yXCI6e1wiJGlkXCI6XCI1NVwiLFwiQVwiOjI1NSxcIlJcIjoyNTUsXCJHXCI6MCxcIkJcIjowfX0sXCJJc1Zpc2libGVcIjp0cnVlLFwiV2lkdGhcIjowLjAsXCJIZWlnaHRcIjowLjAsXCJCb3JkZXJTdHlsZVwiOm51bGx9LFwiU2NhbGVTdHlsZVwiOntcIiRpZFwiOlwiNTZcIixcIlNob3dTZWdtZW50U2VwYXJhdG9yc1wiOnRydWUsXCJTZWdtZW50U2VwYXJhdG9yT3BhY2l0eVwiOjMwLFwiU2hhcGVcIjo0LFwiSGFzQmVlblZpc2libGVCZWZvcmVcIjp0cnVlLFwiRm9udFNldHRpbmdzXCI6e1wiJGlkXCI6XCI1N1wiLFwiRm9udFNpemVcIjoxMixcIkZvbnROYW1lXCI6XCJDYWxpYnJpXCIsXCJJc0JvbGRcIjpmYWxzZSxcIklzSXRhbGljXCI6ZmFsc2UsXCJJc1VuZGVybGluZWRcIjpmYWxzZX0sXCJBdXRvU2l6ZVwiOjAsXCJGb3JlZ3JvdW5kXCI6e1wiJGlkXCI6XCI1OFwiLFwiQ29sb3JcIjp7XCIkaWRcIjpcIjU5XCIsXCJBXCI6MjU1LFwiUlwiOjI1NSxcIkdcIjoyNTUsXCJCXCI6MjU1fX0sXCJCYWNrZ3JvdW5kRmlsbFR5cGVcIjowLFwiTWF4V2lkdGhcIjoyMDAuMCxcIk1heEhlaWdodFwiOlwiSW5maW5pdHlcIixcIlNtYXJ0Rm9yZWdyb3VuZElzQWN0aXZlXCI6ZmFsc2UsXCJIb3Jpem9udGFsQWxpZ25tZW50XCI6MCxcIlZlcnRpY2FsQWxpZ25tZW50XCI6MSxcIlNtYXJ0Rm9yZWdyb3VuZFwiOm51bGwsXCJNYXJnaW5cIjp7XCIkaWRcIjpcIjYwXCIsXCJUb3BcIjowLjAsXCJMZWZ0XCI6NS4wLFwiUmlnaHRcIjowLjAsXCJCb3R0b21cIjowLjB9LFwiUGFkZGluZ1wiOntcIiRpZFwiOlwiNjFcIixcIlRvcFwiOjAuMCxcIkxlZnRcIjowLjAsXCJSaWdodFwiOjAuMCxcIkJvdHRvbVwiOjAuMH0sXCJCYWNrZ3JvdW5kXCI6e1wiJGlkXCI6XCI2MlwiLFwiQ29sb3JcIjp7XCIkcmVmXCI6XCIzNlwifX0sXCJJc1Zpc2libGVcIjp0cnVlLFwiV2lkdGhcIjowLjAsXCJIZWlnaHRcIjowLjAsXCJCb3JkZXJTdHlsZVwiOm51bGx9LFwiTWlkZGxlVGllclNjYWxlU3R5bGVcIjp7XCIkaWRcIjpcIjYzXCIsXCJTaG93U2VnbWVudFNlcGFyYXRvcnNcIjp0cnVlLFwiU2VnbWVudFNlcGFyYXRvck9wYWNpdHlcIjozMCxcIlNoYXBlXCI6NCxcIkhhc0JlZW5WaXNpYmxlQmVmb3JlXCI6ZmFsc2UsXCJGb250U2V0dGluZ3NcIjp7XCIkaWRcIjpcIjY0XCIsXCJGb250U2l6ZVwiOjEyLFwiRm9udE5hbWVcIjpcIkNhbGlicmlcIixcIklzQm9sZFwiOmZhbHNlLFwiSXNJdGFsaWNcIjpmYWxzZSxcIklzVW5kZXJsaW5lZFwiOmZhbHNlfSxcIkF1dG9TaXplXCI6MCxcIkZvcmVncm91bmRcIjp7XCIkaWRcIjpcIjY1XCIsXCJDb2xvclwiOntcIiRpZFwiOlwiNjZcIixcIkFcIjoyNTUsXCJSXCI6MjU1LFwiR1wiOjI1NSxcIkJcIjoyNTV9fSxcIkJhY2tncm91bmRGaWxsVHlwZVwiOjAsXCJNYXhXaWR0aFwiOjIwMC4wLFwiTWF4SGVpZ2h0XCI6XCJJbmZpbml0eVwiLFwiU21hcnRGb3JlZ3JvdW5kSXNBY3RpdmVcIjpmYWxzZSxcIkhvcml6b250YWxBbGlnbm1lbnRcIjowLFwiVmVydGljYWxBbGlnbm1lbnRcIjoxLFwiU21hcnRGb3JlZ3JvdW5kXCI6bnVsbCxcIk1hcmdpblwiOntcIiRpZFwiOlwiNjdcIixcIlRvcFwiOjAuMCxcIkxlZnRcIjo1LjAsXCJSaWdodFwiOjAuMCxcIkJvdHRvbVwiOjAuMH0sXCJQYWRkaW5nXCI6e1wiJGlkXCI6XCI2OFwiLFwiVG9wXCI6MC4wLFwiTGVmdFwiOjAuMCxcIlJpZ2h0XCI6MC4wLFwiQm90dG9tXCI6MC4wfSxcIkJhY2tncm91bmRcIjp7XCIkaWRcIjpcIjY5XCIsXCJDb2xvclwiOntcIiRpZFwiOlwiNzBcIixcIkFcIjowLFwiUlwiOjAsXCJHXCI6MCxcIkJcIjowfX0sXCJJc1Zpc2libGVcIjpmYWxzZSxcIldpZHRoXCI6MC4wLFwiSGVpZ2h0XCI6MC4wLFwiQm9yZGVyU3R5bGVcIjpudWxsfSxcIkJvdHRvbVRpZXJTY2FsZVN0eWxlXCI6e1wiJGlkXCI6XCI3MVwiLFwiU2hvd1NlZ21lbnRTZXBhcmF0b3JzXCI6dHJ1ZSxcIlNlZ21lbnRTZXBhcmF0b3JPcGFjaXR5XCI6MzAsXCJTaGFwZVwiOjQsXCJIYXNCZWVuVmlzaWJsZUJlZm9yZVwiOmZhbHNlLFwiRm9udFNldHRpbmdzXCI6e1wiJGlkXCI6XCI3MlwiLFwiRm9udFNpemVcIjoxMixcIkZvbnROYW1lXCI6XCJDYWxpYnJpXCIsXCJJc0JvbGRcIjpmYWxzZSxcIklzSXRhbGljXCI6ZmFsc2UsXCJJc1VuZGVybGluZWRcIjpmYWxzZX0sXCJBdXRvU2l6ZVwiOjAsXCJGb3JlZ3JvdW5kXCI6e1wiJGlkXCI6XCI3M1wiLFwiQ29sb3JcIjp7XCIkaWRcIjpcIjc0XCIsXCJBXCI6MjU1LFwiUlwiOjI1NSxcIkdcIjoyNTUsXCJCXCI6MjU1fX0sXCJCYWNrZ3JvdW5kRmlsbFR5cGVcIjowLFwiTWF4V2lkdGhcIjoyMDAuMCxcIk1heEhlaWdodFwiOlwiSW5maW5pdHlcIixcIlNtYXJ0Rm9yZWdyb3VuZElzQWN0aXZlXCI6ZmFsc2UsXCJIb3Jpem9udGFsQWxpZ25tZW50XCI6MCxcIlZlcnRpY2FsQWxpZ25tZW50XCI6MSxcIlNtYXJ0Rm9yZWdyb3VuZFwiOm51bGwsXCJNYXJnaW5cIjp7XCIkaWRcIjpcIjc1XCIsXCJUb3BcIjowLjAsXCJMZWZ0XCI6NS4wLFwiUmlnaHRcIjowLjAsXCJCb3R0b21cIjowLjB9LFwiUGFkZGluZ1wiOntcIiRpZFwiOlwiNzZcIixcIlRvcFwiOjAuMCxcIkxlZnRcIjowLjAsXCJSaWdodFwiOjAuMCxcIkJvdHRvbVwiOjAuMH0sXCJCYWNrZ3JvdW5kXCI6e1wiJGlkXCI6XCI3N1wiLFwiQ29sb3JcIjp7XCIkaWRcIjpcIjc4XCIsXCJBXCI6MCxcIlJcIjowLFwiR1wiOjAsXCJCXCI6MH19LFwiSXNWaXNpYmxlXCI6ZmFsc2UsXCJXaWR0aFwiOjAuMCxcIkhlaWdodFwiOjAuMCxcIkJvcmRlclN0eWxlXCI6bnVsbH0sXCJTaW5nbGVTY2FsZVNoYXBlU3R5bGVcIjpudWxsLFwiRWxhcHNlZFRpbWVCYWNrZ3JvdW5kXCI6e1wiJGlkXCI6XCI3OVwiLFwiQ29sb3JcIjp7XCIkaWRcIjpcIjgwXCIsXCJBXCI6NzcsXCJSXCI6MjU1LFwiR1wiOjAsXCJCXCI6MH19LFwiQXBwZW5kWWVhck9uWWVhckNoYW5nZVwiOnRydWUsXCJFbGFwc2VkVGltZUZvcm1hdFwiOjEsXCJUb2RheU1hcmtlclBvc2l0aW9uXCI6MyxcIlF1aWNrUG9zaXRpb25cIjoxLFwiQWJzb2x1dGVQb3NpdGlvblwiOjI0MC4wLFwiTWFyZ2luXCI6e1wiJGlkXCI6XCI4MVwiLFwiVG9wXCI6MC4wLFwiTGVmdFwiOjEwLjAsXCJSaWdodFwiOjEwLjAsXCJCb3R0b21cIjowLjB9LFwiUGFkZGluZ1wiOntcIiRpZFwiOlwiODJcIixcIlRvcFwiOjAuMCxcIkxlZnRcIjowLjAsXCJSaWdodFwiOjAuMCxcIkJvdHRvbVwiOjAuMH0sXCJCYWNrZ3JvdW5kXCI6e1wiJGlkXCI6XCI4M1wiLFwiQ29sb3JcIjp7XCIkaWRcIjpcIjg0XCIsXCJBXCI6MjU1LFwiUlwiOjExNSxcIkdcIjoxMTUsXCJCXCI6MTE1fX0sXCJJc1Zpc2libGVcIjp0cnVlLFwiV2lkdGhcIjowLjAsXCJIZWlnaHRcIjowLjAsXCJCb3JkZXJTdHlsZVwiOm51bGx9LFwiRGVmYXVsdE1pbGVzdG9uZVN0eWxlXCI6e1wiJGlkXCI6XCI4NVwiLFwiU2hhcGVcIjowLFwiQ29ubmVjdG9yTWFyZ2luXCI6e1wiJGlkXCI6XCI4NlwiLFwiVG9wXCI6MC4wLFwiTGVmdFwiOjIuMCxcIlJpZ2h0XCI6Mi4wLFwiQm90dG9tXCI6MC4wfSxcIkNvbm5lY3RvclN0eWxlXCI6e1wiJGlkXCI6XCI4N1wiLFwiTGluZUNvbG9yXCI6e1wiJGlkXCI6XCI4OFwiLFwiJHR5cGVcIjpcIk5MUkUuQ29tbW9uLkRvbS5Tb2xpZENvbG9yQnJ1c2gsIE5MUkUuQ29tbW9uXCIsXCJDb2xvclwiOntcIiRpZFwiOlwiODlcIixcIkFcIjoxMjcsXCJSXCI6MzEsXCJHXCI6NzMsXCJCXCI6MTI2fX0sXCJMaW5lV2VpZ2h0XCI6MS4wLFwiTGluZVR5cGVcIjowfSxcIklzQmVsb3dUaW1lYmFuZFwiOmZhbHNlLFwiSGlkZURhdGVcIjpmYWxzZSxcIlNoYXBlU2l6ZVwiOjEsXCJTcGFjaW5nXCI6Mi4wLFwiUGFkZGluZ1wiOntcIiRpZFwiOlwiOTBcIixcIlRvcFwiOjcuMCxcIkxlZnRcIjozLjAsXCJSaWdodFwiOjAuMCxcIkJvdHRvbVwiOjIuMH0sXCJQb3NpdGlvblwiOm51bGwsXCJQb3NpdGlvbk9uVGFza1wiOjAsXCJTaGFwZVN0eWxlXCI6e1wiJGlkXCI6XCI5MVwiLFwiTWFyZ2luXCI6e1wiJGlkXCI6XCI5MlwiLFwiVG9wXCI6MC4wLFwiTGVmdFwiOjAuMCxcIlJpZ2h0XCI6MC4wLFwiQm90dG9tXCI6MC4wfSxcIlBhZGRpbmdcIjp7XCIkaWRcIjpcIjkzXCIsXCJUb3BcIjowLjAsXCJMZWZ0XCI6MC4wLFwiUmlnaHRcIjowLjAsXCJCb3R0b21cIjowLjB9LFwiQmFja2dyb3VuZFwiOntcIiRpZFwiOlwiOTRcIixcIkNvbG9yXCI6e1wiJGlkXCI6XCI5NVwiLFwiQVwiOjI1NSxcIlJcIjowLFwiR1wiOjExNCxcIkJcIjoxODh9fSxcIklzVmlzaWJsZVwiOnRydWUsXCJXaWR0aFwiOjE4LjAsXCJIZWlnaHRcIjoyMC4wLFwiQm9yZGVyU3R5bGVcIjp7XCIkaWRcIjpcIjk2XCIsXCJMaW5lQ29sb3JcIjp7XCIkaWRcIjpcIjk3XCIsXCIkdHlwZVwiOlwiTkxSRS5Db21tb24uRG9tLlNvbGlkQ29sb3JCcnVzaCwgTkxSRS5Db21tb25cIixcIkNvbG9yXCI6e1wiJGlkXCI6XCI5OFwiLFwiQVwiOjI1NSxcIlJcIjoyNTUsXCJHXCI6MCxcIkJcIjowfX0sXCJMaW5lV2VpZ2h0XCI6MC4wLFwiTGluZVR5cGVcIjowfX0sXCJUaXRsZVN0eWxlXCI6e1wiJGlkXCI6XCI5OVwiLFwiRm9udFNldHRpbmdzXCI6e1wiJGlkXCI6XCIxMDBcIixcIkZvbnRTaXplXCI6MTEsXCJGb250TmFtZVwiOlwiQ2FsaWJyaVwiLFwiSXNCb2xkXCI6dHJ1ZSxcIklzSXRhbGljXCI6ZmFsc2UsXCJJc1VuZGVybGluZWRcIjpmYWxzZX0sXCJBdXRvU2l6ZVwiOjAsXCJGb3JlZ3JvdW5kXCI6e1wiJGlkXCI6XCIxMDFcIixcIkNvbG9yXCI6e1wiJGlkXCI6XCIxMDJcIixcIkFcIjoyNTUsXCJSXCI6MCxcIkdcIjowLFwiQlwiOjB9fSxcIkJhY2tncm91bmRGaWxsVHlwZVwiOjAsXCJNYXhXaWR0aFwiOjIwMC4wLFwiTWF4SGVpZ2h0XCI6XCJJbmZpbml0eVwiLFwiU21hcnRGb3JlZ3JvdW5kSXNBY3RpdmVcIjpmYWxzZSxcIkhvcml6b250YWxBbGlnbm1lbnRcIjoxLFwiVmVydGljYWxBbGlnbm1lbnRcIjowLFwiU21hcnRGb3JlZ3JvdW5kXCI6bnVsbCxcIk1hcmdpblwiOntcIiRpZFwiOlwiMTAzXCIsXCJUb3BcIjowLjAsXCJMZWZ0XCI6MC4wLFwiUmlnaHRcIjowLjAsXCJCb3R0b21cIjowLjB9LFwiUGFkZGluZ1wiOntcIiRpZFwiOlwiMTA0XCIsXCJUb3BcIjowLjAsXCJMZWZ0XCI6MC4wLFwiUmlnaHRcIjowLjAsXCJCb3R0b21cIjowLjB9LFwiQmFja2dyb3VuZFwiOntcIiRpZFwiOlwiMTA1XCIsXCJDb2xvclwiOntcIiRyZWZcIjpcIjM2XCJ9fSxcIklzVmlzaWJsZVwiOnRydWUsXCJXaWR0aFwiOjAuMCxcIkhlaWdodFwiOjAuMCxcIkJvcmRlclN0eWxlXCI6bnVsbH0sXCJEYXRlU3R5bGVcIjp7XCIkaWRcIjpcIjEwNlwiLFwiRm9udFNldHRpbmdzXCI6e1wiJGlkXCI6XCIxMDdcIixcIkZvbnRTaXplXCI6MTAsXCJGb250TmFtZVwiOlwiQ2FsaWJyaVwiLFwiSXNCb2xkXCI6ZmFsc2UsXCJJc0l0YWxpY1wiOmZhbHNlLFwiSXNVbmRlcmxpbmVkXCI6ZmFsc2V9LFwiQXV0b1NpemVcIjowLFwiRm9yZWdyb3VuZFwiOntcIiRpZFwiOlwiMTA4XCIsXCJDb2xvclwiOntcIiRpZFwiOlwiMTA5XCIsXCJBXCI6MjU1LFwiUlwiOjY4LFwiR1wiOjg0LFwiQlwiOjEwNn19LFwiQmFja2dyb3VuZEZpbGxUeXBlXCI6MCxcIk1heFdpZHRoXCI6MjAwLjAsXCJNYXhIZWlnaHRcIjpcIkluZmluaXR5XCIsXCJTbWFydEZvcmVncm91bmRJc0FjdGl2ZVwiOmZhbHNlLFwiSG9yaXpvbnRhbEFsaWdubWVudFwiOjAsXCJWZXJ0aWNhbEFsaWdubWVudFwiOjAsXCJTbWFydEZvcmVncm91bmRcIjpudWxsLFwiTWFyZ2luXCI6e1wiJGlkXCI6XCIxMTBcIixcIlRvcFwiOjAuMCxcIkxlZnRcIjowLjAsXCJSaWdodFwiOjAuMCxcIkJvdHRvbVwiOjAuMH0sXCJQYWRkaW5nXCI6e1wiJGlkXCI6XCIxMTFcIixcIlRvcFwiOjAuMCxcIkxlZnRcIjowLjAsXCJSaWdodFwiOjAuMCxcIkJvdHRvbVwiOjAuMH0sXCJCYWNrZ3JvdW5kXCI6e1wiJGlkXCI6XCIxMTJcIixcIkNvbG9yXCI6e1wiJHJlZlwiOlwiMzZcIn19LFwiSXNWaXNpYmxlXCI6dHJ1ZSxcIldpZHRoXCI6MC4wLFwiSGVpZ2h0XCI6MC4wLFwiQm9yZGVyU3R5bGVcIjpudWxsfSxcIkRhdGVGb3JtYXRcIjp7XCIkaWRcIjpcIjExM1wiLFwiRm9ybWF0U3RyaW5nXCI6XCJNTU0gZFwiLFwiU2VwYXJhdG9yXCI6XCIvXCIsXCJVc2VJbnRlcm5hdGlvbmFsRGF0ZUZvcm1hdFwiOmZhbHNlLFwiRGF0ZUlzVmlzaWJsZVwiOnRydWUsXCJUaW1lSXNWaXNpYmxlXCI6ZmFsc2UsXCJIb3VyRGlnaXRzXCI6MSxcIkFtUG1EZXNpZ25hdG9yXCI6MixcIlRyaW0wME1pbnV0ZXNcIjpmYWxzZSxcIkxhc3RLbm93blZpc2liaWxpdHlTdGF0ZVwiOm51bGx9LFwiSXNWaXNpYmxlXCI6dHJ1ZX0sXCJEZWZhdWx0VGFza1N0eWxlXCI6e1wiJGlkXCI6XCIxMTRcIixcIlNoYXBlXCI6MixcIlNoYXBlVGhpY2tuZXNzXCI6MSxcIkR1cmF0aW9uRm9ybWF0XCI6MCxcIlBlcmNlbnRhZ2VDb21wbGV0ZVN0eWxlXCI6e1wiJGlkXCI6XCIxMTVcIixcIkZvbnRTZXR0aW5nc1wiOntcIiRpZFwiOlwiMTE2XCIsXCJGb250U2l6ZVwiOjEwLFwiRm9udE5hbWVcIjpcIkNhbGlicmlcIixcIklzQm9sZFwiOmZhbHNlLFwiSXNJdGFsaWNcIjpmYWxzZSxcIklzVW5kZXJsaW5lZFwiOmZhbHNlfSxcIkF1dG9TaXplXCI6MCxcIkZvcmVncm91bmRcIjp7XCIkaWRcIjpcIjExN1wiLFwiQ29sb3JcIjp7XCIkaWRcIjpcIjExOFwiLFwiQVwiOjI1NSxcIlJcIjoyMzcsXCJHXCI6MTI1LFwiQlwiOjQ5fX0sXCJCYWNrZ3JvdW5kRmlsbFR5cGVcIjowLFwiTWF4V2lkdGhcIjoyMDAuMCxcIk1heEhlaWdodFwiOlwiSW5maW5pdHlcIixcIlNtYXJ0Rm9yZWdyb3VuZElzQWN0aXZlXCI6ZmFsc2UsXCJIb3Jpem9udGFsQWxpZ25tZW50XCI6MCxcIlZlcnRpY2FsQWxpZ25tZW50XCI6MCxcIlNtYXJ0Rm9yZWdyb3VuZFwiOm51bGwsXCJNYXJnaW5cIjp7XCIkaWRcIjpcIjExOVwiLFwiVG9wXCI6MC4wLFwiTGVmdFwiOjAuMCxcIlJpZ2h0XCI6MC4wLFwiQm90dG9tXCI6MC4wfSxcIlBhZGRpbmdcIjp7XCIkaWRcIjpcIjEyMFwiLFwiVG9wXCI6MC4wLFwiTGVmdFwiOjAuMCxcIlJpZ2h0XCI6MC4wLFwiQm90dG9tXCI6MC4wfSxcIkJhY2tncm91bmRcIjp7XCIkaWRcIjpcIjEyMVwiLFwiQ29sb3JcIjp7XCIkcmVmXCI6XCIzNlwifX0sXCJJc1Zpc2libGVcIjp0cnVlLFwiV2lkdGhcIjowLjAsXCJIZWlnaHRcIjowLjAsXCJCb3JkZXJTdHlsZVwiOm51bGx9LFwiRHVyYXRpb25TdHlsZVwiOntcIiRpZFwiOlwiMTIyXCIsXCJGb250U2V0dGluZ3NcIjp7XCIkaWRcIjpcIjEyM1wiLFwiRm9udFNpemVcIjoxMCxcIkZvbnROYW1lXCI6XCJDYWxpYnJpXCIsXCJJc0JvbGRcIjpmYWxzZSxcIklzSXRhbGljXCI6ZmFsc2UsXCJJc1VuZGVybGluZWRcIjpmYWxzZX0sXCJBdXRvU2l6ZVwiOjAsXCJGb3JlZ3JvdW5kXCI6e1wiJGlkXCI6XCIxMjRcIixcIkNvbG9yXCI6e1wiJGlkXCI6XCIxMjVcIixcIkFcIjoyNTUsXCJSXCI6MjM3LFwiR1wiOjEyNSxcIkJcIjo0OX19LFwiQmFja2dyb3VuZEZpbGxUeXBlXCI6MCxcIk1heFdpZHRoXCI6MjAwLjAsXCJNYXhIZWlnaHRcIjpcIkluZmluaXR5XCIsXCJTbWFydEZvcmVncm91bmRJc0FjdGl2ZVwiOmZhbHNlLFwiSG9yaXpvbnRhbEFsaWdubWVudFwiOjAsXCJWZXJ0aWNhbEFsaWdubWVudFwiOjAsXCJTbWFydEZvcmVncm91bmRcIjpudWxsLFwiTWFyZ2luXCI6e1wiJGlkXCI6XCIxMjZcIixcIlRvcFwiOjAuMCxcIkxlZnRcIjowLjAsXCJSaWdodFwiOjAuMCxcIkJvdHRvbVwiOjAuMH0sXCJQYWRkaW5nXCI6e1wiJGlkXCI6XCIxMjdcIixcIlRvcFwiOjAuMCxcIkxlZnRcIjowLjAsXCJSaWdodFwiOjAuMCxcIkJvdHRvbVwiOjAuMH0sXCJCYWNrZ3JvdW5kXCI6e1wiJGlkXCI6XCIxMjhcIixcIkNvbG9yXCI6e1wiJHJlZlwiOlwiMzZcIn19LFwiSXNWaXNpYmxlXCI6dHJ1ZSxcIldpZHRoXCI6MC4wLFwiSGVpZ2h0XCI6MC4wLFwiQm9yZGVyU3R5bGVcIjpudWxsfSxcIkhvcml6b250YWxDb25uZWN0b3JTdHlsZVwiOntcIiRpZFwiOlwiMTI5XCIsXCJMaW5lQ29sb3JcIjp7XCIkaWRcIjpcIjEzMFwiLFwiJHR5cGVcIjpcIk5MUkUuQ29tbW9uLkRvbS5Tb2xpZENvbG9yQnJ1c2gsIE5MUkUuQ29tbW9uXCIsXCJDb2xvclwiOntcIiRpZFwiOlwiMTMxXCIsXCJBXCI6MjU1LFwiUlwiOjIwNCxcIkdcIjoyMDQsXCJCXCI6MjA0fX0sXCJMaW5lV2VpZ2h0XCI6MS4wLFwiTGluZVR5cGVcIjowfSxcIlZlcnRpY2FsQ29ubmVjdG9yU3R5bGVcIjp7XCIkaWRcIjpcIjEzMlwiLFwiTGluZUNvbG9yXCI6e1wiJGlkXCI6XCIxMzNcIixcIiR0eXBlXCI6XCJOTFJFLkNvbW1vbi5Eb20uU29saWRDb2xvckJydXNoLCBOTFJFLkNvbW1vblwiLFwiQ29sb3JcIjp7XCIkaWRcIjpcIjEzNFwiLFwiQVwiOjI1NSxcIlJcIjoyMDQsXCJHXCI6MjA0LFwiQlwiOjIwNH19LFwiTGluZVdlaWdodFwiOjAuMCxcIkxpbmVUeXBlXCI6MH0sXCJNYXJnaW5cIjpudWxsLFwiU3RhcnREYXRlUG9zaXRpb25cIjozLFwiRW5kRGF0ZVBvc2l0aW9uXCI6NCxcIlRpdGxlUG9zaXRpb25cIjoyLFwiRHVyYXRpb25Qb3NpdGlvblwiOjYsXCJQZXJjZW50YWdlQ29tcGxldGVkUG9zaXRpb25cIjo2LFwiU3BhY2luZ1wiOjUsXCJJc0JlbG93VGltZWJhbmRcIjp0cnVlLFwiUGVyY2VudGFnZUNvbXBsZXRlU2hhcGVPcGFjaXR5XCI6MzUsXCJHcm91cE5hbWVcIjpudWxsLFwiQXR0YWNoZWRNaWxlc3RvbmVzU3R5bGVzXCI6bnVsbCxcIlNoYXBlU3R5bGVcIjp7XCIkaWRcIjpcIjEzNVwiLFwiTWFyZ2luXCI6e1wiJGlkXCI6XCIxMzZcIixcIlRvcFwiOjAuMCxcIkxlZnRcIjo0LjAsXCJSaWdodFwiOjQuMCxcIkJvdHRvbVwiOjAuMH0sXCJQYWRkaW5nXCI6e1wiJGlkXCI6XCIxMzdcIixcIlRvcFwiOjAuMCxcIkxlZnRcIjowLjAsXCJSaWdodFwiOjAuMCxcIkJvdHRvbVwiOjAuMH0sXCJCYWNrZ3JvdW5kXCI6e1wiJGlkXCI6XCIxMzhcIixcIkNvbG9yXCI6e1wiJGlkXCI6XCIxMzlcIixcIkFcIjoyNTUsXCJSXCI6MCxcIkdcIjoxMTQsXCJCXCI6MTg4fX0sXCJJc1Zpc2libGVcIjp0cnVlLFwiV2lkdGhcIjowLjAsXCJIZWlnaHRcIjoxNi4wLFwiQm9yZGVyU3R5bGVcIjp7XCIkaWRcIjpcIjE0MFwiLFwiTGluZUNvbG9yXCI6e1wiJGlkXCI6XCIxNDFcIixcIiR0eXBlXCI6XCJOTFJFLkNvbW1vbi5Eb20uU29saWRDb2xvckJydXNoLCBOTFJFLkNvbW1vblwiLFwiQ29sb3JcIjp7XCIkaWRcIjpcIjE0MlwiLFwiQVwiOjI1NSxcIlJcIjoyNTUsXCJHXCI6MCxcIkJcIjowfX0sXCJMaW5lV2VpZ2h0XCI6MC4wLFwiTGluZVR5cGVcIjowfX0sXCJUaXRsZVN0eWxlXCI6e1wiJGlkXCI6XCIxNDNcIixcIkZvbnRTZXR0aW5nc1wiOntcIiRpZFwiOlwiMTQ0XCIsXCJGb250U2l6ZVwiOjExLFwiRm9udE5hbWVcIjpcIkNhbGlicmlcIixcIklzQm9sZFwiOnRydWUsXCJJc0l0YWxpY1wiOmZhbHNlLFwiSXNVbmRlcmxpbmVkXCI6ZmFsc2V9LFwiQXV0b1NpemVcIjowLFwiRm9yZWdyb3VuZFwiOntcIiRpZFwiOlwiMTQ1XCIsXCJDb2xvclwiOntcIiRpZFwiOlwiMTQ2XCIsXCJBXCI6MjU1LFwiUlwiOjAsXCJHXCI6MCxcIkJcIjowfX0sXCJCYWNrZ3JvdW5kRmlsbFR5cGVcIjowLFwiTWF4V2lkdGhcIjo5NjAuMCxcIk1heEhlaWdodFwiOlwiSW5maW5pdHlcIixcIlNtYXJ0Rm9yZWdyb3VuZElzQWN0aXZlXCI6ZmFsc2UsXCJIb3Jpem9udGFsQWxpZ25tZW50XCI6MSxcIlZlcnRpY2FsQWxpZ25tZW50XCI6MCxcIlNtYXJ0Rm9yZWdyb3VuZFwiOm51bGwsXCJNYXJnaW5cIjp7XCIkaWRcIjpcIjE0N1wiLFwiVG9wXCI6MC4wLFwiTGVmdFwiOjAuMCxcIlJpZ2h0XCI6MC4wLFwiQm90dG9tXCI6MC4wfSxcIlBhZGRpbmdcIjp7XCIkaWRcIjpcIjE0OFwiLFwiVG9wXCI6MC4wLFwiTGVmdFwiOjAuMCxcIlJpZ2h0XCI6MC4wLFwiQm90dG9tXCI6MC4wfSxcIkJhY2tncm91bmRcIjp7XCIkaWRcIjpcIjE0OVwiLFwiQ29sb3JcIjp7XCIkcmVmXCI6XCIzNlwifX0sXCJJc1Zpc2libGVcIjp0cnVlLFwiV2lkdGhcIjowLjAsXCJIZWlnaHRcIjowLjAsXCJCb3JkZXJTdHlsZVwiOm51bGx9LFwiRGF0ZVN0eWxlXCI6e1wiJGlkXCI6XCIxNTBcIixcIkZvbnRTZXR0aW5nc1wiOntcIiRpZFwiOlwiMTUxXCIsXCJGb250U2l6ZVwiOjEwLFwiRm9udE5hbWVcIjpcIkNhbGlicmlcIixcIklzQm9sZFwiOmZhbHNlLFwiSXNJdGFsaWNcIjpmYWxzZSxcIklzVW5kZXJsaW5lZFwiOmZhbHNlfSxcIkF1dG9TaXplXCI6MCxcIkZvcmVncm91bmRcIjp7XCIkaWRcIjpcIjE1MlwiLFwiQ29sb3JcIjp7XCIkaWRcIjpcIjE1M1wiLFwiQVwiOjI1NSxcIlJcIjo2OCxcIkdcIjo4NCxcIkJcIjoxMDZ9fSxcIkJhY2tncm91bmRGaWxsVHlwZVwiOjAsXCJNYXhXaWR0aFwiOjIwMC4wLFwiTWF4SGVpZ2h0XCI6XCJJbmZpbml0eVwiLFwiU21hcnRGb3JlZ3JvdW5kSXNBY3RpdmVcIjpmYWxzZSxcIkhvcml6b250YWxBbGlnbm1lbnRcIjoxLFwiVmVydGljYWxBbGlnbm1lbnRcIjowLFwiU21hcnRGb3JlZ3JvdW5kXCI6bnVsbCxcIk1hcmdpblwiOntcIiRpZFwiOlwiMTU0XCIsXCJUb3BcIjowLjAsXCJMZWZ0XCI6MC4wLFwiUmlnaHRcIjowLjAsXCJCb3R0b21cIjowLjB9LFwiUGFkZGluZ1wiOntcIiRpZFwiOlwiMTU1XCIsXCJUb3BcIjowLjAsXCJMZWZ0XCI6MC4wLFwiUmlnaHRcIjowLjAsXCJCb3R0b21cIjowLjB9LFwiQmFja2dyb3VuZFwiOntcIiRpZFwiOlwiMTU2XCIsXCJDb2xvclwiOntcIiRyZWZcIjpcIjM2XCJ9fSxcIklzVmlzaWJsZVwiOnRydWUsXCJXaWR0aFwiOjAuMCxcIkhlaWdodFwiOjAuMCxcIkJvcmRlclN0eWxlXCI6bnVsbH0sXCJEYXRlRm9ybWF0XCI6e1wiJGlkXCI6XCIxNTdcIixcIkZvcm1hdFN0cmluZ1wiOlwiTU1NIGRcIixcIlNlcGFyYXRvclwiOlwiL1wiLFwiVXNlSW50ZXJuYXRpb25hbERhdGVGb3JtYXRcIjpmYWxzZSxcIkRhdGVJc1Zpc2libGVcIjp0cnVlLFwiVGltZUlzVmlzaWJsZVwiOmZhbHNlLFwiSG91ckRpZ2l0c1wiOjEsXCJBbVBtRGVzaWduYXRvclwiOjIsXCJUcmltMDBNaW51dGVzXCI6ZmFsc2UsXCJMYXN0S25vd25WaXNpYmlsaXR5U3RhdGVcIjpudWxsfSxcIklzVmlzaWJsZVwiOnRydWV9LFwiU2hvd0VsYXBzZWRUaW1lR3JhZGllbnRTdHlsZVwiOmZhbHNlLFwiVGltZWJhbmRSZXNlcnZlZExlZnRBcmVhU3R5bGVcIjpudWxsLFwiRGVmYXVsdFN3aW1sYW5lU3R5bGVcIjp7XCIkaWRcIjpcIjE1OFwiLFwiSGVhZGVyU3R5bGVcIjp7XCIkaWRcIjpcIjE1OVwiLFwiVGV4dFN0eWxlXCI6e1wiJGlkXCI6XCIxNjBcIixcIkZvbnRTZXR0aW5nc1wiOntcIiRpZFwiOlwiMTYxXCIsXCJGb250U2l6ZVwiOjEyLFwiRm9udE5hbWVcIjpcIkNhbGlicmlcIixcIklzQm9sZFwiOmZhbHNlLFwiSXNJdGFsaWNcIjpmYWxzZSxcIklzVW5kZXJsaW5lZFwiOmZhbHNlfSxcIkF1dG9TaXplXCI6MCxcIkZvcmVncm91bmRcIjp7XCIkaWRcIjpcIjE2MlwiLFwiQ29sb3JcIjp7XCIkaWRcIjpcIjE2M1wiLFwiQVwiOjI1NSxcIlJcIjozMixcIkdcIjo1NixcIkJcIjoxMDB9fSxcIkJhY2tncm91bmRGaWxsVHlwZVwiOjAsXCJNYXhXaWR0aFwiOjAuMCxcIk1heEhlaWdodFwiOjAuMCxcIlNtYXJ0Rm9yZWdyb3VuZElzQWN0aXZlXCI6ZmFsc2UsXCJIb3Jpem9udGFsQWxpZ25tZW50XCI6MCxcIlZlcnRpY2FsQWxpZ25tZW50XCI6MCxcIlNtYXJ0Rm9yZWdyb3VuZFwiOm51bGwsXCJNYXJnaW5cIjp7XCIkaWRcIjpcIjE2NFwiLFwiVG9wXCI6MC4wLFwiTGVmdFwiOjAuMCxcIlJpZ2h0XCI6MC4wLFwiQm90dG9tXCI6MC4wfSxcIlBhZGRpbmdcIjp7XCIkaWRcIjpcIjE2NVwiLFwiVG9wXCI6MC4wLFwiTGVmdFwiOjAuMCxcIlJpZ2h0XCI6MC4wLFwiQm90dG9tXCI6MC4wfSxcIkJhY2tncm91bmRcIjpudWxsLFwiSXNWaXNpYmxlXCI6ZmFsc2UsXCJXaWR0aFwiOjAuMCxcIkhlaWdodFwiOjAuMCxcIkJvcmRlclN0eWxlXCI6bnVsbH0sXCJSZWN0YW5nbGVTdHlsZVwiOntcIiRpZFwiOlwiMTY2XCIsXCJNYXJnaW5cIjp7XCIkaWRcIjpcIjE2N1wiLFwiVG9wXCI6MC4wLFwiTGVmdFwiOjAuMCxcIlJpZ2h0XCI6MC4wLFwiQm90dG9tXCI6MC4wfSxcIlBhZGRpbmdcIjp7XCIkaWRcIjpcIjE2OFwiLFwiVG9wXCI6MC4wLFwiTGVmdFwiOjAuMCxcIlJpZ2h0XCI6MC4wLFwiQm90dG9tXCI6MC4wfSxcIkJhY2tncm91bmRcIjp7XCIkaWRcIjpcIjE2OVwiLFwiQ29sb3JcIjp7XCIkaWRcIjpcIjE3MFwiLFwiQVwiOjEyNyxcIlJcIjo5MSxcIkdcIjoxNTUsXCJCXCI6MjEzfX0sXCJJc1Zpc2libGVcIjpmYWxzZSxcIldpZHRoXCI6MC4wLFwiSGVpZ2h0XCI6MC4wLFwiQm9yZGVyU3R5bGVcIjp7XCIkaWRcIjpcIjE3MVwiLFwiTGluZUNvbG9yXCI6e1wiJGlkXCI6XCIxNzJcIixcIiR0eXBlXCI6XCJOTFJFLkNvbW1vbi5Eb20uU29saWRDb2xvckJydXNoLCBOTFJFLkNvbW1vblwiLFwiQ29sb3JcIjp7XCIkaWRcIjpcIjE3M1wiLFwiQVwiOjI1NSxcIlJcIjoyNTUsXCJHXCI6MCxcIkJcIjowfX0sXCJMaW5lV2VpZ2h0XCI6MC4wLFwiTGluZVR5cGVcIjowfX0sXCJUZXh0SXNWZXJ0aWNhbFwiOmZhbHNlfSxcIkJhY2tncm91bmRTdHlsZVwiOntcIiRpZFwiOlwiMTc0XCIsXCJNYXJnaW5cIjp7XCIkaWRcIjpcIjE3NVwiLFwiVG9wXCI6MC4wLFwiTGVmdFwiOjAuMCxcIlJpZ2h0XCI6MC4wLFwiQm90dG9tXCI6MC4wfSxcIlBhZGRpbmdcIjp7XCIkaWRcIjpcIjE3NlwiLFwiVG9wXCI6MC4wLFwiTGVmdFwiOjAuMCxcIlJpZ2h0XCI6MC4wLFwiQm90dG9tXCI6MC4wfSxcIkJhY2tncm91bmRcIjp7XCIkaWRcIjpcIjE3N1wiLFwiQ29sb3JcIjp7XCIkaWRcIjpcIjE3OFwiLFwiQVwiOjM4LFwiUlwiOjkxLFwiR1wiOjE1NSxcIkJcIjoyMTN9fSxcIklzVmlzaWJsZVwiOnRydWUsXCJXaWR0aFwiOjAuMCxcIkhlaWdodFwiOjAuMCxcIkJvcmRlclN0eWxlXCI6e1wiJGlkXCI6XCIxNzlcIixcIkxpbmVDb2xvclwiOntcIiRpZFwiOlwiMTgwXCIsXCIkdHlwZVwiOlwiTkxSRS5Db21tb24uRG9tLlNvbGlkQ29sb3JCcnVzaCwgTkxSRS5Db21tb25cIixcIkNvbG9yXCI6e1wiJGlkXCI6XCIxODFcIixcIkFcIjoyNTUsXCJSXCI6MjU1LFwiR1wiOjAsXCJCXCI6MH19LFwiTGluZVdlaWdodFwiOjAuMCxcIkxpbmVUeXBlXCI6MH19LFwiSXNBYm92ZVRpbWViYW5kXCI6ZmFsc2V9LFwiQ3VzdG9tTWlsZXN0b25lU3R5bGVMaXN0XCI6W10sXCJDdXN0b21UYXNrU3R5bGVMaXN0XCI6W10sXCJDdXN0b21Td2ltbGFuZURlZmluaXRpb25TdHlsZUxpc3RcIjpbXSxcIkN1c3RvbVN3aW1sYW5lVjJTdHlsZUxpc3RcIjpbXSxcIkdyaWRsaW5lUGFuZWxTdHlsZVwiOntcIiRpZFwiOlwiMTgyXCIsXCJHcmlkbGluZVN0eWxlXCI6e1wiJGlkXCI6XCIxODNcIixcIkxpbmVDb2xvclwiOntcIiRpZFwiOlwiMTg0XCIsXCIkdHlwZVwiOlwiTkxSRS5Db21tb24uRG9tLlNvbGlkQ29sb3JCcnVzaCwgTkxSRS5Db21tb25cIixcIkNvbG9yXCI6e1wiJGlkXCI6XCIxODVcIixcIkFcIjozOCxcIlJcIjo5MSxcIkdcIjoxNTUsXCJCXCI6MjEzfX0sXCJMaW5lV2VpZ2h0XCI6MS4wLFwiTGluZVR5cGVcIjowfSxcIklzVmlzaWJsZVwiOnRydWV9LFwiQWN0aXZpdHlMaW5lUGFuZWxTdHlsZVwiOntcIiRpZFwiOlwiMTg2XCIsXCJBY3Rpdml0eUxpbmVTdHlsZVwiOntcIiRpZFwiOlwiMTg3XCIsXCJMaW5lQ29sb3JcIjp7XCIkaWRcIjpcIjE4OFwiLFwiJHR5cGVcIjpcIk5MUkUuQ29tbW9uLkRvbS5Tb2xpZENvbG9yQnJ1c2gsIE5MUkUuQ29tbW9uXCIsXCJDb2xvclwiOntcIiRpZFwiOlwiMTg5XCIsXCJBXCI6MzgsXCJSXCI6NjgsXCJHXCI6MTE0LFwiQlwiOjE5Nn19LFwiTGluZVdlaWdodFwiOjEuMCxcIkxpbmVUeXBlXCI6MH0sXCJJc1Zpc2libGVcIjp0cnVlfX0sXCJTY2FsZVwiOntcIiRpZFwiOlwiMTkwXCIsXCJTdGFydERhdGVcIjpcIjAwMDEtMDEtMDFUMDA6MDA6MDBcIixcIkVuZERhdGVcIjpcIjAwMDEtMDEtMDFUMDA6MDA6MDBcIixcIkZvcm1hdFwiOlwid1wiLFwiVHlwZVwiOjEsXCJBdXRvRGF0ZVJhbmdlXCI6dHJ1ZSxcIldvcmtpbmdEYXlzXCI6MzEsXCJUb2RheU1hcmtlclRleHRcIjpcIlRvZGF5XCIsXCJBdXRvU2NhbGVUeXBlXCI6dHJ1ZX0sXCJTY2FsZVYyXCI6e1wiJGlkXCI6XCIxOTFcIixcIlN0YXJ0RGF0ZVwiOlwiMDAwMS0wMS0wMVQwMDowMDowMFwiLFwiRW5kRGF0ZVwiOlwiMDAwMS0wMS0wMVQwMDowMDowMFwiLFwiQXV0b0RhdGVSYW5nZVwiOnRydWUsXCJXb3JraW5nRGF5c1wiOjMxLFwiVG9kYXlNYXJrZXJUZXh0XCI6XCJUb2RheVwiLFwiQXV0b1NjYWxlVHlwZVwiOnRydWUsXCJUaW1lYmFuZFNjYWxlc1wiOntcIiRpZFwiOlwiMTkyXCIsXCJUb3BTY2FsZUxheWVyXCI6e1wiJGlkXCI6XCIxOTNcIixcIkZvcm1hdFwiOlwid1wiLFwiVHlwZVwiOjF9LFwiTWlkZGxlU2NhbGVMYXllclwiOntcIiRpZFwiOlwiMTk0XCIsXCJGb3JtYXRcIjpudWxsLFwiVHlwZVwiOjB9LFwiQm90dG9tU2NhbGVMYXllclwiOntcIiRpZFwiOlwiMTk1XCIsXCJGb3JtYXRcIjpudWxsLFwiVHlwZVwiOjB9fX0sXCJNaWxlc3RvbmVzXCI6W10sXCJUYXNrc1wiOltdLFwiU3dpbWxhbmVzXCI6W10sXCJTd2ltbGFuZXNWMlwiOltdLFwiU2V0dGluZ3NcIjp7XCIkaWRcIjpcIjE5NlwiLFwiSW1wYU9wdGlvbnNcIjp7XCIkaWRcIjpcIjE5N1wiLFwiTGVmdFRvUmlnaHRcIjpmYWxzZSxcIlBheWxvYWRPcHRpb25zXCI6Mn19LFwiVGltZUNvbmZpZ3VyYXRpb25cIjp7XCIkaWRcIjpcIjE5OFwiLFwiVXNlVGltZVwiOmZhbHNlLFwiV29ya0RheVN0YXJ0XCI6XCIwMDowMDowMFwiLFwiV29ya0RheUVuZFwiOlwiMjM6NTk6MDBcIn19IiwiUmVjZW50Q29sb3JzQ29sbGVjdGlvbiI6IltcIiNGRjFBQUE0MlwiXSJ9LCJTZXR0aW5ncyI6eyIkaWQiOiI2ODciLCJJbXBhT3B0aW9ucyI6eyIkaWQiOiI2ODgiLCJMZWZ0VG9SaWdodCI6ZmFsc2UsIlBheWxvYWRPcHRpb25zIjoyfSwiVXNlQ29tcHJlc3Npb24iOmZhbHNlLCJDb21wcmVzaW9uUGVyY2VudGFnZSI6NTAuMCwiSW5hY3RpdmVJbnRlcnZhbFdpZHRoVGhyZXNob2xkIjozMC4wLCJJbmFjdGl2ZUludGVydmFsV2lkdGgiOjEuMCwiU3BsaXRUYXNrcyI6ZmFsc2UsIlVzZUNsdXN0ZXIiOmZhbHNlLCJFcHNpbG9uIjo1LjAsIk1pblBvaW50c1RvRm9ybUFDbHVzdGVyIjoyLCJHZW5lcmF0ZUludmlzaWJsZVNoYXBlcyI6ZmFsc2UsIlNtYXJ0VGltZWxpbmVUYXNrUGVyY2VudGFnZUZpdCI6ZmFsc2V9LCJJc05ldyI6ZmFsc2UsIkltcG9ydFR5cGUiOjAsIkZpbGVQYXRoIjpudWxsLCJUaW1lQ29uZmlndXJhdGlvbiI6eyIkaWQiOiI2ODkiLCJVc2VUaW1lIjpmYWxzZSwiV29ya0RheVN0YXJ0IjoiMDA6MDA6MDAiLCJXb3JrRGF5RW5kIjoiMjM6NTk6MDAifSwiTGFzdFVzZWRUZW1wbGF0ZUlkIjoiYzExZjZmNDktN2RiOC00NWZkLWJhMzItYmZjYWVhNDkyZjM5IiwiRmlyc3RXZWVrT2ZZZWFyIjowLCJQbGFjZU1pbGVzdG9uZUF0VGhlQmVnaW5uaW5nT2ZUaGVEYXkiOmZhbHNlfQ=="/>
   <p:tag name="__MASTER" val="__part_0"/>
 </p:tagLst>
 </file>
@@ -16525,9 +16525,9 @@
   <p:tag name="OTLTIMEBANDRESERVEDLEFTAREAISSET" val="False"/>
   <p:tag name="OTLTIMEBANDQUICKPOSITION" val="Custom"/>
   <p:tag name="OTLTIMEBANDENDDATE" val="2022-06-30T23:59:00.0000000"/>
-  <p:tag name="OTLMARKERSHAPE" val="OTL"/>
   <p:tag name="OTLTIMEBANDSCALETYPE" val="Days"/>
   <p:tag name="OTLTIMEBANDSCALEFORMAT" val="d"/>
+  <p:tag name="OTLMARKERSHAPE" val="OTL"/>
 </p:tagLst>
 </file>
 
@@ -16660,7 +16660,6 @@
 
 <file path=ppt/tags/tag150.xml><?xml version="1.0" encoding="utf-8"?>
 <p:tagLst xmlns:a="http://schemas.openxmlformats.org/drawingml/2006/main" xmlns:r="http://schemas.openxmlformats.org/officeDocument/2006/relationships" xmlns:p="http://schemas.openxmlformats.org/presentationml/2006/main">
-  <p:tag name="OTLMARKERSHAPE" val="OTL"/>
   <p:tag name="OTLDATEFORMATSTRING" val="MMM d"/>
   <p:tag name="OTLDATEFORMATSEPARATOR" val="/"/>
   <p:tag name="OTLDATEFORMATUSEUS" val="True"/>
@@ -16671,17 +16670,17 @@
   <p:tag name="OTLDATEFORMATTRIM00MINUTES" val="False"/>
   <p:tag name="OTLWEEKNUMBERINGFORMAT" val="WNFormat1"/>
   <p:tag name="OTLWEEKNUMBERINGISVISIBLE" val="False"/>
-  <p:tag name="OTLSTARTDATE" val="2022-05-07T00:00:00.0000000Z"/>
   <p:tag name="OTLENDDATE" val="2022-05-14T23:59:00.0000000Z"/>
   <p:tag name="OTLDURATIONFORMAT" val="day"/>
   <p:tag name="OTLSPACING" val="5"/>
   <p:tag name="OTLSHAPETHICKNESSTYPE" val="Regular"/>
+  <p:tag name="OTLMARKERSHAPE" val="OTL"/>
+  <p:tag name="OTLSTARTDATE" val="2022-05-11T00:00:00.0000000Z"/>
 </p:tagLst>
 </file>
 
 <file path=ppt/tags/tag151.xml><?xml version="1.0" encoding="utf-8"?>
 <p:tagLst xmlns:a="http://schemas.openxmlformats.org/drawingml/2006/main" xmlns:r="http://schemas.openxmlformats.org/officeDocument/2006/relationships" xmlns:p="http://schemas.openxmlformats.org/presentationml/2006/main">
-  <p:tag name="OTLMARKERSHAPE" val="OTL"/>
   <p:tag name="OTLDATEFORMATSTRING" val="MMM d"/>
   <p:tag name="OTLDATEFORMATSEPARATOR" val="/"/>
   <p:tag name="OTLDATEFORMATUSEUS" val="True"/>
@@ -16693,16 +16692,16 @@
   <p:tag name="OTLWEEKNUMBERINGFORMAT" val="WNFormat1"/>
   <p:tag name="OTLWEEKNUMBERINGISVISIBLE" val="False"/>
   <p:tag name="OTLSTARTDATE" val="2022-05-10T00:00:00.0000000Z"/>
-  <p:tag name="OTLENDDATE" val="2022-05-14T23:59:00.0000000Z"/>
   <p:tag name="OTLDURATIONFORMAT" val="day"/>
   <p:tag name="OTLSPACING" val="5"/>
   <p:tag name="OTLSHAPETHICKNESSTYPE" val="Regular"/>
+  <p:tag name="OTLENDDATE" val="2022-05-13T23:59:00.0000000Z"/>
+  <p:tag name="OTLMARKERSHAPE" val="OTL"/>
 </p:tagLst>
 </file>
 
 <file path=ppt/tags/tag152.xml><?xml version="1.0" encoding="utf-8"?>
 <p:tagLst xmlns:a="http://schemas.openxmlformats.org/drawingml/2006/main" xmlns:r="http://schemas.openxmlformats.org/officeDocument/2006/relationships" xmlns:p="http://schemas.openxmlformats.org/presentationml/2006/main">
-  <p:tag name="OTLMARKERSHAPE" val="OTL"/>
   <p:tag name="OTLDATEFORMATSTRING" val="MMM d"/>
   <p:tag name="OTLDATEFORMATSEPARATOR" val="/"/>
   <p:tag name="OTLDATEFORMATUSEUS" val="True"/>
@@ -16718,12 +16717,12 @@
   <p:tag name="OTLDURATIONFORMAT" val="day"/>
   <p:tag name="OTLSPACING" val="5"/>
   <p:tag name="OTLSHAPETHICKNESSTYPE" val="Regular"/>
+  <p:tag name="OTLMARKERSHAPE" val="OTL"/>
 </p:tagLst>
 </file>
 
 <file path=ppt/tags/tag153.xml><?xml version="1.0" encoding="utf-8"?>
 <p:tagLst xmlns:a="http://schemas.openxmlformats.org/drawingml/2006/main" xmlns:r="http://schemas.openxmlformats.org/officeDocument/2006/relationships" xmlns:p="http://schemas.openxmlformats.org/presentationml/2006/main">
-  <p:tag name="OTLMARKERSHAPE" val="OTL"/>
   <p:tag name="OTLDATEFORMATSTRING" val="MMM d"/>
   <p:tag name="OTLDATEFORMATSEPARATOR" val="/"/>
   <p:tag name="OTLDATEFORMATUSEUS" val="True"/>
@@ -16739,12 +16738,12 @@
   <p:tag name="OTLDURATIONFORMAT" val="day"/>
   <p:tag name="OTLSPACING" val="5"/>
   <p:tag name="OTLSHAPETHICKNESSTYPE" val="Regular"/>
+  <p:tag name="OTLMARKERSHAPE" val="OTL"/>
 </p:tagLst>
 </file>
 
 <file path=ppt/tags/tag154.xml><?xml version="1.0" encoding="utf-8"?>
 <p:tagLst xmlns:a="http://schemas.openxmlformats.org/drawingml/2006/main" xmlns:r="http://schemas.openxmlformats.org/officeDocument/2006/relationships" xmlns:p="http://schemas.openxmlformats.org/presentationml/2006/main">
-  <p:tag name="OTLMARKERSHAPE" val="OTL"/>
   <p:tag name="OTLDATEFORMATSTRING" val="MMM d"/>
   <p:tag name="OTLDATEFORMATSEPARATOR" val="/"/>
   <p:tag name="OTLDATEFORMATUSEUS" val="True"/>
@@ -16760,12 +16759,12 @@
   <p:tag name="OTLDURATIONFORMAT" val="day"/>
   <p:tag name="OTLSPACING" val="5"/>
   <p:tag name="OTLSHAPETHICKNESSTYPE" val="Regular"/>
+  <p:tag name="OTLMARKERSHAPE" val="OTL"/>
 </p:tagLst>
 </file>
 
 <file path=ppt/tags/tag155.xml><?xml version="1.0" encoding="utf-8"?>
 <p:tagLst xmlns:a="http://schemas.openxmlformats.org/drawingml/2006/main" xmlns:r="http://schemas.openxmlformats.org/officeDocument/2006/relationships" xmlns:p="http://schemas.openxmlformats.org/presentationml/2006/main">
-  <p:tag name="OTLMARKERSHAPE" val="OTL"/>
   <p:tag name="OTLDATEFORMATSTRING" val="MMM d"/>
   <p:tag name="OTLDATEFORMATSEPARATOR" val="/"/>
   <p:tag name="OTLDATEFORMATUSEUS" val="True"/>
@@ -16781,12 +16780,12 @@
   <p:tag name="OTLDURATIONFORMAT" val="day"/>
   <p:tag name="OTLSPACING" val="5"/>
   <p:tag name="OTLSHAPETHICKNESSTYPE" val="Regular"/>
+  <p:tag name="OTLMARKERSHAPE" val="OTL"/>
 </p:tagLst>
 </file>
 
 <file path=ppt/tags/tag156.xml><?xml version="1.0" encoding="utf-8"?>
 <p:tagLst xmlns:a="http://schemas.openxmlformats.org/drawingml/2006/main" xmlns:r="http://schemas.openxmlformats.org/officeDocument/2006/relationships" xmlns:p="http://schemas.openxmlformats.org/presentationml/2006/main">
-  <p:tag name="OTLMARKERSHAPE" val="OTL"/>
   <p:tag name="OTLDATEFORMATSTRING" val="MMM d"/>
   <p:tag name="OTLDATEFORMATSEPARATOR" val="/"/>
   <p:tag name="OTLDATEFORMATUSEUS" val="True"/>
@@ -16802,12 +16801,12 @@
   <p:tag name="OTLDURATIONFORMAT" val="day"/>
   <p:tag name="OTLSPACING" val="5"/>
   <p:tag name="OTLSHAPETHICKNESSTYPE" val="Regular"/>
+  <p:tag name="OTLMARKERSHAPE" val="OTL"/>
 </p:tagLst>
 </file>
 
 <file path=ppt/tags/tag157.xml><?xml version="1.0" encoding="utf-8"?>
 <p:tagLst xmlns:a="http://schemas.openxmlformats.org/drawingml/2006/main" xmlns:r="http://schemas.openxmlformats.org/officeDocument/2006/relationships" xmlns:p="http://schemas.openxmlformats.org/presentationml/2006/main">
-  <p:tag name="OTLMARKERSHAPE" val="OTL"/>
   <p:tag name="OTLDATEFORMATSTRING" val="MMM d"/>
   <p:tag name="OTLDATEFORMATSEPARATOR" val="/"/>
   <p:tag name="OTLDATEFORMATUSEUS" val="True"/>
@@ -16823,12 +16822,12 @@
   <p:tag name="OTLDURATIONFORMAT" val="day"/>
   <p:tag name="OTLSPACING" val="5"/>
   <p:tag name="OTLSHAPETHICKNESSTYPE" val="Regular"/>
+  <p:tag name="OTLMARKERSHAPE" val="OTL"/>
 </p:tagLst>
 </file>
 
 <file path=ppt/tags/tag158.xml><?xml version="1.0" encoding="utf-8"?>
 <p:tagLst xmlns:a="http://schemas.openxmlformats.org/drawingml/2006/main" xmlns:r="http://schemas.openxmlformats.org/officeDocument/2006/relationships" xmlns:p="http://schemas.openxmlformats.org/presentationml/2006/main">
-  <p:tag name="OTLMARKERSHAPE" val="OTL"/>
   <p:tag name="OTLDATEFORMATSTRING" val="MMM d"/>
   <p:tag name="OTLDATEFORMATSEPARATOR" val="/"/>
   <p:tag name="OTLDATEFORMATUSEUS" val="True"/>
@@ -16844,12 +16843,12 @@
   <p:tag name="OTLDURATIONFORMAT" val="day"/>
   <p:tag name="OTLSPACING" val="5"/>
   <p:tag name="OTLSHAPETHICKNESSTYPE" val="Regular"/>
+  <p:tag name="OTLMARKERSHAPE" val="OTL"/>
 </p:tagLst>
 </file>
 
 <file path=ppt/tags/tag159.xml><?xml version="1.0" encoding="utf-8"?>
 <p:tagLst xmlns:a="http://schemas.openxmlformats.org/drawingml/2006/main" xmlns:r="http://schemas.openxmlformats.org/officeDocument/2006/relationships" xmlns:p="http://schemas.openxmlformats.org/presentationml/2006/main">
-  <p:tag name="OTLMARKERSHAPE" val="OTL"/>
   <p:tag name="OTLDATEFORMATSTRING" val="MMM d"/>
   <p:tag name="OTLDATEFORMATSEPARATOR" val="/"/>
   <p:tag name="OTLDATEFORMATUSEUS" val="True"/>
@@ -16865,6 +16864,7 @@
   <p:tag name="OTLDURATIONFORMAT" val="day"/>
   <p:tag name="OTLSPACING" val="5"/>
   <p:tag name="OTLSHAPETHICKNESSTYPE" val="Regular"/>
+  <p:tag name="OTLMARKERSHAPE" val="OTL"/>
 </p:tagLst>
 </file>
 

</xml_diff>